<commit_message>
extended vignette secion on normality assumption checks
</commit_message>
<xml_diff>
--- a/vignettes/figures/decision_tree.pptx
+++ b/vignettes/figures/decision_tree.pptx
@@ -5,10 +5,11 @@
     <p:sldMasterId id="2147483648" r:id="rId1"/>
   </p:sldMasterIdLst>
   <p:notesMasterIdLst>
-    <p:notesMasterId r:id="rId3"/>
+    <p:notesMasterId r:id="rId4"/>
   </p:notesMasterIdLst>
   <p:sldIdLst>
     <p:sldId id="259" r:id="rId2"/>
+    <p:sldId id="260" r:id="rId3"/>
   </p:sldIdLst>
   <p:sldSz cx="12192000" cy="6858000"/>
   <p:notesSz cx="6858000" cy="9144000"/>
@@ -110,7 +111,7 @@
   <p:extLst>
     <p:ext uri="{EFAFB233-063F-42B5-8137-9DF3F51BA10A}">
       <p15:sldGuideLst xmlns:p15="http://schemas.microsoft.com/office/powerpoint/2012/main">
-        <p15:guide id="1" orient="horz" pos="2183" userDrawn="1">
+        <p15:guide id="1" orient="horz" pos="2205" userDrawn="1">
           <p15:clr>
             <a:srgbClr val="A4A3A4"/>
           </p15:clr>
@@ -285,7 +286,7 @@
           <a:p>
             <a:fld id="{0AECA108-3915-9043-8428-B4BE4472B821}" type="datetimeFigureOut">
               <a:rPr lang="de-DE" smtClean="0"/>
-              <a:t>25.05.25</a:t>
+              <a:t>29.05.25</a:t>
             </a:fld>
             <a:endParaRPr lang="de-DE"/>
           </a:p>
@@ -636,6 +637,114 @@
 </p:notes>
 </file>
 
+<file path=ppt/notesSlides/notesSlide2.xml><?xml version="1.0" encoding="utf-8"?>
+<p:notes xmlns:a="http://schemas.openxmlformats.org/drawingml/2006/main" xmlns:r="http://schemas.openxmlformats.org/officeDocument/2006/relationships" xmlns:p="http://schemas.openxmlformats.org/presentationml/2006/main">
+  <p:cSld>
+    <p:spTree>
+      <p:nvGrpSpPr>
+        <p:cNvPr id="1" name="">
+          <a:extLst>
+            <a:ext uri="{FF2B5EF4-FFF2-40B4-BE49-F238E27FC236}">
+              <a16:creationId xmlns:a16="http://schemas.microsoft.com/office/drawing/2014/main" id="{EB5E5CAC-38A9-4D47-4FB3-21F18E4FC1F6}"/>
+            </a:ext>
+          </a:extLst>
+        </p:cNvPr>
+        <p:cNvGrpSpPr/>
+        <p:nvPr/>
+      </p:nvGrpSpPr>
+      <p:grpSpPr>
+        <a:xfrm>
+          <a:off x="0" y="0"/>
+          <a:ext cx="0" cy="0"/>
+          <a:chOff x="0" y="0"/>
+          <a:chExt cx="0" cy="0"/>
+        </a:xfrm>
+      </p:grpSpPr>
+      <p:sp>
+        <p:nvSpPr>
+          <p:cNvPr id="2" name="Folienbildplatzhalter 1">
+            <a:extLst>
+              <a:ext uri="{FF2B5EF4-FFF2-40B4-BE49-F238E27FC236}">
+                <a16:creationId xmlns:a16="http://schemas.microsoft.com/office/drawing/2014/main" id="{D11C89AC-1E0E-96D4-378E-71B115BFCDF3}"/>
+              </a:ext>
+            </a:extLst>
+          </p:cNvPr>
+          <p:cNvSpPr>
+            <a:spLocks noGrp="1" noRot="1" noChangeAspect="1"/>
+          </p:cNvSpPr>
+          <p:nvPr>
+            <p:ph type="sldImg"/>
+          </p:nvPr>
+        </p:nvSpPr>
+        <p:spPr/>
+      </p:sp>
+      <p:sp>
+        <p:nvSpPr>
+          <p:cNvPr id="3" name="Notizenplatzhalter 2">
+            <a:extLst>
+              <a:ext uri="{FF2B5EF4-FFF2-40B4-BE49-F238E27FC236}">
+                <a16:creationId xmlns:a16="http://schemas.microsoft.com/office/drawing/2014/main" id="{DCCE788D-7C9F-EA1C-69B3-A54098FA02DD}"/>
+              </a:ext>
+            </a:extLst>
+          </p:cNvPr>
+          <p:cNvSpPr>
+            <a:spLocks noGrp="1"/>
+          </p:cNvSpPr>
+          <p:nvPr>
+            <p:ph type="body" idx="1"/>
+          </p:nvPr>
+        </p:nvSpPr>
+        <p:spPr/>
+        <p:txBody>
+          <a:bodyPr/>
+          <a:lstStyle/>
+          <a:p>
+            <a:endParaRPr lang="de-DE" dirty="0"/>
+          </a:p>
+        </p:txBody>
+      </p:sp>
+      <p:sp>
+        <p:nvSpPr>
+          <p:cNvPr id="4" name="Foliennummernplatzhalter 3">
+            <a:extLst>
+              <a:ext uri="{FF2B5EF4-FFF2-40B4-BE49-F238E27FC236}">
+                <a16:creationId xmlns:a16="http://schemas.microsoft.com/office/drawing/2014/main" id="{FB08C572-E14B-6AF1-3E30-32DA027BA7C3}"/>
+              </a:ext>
+            </a:extLst>
+          </p:cNvPr>
+          <p:cNvSpPr>
+            <a:spLocks noGrp="1"/>
+          </p:cNvSpPr>
+          <p:nvPr>
+            <p:ph type="sldNum" sz="quarter" idx="5"/>
+          </p:nvPr>
+        </p:nvSpPr>
+        <p:spPr/>
+        <p:txBody>
+          <a:bodyPr/>
+          <a:lstStyle/>
+          <a:p>
+            <a:fld id="{67B21A6D-3249-074E-BBD6-BCFA95367850}" type="slidenum">
+              <a:rPr lang="de-DE" smtClean="0"/>
+              <a:t>2</a:t>
+            </a:fld>
+            <a:endParaRPr lang="de-DE"/>
+          </a:p>
+        </p:txBody>
+      </p:sp>
+    </p:spTree>
+    <p:extLst>
+      <p:ext uri="{BB962C8B-B14F-4D97-AF65-F5344CB8AC3E}">
+        <p14:creationId xmlns:p14="http://schemas.microsoft.com/office/powerpoint/2010/main" val="4059778080"/>
+      </p:ext>
+    </p:extLst>
+  </p:cSld>
+  <p:clrMapOvr>
+    <a:masterClrMapping/>
+  </p:clrMapOvr>
+</p:notes>
+</file>
+
 <file path=ppt/slideLayouts/slideLayout1.xml><?xml version="1.0" encoding="utf-8"?>
 <p:sldLayout xmlns:a="http://schemas.openxmlformats.org/drawingml/2006/main" xmlns:r="http://schemas.openxmlformats.org/officeDocument/2006/relationships" xmlns:p="http://schemas.openxmlformats.org/presentationml/2006/main" type="title" preserve="1">
   <p:cSld name="Titelfolie">
@@ -783,7 +892,7 @@
           <a:p>
             <a:fld id="{43497422-92ED-3D47-BF28-17000E80E497}" type="datetimeFigureOut">
               <a:rPr lang="de-DE" smtClean="0"/>
-              <a:t>25.05.25</a:t>
+              <a:t>29.05.25</a:t>
             </a:fld>
             <a:endParaRPr lang="de-DE"/>
           </a:p>
@@ -981,7 +1090,7 @@
           <a:p>
             <a:fld id="{43497422-92ED-3D47-BF28-17000E80E497}" type="datetimeFigureOut">
               <a:rPr lang="de-DE" smtClean="0"/>
-              <a:t>25.05.25</a:t>
+              <a:t>29.05.25</a:t>
             </a:fld>
             <a:endParaRPr lang="de-DE"/>
           </a:p>
@@ -1189,7 +1298,7 @@
           <a:p>
             <a:fld id="{43497422-92ED-3D47-BF28-17000E80E497}" type="datetimeFigureOut">
               <a:rPr lang="de-DE" smtClean="0"/>
-              <a:t>25.05.25</a:t>
+              <a:t>29.05.25</a:t>
             </a:fld>
             <a:endParaRPr lang="de-DE"/>
           </a:p>
@@ -1387,7 +1496,7 @@
           <a:p>
             <a:fld id="{43497422-92ED-3D47-BF28-17000E80E497}" type="datetimeFigureOut">
               <a:rPr lang="de-DE" smtClean="0"/>
-              <a:t>25.05.25</a:t>
+              <a:t>29.05.25</a:t>
             </a:fld>
             <a:endParaRPr lang="de-DE"/>
           </a:p>
@@ -1662,7 +1771,7 @@
           <a:p>
             <a:fld id="{43497422-92ED-3D47-BF28-17000E80E497}" type="datetimeFigureOut">
               <a:rPr lang="de-DE" smtClean="0"/>
-              <a:t>25.05.25</a:t>
+              <a:t>29.05.25</a:t>
             </a:fld>
             <a:endParaRPr lang="de-DE"/>
           </a:p>
@@ -1927,7 +2036,7 @@
           <a:p>
             <a:fld id="{43497422-92ED-3D47-BF28-17000E80E497}" type="datetimeFigureOut">
               <a:rPr lang="de-DE" smtClean="0"/>
-              <a:t>25.05.25</a:t>
+              <a:t>29.05.25</a:t>
             </a:fld>
             <a:endParaRPr lang="de-DE"/>
           </a:p>
@@ -2339,7 +2448,7 @@
           <a:p>
             <a:fld id="{43497422-92ED-3D47-BF28-17000E80E497}" type="datetimeFigureOut">
               <a:rPr lang="de-DE" smtClean="0"/>
-              <a:t>25.05.25</a:t>
+              <a:t>29.05.25</a:t>
             </a:fld>
             <a:endParaRPr lang="de-DE"/>
           </a:p>
@@ -2480,7 +2589,7 @@
           <a:p>
             <a:fld id="{43497422-92ED-3D47-BF28-17000E80E497}" type="datetimeFigureOut">
               <a:rPr lang="de-DE" smtClean="0"/>
-              <a:t>25.05.25</a:t>
+              <a:t>29.05.25</a:t>
             </a:fld>
             <a:endParaRPr lang="de-DE"/>
           </a:p>
@@ -2593,7 +2702,7 @@
           <a:p>
             <a:fld id="{43497422-92ED-3D47-BF28-17000E80E497}" type="datetimeFigureOut">
               <a:rPr lang="de-DE" smtClean="0"/>
-              <a:t>25.05.25</a:t>
+              <a:t>29.05.25</a:t>
             </a:fld>
             <a:endParaRPr lang="de-DE"/>
           </a:p>
@@ -2904,7 +3013,7 @@
           <a:p>
             <a:fld id="{43497422-92ED-3D47-BF28-17000E80E497}" type="datetimeFigureOut">
               <a:rPr lang="de-DE" smtClean="0"/>
-              <a:t>25.05.25</a:t>
+              <a:t>29.05.25</a:t>
             </a:fld>
             <a:endParaRPr lang="de-DE"/>
           </a:p>
@@ -3192,7 +3301,7 @@
           <a:p>
             <a:fld id="{43497422-92ED-3D47-BF28-17000E80E497}" type="datetimeFigureOut">
               <a:rPr lang="de-DE" smtClean="0"/>
-              <a:t>25.05.25</a:t>
+              <a:t>29.05.25</a:t>
             </a:fld>
             <a:endParaRPr lang="de-DE"/>
           </a:p>
@@ -3433,7 +3542,7 @@
           <a:p>
             <a:fld id="{43497422-92ED-3D47-BF28-17000E80E497}" type="datetimeFigureOut">
               <a:rPr lang="de-DE" smtClean="0"/>
-              <a:t>25.05.25</a:t>
+              <a:t>29.05.25</a:t>
             </a:fld>
             <a:endParaRPr lang="de-DE"/>
           </a:p>
@@ -3850,8 +3959,8 @@
           <a:chExt cx="0" cy="0"/>
         </a:xfrm>
       </p:grpSpPr>
-      <mc:AlternateContent xmlns:mc="http://schemas.openxmlformats.org/markup-compatibility/2006">
-        <mc:Choice xmlns:a14="http://schemas.microsoft.com/office/drawing/2010/main" Requires="a14">
+      <mc:AlternateContent xmlns:mc="http://schemas.openxmlformats.org/markup-compatibility/2006" xmlns:a14="http://schemas.microsoft.com/office/drawing/2010/main">
+        <mc:Choice Requires="a14">
           <p:sp>
             <p:nvSpPr>
               <p:cNvPr id="7" name="Textfeld 6">
@@ -4069,7 +4178,7 @@
             </p:txBody>
           </p:sp>
         </mc:Choice>
-        <mc:Fallback>
+        <mc:Fallback xmlns="">
           <p:sp>
             <p:nvSpPr>
               <p:cNvPr id="7" name="Textfeld 6">
@@ -4121,8 +4230,8 @@
           </p:sp>
         </mc:Fallback>
       </mc:AlternateContent>
-      <mc:AlternateContent xmlns:mc="http://schemas.openxmlformats.org/markup-compatibility/2006">
-        <mc:Choice xmlns:a14="http://schemas.microsoft.com/office/drawing/2010/main" Requires="a14">
+      <mc:AlternateContent xmlns:mc="http://schemas.openxmlformats.org/markup-compatibility/2006" xmlns:a14="http://schemas.microsoft.com/office/drawing/2010/main">
+        <mc:Choice Requires="a14">
           <p:sp>
             <p:nvSpPr>
               <p:cNvPr id="8" name="Textfeld 7">
@@ -4287,7 +4396,7 @@
             </p:txBody>
           </p:sp>
         </mc:Choice>
-        <mc:Fallback>
+        <mc:Fallback xmlns="">
           <p:sp>
             <p:nvSpPr>
               <p:cNvPr id="8" name="Textfeld 7">
@@ -4337,8 +4446,8 @@
           </p:sp>
         </mc:Fallback>
       </mc:AlternateContent>
-      <mc:AlternateContent xmlns:mc="http://schemas.openxmlformats.org/markup-compatibility/2006">
-        <mc:Choice xmlns:a14="http://schemas.microsoft.com/office/drawing/2010/main" Requires="a14">
+      <mc:AlternateContent xmlns:mc="http://schemas.openxmlformats.org/markup-compatibility/2006" xmlns:a14="http://schemas.microsoft.com/office/drawing/2010/main">
+        <mc:Choice Requires="a14">
           <p:sp>
             <p:nvSpPr>
               <p:cNvPr id="9" name="Textfeld 8">
@@ -4422,7 +4531,7 @@
             </p:txBody>
           </p:sp>
         </mc:Choice>
-        <mc:Fallback>
+        <mc:Fallback xmlns="">
           <p:sp>
             <p:nvSpPr>
               <p:cNvPr id="9" name="Textfeld 8">
@@ -8053,7 +8162,7 @@
           </a:xfrm>
           <a:prstGeom prst="bentConnector3">
             <a:avLst>
-              <a:gd name="adj1" fmla="val 58890"/>
+              <a:gd name="adj1" fmla="val 100108"/>
             </a:avLst>
           </a:prstGeom>
           <a:ln>
@@ -8449,8 +8558,8 @@
           </a:p>
         </p:txBody>
       </p:sp>
-      <mc:AlternateContent xmlns:mc="http://schemas.openxmlformats.org/markup-compatibility/2006">
-        <mc:Choice xmlns:a14="http://schemas.microsoft.com/office/drawing/2010/main" Requires="a14">
+      <mc:AlternateContent xmlns:mc="http://schemas.openxmlformats.org/markup-compatibility/2006" xmlns:a14="http://schemas.microsoft.com/office/drawing/2010/main">
+        <mc:Choice Requires="a14">
           <p:sp>
             <p:nvSpPr>
               <p:cNvPr id="467" name="Textfeld 466">
@@ -8539,7 +8648,7 @@
             </p:txBody>
           </p:sp>
         </mc:Choice>
-        <mc:Fallback>
+        <mc:Fallback xmlns="">
           <p:sp>
             <p:nvSpPr>
               <p:cNvPr id="467" name="Textfeld 466">
@@ -8589,8 +8698,8 @@
           </p:sp>
         </mc:Fallback>
       </mc:AlternateContent>
-      <mc:AlternateContent xmlns:mc="http://schemas.openxmlformats.org/markup-compatibility/2006">
-        <mc:Choice xmlns:a14="http://schemas.microsoft.com/office/drawing/2010/main" Requires="a14">
+      <mc:AlternateContent xmlns:mc="http://schemas.openxmlformats.org/markup-compatibility/2006" xmlns:a14="http://schemas.microsoft.com/office/drawing/2010/main">
+        <mc:Choice Requires="a14">
           <p:sp>
             <p:nvSpPr>
               <p:cNvPr id="468" name="Textfeld 467">
@@ -8682,7 +8791,7 @@
             </p:txBody>
           </p:sp>
         </mc:Choice>
-        <mc:Fallback>
+        <mc:Fallback xmlns="">
           <p:sp>
             <p:nvSpPr>
               <p:cNvPr id="468" name="Textfeld 467">
@@ -9638,6 +9747,4629 @@
 </p:sld>
 </file>
 
+<file path=ppt/slides/slide2.xml><?xml version="1.0" encoding="utf-8"?>
+<p:sld xmlns:a="http://schemas.openxmlformats.org/drawingml/2006/main" xmlns:r="http://schemas.openxmlformats.org/officeDocument/2006/relationships" xmlns:p="http://schemas.openxmlformats.org/presentationml/2006/main">
+  <p:cSld>
+    <p:spTree>
+      <p:nvGrpSpPr>
+        <p:cNvPr id="1" name="">
+          <a:extLst>
+            <a:ext uri="{FF2B5EF4-FFF2-40B4-BE49-F238E27FC236}">
+              <a16:creationId xmlns:a16="http://schemas.microsoft.com/office/drawing/2014/main" id="{890570BE-1640-9F73-D788-8A46DD31514A}"/>
+            </a:ext>
+          </a:extLst>
+        </p:cNvPr>
+        <p:cNvGrpSpPr/>
+        <p:nvPr/>
+      </p:nvGrpSpPr>
+      <p:grpSpPr>
+        <a:xfrm>
+          <a:off x="0" y="0"/>
+          <a:ext cx="0" cy="0"/>
+          <a:chOff x="0" y="0"/>
+          <a:chExt cx="0" cy="0"/>
+        </a:xfrm>
+      </p:grpSpPr>
+      <p:sp>
+        <p:nvSpPr>
+          <p:cNvPr id="18" name="Textfeld 17">
+            <a:extLst>
+              <a:ext uri="{FF2B5EF4-FFF2-40B4-BE49-F238E27FC236}">
+                <a16:creationId xmlns:a16="http://schemas.microsoft.com/office/drawing/2014/main" id="{D34CBB56-14B3-2DA6-2C01-C65D358BF1B9}"/>
+              </a:ext>
+            </a:extLst>
+          </p:cNvPr>
+          <p:cNvSpPr txBox="1"/>
+          <p:nvPr/>
+        </p:nvSpPr>
+        <p:spPr>
+          <a:xfrm>
+            <a:off x="262794" y="2202514"/>
+            <a:ext cx="2959748" cy="276999"/>
+          </a:xfrm>
+          <a:prstGeom prst="rect">
+            <a:avLst/>
+          </a:prstGeom>
+          <a:solidFill>
+            <a:schemeClr val="accent2">
+              <a:alpha val="19906"/>
+            </a:schemeClr>
+          </a:solidFill>
+          <a:ln w="12700">
+            <a:solidFill>
+              <a:schemeClr val="tx1"/>
+            </a:solidFill>
+          </a:ln>
+        </p:spPr>
+        <p:txBody>
+          <a:bodyPr wrap="square">
+            <a:spAutoFit/>
+          </a:bodyPr>
+          <a:lstStyle/>
+          <a:p>
+            <a:pPr algn="ctr"/>
+            <a:r>
+              <a:rPr lang="en-GB" sz="1200" noProof="0" dirty="0" err="1">
+                <a:latin typeface="Courier New" panose="02070309020205020404" pitchFamily="49" charset="0"/>
+                <a:ea typeface="Cambria Math" panose="02040503050406030204" pitchFamily="18" charset="0"/>
+                <a:cs typeface="Courier New" panose="02070309020205020404" pitchFamily="49" charset="0"/>
+              </a:rPr>
+              <a:t>shapiro.test</a:t>
+            </a:r>
+            <a:r>
+              <a:rPr lang="en-GB" sz="1200" noProof="0" dirty="0">
+                <a:latin typeface="Courier New" panose="02070309020205020404" pitchFamily="49" charset="0"/>
+                <a:ea typeface="Cambria Math" panose="02040503050406030204" pitchFamily="18" charset="0"/>
+                <a:cs typeface="Courier New" panose="02070309020205020404" pitchFamily="49" charset="0"/>
+              </a:rPr>
+              <a:t>()</a:t>
+            </a:r>
+            <a:r>
+              <a:rPr lang="en-GB" sz="1200" noProof="0" dirty="0">
+                <a:latin typeface="Calibri" panose="020F0502020204030204" pitchFamily="34" charset="0"/>
+                <a:ea typeface="Cambria Math" panose="02040503050406030204" pitchFamily="18" charset="0"/>
+                <a:cs typeface="Calibri" panose="020F0502020204030204" pitchFamily="34" charset="0"/>
+              </a:rPr>
+              <a:t> for both levels</a:t>
+            </a:r>
+          </a:p>
+        </p:txBody>
+      </p:sp>
+      <p:sp>
+        <p:nvSpPr>
+          <p:cNvPr id="160" name="Textfeld 159">
+            <a:extLst>
+              <a:ext uri="{FF2B5EF4-FFF2-40B4-BE49-F238E27FC236}">
+                <a16:creationId xmlns:a16="http://schemas.microsoft.com/office/drawing/2014/main" id="{279A448E-3101-CAB7-D021-1115A77D135F}"/>
+              </a:ext>
+            </a:extLst>
+          </p:cNvPr>
+          <p:cNvSpPr txBox="1"/>
+          <p:nvPr/>
+        </p:nvSpPr>
+        <p:spPr>
+          <a:xfrm>
+            <a:off x="10508890" y="2202514"/>
+            <a:ext cx="1618428" cy="276999"/>
+          </a:xfrm>
+          <a:prstGeom prst="rect">
+            <a:avLst/>
+          </a:prstGeom>
+          <a:solidFill>
+            <a:schemeClr val="accent2">
+              <a:lumMod val="20000"/>
+              <a:lumOff val="80000"/>
+            </a:schemeClr>
+          </a:solidFill>
+          <a:ln w="12700">
+            <a:solidFill>
+              <a:schemeClr val="accent1">
+                <a:lumMod val="20000"/>
+                <a:lumOff val="80000"/>
+              </a:schemeClr>
+            </a:solidFill>
+          </a:ln>
+        </p:spPr>
+        <p:txBody>
+          <a:bodyPr wrap="square">
+            <a:spAutoFit/>
+          </a:bodyPr>
+          <a:lstStyle>
+            <a:defPPr>
+              <a:defRPr lang="de-DE"/>
+            </a:defPPr>
+            <a:lvl1pPr algn="ctr">
+              <a:defRPr sz="1200"/>
+            </a:lvl1pPr>
+          </a:lstStyle>
+          <a:p>
+            <a:r>
+              <a:rPr lang="en-GB" noProof="0" dirty="0">
+                <a:latin typeface="Calibri" panose="020F0502020204030204" pitchFamily="34" charset="0"/>
+                <a:ea typeface="Cambria Math" panose="02040503050406030204" pitchFamily="18" charset="0"/>
+                <a:cs typeface="Calibri" panose="020F0502020204030204" pitchFamily="34" charset="0"/>
+              </a:rPr>
+              <a:t>Check normality</a:t>
+            </a:r>
+          </a:p>
+        </p:txBody>
+      </p:sp>
+      <p:sp>
+        <p:nvSpPr>
+          <p:cNvPr id="6" name="Textfeld 5">
+            <a:extLst>
+              <a:ext uri="{FF2B5EF4-FFF2-40B4-BE49-F238E27FC236}">
+                <a16:creationId xmlns:a16="http://schemas.microsoft.com/office/drawing/2014/main" id="{56801521-3031-9E27-A997-448C5AD6BB77}"/>
+              </a:ext>
+            </a:extLst>
+          </p:cNvPr>
+          <p:cNvSpPr txBox="1"/>
+          <p:nvPr/>
+        </p:nvSpPr>
+        <p:spPr>
+          <a:xfrm>
+            <a:off x="5037088" y="2202514"/>
+            <a:ext cx="5300726" cy="276999"/>
+          </a:xfrm>
+          <a:prstGeom prst="rect">
+            <a:avLst/>
+          </a:prstGeom>
+          <a:solidFill>
+            <a:schemeClr val="accent2">
+              <a:alpha val="19906"/>
+            </a:schemeClr>
+          </a:solidFill>
+          <a:ln w="12700">
+            <a:solidFill>
+              <a:schemeClr val="tx1"/>
+            </a:solidFill>
+          </a:ln>
+        </p:spPr>
+        <p:txBody>
+          <a:bodyPr wrap="square">
+            <a:spAutoFit/>
+          </a:bodyPr>
+          <a:lstStyle/>
+          <a:p>
+            <a:pPr algn="ctr"/>
+            <a:r>
+              <a:rPr lang="en-GB" sz="1200" noProof="0" dirty="0" err="1">
+                <a:latin typeface="Courier New" panose="02070309020205020404" pitchFamily="49" charset="0"/>
+                <a:ea typeface="Cambria Math" panose="02040503050406030204" pitchFamily="18" charset="0"/>
+                <a:cs typeface="Courier New" panose="02070309020205020404" pitchFamily="49" charset="0"/>
+              </a:rPr>
+              <a:t>shapiro.test</a:t>
+            </a:r>
+            <a:r>
+              <a:rPr lang="en-GB" sz="1200" noProof="0" dirty="0">
+                <a:latin typeface="Courier New" panose="02070309020205020404" pitchFamily="49" charset="0"/>
+                <a:ea typeface="Cambria Math" panose="02040503050406030204" pitchFamily="18" charset="0"/>
+                <a:cs typeface="Courier New" panose="02070309020205020404" pitchFamily="49" charset="0"/>
+              </a:rPr>
+              <a:t>()</a:t>
+            </a:r>
+            <a:r>
+              <a:rPr lang="en-GB" sz="1200" noProof="0" dirty="0">
+                <a:latin typeface="Calibri" panose="020F0502020204030204" pitchFamily="34" charset="0"/>
+                <a:ea typeface="Cambria Math" panose="02040503050406030204" pitchFamily="18" charset="0"/>
+                <a:cs typeface="Calibri" panose="020F0502020204030204" pitchFamily="34" charset="0"/>
+              </a:rPr>
+              <a:t> </a:t>
+            </a:r>
+            <a:r>
+              <a:rPr lang="en-GB" sz="1200" dirty="0">
+                <a:latin typeface="Calibri" panose="020F0502020204030204" pitchFamily="34" charset="0"/>
+                <a:ea typeface="Cambria Math" panose="02040503050406030204" pitchFamily="18" charset="0"/>
+                <a:cs typeface="Calibri" panose="020F0502020204030204" pitchFamily="34" charset="0"/>
+              </a:rPr>
+              <a:t>of residuals</a:t>
+            </a:r>
+            <a:endParaRPr lang="en-GB" sz="1200" noProof="0" dirty="0">
+              <a:latin typeface="Calibri" panose="020F0502020204030204" pitchFamily="34" charset="0"/>
+              <a:ea typeface="Cambria Math" panose="02040503050406030204" pitchFamily="18" charset="0"/>
+              <a:cs typeface="Calibri" panose="020F0502020204030204" pitchFamily="34" charset="0"/>
+            </a:endParaRPr>
+          </a:p>
+        </p:txBody>
+      </p:sp>
+      <mc:AlternateContent xmlns:mc="http://schemas.openxmlformats.org/markup-compatibility/2006" xmlns:a14="http://schemas.microsoft.com/office/drawing/2010/main">
+        <mc:Choice Requires="a14">
+          <p:sp>
+            <p:nvSpPr>
+              <p:cNvPr id="7" name="Textfeld 6">
+                <a:extLst>
+                  <a:ext uri="{FF2B5EF4-FFF2-40B4-BE49-F238E27FC236}">
+                    <a16:creationId xmlns:a16="http://schemas.microsoft.com/office/drawing/2014/main" id="{AC04AABE-BA22-DA34-30B9-149C93C893D7}"/>
+                  </a:ext>
+                </a:extLst>
+              </p:cNvPr>
+              <p:cNvSpPr txBox="1"/>
+              <p:nvPr/>
+            </p:nvSpPr>
+            <p:spPr>
+              <a:xfrm>
+                <a:off x="3982498" y="268315"/>
+                <a:ext cx="4305145" cy="461665"/>
+              </a:xfrm>
+              <a:prstGeom prst="rect">
+                <a:avLst/>
+              </a:prstGeom>
+              <a:noFill/>
+              <a:ln w="6350">
+                <a:solidFill>
+                  <a:schemeClr val="bg1">
+                    <a:lumMod val="85000"/>
+                  </a:schemeClr>
+                </a:solidFill>
+              </a:ln>
+            </p:spPr>
+            <p:txBody>
+              <a:bodyPr wrap="square">
+                <a:spAutoFit/>
+              </a:bodyPr>
+              <a:lstStyle/>
+              <a:p>
+                <a:pPr marL="171450" indent="-171450">
+                  <a:buFont typeface="Arial" panose="020B0604020202020204" pitchFamily="34" charset="0"/>
+                  <a:buChar char="•"/>
+                </a:pPr>
+                <a:r>
+                  <a:rPr lang="en-GB" sz="1200" dirty="0">
+                    <a:latin typeface="Calibri" panose="020F0502020204030204" pitchFamily="34" charset="0"/>
+                    <a:ea typeface="Cambria Math" panose="02040503050406030204" pitchFamily="18" charset="0"/>
+                    <a:cs typeface="Calibri" panose="020F0502020204030204" pitchFamily="34" charset="0"/>
+                  </a:rPr>
+                  <a:t>C</a:t>
+                </a:r>
+                <a:r>
+                  <a:rPr lang="en-GB" sz="1200" noProof="0" dirty="0" err="1">
+                    <a:latin typeface="Calibri" panose="020F0502020204030204" pitchFamily="34" charset="0"/>
+                    <a:ea typeface="Cambria Math" panose="02040503050406030204" pitchFamily="18" charset="0"/>
+                    <a:cs typeface="Calibri" panose="020F0502020204030204" pitchFamily="34" charset="0"/>
+                  </a:rPr>
+                  <a:t>ategorical</a:t>
+                </a:r>
+                <a:r>
+                  <a:rPr lang="en-GB" sz="1200" noProof="0" dirty="0">
+                    <a:latin typeface="Calibri" panose="020F0502020204030204" pitchFamily="34" charset="0"/>
+                    <a:ea typeface="Cambria Math" panose="02040503050406030204" pitchFamily="18" charset="0"/>
+                    <a:cs typeface="Calibri" panose="020F0502020204030204" pitchFamily="34" charset="0"/>
+                  </a:rPr>
+                  <a:t> predictor of </a:t>
+                </a:r>
+                <a:r>
+                  <a:rPr lang="en-GB" sz="1200" noProof="0" dirty="0">
+                    <a:latin typeface="Courier New" panose="02070309020205020404" pitchFamily="49" charset="0"/>
+                    <a:ea typeface="Cambria Math" panose="02040503050406030204" pitchFamily="18" charset="0"/>
+                    <a:cs typeface="Courier New" panose="02070309020205020404" pitchFamily="49" charset="0"/>
+                  </a:rPr>
+                  <a:t>class </a:t>
+                </a:r>
+                <a:r>
+                  <a:rPr lang="en-GB" sz="1200" dirty="0">
+                    <a:latin typeface="Calibri" panose="020F0502020204030204" pitchFamily="34" charset="0"/>
+                    <a:ea typeface="Cambria Math" panose="02040503050406030204" pitchFamily="18" charset="0"/>
+                    <a:cs typeface="Calibri" panose="020F0502020204030204" pitchFamily="34" charset="0"/>
+                  </a:rPr>
+                  <a:t>“</a:t>
+                </a:r>
+                <a:r>
+                  <a:rPr lang="en-GB" sz="1200" dirty="0">
+                    <a:latin typeface="Courier New" panose="02070309020205020404" pitchFamily="49" charset="0"/>
+                    <a:ea typeface="Cambria Math" panose="02040503050406030204" pitchFamily="18" charset="0"/>
+                    <a:cs typeface="Courier New" panose="02070309020205020404" pitchFamily="49" charset="0"/>
+                  </a:rPr>
+                  <a:t>factor</a:t>
+                </a:r>
+                <a:r>
+                  <a:rPr lang="en-GB" sz="1200" noProof="0" dirty="0">
+                    <a:latin typeface="Calibri" panose="020F0502020204030204" pitchFamily="34" charset="0"/>
+                    <a:ea typeface="Cambria Math" panose="02040503050406030204" pitchFamily="18" charset="0"/>
+                    <a:cs typeface="Calibri" panose="020F0502020204030204" pitchFamily="34" charset="0"/>
+                  </a:rPr>
+                  <a:t>“  with </a:t>
+                </a:r>
+                <a14:m>
+                  <m:oMath xmlns:m="http://schemas.openxmlformats.org/officeDocument/2006/math">
+                    <m:r>
+                      <a:rPr lang="en-GB" sz="1200" i="1" noProof="0" smtClean="0">
+                        <a:latin typeface="Cambria Math" panose="02040503050406030204" pitchFamily="18" charset="0"/>
+                        <a:ea typeface="Cambria Math" panose="02040503050406030204" pitchFamily="18" charset="0"/>
+                      </a:rPr>
+                      <m:t>𝑁</m:t>
+                    </m:r>
+                  </m:oMath>
+                </a14:m>
+                <a:r>
+                  <a:rPr lang="en-GB" sz="1200" noProof="0" dirty="0">
+                    <a:latin typeface="Calibri" panose="020F0502020204030204" pitchFamily="34" charset="0"/>
+                    <a:ea typeface="Cambria Math" panose="02040503050406030204" pitchFamily="18" charset="0"/>
+                    <a:cs typeface="Calibri" panose="020F0502020204030204" pitchFamily="34" charset="0"/>
+                  </a:rPr>
+                  <a:t> levels</a:t>
+                </a:r>
+              </a:p>
+              <a:p>
+                <a:pPr marL="171450" indent="-171450">
+                  <a:buFont typeface="Arial" panose="020B0604020202020204" pitchFamily="34" charset="0"/>
+                  <a:buChar char="•"/>
+                </a:pPr>
+                <a:r>
+                  <a:rPr lang="en-GB" sz="1200" dirty="0">
+                    <a:latin typeface="Calibri" panose="020F0502020204030204" pitchFamily="34" charset="0"/>
+                    <a:ea typeface="Cambria Math" panose="02040503050406030204" pitchFamily="18" charset="0"/>
+                    <a:cs typeface="Calibri" panose="020F0502020204030204" pitchFamily="34" charset="0"/>
+                  </a:rPr>
+                  <a:t>N</a:t>
+                </a:r>
+                <a:r>
+                  <a:rPr lang="en-GB" sz="1200" noProof="0" dirty="0" err="1">
+                    <a:latin typeface="Calibri" panose="020F0502020204030204" pitchFamily="34" charset="0"/>
+                    <a:ea typeface="Cambria Math" panose="02040503050406030204" pitchFamily="18" charset="0"/>
+                    <a:cs typeface="Calibri" panose="020F0502020204030204" pitchFamily="34" charset="0"/>
+                  </a:rPr>
+                  <a:t>umeric</a:t>
+                </a:r>
+                <a:r>
+                  <a:rPr lang="en-GB" sz="1200" noProof="0" dirty="0">
+                    <a:latin typeface="Calibri" panose="020F0502020204030204" pitchFamily="34" charset="0"/>
+                    <a:ea typeface="Cambria Math" panose="02040503050406030204" pitchFamily="18" charset="0"/>
+                    <a:cs typeface="Calibri" panose="020F0502020204030204" pitchFamily="34" charset="0"/>
+                  </a:rPr>
+                  <a:t> response of </a:t>
+                </a:r>
+                <a:r>
+                  <a:rPr lang="en-GB" sz="1200" noProof="0" dirty="0">
+                    <a:latin typeface="Courier New" panose="02070309020205020404" pitchFamily="49" charset="0"/>
+                    <a:ea typeface="Cambria Math" panose="02040503050406030204" pitchFamily="18" charset="0"/>
+                    <a:cs typeface="Courier New" panose="02070309020205020404" pitchFamily="49" charset="0"/>
+                  </a:rPr>
+                  <a:t>class </a:t>
+                </a:r>
+                <a:r>
+                  <a:rPr lang="en-GB" sz="1200" dirty="0">
+                    <a:latin typeface="Calibri" panose="020F0502020204030204" pitchFamily="34" charset="0"/>
+                    <a:ea typeface="Cambria Math" panose="02040503050406030204" pitchFamily="18" charset="0"/>
+                    <a:cs typeface="Calibri" panose="020F0502020204030204" pitchFamily="34" charset="0"/>
+                  </a:rPr>
+                  <a:t>“</a:t>
+                </a:r>
+                <a:r>
+                  <a:rPr lang="en-GB" sz="1200" noProof="0" dirty="0">
+                    <a:latin typeface="Courier New" panose="02070309020205020404" pitchFamily="49" charset="0"/>
+                    <a:ea typeface="Cambria Math" panose="02040503050406030204" pitchFamily="18" charset="0"/>
+                    <a:cs typeface="Courier New" panose="02070309020205020404" pitchFamily="49" charset="0"/>
+                  </a:rPr>
+                  <a:t>numeric</a:t>
+                </a:r>
+                <a:r>
+                  <a:rPr lang="en-GB" sz="1200" dirty="0">
+                    <a:latin typeface="Calibri" panose="020F0502020204030204" pitchFamily="34" charset="0"/>
+                    <a:ea typeface="Cambria Math" panose="02040503050406030204" pitchFamily="18" charset="0"/>
+                    <a:cs typeface="Calibri" panose="020F0502020204030204" pitchFamily="34" charset="0"/>
+                  </a:rPr>
+                  <a:t>”</a:t>
+                </a:r>
+                <a:r>
+                  <a:rPr lang="en-GB" sz="1200" dirty="0">
+                    <a:latin typeface="Courier New" panose="02070309020205020404" pitchFamily="49" charset="0"/>
+                    <a:ea typeface="Cambria Math" panose="02040503050406030204" pitchFamily="18" charset="0"/>
+                    <a:cs typeface="Courier New" panose="02070309020205020404" pitchFamily="49" charset="0"/>
+                  </a:rPr>
+                  <a:t> </a:t>
+                </a:r>
+                <a:r>
+                  <a:rPr lang="en-GB" sz="1200" noProof="0" dirty="0">
+                    <a:latin typeface="Calibri" panose="020F0502020204030204" pitchFamily="34" charset="0"/>
+                    <a:ea typeface="Cambria Math" panose="02040503050406030204" pitchFamily="18" charset="0"/>
+                    <a:cs typeface="Calibri" panose="020F0502020204030204" pitchFamily="34" charset="0"/>
+                  </a:rPr>
+                  <a:t>or “</a:t>
+                </a:r>
+                <a:r>
+                  <a:rPr lang="en-GB" sz="1200" noProof="0" dirty="0">
+                    <a:latin typeface="Courier New" panose="02070309020205020404" pitchFamily="49" charset="0"/>
+                    <a:ea typeface="Cambria Math" panose="02040503050406030204" pitchFamily="18" charset="0"/>
+                    <a:cs typeface="Courier New" panose="02070309020205020404" pitchFamily="49" charset="0"/>
+                  </a:rPr>
+                  <a:t>integer</a:t>
+                </a:r>
+                <a:r>
+                  <a:rPr lang="en-GB" sz="1200" dirty="0">
+                    <a:latin typeface="Calibri" panose="020F0502020204030204" pitchFamily="34" charset="0"/>
+                    <a:ea typeface="Cambria Math" panose="02040503050406030204" pitchFamily="18" charset="0"/>
+                    <a:cs typeface="Calibri" panose="020F0502020204030204" pitchFamily="34" charset="0"/>
+                  </a:rPr>
+                  <a:t>”</a:t>
+                </a:r>
+                <a:endParaRPr lang="en-GB" sz="1200" noProof="0" dirty="0">
+                  <a:latin typeface="Calibri" panose="020F0502020204030204" pitchFamily="34" charset="0"/>
+                  <a:ea typeface="Cambria Math" panose="02040503050406030204" pitchFamily="18" charset="0"/>
+                  <a:cs typeface="Calibri" panose="020F0502020204030204" pitchFamily="34" charset="0"/>
+                </a:endParaRPr>
+              </a:p>
+            </p:txBody>
+          </p:sp>
+        </mc:Choice>
+        <mc:Fallback xmlns="">
+          <p:sp>
+            <p:nvSpPr>
+              <p:cNvPr id="7" name="Textfeld 6">
+                <a:extLst>
+                  <a:ext uri="{FF2B5EF4-FFF2-40B4-BE49-F238E27FC236}">
+                    <a16:creationId xmlns:a16="http://schemas.microsoft.com/office/drawing/2014/main" id="{D954AB4D-A237-C043-A913-633703A9C26B}"/>
+                  </a:ext>
+                </a:extLst>
+              </p:cNvPr>
+              <p:cNvSpPr txBox="1">
+                <a:spLocks noRot="1" noChangeAspect="1" noMove="1" noResize="1" noEditPoints="1" noAdjustHandles="1" noChangeArrowheads="1" noChangeShapeType="1" noTextEdit="1"/>
+              </p:cNvSpPr>
+              <p:nvPr/>
+            </p:nvSpPr>
+            <p:spPr>
+              <a:xfrm>
+                <a:off x="3982498" y="268315"/>
+                <a:ext cx="4305145" cy="461665"/>
+              </a:xfrm>
+              <a:prstGeom prst="rect">
+                <a:avLst/>
+              </a:prstGeom>
+              <a:blipFill>
+                <a:blip r:embed="rId3"/>
+                <a:stretch>
+                  <a:fillRect b="-5263"/>
+                </a:stretch>
+              </a:blipFill>
+              <a:ln w="6350">
+                <a:solidFill>
+                  <a:schemeClr val="bg1">
+                    <a:lumMod val="85000"/>
+                  </a:schemeClr>
+                </a:solidFill>
+              </a:ln>
+            </p:spPr>
+            <p:txBody>
+              <a:bodyPr/>
+              <a:lstStyle/>
+              <a:p>
+                <a:r>
+                  <a:rPr lang="de-DE">
+                    <a:noFill/>
+                  </a:rPr>
+                  <a:t> </a:t>
+                </a:r>
+              </a:p>
+            </p:txBody>
+          </p:sp>
+        </mc:Fallback>
+      </mc:AlternateContent>
+      <mc:AlternateContent xmlns:mc="http://schemas.openxmlformats.org/markup-compatibility/2006" xmlns:a14="http://schemas.microsoft.com/office/drawing/2010/main">
+        <mc:Choice Requires="a14">
+          <p:sp>
+            <p:nvSpPr>
+              <p:cNvPr id="8" name="Textfeld 7">
+                <a:extLst>
+                  <a:ext uri="{FF2B5EF4-FFF2-40B4-BE49-F238E27FC236}">
+                    <a16:creationId xmlns:a16="http://schemas.microsoft.com/office/drawing/2014/main" id="{AE054EA2-1B0A-7D73-BA51-482017E880A4}"/>
+                  </a:ext>
+                </a:extLst>
+              </p:cNvPr>
+              <p:cNvSpPr txBox="1"/>
+              <p:nvPr/>
+            </p:nvSpPr>
+            <p:spPr>
+              <a:xfrm>
+                <a:off x="262794" y="832787"/>
+                <a:ext cx="4514400" cy="276999"/>
+              </a:xfrm>
+              <a:prstGeom prst="rect">
+                <a:avLst/>
+              </a:prstGeom>
+              <a:noFill/>
+              <a:ln w="12700">
+                <a:solidFill>
+                  <a:schemeClr val="tx1"/>
+                </a:solidFill>
+              </a:ln>
+            </p:spPr>
+            <p:txBody>
+              <a:bodyPr wrap="square">
+                <a:spAutoFit/>
+              </a:bodyPr>
+              <a:lstStyle>
+                <a:defPPr>
+                  <a:defRPr lang="de-DE"/>
+                </a:defPPr>
+              </a:lstStyle>
+              <a:p>
+                <a:pPr algn="ctr"/>
+                <a:r>
+                  <a:rPr lang="en-GB" sz="1200" dirty="0">
+                    <a:latin typeface="Calibri" panose="020F0502020204030204" pitchFamily="34" charset="0"/>
+                    <a:ea typeface="Cambria Math" panose="02040503050406030204" pitchFamily="18" charset="0"/>
+                    <a:cs typeface="Calibri" panose="020F0502020204030204" pitchFamily="34" charset="0"/>
+                  </a:rPr>
+                  <a:t>predictor</a:t>
+                </a:r>
+                <a:r>
+                  <a:rPr lang="en-GB" sz="1200" noProof="0" dirty="0">
+                    <a:latin typeface="Calibri" panose="020F0502020204030204" pitchFamily="34" charset="0"/>
+                    <a:ea typeface="Cambria Math" panose="02040503050406030204" pitchFamily="18" charset="0"/>
+                    <a:cs typeface="Calibri" panose="020F0502020204030204" pitchFamily="34" charset="0"/>
+                  </a:rPr>
+                  <a:t>: </a:t>
+                </a:r>
+                <a14:m>
+                  <m:oMath xmlns:m="http://schemas.openxmlformats.org/officeDocument/2006/math">
+                    <m:r>
+                      <a:rPr lang="en-GB" sz="1200" i="1" noProof="0" smtClean="0">
+                        <a:latin typeface="Cambria Math" panose="02040503050406030204" pitchFamily="18" charset="0"/>
+                        <a:ea typeface="Cambria Math" panose="02040503050406030204" pitchFamily="18" charset="0"/>
+                      </a:rPr>
+                      <m:t>𝑁</m:t>
+                    </m:r>
+                    <m:r>
+                      <a:rPr lang="en-GB" sz="1200" i="1" noProof="0" smtClean="0">
+                        <a:latin typeface="Cambria Math" panose="02040503050406030204" pitchFamily="18" charset="0"/>
+                        <a:ea typeface="Cambria Math" panose="02040503050406030204" pitchFamily="18" charset="0"/>
+                      </a:rPr>
+                      <m:t>=2 </m:t>
+                    </m:r>
+                  </m:oMath>
+                </a14:m>
+                <a:r>
+                  <a:rPr lang="en-GB" sz="1200" noProof="0" dirty="0">
+                    <a:latin typeface="Calibri" panose="020F0502020204030204" pitchFamily="34" charset="0"/>
+                    <a:ea typeface="Cambria Math" panose="02040503050406030204" pitchFamily="18" charset="0"/>
+                    <a:cs typeface="Calibri" panose="020F0502020204030204" pitchFamily="34" charset="0"/>
+                  </a:rPr>
+                  <a:t>levels  with </a:t>
+                </a:r>
+                <a14:m>
+                  <m:oMath xmlns:m="http://schemas.openxmlformats.org/officeDocument/2006/math">
+                    <m:sSub>
+                      <m:sSubPr>
+                        <m:ctrlPr>
+                          <a:rPr lang="en-GB" sz="1200" b="0" i="1" noProof="0" smtClean="0">
+                            <a:latin typeface="Cambria Math" panose="02040503050406030204" pitchFamily="18" charset="0"/>
+                            <a:ea typeface="Cambria Math" panose="02040503050406030204" pitchFamily="18" charset="0"/>
+                          </a:rPr>
+                        </m:ctrlPr>
+                      </m:sSubPr>
+                      <m:e>
+                        <m:r>
+                          <a:rPr lang="en-GB" sz="1200" b="0" i="1" noProof="0" smtClean="0">
+                            <a:latin typeface="Cambria Math" panose="02040503050406030204" pitchFamily="18" charset="0"/>
+                            <a:ea typeface="Cambria Math" panose="02040503050406030204" pitchFamily="18" charset="0"/>
+                          </a:rPr>
+                          <m:t>𝑛</m:t>
+                        </m:r>
+                      </m:e>
+                      <m:sub>
+                        <m:r>
+                          <a:rPr lang="en-GB" sz="1200" b="0" i="1" noProof="0" smtClean="0">
+                            <a:latin typeface="Cambria Math" panose="02040503050406030204" pitchFamily="18" charset="0"/>
+                            <a:ea typeface="Cambria Math" panose="02040503050406030204" pitchFamily="18" charset="0"/>
+                          </a:rPr>
+                          <m:t>1</m:t>
+                        </m:r>
+                      </m:sub>
+                    </m:sSub>
+                  </m:oMath>
+                </a14:m>
+                <a:r>
+                  <a:rPr lang="en-GB" sz="1200" noProof="0" dirty="0">
+                    <a:latin typeface="Calibri" panose="020F0502020204030204" pitchFamily="34" charset="0"/>
+                    <a:ea typeface="Cambria Math" panose="02040503050406030204" pitchFamily="18" charset="0"/>
+                    <a:cs typeface="Calibri" panose="020F0502020204030204" pitchFamily="34" charset="0"/>
+                  </a:rPr>
+                  <a:t> resp.  </a:t>
+                </a:r>
+                <a14:m>
+                  <m:oMath xmlns:m="http://schemas.openxmlformats.org/officeDocument/2006/math">
+                    <m:sSub>
+                      <m:sSubPr>
+                        <m:ctrlPr>
+                          <a:rPr lang="en-GB" sz="1200" b="0" i="1" noProof="0" smtClean="0">
+                            <a:latin typeface="Cambria Math" panose="02040503050406030204" pitchFamily="18" charset="0"/>
+                            <a:ea typeface="Cambria Math" panose="02040503050406030204" pitchFamily="18" charset="0"/>
+                          </a:rPr>
+                        </m:ctrlPr>
+                      </m:sSubPr>
+                      <m:e>
+                        <m:r>
+                          <a:rPr lang="en-GB" sz="1200" b="0" i="1" noProof="0" smtClean="0">
+                            <a:latin typeface="Cambria Math" panose="02040503050406030204" pitchFamily="18" charset="0"/>
+                            <a:ea typeface="Cambria Math" panose="02040503050406030204" pitchFamily="18" charset="0"/>
+                          </a:rPr>
+                          <m:t>𝑛</m:t>
+                        </m:r>
+                      </m:e>
+                      <m:sub>
+                        <m:r>
+                          <a:rPr lang="en-GB" sz="1200" b="0" i="1" noProof="0" smtClean="0">
+                            <a:latin typeface="Cambria Math" panose="02040503050406030204" pitchFamily="18" charset="0"/>
+                            <a:ea typeface="Cambria Math" panose="02040503050406030204" pitchFamily="18" charset="0"/>
+                          </a:rPr>
+                          <m:t>2</m:t>
+                        </m:r>
+                      </m:sub>
+                    </m:sSub>
+                  </m:oMath>
+                </a14:m>
+                <a:r>
+                  <a:rPr lang="en-GB" sz="1200" noProof="0" dirty="0">
+                    <a:latin typeface="Calibri" panose="020F0502020204030204" pitchFamily="34" charset="0"/>
+                    <a:ea typeface="Cambria Math" panose="02040503050406030204" pitchFamily="18" charset="0"/>
+                    <a:cs typeface="Calibri" panose="020F0502020204030204" pitchFamily="34" charset="0"/>
+                  </a:rPr>
+                  <a:t> entries in each level</a:t>
+                </a:r>
+              </a:p>
+            </p:txBody>
+          </p:sp>
+        </mc:Choice>
+        <mc:Fallback xmlns="">
+          <p:sp>
+            <p:nvSpPr>
+              <p:cNvPr id="8" name="Textfeld 7">
+                <a:extLst>
+                  <a:ext uri="{FF2B5EF4-FFF2-40B4-BE49-F238E27FC236}">
+                    <a16:creationId xmlns:a16="http://schemas.microsoft.com/office/drawing/2014/main" id="{295FEA9A-D31C-504B-9808-C226C7EA0707}"/>
+                  </a:ext>
+                </a:extLst>
+              </p:cNvPr>
+              <p:cNvSpPr txBox="1">
+                <a:spLocks noRot="1" noChangeAspect="1" noMove="1" noResize="1" noEditPoints="1" noAdjustHandles="1" noChangeArrowheads="1" noChangeShapeType="1" noTextEdit="1"/>
+              </p:cNvSpPr>
+              <p:nvPr/>
+            </p:nvSpPr>
+            <p:spPr>
+              <a:xfrm>
+                <a:off x="262794" y="832787"/>
+                <a:ext cx="4514400" cy="276999"/>
+              </a:xfrm>
+              <a:prstGeom prst="rect">
+                <a:avLst/>
+              </a:prstGeom>
+              <a:blipFill>
+                <a:blip r:embed="rId4"/>
+                <a:stretch>
+                  <a:fillRect b="-13043"/>
+                </a:stretch>
+              </a:blipFill>
+              <a:ln w="12700">
+                <a:solidFill>
+                  <a:schemeClr val="tx1"/>
+                </a:solidFill>
+              </a:ln>
+            </p:spPr>
+            <p:txBody>
+              <a:bodyPr/>
+              <a:lstStyle/>
+              <a:p>
+                <a:r>
+                  <a:rPr lang="de-DE">
+                    <a:noFill/>
+                  </a:rPr>
+                  <a:t> </a:t>
+                </a:r>
+              </a:p>
+            </p:txBody>
+          </p:sp>
+        </mc:Fallback>
+      </mc:AlternateContent>
+      <mc:AlternateContent xmlns:mc="http://schemas.openxmlformats.org/markup-compatibility/2006">
+        <mc:Choice xmlns:a14="http://schemas.microsoft.com/office/drawing/2010/main" Requires="a14">
+          <p:sp>
+            <p:nvSpPr>
+              <p:cNvPr id="9" name="Textfeld 8">
+                <a:extLst>
+                  <a:ext uri="{FF2B5EF4-FFF2-40B4-BE49-F238E27FC236}">
+                    <a16:creationId xmlns:a16="http://schemas.microsoft.com/office/drawing/2014/main" id="{8503CA89-315E-D465-88DB-CCE4B3127177}"/>
+                  </a:ext>
+                </a:extLst>
+              </p:cNvPr>
+              <p:cNvSpPr txBox="1"/>
+              <p:nvPr/>
+            </p:nvSpPr>
+            <p:spPr>
+              <a:xfrm>
+                <a:off x="5050390" y="832787"/>
+                <a:ext cx="5304067" cy="276999"/>
+              </a:xfrm>
+              <a:prstGeom prst="rect">
+                <a:avLst/>
+              </a:prstGeom>
+              <a:noFill/>
+              <a:ln w="12700">
+                <a:solidFill>
+                  <a:schemeClr val="accent1">
+                    <a:lumMod val="40000"/>
+                    <a:lumOff val="60000"/>
+                  </a:schemeClr>
+                </a:solidFill>
+              </a:ln>
+            </p:spPr>
+            <p:txBody>
+              <a:bodyPr wrap="square">
+                <a:spAutoFit/>
+              </a:bodyPr>
+              <a:lstStyle/>
+              <a:p>
+                <a:pPr algn="ctr"/>
+                <a:r>
+                  <a:rPr lang="en-GB" sz="1200" dirty="0">
+                    <a:latin typeface="Calibri" panose="020F0502020204030204" pitchFamily="34" charset="0"/>
+                    <a:ea typeface="Cambria Math" panose="02040503050406030204" pitchFamily="18" charset="0"/>
+                    <a:cs typeface="Calibri" panose="020F0502020204030204" pitchFamily="34" charset="0"/>
+                  </a:rPr>
+                  <a:t>predictor</a:t>
+                </a:r>
+                <a:r>
+                  <a:rPr lang="en-GB" sz="1200" noProof="0" dirty="0">
+                    <a:latin typeface="Calibri" panose="020F0502020204030204" pitchFamily="34" charset="0"/>
+                    <a:ea typeface="Cambria Math" panose="02040503050406030204" pitchFamily="18" charset="0"/>
+                    <a:cs typeface="Calibri" panose="020F0502020204030204" pitchFamily="34" charset="0"/>
+                  </a:rPr>
+                  <a:t>:  </a:t>
+                </a:r>
+                <a14:m>
+                  <m:oMath xmlns:m="http://schemas.openxmlformats.org/officeDocument/2006/math">
+                    <m:r>
+                      <a:rPr lang="en-GB" sz="1200" b="0" i="1" noProof="0" smtClean="0">
+                        <a:latin typeface="Cambria Math" panose="02040503050406030204" pitchFamily="18" charset="0"/>
+                        <a:ea typeface="Cambria Math" panose="02040503050406030204" pitchFamily="18" charset="0"/>
+                      </a:rPr>
+                      <m:t>𝑁</m:t>
+                    </m:r>
+                    <m:r>
+                      <a:rPr lang="en-GB" sz="1200" b="0" i="1" noProof="0" smtClean="0">
+                        <a:latin typeface="Cambria Math" panose="02040503050406030204" pitchFamily="18" charset="0"/>
+                        <a:ea typeface="Cambria Math" panose="02040503050406030204" pitchFamily="18" charset="0"/>
+                      </a:rPr>
+                      <m:t>&gt;2</m:t>
+                    </m:r>
+                  </m:oMath>
+                </a14:m>
+                <a:r>
+                  <a:rPr lang="en-GB" sz="1200" noProof="0" dirty="0">
+                    <a:latin typeface="Calibri" panose="020F0502020204030204" pitchFamily="34" charset="0"/>
+                    <a:ea typeface="Cambria Math" panose="02040503050406030204" pitchFamily="18" charset="0"/>
+                    <a:cs typeface="Calibri" panose="020F0502020204030204" pitchFamily="34" charset="0"/>
+                  </a:rPr>
+                  <a:t> levels</a:t>
+                </a:r>
+              </a:p>
+            </p:txBody>
+          </p:sp>
+        </mc:Choice>
+        <mc:Fallback>
+          <p:sp>
+            <p:nvSpPr>
+              <p:cNvPr id="9" name="Textfeld 8">
+                <a:extLst>
+                  <a:ext uri="{FF2B5EF4-FFF2-40B4-BE49-F238E27FC236}">
+                    <a16:creationId xmlns:a16="http://schemas.microsoft.com/office/drawing/2014/main" id="{8503CA89-315E-D465-88DB-CCE4B3127177}"/>
+                  </a:ext>
+                </a:extLst>
+              </p:cNvPr>
+              <p:cNvSpPr txBox="1">
+                <a:spLocks noRot="1" noChangeAspect="1" noMove="1" noResize="1" noEditPoints="1" noAdjustHandles="1" noChangeArrowheads="1" noChangeShapeType="1" noTextEdit="1"/>
+              </p:cNvSpPr>
+              <p:nvPr/>
+            </p:nvSpPr>
+            <p:spPr>
+              <a:xfrm>
+                <a:off x="5050390" y="832787"/>
+                <a:ext cx="5304067" cy="276999"/>
+              </a:xfrm>
+              <a:prstGeom prst="rect">
+                <a:avLst/>
+              </a:prstGeom>
+              <a:blipFill>
+                <a:blip r:embed="rId5"/>
+                <a:stretch>
+                  <a:fillRect b="-13043"/>
+                </a:stretch>
+              </a:blipFill>
+              <a:ln w="12700">
+                <a:solidFill>
+                  <a:schemeClr val="accent1">
+                    <a:lumMod val="40000"/>
+                    <a:lumOff val="60000"/>
+                  </a:schemeClr>
+                </a:solidFill>
+              </a:ln>
+            </p:spPr>
+            <p:txBody>
+              <a:bodyPr/>
+              <a:lstStyle/>
+              <a:p>
+                <a:r>
+                  <a:rPr lang="de-DE">
+                    <a:noFill/>
+                  </a:rPr>
+                  <a:t> </a:t>
+                </a:r>
+              </a:p>
+            </p:txBody>
+          </p:sp>
+        </mc:Fallback>
+      </mc:AlternateContent>
+      <mc:AlternateContent xmlns:mc="http://schemas.openxmlformats.org/markup-compatibility/2006">
+        <mc:Choice xmlns:a14="http://schemas.microsoft.com/office/drawing/2010/main" Requires="a14">
+          <p:sp>
+            <p:nvSpPr>
+              <p:cNvPr id="13" name="Textfeld 12">
+                <a:extLst>
+                  <a:ext uri="{FF2B5EF4-FFF2-40B4-BE49-F238E27FC236}">
+                    <a16:creationId xmlns:a16="http://schemas.microsoft.com/office/drawing/2014/main" id="{E013A2E8-9419-9082-A924-2FDA53C069E7}"/>
+                  </a:ext>
+                </a:extLst>
+              </p:cNvPr>
+              <p:cNvSpPr txBox="1"/>
+              <p:nvPr/>
+            </p:nvSpPr>
+            <p:spPr>
+              <a:xfrm>
+                <a:off x="3296687" y="1721123"/>
+                <a:ext cx="1490532" cy="276999"/>
+              </a:xfrm>
+              <a:prstGeom prst="rect">
+                <a:avLst/>
+              </a:prstGeom>
+              <a:noFill/>
+              <a:ln w="12700">
+                <a:solidFill>
+                  <a:schemeClr val="tx1"/>
+                </a:solidFill>
+              </a:ln>
+            </p:spPr>
+            <p:txBody>
+              <a:bodyPr wrap="square">
+                <a:spAutoFit/>
+              </a:bodyPr>
+              <a:lstStyle>
+                <a:defPPr>
+                  <a:defRPr lang="de-DE"/>
+                </a:defPPr>
+              </a:lstStyle>
+              <a:p>
+                <a:pPr algn="ctr"/>
+                <a14:m>
+                  <m:oMath xmlns:m="http://schemas.openxmlformats.org/officeDocument/2006/math">
+                    <m:sSub>
+                      <m:sSubPr>
+                        <m:ctrlPr>
+                          <a:rPr lang="en-GB" sz="1200" b="0" i="1" noProof="0" smtClean="0">
+                            <a:latin typeface="Cambria Math" panose="02040503050406030204" pitchFamily="18" charset="0"/>
+                            <a:ea typeface="Cambria Math" panose="02040503050406030204" pitchFamily="18" charset="0"/>
+                          </a:rPr>
+                        </m:ctrlPr>
+                      </m:sSubPr>
+                      <m:e>
+                        <m:r>
+                          <a:rPr lang="en-GB" sz="1200" b="0" i="1" noProof="0" smtClean="0">
+                            <a:latin typeface="Cambria Math" panose="02040503050406030204" pitchFamily="18" charset="0"/>
+                            <a:ea typeface="Cambria Math" panose="02040503050406030204" pitchFamily="18" charset="0"/>
+                          </a:rPr>
+                          <m:t>𝑛</m:t>
+                        </m:r>
+                      </m:e>
+                      <m:sub>
+                        <m:r>
+                          <a:rPr lang="en-GB" sz="1200" b="0" i="1" noProof="0" smtClean="0">
+                            <a:latin typeface="Cambria Math" panose="02040503050406030204" pitchFamily="18" charset="0"/>
+                            <a:ea typeface="Cambria Math" panose="02040503050406030204" pitchFamily="18" charset="0"/>
+                          </a:rPr>
+                          <m:t>1</m:t>
+                        </m:r>
+                      </m:sub>
+                    </m:sSub>
+                  </m:oMath>
+                </a14:m>
+                <a:r>
+                  <a:rPr lang="en-GB" sz="1200" noProof="0" dirty="0">
+                    <a:latin typeface="Calibri" panose="020F0502020204030204" pitchFamily="34" charset="0"/>
+                    <a:ea typeface="Cambria Math" panose="02040503050406030204" pitchFamily="18" charset="0"/>
+                    <a:cs typeface="Calibri" panose="020F0502020204030204" pitchFamily="34" charset="0"/>
+                  </a:rPr>
+                  <a:t> and </a:t>
+                </a:r>
+                <a14:m>
+                  <m:oMath xmlns:m="http://schemas.openxmlformats.org/officeDocument/2006/math">
+                    <m:sSub>
+                      <m:sSubPr>
+                        <m:ctrlPr>
+                          <a:rPr lang="en-GB" sz="1200" i="1" noProof="0" smtClean="0">
+                            <a:latin typeface="Cambria Math" panose="02040503050406030204" pitchFamily="18" charset="0"/>
+                            <a:ea typeface="Cambria Math" panose="02040503050406030204" pitchFamily="18" charset="0"/>
+                          </a:rPr>
+                        </m:ctrlPr>
+                      </m:sSubPr>
+                      <m:e>
+                        <m:r>
+                          <a:rPr lang="en-GB" sz="1200" i="1" noProof="0" smtClean="0">
+                            <a:latin typeface="Cambria Math" panose="02040503050406030204" pitchFamily="18" charset="0"/>
+                            <a:ea typeface="Cambria Math" panose="02040503050406030204" pitchFamily="18" charset="0"/>
+                          </a:rPr>
+                          <m:t>𝑛</m:t>
+                        </m:r>
+                      </m:e>
+                      <m:sub>
+                        <m:r>
+                          <a:rPr lang="en-GB" sz="1200" b="0" i="1" noProof="0" smtClean="0">
+                            <a:latin typeface="Cambria Math" panose="02040503050406030204" pitchFamily="18" charset="0"/>
+                            <a:ea typeface="Cambria Math" panose="02040503050406030204" pitchFamily="18" charset="0"/>
+                          </a:rPr>
+                          <m:t>2</m:t>
+                        </m:r>
+                      </m:sub>
+                    </m:sSub>
+                    <m:r>
+                      <a:rPr lang="en-GB" sz="1200" b="0" i="1" noProof="0" smtClean="0">
+                        <a:latin typeface="Cambria Math" panose="02040503050406030204" pitchFamily="18" charset="0"/>
+                        <a:ea typeface="Cambria Math" panose="02040503050406030204" pitchFamily="18" charset="0"/>
+                      </a:rPr>
+                      <m:t>&gt;30</m:t>
+                    </m:r>
+                  </m:oMath>
+                </a14:m>
+                <a:r>
+                  <a:rPr lang="en-GB" sz="1200" noProof="0" dirty="0">
+                    <a:latin typeface="Calibri" panose="020F0502020204030204" pitchFamily="34" charset="0"/>
+                    <a:ea typeface="Cambria Math" panose="02040503050406030204" pitchFamily="18" charset="0"/>
+                    <a:cs typeface="Calibri" panose="020F0502020204030204" pitchFamily="34" charset="0"/>
+                  </a:rPr>
+                  <a:t> </a:t>
+                </a:r>
+              </a:p>
+            </p:txBody>
+          </p:sp>
+        </mc:Choice>
+        <mc:Fallback>
+          <p:sp>
+            <p:nvSpPr>
+              <p:cNvPr id="13" name="Textfeld 12">
+                <a:extLst>
+                  <a:ext uri="{FF2B5EF4-FFF2-40B4-BE49-F238E27FC236}">
+                    <a16:creationId xmlns:a16="http://schemas.microsoft.com/office/drawing/2014/main" id="{E013A2E8-9419-9082-A924-2FDA53C069E7}"/>
+                  </a:ext>
+                </a:extLst>
+              </p:cNvPr>
+              <p:cNvSpPr txBox="1">
+                <a:spLocks noRot="1" noChangeAspect="1" noMove="1" noResize="1" noEditPoints="1" noAdjustHandles="1" noChangeArrowheads="1" noChangeShapeType="1" noTextEdit="1"/>
+              </p:cNvSpPr>
+              <p:nvPr/>
+            </p:nvSpPr>
+            <p:spPr>
+              <a:xfrm>
+                <a:off x="3296687" y="1721123"/>
+                <a:ext cx="1490532" cy="276999"/>
+              </a:xfrm>
+              <a:prstGeom prst="rect">
+                <a:avLst/>
+              </a:prstGeom>
+              <a:blipFill>
+                <a:blip r:embed="rId6"/>
+                <a:stretch>
+                  <a:fillRect b="-12500"/>
+                </a:stretch>
+              </a:blipFill>
+              <a:ln w="12700">
+                <a:solidFill>
+                  <a:schemeClr val="tx1"/>
+                </a:solidFill>
+              </a:ln>
+            </p:spPr>
+            <p:txBody>
+              <a:bodyPr/>
+              <a:lstStyle/>
+              <a:p>
+                <a:r>
+                  <a:rPr lang="de-DE">
+                    <a:noFill/>
+                  </a:rPr>
+                  <a:t> </a:t>
+                </a:r>
+              </a:p>
+            </p:txBody>
+          </p:sp>
+        </mc:Fallback>
+      </mc:AlternateContent>
+      <mc:AlternateContent xmlns:mc="http://schemas.openxmlformats.org/markup-compatibility/2006">
+        <mc:Choice xmlns:a14="http://schemas.microsoft.com/office/drawing/2010/main" Requires="a14">
+          <p:sp>
+            <p:nvSpPr>
+              <p:cNvPr id="15" name="Textfeld 14">
+                <a:extLst>
+                  <a:ext uri="{FF2B5EF4-FFF2-40B4-BE49-F238E27FC236}">
+                    <a16:creationId xmlns:a16="http://schemas.microsoft.com/office/drawing/2014/main" id="{2A7C589D-90CE-28E1-F515-49850CAABBCC}"/>
+                  </a:ext>
+                </a:extLst>
+              </p:cNvPr>
+              <p:cNvSpPr txBox="1"/>
+              <p:nvPr/>
+            </p:nvSpPr>
+            <p:spPr>
+              <a:xfrm>
+                <a:off x="271610" y="1721123"/>
+                <a:ext cx="2950932" cy="276999"/>
+              </a:xfrm>
+              <a:prstGeom prst="rect">
+                <a:avLst/>
+              </a:prstGeom>
+              <a:noFill/>
+              <a:ln w="12700">
+                <a:solidFill>
+                  <a:schemeClr val="tx1"/>
+                </a:solidFill>
+              </a:ln>
+            </p:spPr>
+            <p:txBody>
+              <a:bodyPr wrap="square">
+                <a:spAutoFit/>
+              </a:bodyPr>
+              <a:lstStyle>
+                <a:defPPr>
+                  <a:defRPr lang="de-DE"/>
+                </a:defPPr>
+              </a:lstStyle>
+              <a:p>
+                <a:pPr algn="ctr"/>
+                <a14:m>
+                  <m:oMath xmlns:m="http://schemas.openxmlformats.org/officeDocument/2006/math">
+                    <m:sSub>
+                      <m:sSubPr>
+                        <m:ctrlPr>
+                          <a:rPr lang="en-GB" sz="1200" b="0" i="1" noProof="0" smtClean="0">
+                            <a:latin typeface="Cambria Math" panose="02040503050406030204" pitchFamily="18" charset="0"/>
+                            <a:ea typeface="Cambria Math" panose="02040503050406030204" pitchFamily="18" charset="0"/>
+                          </a:rPr>
+                        </m:ctrlPr>
+                      </m:sSubPr>
+                      <m:e>
+                        <m:r>
+                          <a:rPr lang="en-GB" sz="1200" b="0" i="1" noProof="0" smtClean="0">
+                            <a:latin typeface="Cambria Math" panose="02040503050406030204" pitchFamily="18" charset="0"/>
+                            <a:ea typeface="Cambria Math" panose="02040503050406030204" pitchFamily="18" charset="0"/>
+                          </a:rPr>
+                          <m:t>𝑛</m:t>
+                        </m:r>
+                      </m:e>
+                      <m:sub>
+                        <m:r>
+                          <a:rPr lang="en-GB" sz="1200" b="0" i="1" noProof="0" smtClean="0">
+                            <a:latin typeface="Cambria Math" panose="02040503050406030204" pitchFamily="18" charset="0"/>
+                            <a:ea typeface="Cambria Math" panose="02040503050406030204" pitchFamily="18" charset="0"/>
+                          </a:rPr>
+                          <m:t>1</m:t>
+                        </m:r>
+                      </m:sub>
+                    </m:sSub>
+                  </m:oMath>
+                </a14:m>
+                <a:r>
+                  <a:rPr lang="en-GB" sz="1200" noProof="0" dirty="0">
+                    <a:latin typeface="Calibri" panose="020F0502020204030204" pitchFamily="34" charset="0"/>
+                    <a:ea typeface="Cambria Math" panose="02040503050406030204" pitchFamily="18" charset="0"/>
+                    <a:cs typeface="Calibri" panose="020F0502020204030204" pitchFamily="34" charset="0"/>
+                  </a:rPr>
+                  <a:t> or </a:t>
+                </a:r>
+                <a14:m>
+                  <m:oMath xmlns:m="http://schemas.openxmlformats.org/officeDocument/2006/math">
+                    <m:sSub>
+                      <m:sSubPr>
+                        <m:ctrlPr>
+                          <a:rPr lang="en-GB" sz="1200" i="1" noProof="0" smtClean="0">
+                            <a:latin typeface="Cambria Math" panose="02040503050406030204" pitchFamily="18" charset="0"/>
+                            <a:ea typeface="Cambria Math" panose="02040503050406030204" pitchFamily="18" charset="0"/>
+                            <a:cs typeface="Calibri" panose="020F0502020204030204" pitchFamily="34" charset="0"/>
+                          </a:rPr>
+                        </m:ctrlPr>
+                      </m:sSubPr>
+                      <m:e>
+                        <m:r>
+                          <a:rPr lang="en-GB" sz="1200" i="1" noProof="0" smtClean="0">
+                            <a:latin typeface="Cambria Math" panose="02040503050406030204" pitchFamily="18" charset="0"/>
+                            <a:ea typeface="Cambria Math" panose="02040503050406030204" pitchFamily="18" charset="0"/>
+                          </a:rPr>
+                          <m:t>𝑛</m:t>
+                        </m:r>
+                      </m:e>
+                      <m:sub>
+                        <m:r>
+                          <a:rPr lang="en-GB" sz="1200" i="1" noProof="0" smtClean="0">
+                            <a:latin typeface="Cambria Math" panose="02040503050406030204" pitchFamily="18" charset="0"/>
+                            <a:ea typeface="Cambria Math" panose="02040503050406030204" pitchFamily="18" charset="0"/>
+                          </a:rPr>
+                          <m:t>2</m:t>
+                        </m:r>
+                      </m:sub>
+                    </m:sSub>
+                    <m:r>
+                      <a:rPr lang="en-GB" sz="1200" i="1" noProof="0" smtClean="0">
+                        <a:latin typeface="Cambria Math" panose="02040503050406030204" pitchFamily="18" charset="0"/>
+                        <a:ea typeface="Cambria Math" panose="02040503050406030204" pitchFamily="18" charset="0"/>
+                      </a:rPr>
+                      <m:t>≤30</m:t>
+                    </m:r>
+                    <m:r>
+                      <a:rPr lang="en-GB" sz="1200" i="1" noProof="0" smtClean="0">
+                        <a:latin typeface="Cambria Math" panose="02040503050406030204" pitchFamily="18" charset="0"/>
+                        <a:ea typeface="Cambria Math" panose="02040503050406030204" pitchFamily="18" charset="0"/>
+                        <a:cs typeface="Calibri" panose="020F0502020204030204" pitchFamily="34" charset="0"/>
+                      </a:rPr>
+                      <m:t> </m:t>
+                    </m:r>
+                  </m:oMath>
+                </a14:m>
+                <a:endParaRPr lang="en-GB" sz="1200" noProof="0" dirty="0">
+                  <a:latin typeface="Calibri" panose="020F0502020204030204" pitchFamily="34" charset="0"/>
+                  <a:ea typeface="Cambria Math" panose="02040503050406030204" pitchFamily="18" charset="0"/>
+                  <a:cs typeface="Calibri" panose="020F0502020204030204" pitchFamily="34" charset="0"/>
+                </a:endParaRPr>
+              </a:p>
+            </p:txBody>
+          </p:sp>
+        </mc:Choice>
+        <mc:Fallback>
+          <p:sp>
+            <p:nvSpPr>
+              <p:cNvPr id="15" name="Textfeld 14">
+                <a:extLst>
+                  <a:ext uri="{FF2B5EF4-FFF2-40B4-BE49-F238E27FC236}">
+                    <a16:creationId xmlns:a16="http://schemas.microsoft.com/office/drawing/2014/main" id="{2A7C589D-90CE-28E1-F515-49850CAABBCC}"/>
+                  </a:ext>
+                </a:extLst>
+              </p:cNvPr>
+              <p:cNvSpPr txBox="1">
+                <a:spLocks noRot="1" noChangeAspect="1" noMove="1" noResize="1" noEditPoints="1" noAdjustHandles="1" noChangeArrowheads="1" noChangeShapeType="1" noTextEdit="1"/>
+              </p:cNvSpPr>
+              <p:nvPr/>
+            </p:nvSpPr>
+            <p:spPr>
+              <a:xfrm>
+                <a:off x="271610" y="1721123"/>
+                <a:ext cx="2950932" cy="276999"/>
+              </a:xfrm>
+              <a:prstGeom prst="rect">
+                <a:avLst/>
+              </a:prstGeom>
+              <a:blipFill>
+                <a:blip r:embed="rId7"/>
+                <a:stretch>
+                  <a:fillRect b="-12500"/>
+                </a:stretch>
+              </a:blipFill>
+              <a:ln w="12700">
+                <a:solidFill>
+                  <a:schemeClr val="tx1"/>
+                </a:solidFill>
+              </a:ln>
+            </p:spPr>
+            <p:txBody>
+              <a:bodyPr/>
+              <a:lstStyle/>
+              <a:p>
+                <a:r>
+                  <a:rPr lang="de-DE">
+                    <a:noFill/>
+                  </a:rPr>
+                  <a:t> </a:t>
+                </a:r>
+              </a:p>
+            </p:txBody>
+          </p:sp>
+        </mc:Fallback>
+      </mc:AlternateContent>
+      <mc:AlternateContent xmlns:mc="http://schemas.openxmlformats.org/markup-compatibility/2006">
+        <mc:Choice xmlns:a14="http://schemas.microsoft.com/office/drawing/2010/main" Requires="a14">
+          <p:sp>
+            <p:nvSpPr>
+              <p:cNvPr id="19" name="Textfeld 18">
+                <a:extLst>
+                  <a:ext uri="{FF2B5EF4-FFF2-40B4-BE49-F238E27FC236}">
+                    <a16:creationId xmlns:a16="http://schemas.microsoft.com/office/drawing/2014/main" id="{738B4D66-E2FD-3D06-F527-A82D7C3BDF1B}"/>
+                  </a:ext>
+                </a:extLst>
+              </p:cNvPr>
+              <p:cNvSpPr txBox="1"/>
+              <p:nvPr/>
+            </p:nvSpPr>
+            <p:spPr>
+              <a:xfrm>
+                <a:off x="1782316" y="3003780"/>
+                <a:ext cx="1440000" cy="276999"/>
+              </a:xfrm>
+              <a:prstGeom prst="rect">
+                <a:avLst/>
+              </a:prstGeom>
+              <a:noFill/>
+              <a:ln w="12700">
+                <a:solidFill>
+                  <a:schemeClr val="tx1"/>
+                </a:solidFill>
+              </a:ln>
+            </p:spPr>
+            <p:txBody>
+              <a:bodyPr wrap="square">
+                <a:spAutoFit/>
+              </a:bodyPr>
+              <a:lstStyle/>
+              <a:p>
+                <a14:m>
+                  <m:oMath xmlns:m="http://schemas.openxmlformats.org/officeDocument/2006/math">
+                    <m:sSub>
+                      <m:sSubPr>
+                        <m:ctrlPr>
+                          <a:rPr lang="en-GB" sz="1200" b="0" i="1" noProof="0" smtClean="0">
+                            <a:latin typeface="Cambria Math" panose="02040503050406030204" pitchFamily="18" charset="0"/>
+                            <a:ea typeface="Cambria Math" panose="02040503050406030204" pitchFamily="18" charset="0"/>
+                          </a:rPr>
+                        </m:ctrlPr>
+                      </m:sSubPr>
+                      <m:e>
+                        <m:r>
+                          <a:rPr lang="en-GB" sz="1200" b="0" i="1" noProof="0" smtClean="0">
+                            <a:latin typeface="Cambria Math" panose="02040503050406030204" pitchFamily="18" charset="0"/>
+                            <a:ea typeface="Cambria Math" panose="02040503050406030204" pitchFamily="18" charset="0"/>
+                          </a:rPr>
+                          <m:t>𝑝</m:t>
+                        </m:r>
+                      </m:e>
+                      <m:sub>
+                        <m:r>
+                          <a:rPr lang="en-GB" sz="1200" b="0" i="1" noProof="0" smtClean="0">
+                            <a:latin typeface="Cambria Math" panose="02040503050406030204" pitchFamily="18" charset="0"/>
+                            <a:ea typeface="Cambria Math" panose="02040503050406030204" pitchFamily="18" charset="0"/>
+                          </a:rPr>
+                          <m:t>1</m:t>
+                        </m:r>
+                      </m:sub>
+                    </m:sSub>
+                    <m:r>
+                      <a:rPr lang="en-GB" sz="1200" b="0" i="1" noProof="0" smtClean="0">
+                        <a:latin typeface="Cambria Math" panose="02040503050406030204" pitchFamily="18" charset="0"/>
+                        <a:ea typeface="Cambria Math" panose="02040503050406030204" pitchFamily="18" charset="0"/>
+                      </a:rPr>
+                      <m:t>≥</m:t>
+                    </m:r>
+                    <m:r>
+                      <a:rPr lang="en-GB" sz="1200" b="0" i="1" noProof="0" smtClean="0">
+                        <a:latin typeface="Cambria Math" panose="02040503050406030204" pitchFamily="18" charset="0"/>
+                        <a:ea typeface="Cambria Math" panose="02040503050406030204" pitchFamily="18" charset="0"/>
+                      </a:rPr>
+                      <m:t>𝛼</m:t>
+                    </m:r>
+                  </m:oMath>
+                </a14:m>
+                <a:r>
+                  <a:rPr lang="en-GB" sz="1200" noProof="0" dirty="0">
+                    <a:latin typeface="Calibri" panose="020F0502020204030204" pitchFamily="34" charset="0"/>
+                    <a:ea typeface="Cambria Math" panose="02040503050406030204" pitchFamily="18" charset="0"/>
+                    <a:cs typeface="Calibri" panose="020F0502020204030204" pitchFamily="34" charset="0"/>
+                  </a:rPr>
+                  <a:t> and </a:t>
+                </a:r>
+                <a14:m>
+                  <m:oMath xmlns:m="http://schemas.openxmlformats.org/officeDocument/2006/math">
+                    <m:sSub>
+                      <m:sSubPr>
+                        <m:ctrlPr>
+                          <a:rPr lang="en-GB" sz="1200" b="0" i="1" noProof="0" smtClean="0">
+                            <a:latin typeface="Cambria Math" panose="02040503050406030204" pitchFamily="18" charset="0"/>
+                            <a:ea typeface="Cambria Math" panose="02040503050406030204" pitchFamily="18" charset="0"/>
+                          </a:rPr>
+                        </m:ctrlPr>
+                      </m:sSubPr>
+                      <m:e>
+                        <m:r>
+                          <a:rPr lang="en-GB" sz="1200" b="0" i="1" noProof="0" smtClean="0">
+                            <a:latin typeface="Cambria Math" panose="02040503050406030204" pitchFamily="18" charset="0"/>
+                            <a:ea typeface="Cambria Math" panose="02040503050406030204" pitchFamily="18" charset="0"/>
+                          </a:rPr>
+                          <m:t>𝑝</m:t>
+                        </m:r>
+                      </m:e>
+                      <m:sub>
+                        <m:r>
+                          <a:rPr lang="en-GB" sz="1200" b="0" i="1" noProof="0" smtClean="0">
+                            <a:latin typeface="Cambria Math" panose="02040503050406030204" pitchFamily="18" charset="0"/>
+                            <a:ea typeface="Cambria Math" panose="02040503050406030204" pitchFamily="18" charset="0"/>
+                          </a:rPr>
+                          <m:t>2</m:t>
+                        </m:r>
+                      </m:sub>
+                    </m:sSub>
+                    <m:r>
+                      <a:rPr lang="en-GB" sz="1200" b="0" i="1" noProof="0" smtClean="0">
+                        <a:latin typeface="Cambria Math" panose="02040503050406030204" pitchFamily="18" charset="0"/>
+                        <a:ea typeface="Cambria Math" panose="02040503050406030204" pitchFamily="18" charset="0"/>
+                      </a:rPr>
+                      <m:t>≥</m:t>
+                    </m:r>
+                    <m:r>
+                      <a:rPr lang="en-GB" sz="1200" b="0" i="1" noProof="0" smtClean="0">
+                        <a:latin typeface="Cambria Math" panose="02040503050406030204" pitchFamily="18" charset="0"/>
+                        <a:ea typeface="Cambria Math" panose="02040503050406030204" pitchFamily="18" charset="0"/>
+                      </a:rPr>
+                      <m:t>𝛼</m:t>
+                    </m:r>
+                  </m:oMath>
+                </a14:m>
+                <a:r>
+                  <a:rPr lang="en-GB" sz="1200" noProof="0" dirty="0">
+                    <a:latin typeface="Calibri" panose="020F0502020204030204" pitchFamily="34" charset="0"/>
+                    <a:ea typeface="Cambria Math" panose="02040503050406030204" pitchFamily="18" charset="0"/>
+                    <a:cs typeface="Calibri" panose="020F0502020204030204" pitchFamily="34" charset="0"/>
+                  </a:rPr>
+                  <a:t> </a:t>
+                </a:r>
+              </a:p>
+            </p:txBody>
+          </p:sp>
+        </mc:Choice>
+        <mc:Fallback>
+          <p:sp>
+            <p:nvSpPr>
+              <p:cNvPr id="19" name="Textfeld 18">
+                <a:extLst>
+                  <a:ext uri="{FF2B5EF4-FFF2-40B4-BE49-F238E27FC236}">
+                    <a16:creationId xmlns:a16="http://schemas.microsoft.com/office/drawing/2014/main" id="{738B4D66-E2FD-3D06-F527-A82D7C3BDF1B}"/>
+                  </a:ext>
+                </a:extLst>
+              </p:cNvPr>
+              <p:cNvSpPr txBox="1">
+                <a:spLocks noRot="1" noChangeAspect="1" noMove="1" noResize="1" noEditPoints="1" noAdjustHandles="1" noChangeArrowheads="1" noChangeShapeType="1" noTextEdit="1"/>
+              </p:cNvSpPr>
+              <p:nvPr/>
+            </p:nvSpPr>
+            <p:spPr>
+              <a:xfrm>
+                <a:off x="1782316" y="3003780"/>
+                <a:ext cx="1440000" cy="276999"/>
+              </a:xfrm>
+              <a:prstGeom prst="rect">
+                <a:avLst/>
+              </a:prstGeom>
+              <a:blipFill>
+                <a:blip r:embed="rId8"/>
+                <a:stretch>
+                  <a:fillRect b="-13043"/>
+                </a:stretch>
+              </a:blipFill>
+              <a:ln w="12700">
+                <a:solidFill>
+                  <a:schemeClr val="tx1"/>
+                </a:solidFill>
+              </a:ln>
+            </p:spPr>
+            <p:txBody>
+              <a:bodyPr/>
+              <a:lstStyle/>
+              <a:p>
+                <a:r>
+                  <a:rPr lang="de-DE">
+                    <a:noFill/>
+                  </a:rPr>
+                  <a:t> </a:t>
+                </a:r>
+              </a:p>
+            </p:txBody>
+          </p:sp>
+        </mc:Fallback>
+      </mc:AlternateContent>
+      <mc:AlternateContent xmlns:mc="http://schemas.openxmlformats.org/markup-compatibility/2006">
+        <mc:Choice xmlns:a14="http://schemas.microsoft.com/office/drawing/2010/main" Requires="a14">
+          <p:sp>
+            <p:nvSpPr>
+              <p:cNvPr id="22" name="Textfeld 21">
+                <a:extLst>
+                  <a:ext uri="{FF2B5EF4-FFF2-40B4-BE49-F238E27FC236}">
+                    <a16:creationId xmlns:a16="http://schemas.microsoft.com/office/drawing/2014/main" id="{935D93BB-1C95-A787-6B51-42A0FF2A9242}"/>
+                  </a:ext>
+                </a:extLst>
+              </p:cNvPr>
+              <p:cNvSpPr txBox="1"/>
+              <p:nvPr/>
+            </p:nvSpPr>
+            <p:spPr>
+              <a:xfrm>
+                <a:off x="271610" y="3003780"/>
+                <a:ext cx="1440000" cy="276999"/>
+              </a:xfrm>
+              <a:prstGeom prst="rect">
+                <a:avLst/>
+              </a:prstGeom>
+              <a:noFill/>
+              <a:ln w="12700">
+                <a:solidFill>
+                  <a:schemeClr val="tx1"/>
+                </a:solidFill>
+              </a:ln>
+            </p:spPr>
+            <p:txBody>
+              <a:bodyPr wrap="square">
+                <a:spAutoFit/>
+              </a:bodyPr>
+              <a:lstStyle/>
+              <a:p>
+                <a14:m>
+                  <m:oMath xmlns:m="http://schemas.openxmlformats.org/officeDocument/2006/math">
+                    <m:sSub>
+                      <m:sSubPr>
+                        <m:ctrlPr>
+                          <a:rPr lang="en-GB" sz="1200" b="0" i="1" noProof="0" smtClean="0">
+                            <a:latin typeface="Cambria Math" panose="02040503050406030204" pitchFamily="18" charset="0"/>
+                            <a:ea typeface="Cambria Math" panose="02040503050406030204" pitchFamily="18" charset="0"/>
+                          </a:rPr>
+                        </m:ctrlPr>
+                      </m:sSubPr>
+                      <m:e>
+                        <m:r>
+                          <a:rPr lang="en-GB" sz="1200" b="0" i="1" noProof="0" smtClean="0">
+                            <a:latin typeface="Cambria Math" panose="02040503050406030204" pitchFamily="18" charset="0"/>
+                            <a:ea typeface="Cambria Math" panose="02040503050406030204" pitchFamily="18" charset="0"/>
+                          </a:rPr>
+                          <m:t>𝑝</m:t>
+                        </m:r>
+                      </m:e>
+                      <m:sub>
+                        <m:r>
+                          <a:rPr lang="en-GB" sz="1200" b="0" i="1" noProof="0" smtClean="0">
+                            <a:latin typeface="Cambria Math" panose="02040503050406030204" pitchFamily="18" charset="0"/>
+                            <a:ea typeface="Cambria Math" panose="02040503050406030204" pitchFamily="18" charset="0"/>
+                          </a:rPr>
+                          <m:t>1</m:t>
+                        </m:r>
+                      </m:sub>
+                    </m:sSub>
+                    <m:r>
+                      <a:rPr lang="en-GB" sz="1200" b="0" i="1" noProof="0" smtClean="0">
+                        <a:latin typeface="Cambria Math" panose="02040503050406030204" pitchFamily="18" charset="0"/>
+                        <a:ea typeface="Cambria Math" panose="02040503050406030204" pitchFamily="18" charset="0"/>
+                      </a:rPr>
+                      <m:t>&lt;</m:t>
+                    </m:r>
+                    <m:r>
+                      <a:rPr lang="en-GB" sz="1200" b="0" i="1" noProof="0" smtClean="0">
+                        <a:latin typeface="Cambria Math" panose="02040503050406030204" pitchFamily="18" charset="0"/>
+                        <a:ea typeface="Cambria Math" panose="02040503050406030204" pitchFamily="18" charset="0"/>
+                      </a:rPr>
+                      <m:t>𝛼</m:t>
+                    </m:r>
+                    <m:r>
+                      <a:rPr lang="en-GB" sz="1200" b="0" i="1" noProof="0" smtClean="0">
+                        <a:latin typeface="Cambria Math" panose="02040503050406030204" pitchFamily="18" charset="0"/>
+                        <a:ea typeface="Cambria Math" panose="02040503050406030204" pitchFamily="18" charset="0"/>
+                      </a:rPr>
+                      <m:t>  </m:t>
+                    </m:r>
+                  </m:oMath>
+                </a14:m>
+                <a:r>
+                  <a:rPr lang="en-GB" sz="1200" noProof="0" dirty="0">
+                    <a:latin typeface="Calibri" panose="020F0502020204030204" pitchFamily="34" charset="0"/>
+                    <a:ea typeface="Cambria Math" panose="02040503050406030204" pitchFamily="18" charset="0"/>
+                    <a:cs typeface="Calibri" panose="020F0502020204030204" pitchFamily="34" charset="0"/>
+                  </a:rPr>
+                  <a:t>or </a:t>
+                </a:r>
+                <a14:m>
+                  <m:oMath xmlns:m="http://schemas.openxmlformats.org/officeDocument/2006/math">
+                    <m:sSub>
+                      <m:sSubPr>
+                        <m:ctrlPr>
+                          <a:rPr lang="en-GB" sz="1200" i="1" noProof="0" smtClean="0">
+                            <a:latin typeface="Cambria Math" panose="02040503050406030204" pitchFamily="18" charset="0"/>
+                            <a:ea typeface="Cambria Math" panose="02040503050406030204" pitchFamily="18" charset="0"/>
+                          </a:rPr>
+                        </m:ctrlPr>
+                      </m:sSubPr>
+                      <m:e>
+                        <m:r>
+                          <a:rPr lang="en-GB" sz="1200" i="1" noProof="0" smtClean="0">
+                            <a:latin typeface="Cambria Math" panose="02040503050406030204" pitchFamily="18" charset="0"/>
+                            <a:ea typeface="Cambria Math" panose="02040503050406030204" pitchFamily="18" charset="0"/>
+                          </a:rPr>
+                          <m:t>𝑝</m:t>
+                        </m:r>
+                      </m:e>
+                      <m:sub>
+                        <m:r>
+                          <a:rPr lang="en-GB" sz="1200" b="0" i="1" noProof="0" smtClean="0">
+                            <a:latin typeface="Cambria Math" panose="02040503050406030204" pitchFamily="18" charset="0"/>
+                            <a:ea typeface="Cambria Math" panose="02040503050406030204" pitchFamily="18" charset="0"/>
+                          </a:rPr>
+                          <m:t>2</m:t>
+                        </m:r>
+                      </m:sub>
+                    </m:sSub>
+                    <m:r>
+                      <a:rPr lang="en-GB" sz="1200" i="1" noProof="0" smtClean="0">
+                        <a:latin typeface="Cambria Math" panose="02040503050406030204" pitchFamily="18" charset="0"/>
+                        <a:ea typeface="Cambria Math" panose="02040503050406030204" pitchFamily="18" charset="0"/>
+                      </a:rPr>
+                      <m:t>&lt;</m:t>
+                    </m:r>
+                    <m:r>
+                      <a:rPr lang="en-GB" sz="1200" i="1" noProof="0" smtClean="0">
+                        <a:latin typeface="Cambria Math" panose="02040503050406030204" pitchFamily="18" charset="0"/>
+                        <a:ea typeface="Cambria Math" panose="02040503050406030204" pitchFamily="18" charset="0"/>
+                      </a:rPr>
+                      <m:t>𝛼</m:t>
+                    </m:r>
+                  </m:oMath>
+                </a14:m>
+                <a:r>
+                  <a:rPr lang="en-GB" sz="1200" noProof="0" dirty="0">
+                    <a:latin typeface="Calibri" panose="020F0502020204030204" pitchFamily="34" charset="0"/>
+                    <a:ea typeface="Cambria Math" panose="02040503050406030204" pitchFamily="18" charset="0"/>
+                    <a:cs typeface="Calibri" panose="020F0502020204030204" pitchFamily="34" charset="0"/>
+                  </a:rPr>
+                  <a:t> </a:t>
+                </a:r>
+              </a:p>
+            </p:txBody>
+          </p:sp>
+        </mc:Choice>
+        <mc:Fallback>
+          <p:sp>
+            <p:nvSpPr>
+              <p:cNvPr id="22" name="Textfeld 21">
+                <a:extLst>
+                  <a:ext uri="{FF2B5EF4-FFF2-40B4-BE49-F238E27FC236}">
+                    <a16:creationId xmlns:a16="http://schemas.microsoft.com/office/drawing/2014/main" id="{935D93BB-1C95-A787-6B51-42A0FF2A9242}"/>
+                  </a:ext>
+                </a:extLst>
+              </p:cNvPr>
+              <p:cNvSpPr txBox="1">
+                <a:spLocks noRot="1" noChangeAspect="1" noMove="1" noResize="1" noEditPoints="1" noAdjustHandles="1" noChangeArrowheads="1" noChangeShapeType="1" noTextEdit="1"/>
+              </p:cNvSpPr>
+              <p:nvPr/>
+            </p:nvSpPr>
+            <p:spPr>
+              <a:xfrm>
+                <a:off x="271610" y="3003780"/>
+                <a:ext cx="1440000" cy="276999"/>
+              </a:xfrm>
+              <a:prstGeom prst="rect">
+                <a:avLst/>
+              </a:prstGeom>
+              <a:blipFill>
+                <a:blip r:embed="rId9"/>
+                <a:stretch>
+                  <a:fillRect b="-13043"/>
+                </a:stretch>
+              </a:blipFill>
+              <a:ln w="12700">
+                <a:solidFill>
+                  <a:schemeClr val="tx1"/>
+                </a:solidFill>
+              </a:ln>
+            </p:spPr>
+            <p:txBody>
+              <a:bodyPr/>
+              <a:lstStyle/>
+              <a:p>
+                <a:r>
+                  <a:rPr lang="de-DE">
+                    <a:noFill/>
+                  </a:rPr>
+                  <a:t> </a:t>
+                </a:r>
+              </a:p>
+            </p:txBody>
+          </p:sp>
+        </mc:Fallback>
+      </mc:AlternateContent>
+      <p:sp>
+        <p:nvSpPr>
+          <p:cNvPr id="23" name="Textfeld 22">
+            <a:extLst>
+              <a:ext uri="{FF2B5EF4-FFF2-40B4-BE49-F238E27FC236}">
+                <a16:creationId xmlns:a16="http://schemas.microsoft.com/office/drawing/2014/main" id="{4962E47A-D838-C779-D5B4-7C91FDFA8D4F}"/>
+              </a:ext>
+            </a:extLst>
+          </p:cNvPr>
+          <p:cNvSpPr txBox="1"/>
+          <p:nvPr/>
+        </p:nvSpPr>
+        <p:spPr>
+          <a:xfrm>
+            <a:off x="219834" y="4971020"/>
+            <a:ext cx="1447008" cy="276999"/>
+          </a:xfrm>
+          <a:prstGeom prst="rect">
+            <a:avLst/>
+          </a:prstGeom>
+          <a:solidFill>
+            <a:schemeClr val="accent1">
+              <a:lumMod val="40000"/>
+              <a:lumOff val="60000"/>
+            </a:schemeClr>
+          </a:solidFill>
+          <a:ln w="12700">
+            <a:solidFill>
+              <a:schemeClr val="tx1"/>
+            </a:solidFill>
+          </a:ln>
+        </p:spPr>
+        <p:txBody>
+          <a:bodyPr wrap="square">
+            <a:spAutoFit/>
+          </a:bodyPr>
+          <a:lstStyle>
+            <a:defPPr>
+              <a:defRPr lang="de-DE"/>
+            </a:defPPr>
+            <a:lvl1pPr algn="ctr">
+              <a:defRPr sz="1200"/>
+            </a:lvl1pPr>
+          </a:lstStyle>
+          <a:p>
+            <a:r>
+              <a:rPr lang="en-GB" noProof="0" dirty="0" err="1">
+                <a:latin typeface="Courier New" panose="02070309020205020404" pitchFamily="49" charset="0"/>
+                <a:ea typeface="Cambria Math" panose="02040503050406030204" pitchFamily="18" charset="0"/>
+                <a:cs typeface="Courier New" panose="02070309020205020404" pitchFamily="49" charset="0"/>
+              </a:rPr>
+              <a:t>wilcox.test</a:t>
+            </a:r>
+            <a:r>
+              <a:rPr lang="en-GB" noProof="0" dirty="0">
+                <a:latin typeface="Courier New" panose="02070309020205020404" pitchFamily="49" charset="0"/>
+                <a:ea typeface="Cambria Math" panose="02040503050406030204" pitchFamily="18" charset="0"/>
+                <a:cs typeface="Courier New" panose="02070309020205020404" pitchFamily="49" charset="0"/>
+              </a:rPr>
+              <a:t>()</a:t>
+            </a:r>
+          </a:p>
+        </p:txBody>
+      </p:sp>
+      <p:sp>
+        <p:nvSpPr>
+          <p:cNvPr id="27" name="Textfeld 26">
+            <a:extLst>
+              <a:ext uri="{FF2B5EF4-FFF2-40B4-BE49-F238E27FC236}">
+                <a16:creationId xmlns:a16="http://schemas.microsoft.com/office/drawing/2014/main" id="{0644D9CF-CD52-FF0C-4442-A4247BB3D4A1}"/>
+              </a:ext>
+            </a:extLst>
+          </p:cNvPr>
+          <p:cNvSpPr txBox="1"/>
+          <p:nvPr/>
+        </p:nvSpPr>
+        <p:spPr>
+          <a:xfrm>
+            <a:off x="5130837" y="4971019"/>
+            <a:ext cx="2338435" cy="276999"/>
+          </a:xfrm>
+          <a:prstGeom prst="rect">
+            <a:avLst/>
+          </a:prstGeom>
+          <a:solidFill>
+            <a:schemeClr val="accent1">
+              <a:lumMod val="40000"/>
+              <a:lumOff val="60000"/>
+            </a:schemeClr>
+          </a:solidFill>
+          <a:ln w="12700">
+            <a:solidFill>
+              <a:schemeClr val="accent1">
+                <a:lumMod val="40000"/>
+                <a:lumOff val="60000"/>
+              </a:schemeClr>
+            </a:solidFill>
+          </a:ln>
+        </p:spPr>
+        <p:txBody>
+          <a:bodyPr wrap="square">
+            <a:spAutoFit/>
+          </a:bodyPr>
+          <a:lstStyle>
+            <a:defPPr>
+              <a:defRPr lang="de-DE"/>
+            </a:defPPr>
+            <a:lvl1pPr algn="ctr">
+              <a:defRPr sz="1200"/>
+            </a:lvl1pPr>
+          </a:lstStyle>
+          <a:p>
+            <a:r>
+              <a:rPr lang="en-GB" noProof="0" dirty="0" err="1">
+                <a:latin typeface="Courier New" panose="02070309020205020404" pitchFamily="49" charset="0"/>
+                <a:ea typeface="Cambria Math" panose="02040503050406030204" pitchFamily="18" charset="0"/>
+                <a:cs typeface="Courier New" panose="02070309020205020404" pitchFamily="49" charset="0"/>
+              </a:rPr>
+              <a:t>kruskal.test</a:t>
+            </a:r>
+            <a:r>
+              <a:rPr lang="en-GB" noProof="0" dirty="0">
+                <a:latin typeface="Courier New" panose="02070309020205020404" pitchFamily="49" charset="0"/>
+                <a:ea typeface="Cambria Math" panose="02040503050406030204" pitchFamily="18" charset="0"/>
+                <a:cs typeface="Courier New" panose="02070309020205020404" pitchFamily="49" charset="0"/>
+              </a:rPr>
+              <a:t>()</a:t>
+            </a:r>
+          </a:p>
+        </p:txBody>
+      </p:sp>
+      <p:sp>
+        <p:nvSpPr>
+          <p:cNvPr id="28" name="Textfeld 27">
+            <a:extLst>
+              <a:ext uri="{FF2B5EF4-FFF2-40B4-BE49-F238E27FC236}">
+                <a16:creationId xmlns:a16="http://schemas.microsoft.com/office/drawing/2014/main" id="{0F0AEF4C-6AC0-4916-C978-C601B1A9FC63}"/>
+              </a:ext>
+            </a:extLst>
+          </p:cNvPr>
+          <p:cNvSpPr txBox="1"/>
+          <p:nvPr/>
+        </p:nvSpPr>
+        <p:spPr>
+          <a:xfrm>
+            <a:off x="7559455" y="3878295"/>
+            <a:ext cx="2795001" cy="280863"/>
+          </a:xfrm>
+          <a:prstGeom prst="rect">
+            <a:avLst/>
+          </a:prstGeom>
+          <a:solidFill>
+            <a:schemeClr val="accent6">
+              <a:lumMod val="20000"/>
+              <a:lumOff val="80000"/>
+            </a:schemeClr>
+          </a:solidFill>
+          <a:ln w="12700">
+            <a:solidFill>
+              <a:schemeClr val="accent1">
+                <a:lumMod val="40000"/>
+                <a:lumOff val="60000"/>
+              </a:schemeClr>
+            </a:solidFill>
+          </a:ln>
+        </p:spPr>
+        <p:txBody>
+          <a:bodyPr wrap="square">
+            <a:spAutoFit/>
+          </a:bodyPr>
+          <a:lstStyle/>
+          <a:p>
+            <a:pPr algn="ctr"/>
+            <a:r>
+              <a:rPr lang="en-GB" sz="1200" noProof="0" dirty="0" err="1">
+                <a:latin typeface="Courier New" panose="02070309020205020404" pitchFamily="49" charset="0"/>
+                <a:ea typeface="Cambria Math" panose="02040503050406030204" pitchFamily="18" charset="0"/>
+                <a:cs typeface="Courier New" panose="02070309020205020404" pitchFamily="49" charset="0"/>
+              </a:rPr>
+              <a:t>bartlett.test</a:t>
+            </a:r>
+            <a:r>
+              <a:rPr lang="en-GB" sz="1200" noProof="0" dirty="0">
+                <a:latin typeface="Courier New" panose="02070309020205020404" pitchFamily="49" charset="0"/>
+                <a:ea typeface="Cambria Math" panose="02040503050406030204" pitchFamily="18" charset="0"/>
+                <a:cs typeface="Courier New" panose="02070309020205020404" pitchFamily="49" charset="0"/>
+              </a:rPr>
+              <a:t>() </a:t>
+            </a:r>
+          </a:p>
+        </p:txBody>
+      </p:sp>
+      <mc:AlternateContent xmlns:mc="http://schemas.openxmlformats.org/markup-compatibility/2006" xmlns:a14="http://schemas.microsoft.com/office/drawing/2010/main">
+        <mc:Choice Requires="a14">
+          <p:sp>
+            <p:nvSpPr>
+              <p:cNvPr id="29" name="Textfeld 28">
+                <a:extLst>
+                  <a:ext uri="{FF2B5EF4-FFF2-40B4-BE49-F238E27FC236}">
+                    <a16:creationId xmlns:a16="http://schemas.microsoft.com/office/drawing/2014/main" id="{6A843E82-AE36-2049-F32E-7DB7C257BD0C}"/>
+                  </a:ext>
+                </a:extLst>
+              </p:cNvPr>
+              <p:cNvSpPr txBox="1"/>
+              <p:nvPr/>
+            </p:nvSpPr>
+            <p:spPr>
+              <a:xfrm>
+                <a:off x="9261991" y="4482840"/>
+                <a:ext cx="1080000" cy="277200"/>
+              </a:xfrm>
+              <a:prstGeom prst="rect">
+                <a:avLst/>
+              </a:prstGeom>
+              <a:noFill/>
+              <a:ln w="12700">
+                <a:solidFill>
+                  <a:schemeClr val="accent1">
+                    <a:lumMod val="40000"/>
+                    <a:lumOff val="60000"/>
+                  </a:schemeClr>
+                </a:solidFill>
+              </a:ln>
+            </p:spPr>
+            <p:txBody>
+              <a:bodyPr wrap="square">
+                <a:spAutoFit/>
+              </a:bodyPr>
+              <a:lstStyle/>
+              <a:p>
+                <a:pPr algn="ctr"/>
+                <a14:m>
+                  <m:oMathPara xmlns:m="http://schemas.openxmlformats.org/officeDocument/2006/math">
+                    <m:oMathParaPr>
+                      <m:jc m:val="centerGroup"/>
+                    </m:oMathParaPr>
+                    <m:oMath xmlns:m="http://schemas.openxmlformats.org/officeDocument/2006/math">
+                      <m:r>
+                        <a:rPr lang="en-GB" sz="1200" b="0" i="1" noProof="0" smtClean="0">
+                          <a:latin typeface="Cambria Math" panose="02040503050406030204" pitchFamily="18" charset="0"/>
+                          <a:ea typeface="Cambria Math" panose="02040503050406030204" pitchFamily="18" charset="0"/>
+                        </a:rPr>
+                        <m:t>𝑝</m:t>
+                      </m:r>
+                      <m:r>
+                        <a:rPr lang="en-GB" sz="1200" b="0" i="1" noProof="0" smtClean="0">
+                          <a:latin typeface="Cambria Math" panose="02040503050406030204" pitchFamily="18" charset="0"/>
+                          <a:ea typeface="Cambria Math" panose="02040503050406030204" pitchFamily="18" charset="0"/>
+                        </a:rPr>
+                        <m:t>≥</m:t>
+                      </m:r>
+                      <m:r>
+                        <a:rPr lang="en-GB" sz="1200" b="0" i="1" noProof="0" smtClean="0">
+                          <a:latin typeface="Cambria Math" panose="02040503050406030204" pitchFamily="18" charset="0"/>
+                          <a:ea typeface="Cambria Math" panose="02040503050406030204" pitchFamily="18" charset="0"/>
+                        </a:rPr>
+                        <m:t>𝛼</m:t>
+                      </m:r>
+                    </m:oMath>
+                  </m:oMathPara>
+                </a14:m>
+                <a:endParaRPr lang="en-GB" sz="1200" noProof="0" dirty="0">
+                  <a:latin typeface="Calibri" panose="020F0502020204030204" pitchFamily="34" charset="0"/>
+                  <a:ea typeface="Cambria Math" panose="02040503050406030204" pitchFamily="18" charset="0"/>
+                  <a:cs typeface="Calibri" panose="020F0502020204030204" pitchFamily="34" charset="0"/>
+                </a:endParaRPr>
+              </a:p>
+            </p:txBody>
+          </p:sp>
+        </mc:Choice>
+        <mc:Fallback xmlns="">
+          <p:sp>
+            <p:nvSpPr>
+              <p:cNvPr id="29" name="Textfeld 28">
+                <a:extLst>
+                  <a:ext uri="{FF2B5EF4-FFF2-40B4-BE49-F238E27FC236}">
+                    <a16:creationId xmlns:a16="http://schemas.microsoft.com/office/drawing/2014/main" id="{A1E211F9-17D8-404F-BDD9-8FA1CF6DEBDF}"/>
+                  </a:ext>
+                </a:extLst>
+              </p:cNvPr>
+              <p:cNvSpPr txBox="1">
+                <a:spLocks noRot="1" noChangeAspect="1" noMove="1" noResize="1" noEditPoints="1" noAdjustHandles="1" noChangeArrowheads="1" noChangeShapeType="1" noTextEdit="1"/>
+              </p:cNvSpPr>
+              <p:nvPr/>
+            </p:nvSpPr>
+            <p:spPr>
+              <a:xfrm>
+                <a:off x="9261991" y="4482840"/>
+                <a:ext cx="1080000" cy="277200"/>
+              </a:xfrm>
+              <a:prstGeom prst="rect">
+                <a:avLst/>
+              </a:prstGeom>
+              <a:blipFill>
+                <a:blip r:embed="rId10"/>
+                <a:stretch>
+                  <a:fillRect/>
+                </a:stretch>
+              </a:blipFill>
+              <a:ln w="12700">
+                <a:solidFill>
+                  <a:schemeClr val="accent1">
+                    <a:lumMod val="40000"/>
+                    <a:lumOff val="60000"/>
+                  </a:schemeClr>
+                </a:solidFill>
+              </a:ln>
+            </p:spPr>
+            <p:txBody>
+              <a:bodyPr/>
+              <a:lstStyle/>
+              <a:p>
+                <a:r>
+                  <a:rPr lang="de-DE">
+                    <a:noFill/>
+                  </a:rPr>
+                  <a:t> </a:t>
+                </a:r>
+              </a:p>
+            </p:txBody>
+          </p:sp>
+        </mc:Fallback>
+      </mc:AlternateContent>
+      <mc:AlternateContent xmlns:mc="http://schemas.openxmlformats.org/markup-compatibility/2006" xmlns:a14="http://schemas.microsoft.com/office/drawing/2010/main">
+        <mc:Choice Requires="a14">
+          <p:sp>
+            <p:nvSpPr>
+              <p:cNvPr id="30" name="Textfeld 29">
+                <a:extLst>
+                  <a:ext uri="{FF2B5EF4-FFF2-40B4-BE49-F238E27FC236}">
+                    <a16:creationId xmlns:a16="http://schemas.microsoft.com/office/drawing/2014/main" id="{535CC64A-5626-C143-9BE2-9D075A38E65A}"/>
+                  </a:ext>
+                </a:extLst>
+              </p:cNvPr>
+              <p:cNvSpPr txBox="1"/>
+              <p:nvPr/>
+            </p:nvSpPr>
+            <p:spPr>
+              <a:xfrm>
+                <a:off x="7582544" y="4472251"/>
+                <a:ext cx="1080000" cy="276999"/>
+              </a:xfrm>
+              <a:prstGeom prst="rect">
+                <a:avLst/>
+              </a:prstGeom>
+              <a:noFill/>
+              <a:ln w="12700">
+                <a:solidFill>
+                  <a:schemeClr val="accent1">
+                    <a:lumMod val="40000"/>
+                    <a:lumOff val="60000"/>
+                  </a:schemeClr>
+                </a:solidFill>
+              </a:ln>
+            </p:spPr>
+            <p:txBody>
+              <a:bodyPr wrap="square">
+                <a:spAutoFit/>
+              </a:bodyPr>
+              <a:lstStyle/>
+              <a:p>
+                <a:pPr algn="ctr"/>
+                <a14:m>
+                  <m:oMathPara xmlns:m="http://schemas.openxmlformats.org/officeDocument/2006/math">
+                    <m:oMathParaPr>
+                      <m:jc m:val="centerGroup"/>
+                    </m:oMathParaPr>
+                    <m:oMath xmlns:m="http://schemas.openxmlformats.org/officeDocument/2006/math">
+                      <m:r>
+                        <a:rPr lang="en-GB" sz="1200" b="0" i="1" noProof="0" smtClean="0">
+                          <a:latin typeface="Cambria Math" panose="02040503050406030204" pitchFamily="18" charset="0"/>
+                          <a:ea typeface="Cambria Math" panose="02040503050406030204" pitchFamily="18" charset="0"/>
+                        </a:rPr>
+                        <m:t>𝑝</m:t>
+                      </m:r>
+                      <m:r>
+                        <a:rPr lang="en-GB" sz="1200" b="0" i="1" noProof="0" smtClean="0">
+                          <a:latin typeface="Cambria Math" panose="02040503050406030204" pitchFamily="18" charset="0"/>
+                          <a:ea typeface="Cambria Math" panose="02040503050406030204" pitchFamily="18" charset="0"/>
+                        </a:rPr>
+                        <m:t>&lt;</m:t>
+                      </m:r>
+                      <m:r>
+                        <a:rPr lang="en-GB" sz="1200" b="0" i="1" noProof="0" smtClean="0">
+                          <a:latin typeface="Cambria Math" panose="02040503050406030204" pitchFamily="18" charset="0"/>
+                          <a:ea typeface="Cambria Math" panose="02040503050406030204" pitchFamily="18" charset="0"/>
+                        </a:rPr>
+                        <m:t>𝛼</m:t>
+                      </m:r>
+                    </m:oMath>
+                  </m:oMathPara>
+                </a14:m>
+                <a:endParaRPr lang="en-GB" sz="1200" noProof="0" dirty="0">
+                  <a:latin typeface="Calibri" panose="020F0502020204030204" pitchFamily="34" charset="0"/>
+                  <a:ea typeface="Cambria Math" panose="02040503050406030204" pitchFamily="18" charset="0"/>
+                  <a:cs typeface="Calibri" panose="020F0502020204030204" pitchFamily="34" charset="0"/>
+                </a:endParaRPr>
+              </a:p>
+            </p:txBody>
+          </p:sp>
+        </mc:Choice>
+        <mc:Fallback xmlns="">
+          <p:sp>
+            <p:nvSpPr>
+              <p:cNvPr id="30" name="Textfeld 29">
+                <a:extLst>
+                  <a:ext uri="{FF2B5EF4-FFF2-40B4-BE49-F238E27FC236}">
+                    <a16:creationId xmlns:a16="http://schemas.microsoft.com/office/drawing/2014/main" id="{5E44A5B4-1C65-9447-A4FA-813B5715A602}"/>
+                  </a:ext>
+                </a:extLst>
+              </p:cNvPr>
+              <p:cNvSpPr txBox="1">
+                <a:spLocks noRot="1" noChangeAspect="1" noMove="1" noResize="1" noEditPoints="1" noAdjustHandles="1" noChangeArrowheads="1" noChangeShapeType="1" noTextEdit="1"/>
+              </p:cNvSpPr>
+              <p:nvPr/>
+            </p:nvSpPr>
+            <p:spPr>
+              <a:xfrm>
+                <a:off x="7582544" y="4472251"/>
+                <a:ext cx="1080000" cy="276999"/>
+              </a:xfrm>
+              <a:prstGeom prst="rect">
+                <a:avLst/>
+              </a:prstGeom>
+              <a:blipFill>
+                <a:blip r:embed="rId11"/>
+                <a:stretch>
+                  <a:fillRect/>
+                </a:stretch>
+              </a:blipFill>
+              <a:ln w="12700">
+                <a:solidFill>
+                  <a:schemeClr val="accent1">
+                    <a:lumMod val="40000"/>
+                    <a:lumOff val="60000"/>
+                  </a:schemeClr>
+                </a:solidFill>
+              </a:ln>
+            </p:spPr>
+            <p:txBody>
+              <a:bodyPr/>
+              <a:lstStyle/>
+              <a:p>
+                <a:r>
+                  <a:rPr lang="de-DE">
+                    <a:noFill/>
+                  </a:rPr>
+                  <a:t> </a:t>
+                </a:r>
+              </a:p>
+            </p:txBody>
+          </p:sp>
+        </mc:Fallback>
+      </mc:AlternateContent>
+      <p:sp>
+        <p:nvSpPr>
+          <p:cNvPr id="31" name="Textfeld 30">
+            <a:extLst>
+              <a:ext uri="{FF2B5EF4-FFF2-40B4-BE49-F238E27FC236}">
+                <a16:creationId xmlns:a16="http://schemas.microsoft.com/office/drawing/2014/main" id="{568EBC00-FD00-E246-A517-9021CAF2EEED}"/>
+              </a:ext>
+            </a:extLst>
+          </p:cNvPr>
+          <p:cNvSpPr txBox="1"/>
+          <p:nvPr/>
+        </p:nvSpPr>
+        <p:spPr>
+          <a:xfrm>
+            <a:off x="7579542" y="4968485"/>
+            <a:ext cx="1457998" cy="276999"/>
+          </a:xfrm>
+          <a:prstGeom prst="rect">
+            <a:avLst/>
+          </a:prstGeom>
+          <a:solidFill>
+            <a:schemeClr val="accent4">
+              <a:alpha val="19758"/>
+            </a:schemeClr>
+          </a:solidFill>
+          <a:ln w="12700">
+            <a:solidFill>
+              <a:schemeClr val="accent1">
+                <a:lumMod val="40000"/>
+                <a:lumOff val="60000"/>
+              </a:schemeClr>
+            </a:solidFill>
+          </a:ln>
+        </p:spPr>
+        <p:txBody>
+          <a:bodyPr wrap="square">
+            <a:spAutoFit/>
+          </a:bodyPr>
+          <a:lstStyle>
+            <a:defPPr>
+              <a:defRPr lang="de-DE"/>
+            </a:defPPr>
+            <a:lvl1pPr algn="ctr">
+              <a:defRPr sz="1200"/>
+            </a:lvl1pPr>
+          </a:lstStyle>
+          <a:p>
+            <a:r>
+              <a:rPr lang="en-GB" noProof="0" dirty="0" err="1">
+                <a:latin typeface="Courier New" panose="02070309020205020404" pitchFamily="49" charset="0"/>
+                <a:ea typeface="Cambria Math" panose="02040503050406030204" pitchFamily="18" charset="0"/>
+                <a:cs typeface="Courier New" panose="02070309020205020404" pitchFamily="49" charset="0"/>
+              </a:rPr>
+              <a:t>oneway.test</a:t>
+            </a:r>
+            <a:r>
+              <a:rPr lang="en-GB" noProof="0" dirty="0">
+                <a:latin typeface="Courier New" panose="02070309020205020404" pitchFamily="49" charset="0"/>
+                <a:ea typeface="Cambria Math" panose="02040503050406030204" pitchFamily="18" charset="0"/>
+                <a:cs typeface="Courier New" panose="02070309020205020404" pitchFamily="49" charset="0"/>
+              </a:rPr>
+              <a:t>()</a:t>
+            </a:r>
+          </a:p>
+        </p:txBody>
+      </p:sp>
+      <p:sp>
+        <p:nvSpPr>
+          <p:cNvPr id="32" name="Textfeld 31">
+            <a:extLst>
+              <a:ext uri="{FF2B5EF4-FFF2-40B4-BE49-F238E27FC236}">
+                <a16:creationId xmlns:a16="http://schemas.microsoft.com/office/drawing/2014/main" id="{15E6515F-83AA-08EF-8A65-00AE681B3602}"/>
+              </a:ext>
+            </a:extLst>
+          </p:cNvPr>
+          <p:cNvSpPr txBox="1"/>
+          <p:nvPr/>
+        </p:nvSpPr>
+        <p:spPr>
+          <a:xfrm>
+            <a:off x="9168872" y="4968284"/>
+            <a:ext cx="1168942" cy="276999"/>
+          </a:xfrm>
+          <a:prstGeom prst="rect">
+            <a:avLst/>
+          </a:prstGeom>
+          <a:solidFill>
+            <a:schemeClr val="accent4">
+              <a:alpha val="19758"/>
+            </a:schemeClr>
+          </a:solidFill>
+          <a:ln w="12700">
+            <a:solidFill>
+              <a:schemeClr val="accent1">
+                <a:lumMod val="40000"/>
+                <a:lumOff val="60000"/>
+              </a:schemeClr>
+            </a:solidFill>
+          </a:ln>
+        </p:spPr>
+        <p:txBody>
+          <a:bodyPr wrap="square">
+            <a:spAutoFit/>
+          </a:bodyPr>
+          <a:lstStyle/>
+          <a:p>
+            <a:pPr algn="ctr"/>
+            <a:r>
+              <a:rPr lang="en-GB" sz="1200" noProof="0" dirty="0" err="1">
+                <a:latin typeface="Courier New" panose="02070309020205020404" pitchFamily="49" charset="0"/>
+                <a:ea typeface="Cambria Math" panose="02040503050406030204" pitchFamily="18" charset="0"/>
+                <a:cs typeface="Courier New" panose="02070309020205020404" pitchFamily="49" charset="0"/>
+              </a:rPr>
+              <a:t>aov</a:t>
+            </a:r>
+            <a:r>
+              <a:rPr lang="en-GB" sz="1200" noProof="0" dirty="0">
+                <a:latin typeface="Courier New" panose="02070309020205020404" pitchFamily="49" charset="0"/>
+                <a:ea typeface="Cambria Math" panose="02040503050406030204" pitchFamily="18" charset="0"/>
+                <a:cs typeface="Courier New" panose="02070309020205020404" pitchFamily="49" charset="0"/>
+              </a:rPr>
+              <a:t>()</a:t>
+            </a:r>
+          </a:p>
+        </p:txBody>
+      </p:sp>
+      <p:grpSp>
+        <p:nvGrpSpPr>
+          <p:cNvPr id="427" name="Gruppieren 426">
+            <a:extLst>
+              <a:ext uri="{FF2B5EF4-FFF2-40B4-BE49-F238E27FC236}">
+                <a16:creationId xmlns:a16="http://schemas.microsoft.com/office/drawing/2014/main" id="{D3A534CE-84E6-368A-DD37-D6F5A126F136}"/>
+              </a:ext>
+            </a:extLst>
+          </p:cNvPr>
+          <p:cNvGrpSpPr/>
+          <p:nvPr/>
+        </p:nvGrpSpPr>
+        <p:grpSpPr>
+          <a:xfrm>
+            <a:off x="8296125" y="4173488"/>
+            <a:ext cx="1289076" cy="305400"/>
+            <a:chOff x="8002301" y="4581613"/>
+            <a:chExt cx="1289076" cy="305400"/>
+          </a:xfrm>
+        </p:grpSpPr>
+        <p:cxnSp>
+          <p:nvCxnSpPr>
+            <p:cNvPr id="85" name="Gerade Verbindung mit Pfeil 84">
+              <a:extLst>
+                <a:ext uri="{FF2B5EF4-FFF2-40B4-BE49-F238E27FC236}">
+                  <a16:creationId xmlns:a16="http://schemas.microsoft.com/office/drawing/2014/main" id="{707EAF21-9518-3159-BE43-A30A8AEA8FA2}"/>
+                </a:ext>
+              </a:extLst>
+            </p:cNvPr>
+            <p:cNvCxnSpPr>
+              <a:cxnSpLocks/>
+            </p:cNvCxnSpPr>
+            <p:nvPr/>
+          </p:nvCxnSpPr>
+          <p:spPr>
+            <a:xfrm flipH="1">
+              <a:off x="8002301" y="4581613"/>
+              <a:ext cx="639486" cy="305400"/>
+            </a:xfrm>
+            <a:prstGeom prst="straightConnector1">
+              <a:avLst/>
+            </a:prstGeom>
+            <a:ln>
+              <a:tailEnd type="triangle"/>
+            </a:ln>
+          </p:spPr>
+          <p:style>
+            <a:lnRef idx="1">
+              <a:schemeClr val="accent1"/>
+            </a:lnRef>
+            <a:fillRef idx="0">
+              <a:schemeClr val="accent1"/>
+            </a:fillRef>
+            <a:effectRef idx="0">
+              <a:schemeClr val="accent1"/>
+            </a:effectRef>
+            <a:fontRef idx="minor">
+              <a:schemeClr val="tx1"/>
+            </a:fontRef>
+          </p:style>
+        </p:cxnSp>
+        <p:cxnSp>
+          <p:nvCxnSpPr>
+            <p:cNvPr id="86" name="Gerade Verbindung mit Pfeil 85">
+              <a:extLst>
+                <a:ext uri="{FF2B5EF4-FFF2-40B4-BE49-F238E27FC236}">
+                  <a16:creationId xmlns:a16="http://schemas.microsoft.com/office/drawing/2014/main" id="{62546CDC-7C3B-F9AE-901A-BBC57BD2E83B}"/>
+                </a:ext>
+              </a:extLst>
+            </p:cNvPr>
+            <p:cNvCxnSpPr>
+              <a:cxnSpLocks/>
+            </p:cNvCxnSpPr>
+            <p:nvPr/>
+          </p:nvCxnSpPr>
+          <p:spPr>
+            <a:xfrm>
+              <a:off x="8641787" y="4581613"/>
+              <a:ext cx="649590" cy="305400"/>
+            </a:xfrm>
+            <a:prstGeom prst="straightConnector1">
+              <a:avLst/>
+            </a:prstGeom>
+            <a:ln>
+              <a:tailEnd type="triangle"/>
+            </a:ln>
+          </p:spPr>
+          <p:style>
+            <a:lnRef idx="1">
+              <a:schemeClr val="accent1"/>
+            </a:lnRef>
+            <a:fillRef idx="0">
+              <a:schemeClr val="accent1"/>
+            </a:fillRef>
+            <a:effectRef idx="0">
+              <a:schemeClr val="accent1"/>
+            </a:effectRef>
+            <a:fontRef idx="minor">
+              <a:schemeClr val="tx1"/>
+            </a:fontRef>
+          </p:style>
+        </p:cxnSp>
+      </p:grpSp>
+      <p:sp>
+        <p:nvSpPr>
+          <p:cNvPr id="93" name="Textfeld 92">
+            <a:extLst>
+              <a:ext uri="{FF2B5EF4-FFF2-40B4-BE49-F238E27FC236}">
+                <a16:creationId xmlns:a16="http://schemas.microsoft.com/office/drawing/2014/main" id="{9DACF3C4-FAF8-1492-DA7F-B5BBFD222B05}"/>
+              </a:ext>
+            </a:extLst>
+          </p:cNvPr>
+          <p:cNvSpPr txBox="1"/>
+          <p:nvPr/>
+        </p:nvSpPr>
+        <p:spPr>
+          <a:xfrm>
+            <a:off x="7588434" y="5449810"/>
+            <a:ext cx="2795000" cy="280863"/>
+          </a:xfrm>
+          <a:prstGeom prst="rect">
+            <a:avLst/>
+          </a:prstGeom>
+          <a:solidFill>
+            <a:schemeClr val="bg2">
+              <a:lumMod val="90000"/>
+            </a:schemeClr>
+          </a:solidFill>
+          <a:ln w="12700">
+            <a:solidFill>
+              <a:schemeClr val="accent1">
+                <a:lumMod val="40000"/>
+                <a:lumOff val="60000"/>
+              </a:schemeClr>
+            </a:solidFill>
+          </a:ln>
+        </p:spPr>
+        <p:txBody>
+          <a:bodyPr wrap="square">
+            <a:spAutoFit/>
+          </a:bodyPr>
+          <a:lstStyle>
+            <a:defPPr>
+              <a:defRPr lang="de-DE"/>
+            </a:defPPr>
+            <a:lvl1pPr algn="ctr">
+              <a:defRPr sz="1200"/>
+            </a:lvl1pPr>
+          </a:lstStyle>
+          <a:p>
+            <a:r>
+              <a:rPr lang="en-GB" noProof="0" dirty="0" err="1">
+                <a:latin typeface="Courier New" panose="02070309020205020404" pitchFamily="49" charset="0"/>
+                <a:ea typeface="Cambria Math" panose="02040503050406030204" pitchFamily="18" charset="0"/>
+                <a:cs typeface="Courier New" panose="02070309020205020404" pitchFamily="49" charset="0"/>
+              </a:rPr>
+              <a:t>TukeyHSD</a:t>
+            </a:r>
+            <a:r>
+              <a:rPr lang="en-GB" noProof="0" dirty="0">
+                <a:latin typeface="Courier New" panose="02070309020205020404" pitchFamily="49" charset="0"/>
+                <a:ea typeface="Cambria Math" panose="02040503050406030204" pitchFamily="18" charset="0"/>
+                <a:cs typeface="Courier New" panose="02070309020205020404" pitchFamily="49" charset="0"/>
+              </a:rPr>
+              <a:t>()</a:t>
+            </a:r>
+          </a:p>
+        </p:txBody>
+      </p:sp>
+      <p:sp>
+        <p:nvSpPr>
+          <p:cNvPr id="94" name="Textfeld 93">
+            <a:extLst>
+              <a:ext uri="{FF2B5EF4-FFF2-40B4-BE49-F238E27FC236}">
+                <a16:creationId xmlns:a16="http://schemas.microsoft.com/office/drawing/2014/main" id="{96AD3D76-097F-C0EA-C7DD-0981F3E66582}"/>
+              </a:ext>
+            </a:extLst>
+          </p:cNvPr>
+          <p:cNvSpPr txBox="1"/>
+          <p:nvPr/>
+        </p:nvSpPr>
+        <p:spPr>
+          <a:xfrm>
+            <a:off x="5130837" y="5449811"/>
+            <a:ext cx="2341205" cy="276999"/>
+          </a:xfrm>
+          <a:prstGeom prst="rect">
+            <a:avLst/>
+          </a:prstGeom>
+          <a:solidFill>
+            <a:schemeClr val="bg2">
+              <a:lumMod val="90000"/>
+            </a:schemeClr>
+          </a:solidFill>
+          <a:ln w="12700">
+            <a:solidFill>
+              <a:schemeClr val="accent1">
+                <a:lumMod val="40000"/>
+                <a:lumOff val="60000"/>
+              </a:schemeClr>
+            </a:solidFill>
+          </a:ln>
+        </p:spPr>
+        <p:txBody>
+          <a:bodyPr wrap="square">
+            <a:spAutoFit/>
+          </a:bodyPr>
+          <a:lstStyle/>
+          <a:p>
+            <a:pPr algn="ctr"/>
+            <a:r>
+              <a:rPr lang="en-GB" sz="1200" noProof="0" dirty="0" err="1">
+                <a:latin typeface="Courier New" panose="02070309020205020404" pitchFamily="49" charset="0"/>
+                <a:ea typeface="Cambria Math" panose="02040503050406030204" pitchFamily="18" charset="0"/>
+                <a:cs typeface="Courier New" panose="02070309020205020404" pitchFamily="49" charset="0"/>
+              </a:rPr>
+              <a:t>pairwise.wilcox.test</a:t>
+            </a:r>
+            <a:r>
+              <a:rPr lang="en-GB" sz="1200" noProof="0" dirty="0">
+                <a:latin typeface="Courier New" panose="02070309020205020404" pitchFamily="49" charset="0"/>
+                <a:ea typeface="Cambria Math" panose="02040503050406030204" pitchFamily="18" charset="0"/>
+                <a:cs typeface="Courier New" panose="02070309020205020404" pitchFamily="49" charset="0"/>
+              </a:rPr>
+              <a:t>()</a:t>
+            </a:r>
+          </a:p>
+        </p:txBody>
+      </p:sp>
+      <p:cxnSp>
+        <p:nvCxnSpPr>
+          <p:cNvPr id="2" name="Gerade Verbindung mit Pfeil 1">
+            <a:extLst>
+              <a:ext uri="{FF2B5EF4-FFF2-40B4-BE49-F238E27FC236}">
+                <a16:creationId xmlns:a16="http://schemas.microsoft.com/office/drawing/2014/main" id="{68DD2B25-F231-6FE2-8E70-2894F8A7391C}"/>
+              </a:ext>
+            </a:extLst>
+          </p:cNvPr>
+          <p:cNvCxnSpPr>
+            <a:cxnSpLocks/>
+          </p:cNvCxnSpPr>
+          <p:nvPr/>
+        </p:nvCxnSpPr>
+        <p:spPr>
+          <a:xfrm flipH="1">
+            <a:off x="4041194" y="1992541"/>
+            <a:ext cx="15604" cy="2920119"/>
+          </a:xfrm>
+          <a:prstGeom prst="straightConnector1">
+            <a:avLst/>
+          </a:prstGeom>
+          <a:ln>
+            <a:solidFill>
+              <a:schemeClr val="tx1"/>
+            </a:solidFill>
+            <a:tailEnd type="triangle"/>
+          </a:ln>
+        </p:spPr>
+        <p:style>
+          <a:lnRef idx="1">
+            <a:schemeClr val="accent1"/>
+          </a:lnRef>
+          <a:fillRef idx="0">
+            <a:schemeClr val="accent1"/>
+          </a:fillRef>
+          <a:effectRef idx="0">
+            <a:schemeClr val="accent1"/>
+          </a:effectRef>
+          <a:fontRef idx="minor">
+            <a:schemeClr val="tx1"/>
+          </a:fontRef>
+        </p:style>
+      </p:cxnSp>
+      <p:sp>
+        <p:nvSpPr>
+          <p:cNvPr id="50" name="Textfeld 49">
+            <a:extLst>
+              <a:ext uri="{FF2B5EF4-FFF2-40B4-BE49-F238E27FC236}">
+                <a16:creationId xmlns:a16="http://schemas.microsoft.com/office/drawing/2014/main" id="{8D907A8C-F56A-3B8D-43ED-DE56F55FF30F}"/>
+              </a:ext>
+            </a:extLst>
+          </p:cNvPr>
+          <p:cNvSpPr txBox="1"/>
+          <p:nvPr/>
+        </p:nvSpPr>
+        <p:spPr>
+          <a:xfrm>
+            <a:off x="1792997" y="4971020"/>
+            <a:ext cx="3053668" cy="276999"/>
+          </a:xfrm>
+          <a:prstGeom prst="rect">
+            <a:avLst/>
+          </a:prstGeom>
+          <a:solidFill>
+            <a:schemeClr val="accent4">
+              <a:alpha val="19758"/>
+            </a:schemeClr>
+          </a:solidFill>
+          <a:ln w="12700">
+            <a:solidFill>
+              <a:schemeClr val="tx1"/>
+            </a:solidFill>
+          </a:ln>
+        </p:spPr>
+        <p:txBody>
+          <a:bodyPr wrap="square">
+            <a:spAutoFit/>
+          </a:bodyPr>
+          <a:lstStyle/>
+          <a:p>
+            <a:pPr algn="ctr"/>
+            <a:r>
+              <a:rPr lang="en-GB" sz="1200" noProof="0" dirty="0" err="1">
+                <a:latin typeface="Courier New" panose="02070309020205020404" pitchFamily="49" charset="0"/>
+                <a:ea typeface="Cambria Math" panose="02040503050406030204" pitchFamily="18" charset="0"/>
+                <a:cs typeface="Courier New" panose="02070309020205020404" pitchFamily="49" charset="0"/>
+              </a:rPr>
+              <a:t>t.test</a:t>
+            </a:r>
+            <a:r>
+              <a:rPr lang="en-GB" sz="1200" noProof="0" dirty="0">
+                <a:latin typeface="Courier New" panose="02070309020205020404" pitchFamily="49" charset="0"/>
+                <a:ea typeface="Cambria Math" panose="02040503050406030204" pitchFamily="18" charset="0"/>
+                <a:cs typeface="Courier New" panose="02070309020205020404" pitchFamily="49" charset="0"/>
+              </a:rPr>
+              <a:t>()</a:t>
+            </a:r>
+          </a:p>
+        </p:txBody>
+      </p:sp>
+      <p:cxnSp>
+        <p:nvCxnSpPr>
+          <p:cNvPr id="51" name="Gerade Verbindung mit Pfeil 50">
+            <a:extLst>
+              <a:ext uri="{FF2B5EF4-FFF2-40B4-BE49-F238E27FC236}">
+                <a16:creationId xmlns:a16="http://schemas.microsoft.com/office/drawing/2014/main" id="{C9369E25-4BFC-28CB-8903-95F3A0AF4FA4}"/>
+              </a:ext>
+            </a:extLst>
+          </p:cNvPr>
+          <p:cNvCxnSpPr>
+            <a:cxnSpLocks/>
+            <a:stCxn id="22" idx="2"/>
+            <a:endCxn id="23" idx="0"/>
+          </p:cNvCxnSpPr>
+          <p:nvPr/>
+        </p:nvCxnSpPr>
+        <p:spPr>
+          <a:xfrm flipH="1">
+            <a:off x="943338" y="3280779"/>
+            <a:ext cx="48272" cy="1690241"/>
+          </a:xfrm>
+          <a:prstGeom prst="straightConnector1">
+            <a:avLst/>
+          </a:prstGeom>
+          <a:ln>
+            <a:solidFill>
+              <a:schemeClr val="tx1"/>
+            </a:solidFill>
+            <a:tailEnd type="triangle"/>
+          </a:ln>
+        </p:spPr>
+        <p:style>
+          <a:lnRef idx="1">
+            <a:schemeClr val="accent1"/>
+          </a:lnRef>
+          <a:fillRef idx="0">
+            <a:schemeClr val="accent1"/>
+          </a:fillRef>
+          <a:effectRef idx="0">
+            <a:schemeClr val="accent1"/>
+          </a:effectRef>
+          <a:fontRef idx="minor">
+            <a:schemeClr val="tx1"/>
+          </a:fontRef>
+        </p:style>
+      </p:cxnSp>
+      <p:grpSp>
+        <p:nvGrpSpPr>
+          <p:cNvPr id="69" name="Gruppieren 68">
+            <a:extLst>
+              <a:ext uri="{FF2B5EF4-FFF2-40B4-BE49-F238E27FC236}">
+                <a16:creationId xmlns:a16="http://schemas.microsoft.com/office/drawing/2014/main" id="{9F7D8173-989D-10CF-310E-FBD280ED595E}"/>
+              </a:ext>
+            </a:extLst>
+          </p:cNvPr>
+          <p:cNvGrpSpPr/>
+          <p:nvPr/>
+        </p:nvGrpSpPr>
+        <p:grpSpPr>
+          <a:xfrm>
+            <a:off x="824372" y="2492447"/>
+            <a:ext cx="1552397" cy="469922"/>
+            <a:chOff x="2719572" y="1536945"/>
+            <a:chExt cx="1289076" cy="305400"/>
+          </a:xfrm>
+        </p:grpSpPr>
+        <p:cxnSp>
+          <p:nvCxnSpPr>
+            <p:cNvPr id="70" name="Gerade Verbindung mit Pfeil 69">
+              <a:extLst>
+                <a:ext uri="{FF2B5EF4-FFF2-40B4-BE49-F238E27FC236}">
+                  <a16:creationId xmlns:a16="http://schemas.microsoft.com/office/drawing/2014/main" id="{D23DFB83-B73D-C907-0AC1-ED4C7C243527}"/>
+                </a:ext>
+              </a:extLst>
+            </p:cNvPr>
+            <p:cNvCxnSpPr>
+              <a:cxnSpLocks/>
+            </p:cNvCxnSpPr>
+            <p:nvPr/>
+          </p:nvCxnSpPr>
+          <p:spPr>
+            <a:xfrm flipH="1">
+              <a:off x="2719572" y="1536945"/>
+              <a:ext cx="639486" cy="305400"/>
+            </a:xfrm>
+            <a:prstGeom prst="straightConnector1">
+              <a:avLst/>
+            </a:prstGeom>
+            <a:ln>
+              <a:solidFill>
+                <a:schemeClr val="tx1"/>
+              </a:solidFill>
+              <a:tailEnd type="triangle"/>
+            </a:ln>
+          </p:spPr>
+          <p:style>
+            <a:lnRef idx="1">
+              <a:schemeClr val="accent1"/>
+            </a:lnRef>
+            <a:fillRef idx="0">
+              <a:schemeClr val="accent1"/>
+            </a:fillRef>
+            <a:effectRef idx="0">
+              <a:schemeClr val="accent1"/>
+            </a:effectRef>
+            <a:fontRef idx="minor">
+              <a:schemeClr val="tx1"/>
+            </a:fontRef>
+          </p:style>
+        </p:cxnSp>
+        <p:cxnSp>
+          <p:nvCxnSpPr>
+            <p:cNvPr id="71" name="Gerade Verbindung mit Pfeil 70">
+              <a:extLst>
+                <a:ext uri="{FF2B5EF4-FFF2-40B4-BE49-F238E27FC236}">
+                  <a16:creationId xmlns:a16="http://schemas.microsoft.com/office/drawing/2014/main" id="{B79EDE03-9D5A-4CBD-8BEB-F9F52F0AADD2}"/>
+                </a:ext>
+              </a:extLst>
+            </p:cNvPr>
+            <p:cNvCxnSpPr>
+              <a:cxnSpLocks/>
+            </p:cNvCxnSpPr>
+            <p:nvPr/>
+          </p:nvCxnSpPr>
+          <p:spPr>
+            <a:xfrm>
+              <a:off x="3359058" y="1536945"/>
+              <a:ext cx="649590" cy="305400"/>
+            </a:xfrm>
+            <a:prstGeom prst="straightConnector1">
+              <a:avLst/>
+            </a:prstGeom>
+            <a:ln>
+              <a:solidFill>
+                <a:schemeClr val="tx1"/>
+              </a:solidFill>
+              <a:tailEnd type="triangle"/>
+            </a:ln>
+          </p:spPr>
+          <p:style>
+            <a:lnRef idx="1">
+              <a:schemeClr val="accent1"/>
+            </a:lnRef>
+            <a:fillRef idx="0">
+              <a:schemeClr val="accent1"/>
+            </a:fillRef>
+            <a:effectRef idx="0">
+              <a:schemeClr val="accent1"/>
+            </a:effectRef>
+            <a:fontRef idx="minor">
+              <a:schemeClr val="tx1"/>
+            </a:fontRef>
+          </p:style>
+        </p:cxnSp>
+      </p:grpSp>
+      <mc:AlternateContent xmlns:mc="http://schemas.openxmlformats.org/markup-compatibility/2006">
+        <mc:Choice xmlns:a14="http://schemas.microsoft.com/office/drawing/2010/main" Requires="a14">
+          <p:sp>
+            <p:nvSpPr>
+              <p:cNvPr id="82" name="Textfeld 81">
+                <a:extLst>
+                  <a:ext uri="{FF2B5EF4-FFF2-40B4-BE49-F238E27FC236}">
+                    <a16:creationId xmlns:a16="http://schemas.microsoft.com/office/drawing/2014/main" id="{74CB43FD-F472-800C-0BC9-D288FF8733B0}"/>
+                  </a:ext>
+                </a:extLst>
+              </p:cNvPr>
+              <p:cNvSpPr txBox="1"/>
+              <p:nvPr/>
+            </p:nvSpPr>
+            <p:spPr>
+              <a:xfrm>
+                <a:off x="5037088" y="3113051"/>
+                <a:ext cx="2338425" cy="276999"/>
+              </a:xfrm>
+              <a:prstGeom prst="rect">
+                <a:avLst/>
+              </a:prstGeom>
+              <a:noFill/>
+              <a:ln w="12700">
+                <a:solidFill>
+                  <a:schemeClr val="accent1">
+                    <a:lumMod val="40000"/>
+                    <a:lumOff val="60000"/>
+                  </a:schemeClr>
+                </a:solidFill>
+              </a:ln>
+            </p:spPr>
+            <p:txBody>
+              <a:bodyPr wrap="square">
+                <a:spAutoFit/>
+              </a:bodyPr>
+              <a:lstStyle/>
+              <a:p>
+                <a:pPr algn="ctr"/>
+                <a14:m>
+                  <m:oMathPara xmlns:m="http://schemas.openxmlformats.org/officeDocument/2006/math">
+                    <m:oMathParaPr>
+                      <m:jc m:val="centerGroup"/>
+                    </m:oMathParaPr>
+                    <m:oMath xmlns:m="http://schemas.openxmlformats.org/officeDocument/2006/math">
+                      <m:r>
+                        <a:rPr lang="en-GB" sz="1200" i="1">
+                          <a:latin typeface="Cambria Math" panose="02040503050406030204" pitchFamily="18" charset="0"/>
+                          <a:ea typeface="Cambria Math" panose="02040503050406030204" pitchFamily="18" charset="0"/>
+                        </a:rPr>
+                        <m:t>𝑝</m:t>
+                      </m:r>
+                      <m:r>
+                        <a:rPr lang="en-GB" sz="1200" i="1">
+                          <a:latin typeface="Cambria Math" panose="02040503050406030204" pitchFamily="18" charset="0"/>
+                          <a:ea typeface="Cambria Math" panose="02040503050406030204" pitchFamily="18" charset="0"/>
+                        </a:rPr>
+                        <m:t>&lt;</m:t>
+                      </m:r>
+                      <m:r>
+                        <a:rPr lang="en-GB" sz="1200" i="1">
+                          <a:latin typeface="Cambria Math" panose="02040503050406030204" pitchFamily="18" charset="0"/>
+                          <a:ea typeface="Cambria Math" panose="02040503050406030204" pitchFamily="18" charset="0"/>
+                        </a:rPr>
+                        <m:t>𝛼</m:t>
+                      </m:r>
+                    </m:oMath>
+                  </m:oMathPara>
+                </a14:m>
+                <a:endParaRPr lang="en-GB" sz="1200" noProof="0" dirty="0">
+                  <a:latin typeface="Calibri" panose="020F0502020204030204" pitchFamily="34" charset="0"/>
+                  <a:ea typeface="Cambria Math" panose="02040503050406030204" pitchFamily="18" charset="0"/>
+                  <a:cs typeface="Calibri" panose="020F0502020204030204" pitchFamily="34" charset="0"/>
+                </a:endParaRPr>
+              </a:p>
+            </p:txBody>
+          </p:sp>
+        </mc:Choice>
+        <mc:Fallback>
+          <p:sp>
+            <p:nvSpPr>
+              <p:cNvPr id="82" name="Textfeld 81">
+                <a:extLst>
+                  <a:ext uri="{FF2B5EF4-FFF2-40B4-BE49-F238E27FC236}">
+                    <a16:creationId xmlns:a16="http://schemas.microsoft.com/office/drawing/2014/main" id="{74CB43FD-F472-800C-0BC9-D288FF8733B0}"/>
+                  </a:ext>
+                </a:extLst>
+              </p:cNvPr>
+              <p:cNvSpPr txBox="1">
+                <a:spLocks noRot="1" noChangeAspect="1" noMove="1" noResize="1" noEditPoints="1" noAdjustHandles="1" noChangeArrowheads="1" noChangeShapeType="1" noTextEdit="1"/>
+              </p:cNvSpPr>
+              <p:nvPr/>
+            </p:nvSpPr>
+            <p:spPr>
+              <a:xfrm>
+                <a:off x="5037088" y="3113051"/>
+                <a:ext cx="2338425" cy="276999"/>
+              </a:xfrm>
+              <a:prstGeom prst="rect">
+                <a:avLst/>
+              </a:prstGeom>
+              <a:blipFill>
+                <a:blip r:embed="rId12"/>
+                <a:stretch>
+                  <a:fillRect/>
+                </a:stretch>
+              </a:blipFill>
+              <a:ln w="12700">
+                <a:solidFill>
+                  <a:schemeClr val="accent1">
+                    <a:lumMod val="40000"/>
+                    <a:lumOff val="60000"/>
+                  </a:schemeClr>
+                </a:solidFill>
+              </a:ln>
+            </p:spPr>
+            <p:txBody>
+              <a:bodyPr/>
+              <a:lstStyle/>
+              <a:p>
+                <a:r>
+                  <a:rPr lang="de-DE">
+                    <a:noFill/>
+                  </a:rPr>
+                  <a:t> </a:t>
+                </a:r>
+              </a:p>
+            </p:txBody>
+          </p:sp>
+        </mc:Fallback>
+      </mc:AlternateContent>
+      <mc:AlternateContent xmlns:mc="http://schemas.openxmlformats.org/markup-compatibility/2006">
+        <mc:Choice xmlns:a14="http://schemas.microsoft.com/office/drawing/2010/main" Requires="a14">
+          <p:sp>
+            <p:nvSpPr>
+              <p:cNvPr id="88" name="Textfeld 87">
+                <a:extLst>
+                  <a:ext uri="{FF2B5EF4-FFF2-40B4-BE49-F238E27FC236}">
+                    <a16:creationId xmlns:a16="http://schemas.microsoft.com/office/drawing/2014/main" id="{436DE9B5-559B-6581-9440-FF83D251A495}"/>
+                  </a:ext>
+                </a:extLst>
+              </p:cNvPr>
+              <p:cNvSpPr txBox="1"/>
+              <p:nvPr/>
+            </p:nvSpPr>
+            <p:spPr>
+              <a:xfrm>
+                <a:off x="7588434" y="3100255"/>
+                <a:ext cx="2805646" cy="276999"/>
+              </a:xfrm>
+              <a:prstGeom prst="rect">
+                <a:avLst/>
+              </a:prstGeom>
+              <a:noFill/>
+              <a:ln w="12700">
+                <a:solidFill>
+                  <a:schemeClr val="accent1">
+                    <a:lumMod val="40000"/>
+                    <a:lumOff val="60000"/>
+                  </a:schemeClr>
+                </a:solidFill>
+              </a:ln>
+            </p:spPr>
+            <p:txBody>
+              <a:bodyPr wrap="square">
+                <a:spAutoFit/>
+              </a:bodyPr>
+              <a:lstStyle/>
+              <a:p>
+                <a:pPr algn="ctr"/>
+                <a14:m>
+                  <m:oMathPara xmlns:m="http://schemas.openxmlformats.org/officeDocument/2006/math">
+                    <m:oMathParaPr>
+                      <m:jc m:val="centerGroup"/>
+                    </m:oMathParaPr>
+                    <m:oMath xmlns:m="http://schemas.openxmlformats.org/officeDocument/2006/math">
+                      <m:r>
+                        <a:rPr lang="en-GB" sz="1200" b="0" i="1" noProof="0" smtClean="0">
+                          <a:latin typeface="Cambria Math" panose="02040503050406030204" pitchFamily="18" charset="0"/>
+                          <a:ea typeface="Cambria Math" panose="02040503050406030204" pitchFamily="18" charset="0"/>
+                        </a:rPr>
+                        <m:t>𝑝</m:t>
+                      </m:r>
+                      <m:r>
+                        <a:rPr lang="en-GB" sz="1200" b="0" i="1" noProof="0" smtClean="0">
+                          <a:latin typeface="Cambria Math" panose="02040503050406030204" pitchFamily="18" charset="0"/>
+                          <a:ea typeface="Cambria Math" panose="02040503050406030204" pitchFamily="18" charset="0"/>
+                        </a:rPr>
+                        <m:t>≥</m:t>
+                      </m:r>
+                      <m:r>
+                        <a:rPr lang="en-GB" sz="1200" b="0" i="1" noProof="0" smtClean="0">
+                          <a:latin typeface="Cambria Math" panose="02040503050406030204" pitchFamily="18" charset="0"/>
+                          <a:ea typeface="Cambria Math" panose="02040503050406030204" pitchFamily="18" charset="0"/>
+                        </a:rPr>
+                        <m:t>𝛼</m:t>
+                      </m:r>
+                    </m:oMath>
+                  </m:oMathPara>
+                </a14:m>
+                <a:endParaRPr lang="en-GB" sz="1200" noProof="0" dirty="0">
+                  <a:latin typeface="Calibri" panose="020F0502020204030204" pitchFamily="34" charset="0"/>
+                  <a:ea typeface="Cambria Math" panose="02040503050406030204" pitchFamily="18" charset="0"/>
+                  <a:cs typeface="Calibri" panose="020F0502020204030204" pitchFamily="34" charset="0"/>
+                </a:endParaRPr>
+              </a:p>
+            </p:txBody>
+          </p:sp>
+        </mc:Choice>
+        <mc:Fallback>
+          <p:sp>
+            <p:nvSpPr>
+              <p:cNvPr id="88" name="Textfeld 87">
+                <a:extLst>
+                  <a:ext uri="{FF2B5EF4-FFF2-40B4-BE49-F238E27FC236}">
+                    <a16:creationId xmlns:a16="http://schemas.microsoft.com/office/drawing/2014/main" id="{436DE9B5-559B-6581-9440-FF83D251A495}"/>
+                  </a:ext>
+                </a:extLst>
+              </p:cNvPr>
+              <p:cNvSpPr txBox="1">
+                <a:spLocks noRot="1" noChangeAspect="1" noMove="1" noResize="1" noEditPoints="1" noAdjustHandles="1" noChangeArrowheads="1" noChangeShapeType="1" noTextEdit="1"/>
+              </p:cNvSpPr>
+              <p:nvPr/>
+            </p:nvSpPr>
+            <p:spPr>
+              <a:xfrm>
+                <a:off x="7588434" y="3100255"/>
+                <a:ext cx="2805646" cy="276999"/>
+              </a:xfrm>
+              <a:prstGeom prst="rect">
+                <a:avLst/>
+              </a:prstGeom>
+              <a:blipFill>
+                <a:blip r:embed="rId13"/>
+                <a:stretch>
+                  <a:fillRect/>
+                </a:stretch>
+              </a:blipFill>
+              <a:ln w="12700">
+                <a:solidFill>
+                  <a:schemeClr val="accent1">
+                    <a:lumMod val="40000"/>
+                    <a:lumOff val="60000"/>
+                  </a:schemeClr>
+                </a:solidFill>
+              </a:ln>
+            </p:spPr>
+            <p:txBody>
+              <a:bodyPr/>
+              <a:lstStyle/>
+              <a:p>
+                <a:r>
+                  <a:rPr lang="de-DE">
+                    <a:noFill/>
+                  </a:rPr>
+                  <a:t> </a:t>
+                </a:r>
+              </a:p>
+            </p:txBody>
+          </p:sp>
+        </mc:Fallback>
+      </mc:AlternateContent>
+      <p:sp>
+        <p:nvSpPr>
+          <p:cNvPr id="4" name="Textfeld 3">
+            <a:extLst>
+              <a:ext uri="{FF2B5EF4-FFF2-40B4-BE49-F238E27FC236}">
+                <a16:creationId xmlns:a16="http://schemas.microsoft.com/office/drawing/2014/main" id="{55D4BC46-7BBE-D3F9-BDA9-AF61B5CB9651}"/>
+              </a:ext>
+            </a:extLst>
+          </p:cNvPr>
+          <p:cNvSpPr txBox="1"/>
+          <p:nvPr/>
+        </p:nvSpPr>
+        <p:spPr>
+          <a:xfrm>
+            <a:off x="10463276" y="5446449"/>
+            <a:ext cx="1586791" cy="276999"/>
+          </a:xfrm>
+          <a:prstGeom prst="rect">
+            <a:avLst/>
+          </a:prstGeom>
+          <a:solidFill>
+            <a:schemeClr val="bg2">
+              <a:lumMod val="90000"/>
+            </a:schemeClr>
+          </a:solidFill>
+          <a:ln w="12700">
+            <a:solidFill>
+              <a:schemeClr val="bg2">
+                <a:lumMod val="90000"/>
+              </a:schemeClr>
+            </a:solidFill>
+          </a:ln>
+        </p:spPr>
+        <p:txBody>
+          <a:bodyPr wrap="square">
+            <a:spAutoFit/>
+          </a:bodyPr>
+          <a:lstStyle>
+            <a:defPPr>
+              <a:defRPr lang="de-DE"/>
+            </a:defPPr>
+            <a:lvl1pPr algn="ctr">
+              <a:defRPr sz="1200"/>
+            </a:lvl1pPr>
+          </a:lstStyle>
+          <a:p>
+            <a:r>
+              <a:rPr lang="en-GB" noProof="0" dirty="0">
+                <a:latin typeface="Calibri" panose="020F0502020204030204" pitchFamily="34" charset="0"/>
+                <a:ea typeface="Cambria Math" panose="02040503050406030204" pitchFamily="18" charset="0"/>
+                <a:cs typeface="Calibri" panose="020F0502020204030204" pitchFamily="34" charset="0"/>
+              </a:rPr>
+              <a:t>Post-hoc test </a:t>
+            </a:r>
+          </a:p>
+        </p:txBody>
+      </p:sp>
+      <mc:AlternateContent xmlns:mc="http://schemas.openxmlformats.org/markup-compatibility/2006" xmlns:a14="http://schemas.microsoft.com/office/drawing/2010/main">
+        <mc:Choice Requires="a14">
+          <p:sp>
+            <p:nvSpPr>
+              <p:cNvPr id="11" name="Textfeld 10">
+                <a:extLst>
+                  <a:ext uri="{FF2B5EF4-FFF2-40B4-BE49-F238E27FC236}">
+                    <a16:creationId xmlns:a16="http://schemas.microsoft.com/office/drawing/2014/main" id="{0671DC0B-98EA-AB7D-65B6-355C18DCDA54}"/>
+                  </a:ext>
+                </a:extLst>
+              </p:cNvPr>
+              <p:cNvSpPr txBox="1"/>
+              <p:nvPr/>
+            </p:nvSpPr>
+            <p:spPr>
+              <a:xfrm>
+                <a:off x="9967683" y="5959220"/>
+                <a:ext cx="2082384" cy="461665"/>
+              </a:xfrm>
+              <a:prstGeom prst="rect">
+                <a:avLst/>
+              </a:prstGeom>
+              <a:noFill/>
+              <a:ln>
+                <a:noFill/>
+              </a:ln>
+            </p:spPr>
+            <p:txBody>
+              <a:bodyPr wrap="square">
+                <a:spAutoFit/>
+              </a:bodyPr>
+              <a:lstStyle/>
+              <a:p>
+                <a14:m>
+                  <m:oMath xmlns:m="http://schemas.openxmlformats.org/officeDocument/2006/math">
+                    <m:r>
+                      <a:rPr lang="en-GB" sz="1200" i="1" noProof="0" smtClean="0">
+                        <a:latin typeface="Cambria Math" panose="02040503050406030204" pitchFamily="18" charset="0"/>
+                        <a:ea typeface="Cambria Math" panose="02040503050406030204" pitchFamily="18" charset="0"/>
+                      </a:rPr>
+                      <m:t>𝛼</m:t>
+                    </m:r>
+                    <m:r>
+                      <a:rPr lang="en-GB" sz="1200" b="0" i="1" noProof="0" smtClean="0">
+                        <a:latin typeface="Cambria Math" panose="02040503050406030204" pitchFamily="18" charset="0"/>
+                        <a:ea typeface="Cambria Math" panose="02040503050406030204" pitchFamily="18" charset="0"/>
+                      </a:rPr>
+                      <m:t>=1−</m:t>
+                    </m:r>
+                  </m:oMath>
+                </a14:m>
+                <a:r>
+                  <a:rPr lang="en-GB" sz="1200" noProof="0" dirty="0">
+                    <a:latin typeface="Calibri" panose="020F0502020204030204" pitchFamily="34" charset="0"/>
+                    <a:ea typeface="Cambria Math" panose="02040503050406030204" pitchFamily="18" charset="0"/>
+                    <a:cs typeface="Calibri" panose="020F0502020204030204" pitchFamily="34" charset="0"/>
+                  </a:rPr>
+                  <a:t> </a:t>
+                </a:r>
+                <a:r>
+                  <a:rPr lang="en-GB" sz="1200" noProof="0" dirty="0" err="1">
+                    <a:latin typeface="Courier New" panose="02070309020205020404" pitchFamily="49" charset="0"/>
+                    <a:ea typeface="CMU Bright Roman" panose="02000603000000000000" pitchFamily="2" charset="0"/>
+                    <a:cs typeface="Courier New" panose="02070309020205020404" pitchFamily="49" charset="0"/>
+                  </a:rPr>
+                  <a:t>conf.level</a:t>
+                </a:r>
+                <a:r>
+                  <a:rPr lang="en-GB" sz="800" noProof="0" dirty="0">
+                    <a:latin typeface="CMU Bright Roman" panose="02000603000000000000" pitchFamily="2" charset="0"/>
+                    <a:ea typeface="CMU Bright Roman" panose="02000603000000000000" pitchFamily="2" charset="0"/>
+                    <a:cs typeface="CMU Bright Roman" panose="02000603000000000000" pitchFamily="2" charset="0"/>
+                  </a:rPr>
+                  <a:t> </a:t>
+                </a:r>
+              </a:p>
+              <a:p>
+                <a14:m>
+                  <m:oMath xmlns:m="http://schemas.openxmlformats.org/officeDocument/2006/math">
+                    <m:sSub>
+                      <m:sSubPr>
+                        <m:ctrlPr>
+                          <a:rPr lang="en-GB" sz="1200" i="1" noProof="0" smtClean="0">
+                            <a:latin typeface="Cambria Math" panose="02040503050406030204" pitchFamily="18" charset="0"/>
+                            <a:ea typeface="Cambria Math" panose="02040503050406030204" pitchFamily="18" charset="0"/>
+                          </a:rPr>
+                        </m:ctrlPr>
+                      </m:sSubPr>
+                      <m:e>
+                        <m:r>
+                          <a:rPr lang="en-GB" sz="1200" i="1" noProof="0" smtClean="0">
+                            <a:latin typeface="Cambria Math" panose="02040503050406030204" pitchFamily="18" charset="0"/>
+                            <a:ea typeface="Cambria Math" panose="02040503050406030204" pitchFamily="18" charset="0"/>
+                          </a:rPr>
+                          <m:t>𝑝</m:t>
+                        </m:r>
+                      </m:e>
+                      <m:sub>
+                        <m:r>
+                          <a:rPr lang="en-GB" sz="1200" i="1" noProof="0" smtClean="0">
+                            <a:latin typeface="Cambria Math" panose="02040503050406030204" pitchFamily="18" charset="0"/>
+                            <a:ea typeface="Cambria Math" panose="02040503050406030204" pitchFamily="18" charset="0"/>
+                          </a:rPr>
+                          <m:t>𝑖</m:t>
+                        </m:r>
+                      </m:sub>
+                    </m:sSub>
+                    <m:r>
+                      <a:rPr lang="en-US" sz="1200" b="0" i="0" noProof="0" smtClean="0">
+                        <a:latin typeface="Cambria Math" panose="02040503050406030204" pitchFamily="18" charset="0"/>
+                        <a:ea typeface="Cambria Math" panose="02040503050406030204" pitchFamily="18" charset="0"/>
+                      </a:rPr>
+                      <m:t>=</m:t>
+                    </m:r>
+                  </m:oMath>
+                </a14:m>
+                <a:r>
+                  <a:rPr lang="en-GB" sz="1200" noProof="0" dirty="0">
+                    <a:ea typeface="Cambria Math" panose="02040503050406030204" pitchFamily="18" charset="0"/>
+                  </a:rPr>
+                  <a:t> </a:t>
+                </a:r>
+                <a14:m>
+                  <m:oMath xmlns:m="http://schemas.openxmlformats.org/officeDocument/2006/math">
+                    <m:r>
+                      <a:rPr lang="en-GB" sz="1200" i="1" noProof="0" dirty="0" smtClean="0">
+                        <a:latin typeface="Cambria Math" panose="02040503050406030204" pitchFamily="18" charset="0"/>
+                        <a:ea typeface="Cambria Math" panose="02040503050406030204" pitchFamily="18" charset="0"/>
+                      </a:rPr>
+                      <m:t>𝑝</m:t>
+                    </m:r>
+                  </m:oMath>
+                </a14:m>
+                <a:r>
+                  <a:rPr lang="en-GB" sz="1200" noProof="0" dirty="0">
+                    <a:ea typeface="Cambria Math" panose="02040503050406030204" pitchFamily="18" charset="0"/>
+                  </a:rPr>
+                  <a:t>-value of level </a:t>
+                </a:r>
+                <a14:m>
+                  <m:oMath xmlns:m="http://schemas.openxmlformats.org/officeDocument/2006/math">
+                    <m:r>
+                      <a:rPr lang="en-GB" sz="1200" i="1" noProof="0" smtClean="0">
+                        <a:latin typeface="Cambria Math" panose="02040503050406030204" pitchFamily="18" charset="0"/>
+                        <a:ea typeface="Cambria Math" panose="02040503050406030204" pitchFamily="18" charset="0"/>
+                      </a:rPr>
+                      <m:t>𝑖</m:t>
+                    </m:r>
+                    <m:r>
+                      <a:rPr lang="en-GB" sz="1200" i="1" noProof="0" smtClean="0">
+                        <a:latin typeface="Cambria Math" panose="02040503050406030204" pitchFamily="18" charset="0"/>
+                        <a:ea typeface="Cambria Math" panose="02040503050406030204" pitchFamily="18" charset="0"/>
+                      </a:rPr>
+                      <m:t>,</m:t>
+                    </m:r>
+                  </m:oMath>
+                </a14:m>
+                <a:r>
+                  <a:rPr lang="en-GB" sz="1200" noProof="0" dirty="0">
+                    <a:ea typeface="Cambria Math" panose="02040503050406030204" pitchFamily="18" charset="0"/>
+                  </a:rPr>
+                  <a:t> </a:t>
+                </a:r>
+                <a14:m>
+                  <m:oMath xmlns:m="http://schemas.openxmlformats.org/officeDocument/2006/math">
+                    <m:r>
+                      <a:rPr lang="en-GB" sz="1200" i="1" noProof="0" smtClean="0">
+                        <a:latin typeface="Cambria Math" panose="02040503050406030204" pitchFamily="18" charset="0"/>
+                        <a:ea typeface="Cambria Math" panose="02040503050406030204" pitchFamily="18" charset="0"/>
+                      </a:rPr>
+                      <m:t>𝑖</m:t>
+                    </m:r>
+                    <m:r>
+                      <a:rPr lang="en-GB" sz="1200" i="1" noProof="0" smtClean="0">
+                        <a:latin typeface="Cambria Math" panose="02040503050406030204" pitchFamily="18" charset="0"/>
+                        <a:ea typeface="Cambria Math" panose="02040503050406030204" pitchFamily="18" charset="0"/>
+                      </a:rPr>
+                      <m:t>=1,2</m:t>
+                    </m:r>
+                  </m:oMath>
+                </a14:m>
+                <a:endParaRPr lang="en-GB" sz="1200" noProof="0" dirty="0">
+                  <a:latin typeface="CMU Bright Roman" panose="02000603000000000000" pitchFamily="2" charset="0"/>
+                  <a:ea typeface="CMU Bright Roman" panose="02000603000000000000" pitchFamily="2" charset="0"/>
+                  <a:cs typeface="CMU Bright Roman" panose="02000603000000000000" pitchFamily="2" charset="0"/>
+                </a:endParaRPr>
+              </a:p>
+            </p:txBody>
+          </p:sp>
+        </mc:Choice>
+        <mc:Fallback xmlns="">
+          <p:sp>
+            <p:nvSpPr>
+              <p:cNvPr id="11" name="Textfeld 10">
+                <a:extLst>
+                  <a:ext uri="{FF2B5EF4-FFF2-40B4-BE49-F238E27FC236}">
+                    <a16:creationId xmlns:a16="http://schemas.microsoft.com/office/drawing/2014/main" id="{BEADCB87-2FE2-B735-89A2-59CFEE3B9378}"/>
+                  </a:ext>
+                </a:extLst>
+              </p:cNvPr>
+              <p:cNvSpPr txBox="1">
+                <a:spLocks noRot="1" noChangeAspect="1" noMove="1" noResize="1" noEditPoints="1" noAdjustHandles="1" noChangeArrowheads="1" noChangeShapeType="1" noTextEdit="1"/>
+              </p:cNvSpPr>
+              <p:nvPr/>
+            </p:nvSpPr>
+            <p:spPr>
+              <a:xfrm>
+                <a:off x="9967683" y="5959220"/>
+                <a:ext cx="2082384" cy="461665"/>
+              </a:xfrm>
+              <a:prstGeom prst="rect">
+                <a:avLst/>
+              </a:prstGeom>
+              <a:blipFill>
+                <a:blip r:embed="rId18"/>
+                <a:stretch>
+                  <a:fillRect t="-2703" b="-10811"/>
+                </a:stretch>
+              </a:blipFill>
+              <a:ln>
+                <a:noFill/>
+              </a:ln>
+            </p:spPr>
+            <p:txBody>
+              <a:bodyPr/>
+              <a:lstStyle/>
+              <a:p>
+                <a:r>
+                  <a:rPr lang="de-DE">
+                    <a:noFill/>
+                  </a:rPr>
+                  <a:t> </a:t>
+                </a:r>
+              </a:p>
+            </p:txBody>
+          </p:sp>
+        </mc:Fallback>
+      </mc:AlternateContent>
+      <p:sp>
+        <p:nvSpPr>
+          <p:cNvPr id="149" name="Textfeld 148">
+            <a:extLst>
+              <a:ext uri="{FF2B5EF4-FFF2-40B4-BE49-F238E27FC236}">
+                <a16:creationId xmlns:a16="http://schemas.microsoft.com/office/drawing/2014/main" id="{CE1FEDEC-B92D-BD7A-7726-0F1EC8EF7C1A}"/>
+              </a:ext>
+            </a:extLst>
+          </p:cNvPr>
+          <p:cNvSpPr txBox="1"/>
+          <p:nvPr/>
+        </p:nvSpPr>
+        <p:spPr>
+          <a:xfrm>
+            <a:off x="10463276" y="4951684"/>
+            <a:ext cx="1618427" cy="276999"/>
+          </a:xfrm>
+          <a:prstGeom prst="rect">
+            <a:avLst/>
+          </a:prstGeom>
+          <a:noFill/>
+          <a:ln w="12700">
+            <a:solidFill>
+              <a:schemeClr val="bg2">
+                <a:lumMod val="90000"/>
+              </a:schemeClr>
+            </a:solidFill>
+          </a:ln>
+        </p:spPr>
+        <p:txBody>
+          <a:bodyPr wrap="square">
+            <a:spAutoFit/>
+          </a:bodyPr>
+          <a:lstStyle>
+            <a:defPPr>
+              <a:defRPr lang="de-DE"/>
+            </a:defPPr>
+            <a:lvl1pPr algn="ctr">
+              <a:defRPr sz="1200"/>
+            </a:lvl1pPr>
+          </a:lstStyle>
+          <a:p>
+            <a:r>
+              <a:rPr lang="en-GB" noProof="0" dirty="0">
+                <a:latin typeface="Calibri" panose="020F0502020204030204" pitchFamily="34" charset="0"/>
+                <a:ea typeface="Cambria Math" panose="02040503050406030204" pitchFamily="18" charset="0"/>
+                <a:cs typeface="Calibri" panose="020F0502020204030204" pitchFamily="34" charset="0"/>
+              </a:rPr>
+              <a:t>Final test selected </a:t>
+            </a:r>
+          </a:p>
+        </p:txBody>
+      </p:sp>
+      <p:sp>
+        <p:nvSpPr>
+          <p:cNvPr id="159" name="Textfeld 158">
+            <a:extLst>
+              <a:ext uri="{FF2B5EF4-FFF2-40B4-BE49-F238E27FC236}">
+                <a16:creationId xmlns:a16="http://schemas.microsoft.com/office/drawing/2014/main" id="{85EC3D29-68E2-17B6-1748-38B8CC7178F0}"/>
+              </a:ext>
+            </a:extLst>
+          </p:cNvPr>
+          <p:cNvSpPr txBox="1"/>
+          <p:nvPr/>
+        </p:nvSpPr>
+        <p:spPr>
+          <a:xfrm>
+            <a:off x="10463276" y="3876297"/>
+            <a:ext cx="1618761" cy="276999"/>
+          </a:xfrm>
+          <a:prstGeom prst="rect">
+            <a:avLst/>
+          </a:prstGeom>
+          <a:solidFill>
+            <a:schemeClr val="accent6">
+              <a:lumMod val="20000"/>
+              <a:lumOff val="80000"/>
+            </a:schemeClr>
+          </a:solidFill>
+          <a:ln w="12700">
+            <a:solidFill>
+              <a:schemeClr val="accent1">
+                <a:lumMod val="20000"/>
+                <a:lumOff val="80000"/>
+              </a:schemeClr>
+            </a:solidFill>
+          </a:ln>
+        </p:spPr>
+        <p:txBody>
+          <a:bodyPr wrap="square">
+            <a:spAutoFit/>
+          </a:bodyPr>
+          <a:lstStyle>
+            <a:defPPr>
+              <a:defRPr lang="de-DE"/>
+            </a:defPPr>
+            <a:lvl1pPr algn="ctr">
+              <a:defRPr sz="1200"/>
+            </a:lvl1pPr>
+          </a:lstStyle>
+          <a:p>
+            <a:r>
+              <a:rPr lang="en-GB" dirty="0">
+                <a:latin typeface="Calibri" panose="020F0502020204030204" pitchFamily="34" charset="0"/>
+                <a:ea typeface="Cambria Math" panose="02040503050406030204" pitchFamily="18" charset="0"/>
+                <a:cs typeface="Calibri" panose="020F0502020204030204" pitchFamily="34" charset="0"/>
+              </a:rPr>
+              <a:t>C</a:t>
+            </a:r>
+            <a:r>
+              <a:rPr lang="en-GB" noProof="0" dirty="0">
+                <a:latin typeface="Calibri" panose="020F0502020204030204" pitchFamily="34" charset="0"/>
+                <a:ea typeface="Cambria Math" panose="02040503050406030204" pitchFamily="18" charset="0"/>
+                <a:cs typeface="Calibri" panose="020F0502020204030204" pitchFamily="34" charset="0"/>
+              </a:rPr>
+              <a:t>heck </a:t>
+            </a:r>
+            <a:r>
+              <a:rPr lang="en-GB" noProof="0" dirty="0" err="1">
+                <a:latin typeface="Calibri" panose="020F0502020204030204" pitchFamily="34" charset="0"/>
+                <a:ea typeface="Cambria Math" panose="02040503050406030204" pitchFamily="18" charset="0"/>
+                <a:cs typeface="Calibri" panose="020F0502020204030204" pitchFamily="34" charset="0"/>
+              </a:rPr>
+              <a:t>homoscedacity</a:t>
+            </a:r>
+            <a:r>
+              <a:rPr lang="en-GB" noProof="0" dirty="0">
+                <a:latin typeface="Calibri" panose="020F0502020204030204" pitchFamily="34" charset="0"/>
+                <a:ea typeface="Cambria Math" panose="02040503050406030204" pitchFamily="18" charset="0"/>
+                <a:cs typeface="Calibri" panose="020F0502020204030204" pitchFamily="34" charset="0"/>
+              </a:rPr>
+              <a:t> </a:t>
+            </a:r>
+          </a:p>
+        </p:txBody>
+      </p:sp>
+      <p:cxnSp>
+        <p:nvCxnSpPr>
+          <p:cNvPr id="182" name="Gewinkelte Verbindung 181">
+            <a:extLst>
+              <a:ext uri="{FF2B5EF4-FFF2-40B4-BE49-F238E27FC236}">
+                <a16:creationId xmlns:a16="http://schemas.microsoft.com/office/drawing/2014/main" id="{5A11CD97-F054-F225-1DBF-67EFA6F48542}"/>
+              </a:ext>
+            </a:extLst>
+          </p:cNvPr>
+          <p:cNvCxnSpPr>
+            <a:cxnSpLocks/>
+            <a:stCxn id="7" idx="1"/>
+            <a:endCxn id="8" idx="0"/>
+          </p:cNvCxnSpPr>
+          <p:nvPr/>
+        </p:nvCxnSpPr>
+        <p:spPr>
+          <a:xfrm rot="10800000" flipV="1">
+            <a:off x="2519994" y="499147"/>
+            <a:ext cx="1462504" cy="333639"/>
+          </a:xfrm>
+          <a:prstGeom prst="bentConnector2">
+            <a:avLst/>
+          </a:prstGeom>
+          <a:ln>
+            <a:solidFill>
+              <a:schemeClr val="tx1"/>
+            </a:solidFill>
+            <a:tailEnd type="triangle"/>
+          </a:ln>
+        </p:spPr>
+        <p:style>
+          <a:lnRef idx="1">
+            <a:schemeClr val="accent1"/>
+          </a:lnRef>
+          <a:fillRef idx="0">
+            <a:schemeClr val="accent1"/>
+          </a:fillRef>
+          <a:effectRef idx="0">
+            <a:schemeClr val="accent1"/>
+          </a:effectRef>
+          <a:fontRef idx="minor">
+            <a:schemeClr val="tx1"/>
+          </a:fontRef>
+        </p:style>
+      </p:cxnSp>
+      <p:cxnSp>
+        <p:nvCxnSpPr>
+          <p:cNvPr id="185" name="Gewinkelte Verbindung 184">
+            <a:extLst>
+              <a:ext uri="{FF2B5EF4-FFF2-40B4-BE49-F238E27FC236}">
+                <a16:creationId xmlns:a16="http://schemas.microsoft.com/office/drawing/2014/main" id="{4B0BA790-441F-6198-AE12-BC42FC48AE9A}"/>
+              </a:ext>
+            </a:extLst>
+          </p:cNvPr>
+          <p:cNvCxnSpPr>
+            <a:cxnSpLocks/>
+            <a:stCxn id="7" idx="3"/>
+          </p:cNvCxnSpPr>
+          <p:nvPr/>
+        </p:nvCxnSpPr>
+        <p:spPr>
+          <a:xfrm>
+            <a:off x="8287643" y="499148"/>
+            <a:ext cx="1512594" cy="334194"/>
+          </a:xfrm>
+          <a:prstGeom prst="bentConnector3">
+            <a:avLst>
+              <a:gd name="adj1" fmla="val 101482"/>
+            </a:avLst>
+          </a:prstGeom>
+          <a:ln>
+            <a:tailEnd type="triangle"/>
+          </a:ln>
+        </p:spPr>
+        <p:style>
+          <a:lnRef idx="1">
+            <a:schemeClr val="accent1"/>
+          </a:lnRef>
+          <a:fillRef idx="0">
+            <a:schemeClr val="accent1"/>
+          </a:fillRef>
+          <a:effectRef idx="0">
+            <a:schemeClr val="accent1"/>
+          </a:effectRef>
+          <a:fontRef idx="minor">
+            <a:schemeClr val="tx1"/>
+          </a:fontRef>
+        </p:style>
+      </p:cxnSp>
+      <p:cxnSp>
+        <p:nvCxnSpPr>
+          <p:cNvPr id="320" name="Gerade Verbindung mit Pfeil 319">
+            <a:extLst>
+              <a:ext uri="{FF2B5EF4-FFF2-40B4-BE49-F238E27FC236}">
+                <a16:creationId xmlns:a16="http://schemas.microsoft.com/office/drawing/2014/main" id="{E12E9B3F-FCC3-612B-5C29-F2F0DE54673F}"/>
+              </a:ext>
+            </a:extLst>
+          </p:cNvPr>
+          <p:cNvCxnSpPr>
+            <a:cxnSpLocks/>
+          </p:cNvCxnSpPr>
+          <p:nvPr/>
+        </p:nvCxnSpPr>
+        <p:spPr>
+          <a:xfrm>
+            <a:off x="6189491" y="3402561"/>
+            <a:ext cx="0" cy="1510099"/>
+          </a:xfrm>
+          <a:prstGeom prst="straightConnector1">
+            <a:avLst/>
+          </a:prstGeom>
+          <a:ln>
+            <a:tailEnd type="triangle"/>
+          </a:ln>
+        </p:spPr>
+        <p:style>
+          <a:lnRef idx="1">
+            <a:schemeClr val="accent1"/>
+          </a:lnRef>
+          <a:fillRef idx="0">
+            <a:schemeClr val="accent1"/>
+          </a:fillRef>
+          <a:effectRef idx="0">
+            <a:schemeClr val="accent1"/>
+          </a:effectRef>
+          <a:fontRef idx="minor">
+            <a:schemeClr val="tx1"/>
+          </a:fontRef>
+        </p:style>
+      </p:cxnSp>
+      <p:cxnSp>
+        <p:nvCxnSpPr>
+          <p:cNvPr id="363" name="Gerade Verbindung mit Pfeil 362">
+            <a:extLst>
+              <a:ext uri="{FF2B5EF4-FFF2-40B4-BE49-F238E27FC236}">
+                <a16:creationId xmlns:a16="http://schemas.microsoft.com/office/drawing/2014/main" id="{EBAAC66C-8BED-EAAE-1149-6326C2446004}"/>
+              </a:ext>
+            </a:extLst>
+          </p:cNvPr>
+          <p:cNvCxnSpPr>
+            <a:cxnSpLocks/>
+            <a:stCxn id="19" idx="2"/>
+          </p:cNvCxnSpPr>
+          <p:nvPr/>
+        </p:nvCxnSpPr>
+        <p:spPr>
+          <a:xfrm>
+            <a:off x="2502316" y="3280779"/>
+            <a:ext cx="0" cy="1670905"/>
+          </a:xfrm>
+          <a:prstGeom prst="straightConnector1">
+            <a:avLst/>
+          </a:prstGeom>
+          <a:ln>
+            <a:solidFill>
+              <a:schemeClr val="tx1"/>
+            </a:solidFill>
+            <a:tailEnd type="triangle"/>
+          </a:ln>
+        </p:spPr>
+        <p:style>
+          <a:lnRef idx="1">
+            <a:schemeClr val="accent1"/>
+          </a:lnRef>
+          <a:fillRef idx="0">
+            <a:schemeClr val="accent1"/>
+          </a:fillRef>
+          <a:effectRef idx="0">
+            <a:schemeClr val="accent1"/>
+          </a:effectRef>
+          <a:fontRef idx="minor">
+            <a:schemeClr val="tx1"/>
+          </a:fontRef>
+        </p:style>
+      </p:cxnSp>
+      <p:sp>
+        <p:nvSpPr>
+          <p:cNvPr id="5" name="Textfeld 4">
+            <a:extLst>
+              <a:ext uri="{FF2B5EF4-FFF2-40B4-BE49-F238E27FC236}">
+                <a16:creationId xmlns:a16="http://schemas.microsoft.com/office/drawing/2014/main" id="{8478B313-8FA0-6417-6650-04F8FE543C2B}"/>
+              </a:ext>
+            </a:extLst>
+          </p:cNvPr>
+          <p:cNvSpPr txBox="1"/>
+          <p:nvPr/>
+        </p:nvSpPr>
+        <p:spPr>
+          <a:xfrm>
+            <a:off x="305981" y="6396835"/>
+            <a:ext cx="1868481" cy="281831"/>
+          </a:xfrm>
+          <a:prstGeom prst="rect">
+            <a:avLst/>
+          </a:prstGeom>
+          <a:solidFill>
+            <a:schemeClr val="accent1">
+              <a:lumMod val="40000"/>
+              <a:lumOff val="60000"/>
+            </a:schemeClr>
+          </a:solidFill>
+          <a:ln w="12700">
+            <a:noFill/>
+          </a:ln>
+        </p:spPr>
+        <p:txBody>
+          <a:bodyPr wrap="square">
+            <a:spAutoFit/>
+          </a:bodyPr>
+          <a:lstStyle>
+            <a:defPPr>
+              <a:defRPr lang="de-DE"/>
+            </a:defPPr>
+            <a:lvl1pPr algn="ctr">
+              <a:defRPr sz="1200"/>
+            </a:lvl1pPr>
+          </a:lstStyle>
+          <a:p>
+            <a:r>
+              <a:rPr lang="en-GB" noProof="0" dirty="0">
+                <a:latin typeface="Calibri" panose="020F0502020204030204" pitchFamily="34" charset="0"/>
+                <a:ea typeface="Cambria Math" panose="02040503050406030204" pitchFamily="18" charset="0"/>
+                <a:cs typeface="Calibri" panose="020F0502020204030204" pitchFamily="34" charset="0"/>
+              </a:rPr>
+              <a:t>non-parametric tests </a:t>
+            </a:r>
+          </a:p>
+        </p:txBody>
+      </p:sp>
+      <p:sp>
+        <p:nvSpPr>
+          <p:cNvPr id="148" name="Textfeld 147">
+            <a:extLst>
+              <a:ext uri="{FF2B5EF4-FFF2-40B4-BE49-F238E27FC236}">
+                <a16:creationId xmlns:a16="http://schemas.microsoft.com/office/drawing/2014/main" id="{CD7AC8B7-7B80-A6EF-01DF-E98D1A1C4D0A}"/>
+              </a:ext>
+            </a:extLst>
+          </p:cNvPr>
+          <p:cNvSpPr txBox="1"/>
+          <p:nvPr/>
+        </p:nvSpPr>
+        <p:spPr>
+          <a:xfrm>
+            <a:off x="305981" y="5974839"/>
+            <a:ext cx="1859022" cy="281831"/>
+          </a:xfrm>
+          <a:prstGeom prst="rect">
+            <a:avLst/>
+          </a:prstGeom>
+          <a:solidFill>
+            <a:schemeClr val="accent4">
+              <a:alpha val="19758"/>
+            </a:schemeClr>
+          </a:solidFill>
+          <a:ln w="12700">
+            <a:noFill/>
+          </a:ln>
+        </p:spPr>
+        <p:txBody>
+          <a:bodyPr wrap="square">
+            <a:spAutoFit/>
+          </a:bodyPr>
+          <a:lstStyle/>
+          <a:p>
+            <a:pPr algn="ctr"/>
+            <a:r>
+              <a:rPr lang="en-GB" sz="1200" noProof="0" dirty="0">
+                <a:latin typeface="Calibri" panose="020F0502020204030204" pitchFamily="34" charset="0"/>
+                <a:ea typeface="Cambria Math" panose="02040503050406030204" pitchFamily="18" charset="0"/>
+                <a:cs typeface="Calibri" panose="020F0502020204030204" pitchFamily="34" charset="0"/>
+              </a:rPr>
+              <a:t>parametric tests</a:t>
+            </a:r>
+          </a:p>
+        </p:txBody>
+      </p:sp>
+      <mc:AlternateContent xmlns:mc="http://schemas.openxmlformats.org/markup-compatibility/2006" xmlns:a14="http://schemas.microsoft.com/office/drawing/2010/main">
+        <mc:Choice Requires="a14">
+          <p:sp>
+            <p:nvSpPr>
+              <p:cNvPr id="467" name="Textfeld 466">
+                <a:extLst>
+                  <a:ext uri="{FF2B5EF4-FFF2-40B4-BE49-F238E27FC236}">
+                    <a16:creationId xmlns:a16="http://schemas.microsoft.com/office/drawing/2014/main" id="{280A40E3-10CB-1273-98D2-08CCB29196B1}"/>
+                  </a:ext>
+                </a:extLst>
+              </p:cNvPr>
+              <p:cNvSpPr txBox="1"/>
+              <p:nvPr/>
+            </p:nvSpPr>
+            <p:spPr>
+              <a:xfrm>
+                <a:off x="2248265" y="5954905"/>
+                <a:ext cx="2538462" cy="281831"/>
+              </a:xfrm>
+              <a:prstGeom prst="rect">
+                <a:avLst/>
+              </a:prstGeom>
+              <a:noFill/>
+              <a:ln w="12700">
+                <a:solidFill>
+                  <a:schemeClr val="tx1"/>
+                </a:solidFill>
+              </a:ln>
+            </p:spPr>
+            <p:txBody>
+              <a:bodyPr wrap="square">
+                <a:spAutoFit/>
+              </a:bodyPr>
+              <a:lstStyle>
+                <a:defPPr>
+                  <a:defRPr lang="de-DE"/>
+                </a:defPPr>
+                <a:lvl1pPr algn="ctr">
+                  <a:defRPr sz="1200"/>
+                </a:lvl1pPr>
+              </a:lstStyle>
+              <a:p>
+                <a:r>
+                  <a:rPr lang="en-GB" dirty="0">
+                    <a:latin typeface="Calibri" panose="020F0502020204030204" pitchFamily="34" charset="0"/>
+                    <a:ea typeface="Cambria Math" panose="02040503050406030204" pitchFamily="18" charset="0"/>
+                    <a:cs typeface="Calibri" panose="020F0502020204030204" pitchFamily="34" charset="0"/>
+                  </a:rPr>
+                  <a:t>predictor</a:t>
+                </a:r>
+                <a:r>
+                  <a:rPr lang="en-GB" noProof="0" dirty="0">
+                    <a:latin typeface="Calibri" panose="020F0502020204030204" pitchFamily="34" charset="0"/>
+                    <a:ea typeface="Cambria Math" panose="02040503050406030204" pitchFamily="18" charset="0"/>
+                    <a:cs typeface="Calibri" panose="020F0502020204030204" pitchFamily="34" charset="0"/>
+                  </a:rPr>
+                  <a:t> with </a:t>
+                </a:r>
+                <a14:m>
+                  <m:oMath xmlns:m="http://schemas.openxmlformats.org/officeDocument/2006/math">
+                    <m:r>
+                      <a:rPr lang="en-GB" i="1" noProof="0" dirty="0" smtClean="0">
+                        <a:latin typeface="Cambria Math" panose="02040503050406030204" pitchFamily="18" charset="0"/>
+                        <a:ea typeface="Cambria Math" panose="02040503050406030204" pitchFamily="18" charset="0"/>
+                        <a:cs typeface="Calibri" panose="020F0502020204030204" pitchFamily="34" charset="0"/>
+                      </a:rPr>
+                      <m:t>𝑁</m:t>
+                    </m:r>
+                    <m:r>
+                      <a:rPr lang="en-GB" i="1" noProof="0" dirty="0" smtClean="0">
+                        <a:latin typeface="Cambria Math" panose="02040503050406030204" pitchFamily="18" charset="0"/>
+                        <a:ea typeface="Cambria Math" panose="02040503050406030204" pitchFamily="18" charset="0"/>
+                        <a:cs typeface="Calibri" panose="020F0502020204030204" pitchFamily="34" charset="0"/>
+                      </a:rPr>
+                      <m:t>=2</m:t>
+                    </m:r>
+                  </m:oMath>
+                </a14:m>
+                <a:r>
+                  <a:rPr lang="en-GB" noProof="0" dirty="0">
+                    <a:latin typeface="Calibri" panose="020F0502020204030204" pitchFamily="34" charset="0"/>
+                    <a:ea typeface="Cambria Math" panose="02040503050406030204" pitchFamily="18" charset="0"/>
+                    <a:cs typeface="Calibri" panose="020F0502020204030204" pitchFamily="34" charset="0"/>
+                  </a:rPr>
+                  <a:t> levels </a:t>
+                </a:r>
+              </a:p>
+            </p:txBody>
+          </p:sp>
+        </mc:Choice>
+        <mc:Fallback xmlns="">
+          <p:sp>
+            <p:nvSpPr>
+              <p:cNvPr id="467" name="Textfeld 466">
+                <a:extLst>
+                  <a:ext uri="{FF2B5EF4-FFF2-40B4-BE49-F238E27FC236}">
+                    <a16:creationId xmlns:a16="http://schemas.microsoft.com/office/drawing/2014/main" id="{9F3DB9C3-A6B3-DC3B-D937-ACB248DD1895}"/>
+                  </a:ext>
+                </a:extLst>
+              </p:cNvPr>
+              <p:cNvSpPr txBox="1">
+                <a:spLocks noRot="1" noChangeAspect="1" noMove="1" noResize="1" noEditPoints="1" noAdjustHandles="1" noChangeArrowheads="1" noChangeShapeType="1" noTextEdit="1"/>
+              </p:cNvSpPr>
+              <p:nvPr/>
+            </p:nvSpPr>
+            <p:spPr>
+              <a:xfrm>
+                <a:off x="2248265" y="5954905"/>
+                <a:ext cx="2538462" cy="281831"/>
+              </a:xfrm>
+              <a:prstGeom prst="rect">
+                <a:avLst/>
+              </a:prstGeom>
+              <a:blipFill>
+                <a:blip r:embed="rId19"/>
+                <a:stretch>
+                  <a:fillRect b="-8333"/>
+                </a:stretch>
+              </a:blipFill>
+              <a:ln w="12700">
+                <a:solidFill>
+                  <a:schemeClr val="tx1"/>
+                </a:solidFill>
+              </a:ln>
+            </p:spPr>
+            <p:txBody>
+              <a:bodyPr/>
+              <a:lstStyle/>
+              <a:p>
+                <a:r>
+                  <a:rPr lang="de-DE">
+                    <a:noFill/>
+                  </a:rPr>
+                  <a:t> </a:t>
+                </a:r>
+              </a:p>
+            </p:txBody>
+          </p:sp>
+        </mc:Fallback>
+      </mc:AlternateContent>
+      <mc:AlternateContent xmlns:mc="http://schemas.openxmlformats.org/markup-compatibility/2006" xmlns:a14="http://schemas.microsoft.com/office/drawing/2010/main">
+        <mc:Choice Requires="a14">
+          <p:sp>
+            <p:nvSpPr>
+              <p:cNvPr id="468" name="Textfeld 467">
+                <a:extLst>
+                  <a:ext uri="{FF2B5EF4-FFF2-40B4-BE49-F238E27FC236}">
+                    <a16:creationId xmlns:a16="http://schemas.microsoft.com/office/drawing/2014/main" id="{AC807ECB-FC40-C269-CE8F-FFEA920BDAD9}"/>
+                  </a:ext>
+                </a:extLst>
+              </p:cNvPr>
+              <p:cNvSpPr txBox="1"/>
+              <p:nvPr/>
+            </p:nvSpPr>
+            <p:spPr>
+              <a:xfrm>
+                <a:off x="2238790" y="6376901"/>
+                <a:ext cx="2543546" cy="276999"/>
+              </a:xfrm>
+              <a:prstGeom prst="rect">
+                <a:avLst/>
+              </a:prstGeom>
+              <a:noFill/>
+              <a:ln w="12700">
+                <a:solidFill>
+                  <a:schemeClr val="accent1">
+                    <a:lumMod val="40000"/>
+                    <a:lumOff val="60000"/>
+                  </a:schemeClr>
+                </a:solidFill>
+              </a:ln>
+            </p:spPr>
+            <p:txBody>
+              <a:bodyPr wrap="square">
+                <a:spAutoFit/>
+              </a:bodyPr>
+              <a:lstStyle>
+                <a:defPPr>
+                  <a:defRPr lang="de-DE"/>
+                </a:defPPr>
+                <a:lvl1pPr algn="ctr">
+                  <a:defRPr sz="1200"/>
+                </a:lvl1pPr>
+              </a:lstStyle>
+              <a:p>
+                <a:r>
+                  <a:rPr lang="en-GB" dirty="0">
+                    <a:latin typeface="Calibri" panose="020F0502020204030204" pitchFamily="34" charset="0"/>
+                    <a:ea typeface="Cambria Math" panose="02040503050406030204" pitchFamily="18" charset="0"/>
+                    <a:cs typeface="Calibri" panose="020F0502020204030204" pitchFamily="34" charset="0"/>
+                  </a:rPr>
+                  <a:t>predictor</a:t>
+                </a:r>
+                <a:r>
+                  <a:rPr lang="en-GB" noProof="0" dirty="0">
+                    <a:latin typeface="Calibri" panose="020F0502020204030204" pitchFamily="34" charset="0"/>
+                    <a:ea typeface="Cambria Math" panose="02040503050406030204" pitchFamily="18" charset="0"/>
+                    <a:cs typeface="Calibri" panose="020F0502020204030204" pitchFamily="34" charset="0"/>
+                  </a:rPr>
+                  <a:t> with </a:t>
+                </a:r>
+                <a14:m>
+                  <m:oMath xmlns:m="http://schemas.openxmlformats.org/officeDocument/2006/math">
+                    <m:r>
+                      <a:rPr lang="en-GB" i="1" noProof="0" dirty="0" smtClean="0">
+                        <a:latin typeface="Cambria Math" panose="02040503050406030204" pitchFamily="18" charset="0"/>
+                        <a:ea typeface="Cambria Math" panose="02040503050406030204" pitchFamily="18" charset="0"/>
+                        <a:cs typeface="Calibri" panose="020F0502020204030204" pitchFamily="34" charset="0"/>
+                      </a:rPr>
+                      <m:t>𝑁</m:t>
+                    </m:r>
+                    <m:r>
+                      <a:rPr lang="en-GB" i="1" noProof="0" dirty="0" smtClean="0">
+                        <a:latin typeface="Cambria Math" panose="02040503050406030204" pitchFamily="18" charset="0"/>
+                        <a:ea typeface="Cambria Math" panose="02040503050406030204" pitchFamily="18" charset="0"/>
+                        <a:cs typeface="Calibri" panose="020F0502020204030204" pitchFamily="34" charset="0"/>
+                      </a:rPr>
+                      <m:t>&gt; 2 </m:t>
+                    </m:r>
+                  </m:oMath>
+                </a14:m>
+                <a:r>
+                  <a:rPr lang="en-GB" noProof="0" dirty="0">
+                    <a:latin typeface="Calibri" panose="020F0502020204030204" pitchFamily="34" charset="0"/>
+                    <a:ea typeface="Cambria Math" panose="02040503050406030204" pitchFamily="18" charset="0"/>
+                    <a:cs typeface="Calibri" panose="020F0502020204030204" pitchFamily="34" charset="0"/>
+                  </a:rPr>
+                  <a:t>levels </a:t>
+                </a:r>
+              </a:p>
+            </p:txBody>
+          </p:sp>
+        </mc:Choice>
+        <mc:Fallback xmlns="">
+          <p:sp>
+            <p:nvSpPr>
+              <p:cNvPr id="468" name="Textfeld 467">
+                <a:extLst>
+                  <a:ext uri="{FF2B5EF4-FFF2-40B4-BE49-F238E27FC236}">
+                    <a16:creationId xmlns:a16="http://schemas.microsoft.com/office/drawing/2014/main" id="{706DE281-AE3D-2689-6BA1-030155DAFDD8}"/>
+                  </a:ext>
+                </a:extLst>
+              </p:cNvPr>
+              <p:cNvSpPr txBox="1">
+                <a:spLocks noRot="1" noChangeAspect="1" noMove="1" noResize="1" noEditPoints="1" noAdjustHandles="1" noChangeArrowheads="1" noChangeShapeType="1" noTextEdit="1"/>
+              </p:cNvSpPr>
+              <p:nvPr/>
+            </p:nvSpPr>
+            <p:spPr>
+              <a:xfrm>
+                <a:off x="2238790" y="6376901"/>
+                <a:ext cx="2543546" cy="276999"/>
+              </a:xfrm>
+              <a:prstGeom prst="rect">
+                <a:avLst/>
+              </a:prstGeom>
+              <a:blipFill>
+                <a:blip r:embed="rId20"/>
+                <a:stretch>
+                  <a:fillRect b="-12500"/>
+                </a:stretch>
+              </a:blipFill>
+              <a:ln w="12700">
+                <a:solidFill>
+                  <a:schemeClr val="accent1">
+                    <a:lumMod val="40000"/>
+                    <a:lumOff val="60000"/>
+                  </a:schemeClr>
+                </a:solidFill>
+              </a:ln>
+            </p:spPr>
+            <p:txBody>
+              <a:bodyPr/>
+              <a:lstStyle/>
+              <a:p>
+                <a:r>
+                  <a:rPr lang="de-DE">
+                    <a:noFill/>
+                  </a:rPr>
+                  <a:t> </a:t>
+                </a:r>
+              </a:p>
+            </p:txBody>
+          </p:sp>
+        </mc:Fallback>
+      </mc:AlternateContent>
+      <p:sp>
+        <p:nvSpPr>
+          <p:cNvPr id="477" name="Textfeld 476">
+            <a:extLst>
+              <a:ext uri="{FF2B5EF4-FFF2-40B4-BE49-F238E27FC236}">
+                <a16:creationId xmlns:a16="http://schemas.microsoft.com/office/drawing/2014/main" id="{0BB4503C-4B3B-10E0-FDE3-8D464E5FD75F}"/>
+              </a:ext>
+            </a:extLst>
+          </p:cNvPr>
+          <p:cNvSpPr txBox="1"/>
+          <p:nvPr/>
+        </p:nvSpPr>
+        <p:spPr>
+          <a:xfrm>
+            <a:off x="305981" y="5743382"/>
+            <a:ext cx="1091245" cy="281831"/>
+          </a:xfrm>
+          <a:prstGeom prst="rect">
+            <a:avLst/>
+          </a:prstGeom>
+          <a:noFill/>
+          <a:ln w="12700">
+            <a:noFill/>
+          </a:ln>
+        </p:spPr>
+        <p:txBody>
+          <a:bodyPr wrap="square">
+            <a:spAutoFit/>
+          </a:bodyPr>
+          <a:lstStyle>
+            <a:defPPr>
+              <a:defRPr lang="de-DE"/>
+            </a:defPPr>
+            <a:lvl1pPr algn="ctr">
+              <a:defRPr sz="1200"/>
+            </a:lvl1pPr>
+          </a:lstStyle>
+          <a:p>
+            <a:pPr algn="l"/>
+            <a:r>
+              <a:rPr lang="en-GB" noProof="0" dirty="0">
+                <a:latin typeface="Calibri" panose="020F0502020204030204" pitchFamily="34" charset="0"/>
+                <a:ea typeface="Cambria Math" panose="02040503050406030204" pitchFamily="18" charset="0"/>
+                <a:cs typeface="Calibri" panose="020F0502020204030204" pitchFamily="34" charset="0"/>
+              </a:rPr>
+              <a:t>Colour code: </a:t>
+            </a:r>
+          </a:p>
+        </p:txBody>
+      </p:sp>
+      <p:grpSp>
+        <p:nvGrpSpPr>
+          <p:cNvPr id="491" name="Gruppieren 490">
+            <a:extLst>
+              <a:ext uri="{FF2B5EF4-FFF2-40B4-BE49-F238E27FC236}">
+                <a16:creationId xmlns:a16="http://schemas.microsoft.com/office/drawing/2014/main" id="{79827321-6213-5ED6-CA7E-C4EB130F0835}"/>
+              </a:ext>
+            </a:extLst>
+          </p:cNvPr>
+          <p:cNvGrpSpPr/>
+          <p:nvPr/>
+        </p:nvGrpSpPr>
+        <p:grpSpPr>
+          <a:xfrm>
+            <a:off x="1666842" y="1127125"/>
+            <a:ext cx="1785240" cy="542165"/>
+            <a:chOff x="2719572" y="1536945"/>
+            <a:chExt cx="1289076" cy="305400"/>
+          </a:xfrm>
+        </p:grpSpPr>
+        <p:cxnSp>
+          <p:nvCxnSpPr>
+            <p:cNvPr id="492" name="Gerade Verbindung mit Pfeil 491">
+              <a:extLst>
+                <a:ext uri="{FF2B5EF4-FFF2-40B4-BE49-F238E27FC236}">
+                  <a16:creationId xmlns:a16="http://schemas.microsoft.com/office/drawing/2014/main" id="{16A58645-1CDC-5688-788C-9141FE5CCB81}"/>
+                </a:ext>
+              </a:extLst>
+            </p:cNvPr>
+            <p:cNvCxnSpPr>
+              <a:cxnSpLocks/>
+            </p:cNvCxnSpPr>
+            <p:nvPr/>
+          </p:nvCxnSpPr>
+          <p:spPr>
+            <a:xfrm flipH="1">
+              <a:off x="2719572" y="1536945"/>
+              <a:ext cx="639486" cy="305400"/>
+            </a:xfrm>
+            <a:prstGeom prst="straightConnector1">
+              <a:avLst/>
+            </a:prstGeom>
+            <a:ln>
+              <a:solidFill>
+                <a:schemeClr val="tx1"/>
+              </a:solidFill>
+              <a:tailEnd type="triangle"/>
+            </a:ln>
+          </p:spPr>
+          <p:style>
+            <a:lnRef idx="1">
+              <a:schemeClr val="accent1"/>
+            </a:lnRef>
+            <a:fillRef idx="0">
+              <a:schemeClr val="accent1"/>
+            </a:fillRef>
+            <a:effectRef idx="0">
+              <a:schemeClr val="accent1"/>
+            </a:effectRef>
+            <a:fontRef idx="minor">
+              <a:schemeClr val="tx1"/>
+            </a:fontRef>
+          </p:style>
+        </p:cxnSp>
+        <p:cxnSp>
+          <p:nvCxnSpPr>
+            <p:cNvPr id="493" name="Gerade Verbindung mit Pfeil 492">
+              <a:extLst>
+                <a:ext uri="{FF2B5EF4-FFF2-40B4-BE49-F238E27FC236}">
+                  <a16:creationId xmlns:a16="http://schemas.microsoft.com/office/drawing/2014/main" id="{8A7D1534-4F84-E513-64D5-BFCE40C6B39B}"/>
+                </a:ext>
+              </a:extLst>
+            </p:cNvPr>
+            <p:cNvCxnSpPr>
+              <a:cxnSpLocks/>
+            </p:cNvCxnSpPr>
+            <p:nvPr/>
+          </p:nvCxnSpPr>
+          <p:spPr>
+            <a:xfrm>
+              <a:off x="3359058" y="1536945"/>
+              <a:ext cx="649590" cy="305400"/>
+            </a:xfrm>
+            <a:prstGeom prst="straightConnector1">
+              <a:avLst/>
+            </a:prstGeom>
+            <a:ln>
+              <a:solidFill>
+                <a:schemeClr val="tx1"/>
+              </a:solidFill>
+              <a:tailEnd type="triangle"/>
+            </a:ln>
+          </p:spPr>
+          <p:style>
+            <a:lnRef idx="1">
+              <a:schemeClr val="accent1"/>
+            </a:lnRef>
+            <a:fillRef idx="0">
+              <a:schemeClr val="accent1"/>
+            </a:fillRef>
+            <a:effectRef idx="0">
+              <a:schemeClr val="accent1"/>
+            </a:effectRef>
+            <a:fontRef idx="minor">
+              <a:schemeClr val="tx1"/>
+            </a:fontRef>
+          </p:style>
+        </p:cxnSp>
+      </p:grpSp>
+      <p:cxnSp>
+        <p:nvCxnSpPr>
+          <p:cNvPr id="461" name="Gerade Verbindung mit Pfeil 460">
+            <a:extLst>
+              <a:ext uri="{FF2B5EF4-FFF2-40B4-BE49-F238E27FC236}">
+                <a16:creationId xmlns:a16="http://schemas.microsoft.com/office/drawing/2014/main" id="{88C4B9E7-F944-F5A5-374F-D4BD03ACA072}"/>
+              </a:ext>
+            </a:extLst>
+          </p:cNvPr>
+          <p:cNvCxnSpPr>
+            <a:cxnSpLocks/>
+          </p:cNvCxnSpPr>
+          <p:nvPr/>
+        </p:nvCxnSpPr>
+        <p:spPr>
+          <a:xfrm flipH="1">
+            <a:off x="8287643" y="4758610"/>
+            <a:ext cx="4391" cy="180489"/>
+          </a:xfrm>
+          <a:prstGeom prst="straightConnector1">
+            <a:avLst/>
+          </a:prstGeom>
+          <a:ln>
+            <a:solidFill>
+              <a:schemeClr val="accent1"/>
+            </a:solidFill>
+            <a:tailEnd type="triangle"/>
+          </a:ln>
+        </p:spPr>
+        <p:style>
+          <a:lnRef idx="1">
+            <a:schemeClr val="accent1"/>
+          </a:lnRef>
+          <a:fillRef idx="0">
+            <a:schemeClr val="accent1"/>
+          </a:fillRef>
+          <a:effectRef idx="0">
+            <a:schemeClr val="accent1"/>
+          </a:effectRef>
+          <a:fontRef idx="minor">
+            <a:schemeClr val="tx1"/>
+          </a:fontRef>
+        </p:style>
+      </p:cxnSp>
+      <p:cxnSp>
+        <p:nvCxnSpPr>
+          <p:cNvPr id="465" name="Gerade Verbindung mit Pfeil 464">
+            <a:extLst>
+              <a:ext uri="{FF2B5EF4-FFF2-40B4-BE49-F238E27FC236}">
+                <a16:creationId xmlns:a16="http://schemas.microsoft.com/office/drawing/2014/main" id="{0785F576-956F-B66A-DA20-F625740590FF}"/>
+              </a:ext>
+            </a:extLst>
+          </p:cNvPr>
+          <p:cNvCxnSpPr>
+            <a:cxnSpLocks/>
+          </p:cNvCxnSpPr>
+          <p:nvPr/>
+        </p:nvCxnSpPr>
+        <p:spPr>
+          <a:xfrm flipH="1">
+            <a:off x="9767473" y="4763372"/>
+            <a:ext cx="4391" cy="180489"/>
+          </a:xfrm>
+          <a:prstGeom prst="straightConnector1">
+            <a:avLst/>
+          </a:prstGeom>
+          <a:ln>
+            <a:solidFill>
+              <a:schemeClr val="accent1"/>
+            </a:solidFill>
+            <a:tailEnd type="triangle"/>
+          </a:ln>
+        </p:spPr>
+        <p:style>
+          <a:lnRef idx="1">
+            <a:schemeClr val="accent1"/>
+          </a:lnRef>
+          <a:fillRef idx="0">
+            <a:schemeClr val="accent1"/>
+          </a:fillRef>
+          <a:effectRef idx="0">
+            <a:schemeClr val="accent1"/>
+          </a:effectRef>
+          <a:fontRef idx="minor">
+            <a:schemeClr val="tx1"/>
+          </a:fontRef>
+        </p:style>
+      </p:cxnSp>
+      <p:cxnSp>
+        <p:nvCxnSpPr>
+          <p:cNvPr id="466" name="Gerade Verbindung mit Pfeil 465">
+            <a:extLst>
+              <a:ext uri="{FF2B5EF4-FFF2-40B4-BE49-F238E27FC236}">
+                <a16:creationId xmlns:a16="http://schemas.microsoft.com/office/drawing/2014/main" id="{BF011261-4818-C92F-58C9-C7B25CDFDE35}"/>
+              </a:ext>
+            </a:extLst>
+          </p:cNvPr>
+          <p:cNvCxnSpPr>
+            <a:cxnSpLocks/>
+          </p:cNvCxnSpPr>
+          <p:nvPr/>
+        </p:nvCxnSpPr>
+        <p:spPr>
+          <a:xfrm flipH="1">
+            <a:off x="8287643" y="5246480"/>
+            <a:ext cx="4391" cy="180489"/>
+          </a:xfrm>
+          <a:prstGeom prst="straightConnector1">
+            <a:avLst/>
+          </a:prstGeom>
+          <a:ln>
+            <a:solidFill>
+              <a:schemeClr val="accent1"/>
+            </a:solidFill>
+            <a:tailEnd type="triangle"/>
+          </a:ln>
+        </p:spPr>
+        <p:style>
+          <a:lnRef idx="1">
+            <a:schemeClr val="accent1"/>
+          </a:lnRef>
+          <a:fillRef idx="0">
+            <a:schemeClr val="accent1"/>
+          </a:fillRef>
+          <a:effectRef idx="0">
+            <a:schemeClr val="accent1"/>
+          </a:effectRef>
+          <a:fontRef idx="minor">
+            <a:schemeClr val="tx1"/>
+          </a:fontRef>
+        </p:style>
+      </p:cxnSp>
+      <p:cxnSp>
+        <p:nvCxnSpPr>
+          <p:cNvPr id="469" name="Gerade Verbindung mit Pfeil 468">
+            <a:extLst>
+              <a:ext uri="{FF2B5EF4-FFF2-40B4-BE49-F238E27FC236}">
+                <a16:creationId xmlns:a16="http://schemas.microsoft.com/office/drawing/2014/main" id="{B1436C2A-9649-39A1-69A1-D2558C1F5025}"/>
+              </a:ext>
+            </a:extLst>
+          </p:cNvPr>
+          <p:cNvCxnSpPr>
+            <a:cxnSpLocks/>
+          </p:cNvCxnSpPr>
+          <p:nvPr/>
+        </p:nvCxnSpPr>
+        <p:spPr>
+          <a:xfrm flipH="1">
+            <a:off x="9767473" y="5251947"/>
+            <a:ext cx="4391" cy="180489"/>
+          </a:xfrm>
+          <a:prstGeom prst="straightConnector1">
+            <a:avLst/>
+          </a:prstGeom>
+          <a:ln>
+            <a:solidFill>
+              <a:schemeClr val="accent1"/>
+            </a:solidFill>
+            <a:tailEnd type="triangle"/>
+          </a:ln>
+        </p:spPr>
+        <p:style>
+          <a:lnRef idx="1">
+            <a:schemeClr val="accent1"/>
+          </a:lnRef>
+          <a:fillRef idx="0">
+            <a:schemeClr val="accent1"/>
+          </a:fillRef>
+          <a:effectRef idx="0">
+            <a:schemeClr val="accent1"/>
+          </a:effectRef>
+          <a:fontRef idx="minor">
+            <a:schemeClr val="tx1"/>
+          </a:fontRef>
+        </p:style>
+      </p:cxnSp>
+      <p:cxnSp>
+        <p:nvCxnSpPr>
+          <p:cNvPr id="470" name="Gerade Verbindung mit Pfeil 469">
+            <a:extLst>
+              <a:ext uri="{FF2B5EF4-FFF2-40B4-BE49-F238E27FC236}">
+                <a16:creationId xmlns:a16="http://schemas.microsoft.com/office/drawing/2014/main" id="{07351EF4-0BAD-6A84-9BEA-F079675CE45E}"/>
+              </a:ext>
+            </a:extLst>
+          </p:cNvPr>
+          <p:cNvCxnSpPr>
+            <a:cxnSpLocks/>
+          </p:cNvCxnSpPr>
+          <p:nvPr/>
+        </p:nvCxnSpPr>
+        <p:spPr>
+          <a:xfrm flipH="1">
+            <a:off x="6086811" y="5264410"/>
+            <a:ext cx="4391" cy="180489"/>
+          </a:xfrm>
+          <a:prstGeom prst="straightConnector1">
+            <a:avLst/>
+          </a:prstGeom>
+          <a:ln>
+            <a:solidFill>
+              <a:schemeClr val="accent1"/>
+            </a:solidFill>
+            <a:tailEnd type="triangle"/>
+          </a:ln>
+        </p:spPr>
+        <p:style>
+          <a:lnRef idx="1">
+            <a:schemeClr val="accent1"/>
+          </a:lnRef>
+          <a:fillRef idx="0">
+            <a:schemeClr val="accent1"/>
+          </a:fillRef>
+          <a:effectRef idx="0">
+            <a:schemeClr val="accent1"/>
+          </a:effectRef>
+          <a:fontRef idx="minor">
+            <a:schemeClr val="tx1"/>
+          </a:fontRef>
+        </p:style>
+      </p:cxnSp>
+      <p:cxnSp>
+        <p:nvCxnSpPr>
+          <p:cNvPr id="496" name="Gerade Verbindung mit Pfeil 495">
+            <a:extLst>
+              <a:ext uri="{FF2B5EF4-FFF2-40B4-BE49-F238E27FC236}">
+                <a16:creationId xmlns:a16="http://schemas.microsoft.com/office/drawing/2014/main" id="{3056F5E5-586F-C220-7943-C7C7F9AC8D51}"/>
+              </a:ext>
+            </a:extLst>
+          </p:cNvPr>
+          <p:cNvCxnSpPr>
+            <a:cxnSpLocks/>
+          </p:cNvCxnSpPr>
+          <p:nvPr/>
+        </p:nvCxnSpPr>
+        <p:spPr>
+          <a:xfrm flipH="1">
+            <a:off x="8946555" y="3270049"/>
+            <a:ext cx="7967" cy="597516"/>
+          </a:xfrm>
+          <a:prstGeom prst="straightConnector1">
+            <a:avLst/>
+          </a:prstGeom>
+          <a:ln>
+            <a:solidFill>
+              <a:schemeClr val="accent1"/>
+            </a:solidFill>
+            <a:tailEnd type="triangle"/>
+          </a:ln>
+        </p:spPr>
+        <p:style>
+          <a:lnRef idx="1">
+            <a:schemeClr val="accent1"/>
+          </a:lnRef>
+          <a:fillRef idx="0">
+            <a:schemeClr val="accent1"/>
+          </a:fillRef>
+          <a:effectRef idx="0">
+            <a:schemeClr val="accent1"/>
+          </a:effectRef>
+          <a:fontRef idx="minor">
+            <a:schemeClr val="tx1"/>
+          </a:fontRef>
+        </p:style>
+      </p:cxnSp>
+      <p:cxnSp>
+        <p:nvCxnSpPr>
+          <p:cNvPr id="77" name="Gerade Verbindung mit Pfeil 76">
+            <a:extLst>
+              <a:ext uri="{FF2B5EF4-FFF2-40B4-BE49-F238E27FC236}">
+                <a16:creationId xmlns:a16="http://schemas.microsoft.com/office/drawing/2014/main" id="{3D34EA8C-CFAB-FAB2-DCD4-4CF7537C6E76}"/>
+              </a:ext>
+            </a:extLst>
+          </p:cNvPr>
+          <p:cNvCxnSpPr>
+            <a:cxnSpLocks/>
+            <a:stCxn id="9" idx="2"/>
+            <a:endCxn id="6" idx="0"/>
+          </p:cNvCxnSpPr>
+          <p:nvPr/>
+        </p:nvCxnSpPr>
+        <p:spPr>
+          <a:xfrm flipH="1">
+            <a:off x="7687451" y="1109786"/>
+            <a:ext cx="14973" cy="1092728"/>
+          </a:xfrm>
+          <a:prstGeom prst="straightConnector1">
+            <a:avLst/>
+          </a:prstGeom>
+          <a:ln>
+            <a:solidFill>
+              <a:schemeClr val="accent1"/>
+            </a:solidFill>
+            <a:tailEnd type="triangle"/>
+          </a:ln>
+        </p:spPr>
+        <p:style>
+          <a:lnRef idx="1">
+            <a:schemeClr val="accent1"/>
+          </a:lnRef>
+          <a:fillRef idx="0">
+            <a:schemeClr val="accent1"/>
+          </a:fillRef>
+          <a:effectRef idx="0">
+            <a:schemeClr val="accent1"/>
+          </a:effectRef>
+          <a:fontRef idx="minor">
+            <a:schemeClr val="tx1"/>
+          </a:fontRef>
+        </p:style>
+      </p:cxnSp>
+      <p:cxnSp>
+        <p:nvCxnSpPr>
+          <p:cNvPr id="78" name="Gerade Verbindung mit Pfeil 77">
+            <a:extLst>
+              <a:ext uri="{FF2B5EF4-FFF2-40B4-BE49-F238E27FC236}">
+                <a16:creationId xmlns:a16="http://schemas.microsoft.com/office/drawing/2014/main" id="{1E0318E4-BC90-DAA1-B165-1528F8DBB633}"/>
+              </a:ext>
+            </a:extLst>
+          </p:cNvPr>
+          <p:cNvCxnSpPr>
+            <a:cxnSpLocks/>
+          </p:cNvCxnSpPr>
+          <p:nvPr/>
+        </p:nvCxnSpPr>
+        <p:spPr>
+          <a:xfrm flipH="1">
+            <a:off x="1572292" y="1996567"/>
+            <a:ext cx="4391" cy="180489"/>
+          </a:xfrm>
+          <a:prstGeom prst="straightConnector1">
+            <a:avLst/>
+          </a:prstGeom>
+          <a:ln>
+            <a:solidFill>
+              <a:schemeClr val="tx1"/>
+            </a:solidFill>
+            <a:tailEnd type="triangle"/>
+          </a:ln>
+        </p:spPr>
+        <p:style>
+          <a:lnRef idx="1">
+            <a:schemeClr val="accent1"/>
+          </a:lnRef>
+          <a:fillRef idx="0">
+            <a:schemeClr val="accent1"/>
+          </a:fillRef>
+          <a:effectRef idx="0">
+            <a:schemeClr val="accent1"/>
+          </a:effectRef>
+          <a:fontRef idx="minor">
+            <a:schemeClr val="tx1"/>
+          </a:fontRef>
+        </p:style>
+      </p:cxnSp>
+      <p:sp>
+        <p:nvSpPr>
+          <p:cNvPr id="79" name="Rechteck 78">
+            <a:extLst>
+              <a:ext uri="{FF2B5EF4-FFF2-40B4-BE49-F238E27FC236}">
+                <a16:creationId xmlns:a16="http://schemas.microsoft.com/office/drawing/2014/main" id="{E4453A76-E89A-BF08-4B09-EF6173FCD0FF}"/>
+              </a:ext>
+            </a:extLst>
+          </p:cNvPr>
+          <p:cNvSpPr/>
+          <p:nvPr/>
+        </p:nvSpPr>
+        <p:spPr>
+          <a:xfrm>
+            <a:off x="243603" y="5730875"/>
+            <a:ext cx="4603061" cy="999264"/>
+          </a:xfrm>
+          <a:prstGeom prst="rect">
+            <a:avLst/>
+          </a:prstGeom>
+          <a:noFill/>
+          <a:ln>
+            <a:solidFill>
+              <a:schemeClr val="bg1">
+                <a:lumMod val="85000"/>
+              </a:schemeClr>
+            </a:solidFill>
+          </a:ln>
+        </p:spPr>
+        <p:style>
+          <a:lnRef idx="2">
+            <a:schemeClr val="accent1">
+              <a:shade val="15000"/>
+            </a:schemeClr>
+          </a:lnRef>
+          <a:fillRef idx="1">
+            <a:schemeClr val="accent1"/>
+          </a:fillRef>
+          <a:effectRef idx="0">
+            <a:schemeClr val="accent1"/>
+          </a:effectRef>
+          <a:fontRef idx="minor">
+            <a:schemeClr val="lt1"/>
+          </a:fontRef>
+        </p:style>
+        <p:txBody>
+          <a:bodyPr rtlCol="0" anchor="ctr"/>
+          <a:lstStyle/>
+          <a:p>
+            <a:pPr algn="ctr"/>
+            <a:endParaRPr lang="de-DE"/>
+          </a:p>
+        </p:txBody>
+      </p:sp>
+      <p:grpSp>
+        <p:nvGrpSpPr>
+          <p:cNvPr id="17" name="Gruppieren 16">
+            <a:extLst>
+              <a:ext uri="{FF2B5EF4-FFF2-40B4-BE49-F238E27FC236}">
+                <a16:creationId xmlns:a16="http://schemas.microsoft.com/office/drawing/2014/main" id="{62906819-8555-A4E6-C8DA-A8AB35D898BE}"/>
+              </a:ext>
+            </a:extLst>
+          </p:cNvPr>
+          <p:cNvGrpSpPr/>
+          <p:nvPr/>
+        </p:nvGrpSpPr>
+        <p:grpSpPr>
+          <a:xfrm>
+            <a:off x="6911252" y="2511762"/>
+            <a:ext cx="1552397" cy="469922"/>
+            <a:chOff x="2719572" y="1536945"/>
+            <a:chExt cx="1289076" cy="305400"/>
+          </a:xfrm>
+        </p:grpSpPr>
+        <p:cxnSp>
+          <p:nvCxnSpPr>
+            <p:cNvPr id="20" name="Gerade Verbindung mit Pfeil 19">
+              <a:extLst>
+                <a:ext uri="{FF2B5EF4-FFF2-40B4-BE49-F238E27FC236}">
+                  <a16:creationId xmlns:a16="http://schemas.microsoft.com/office/drawing/2014/main" id="{66F22CE8-5044-57ED-E9E6-7BF99A4A9B98}"/>
+                </a:ext>
+              </a:extLst>
+            </p:cNvPr>
+            <p:cNvCxnSpPr>
+              <a:cxnSpLocks/>
+            </p:cNvCxnSpPr>
+            <p:nvPr/>
+          </p:nvCxnSpPr>
+          <p:spPr>
+            <a:xfrm flipH="1">
+              <a:off x="2719572" y="1536945"/>
+              <a:ext cx="639486" cy="305400"/>
+            </a:xfrm>
+            <a:prstGeom prst="straightConnector1">
+              <a:avLst/>
+            </a:prstGeom>
+            <a:ln>
+              <a:tailEnd type="triangle"/>
+            </a:ln>
+          </p:spPr>
+          <p:style>
+            <a:lnRef idx="1">
+              <a:schemeClr val="accent1"/>
+            </a:lnRef>
+            <a:fillRef idx="0">
+              <a:schemeClr val="accent1"/>
+            </a:fillRef>
+            <a:effectRef idx="0">
+              <a:schemeClr val="accent1"/>
+            </a:effectRef>
+            <a:fontRef idx="minor">
+              <a:schemeClr val="tx1"/>
+            </a:fontRef>
+          </p:style>
+        </p:cxnSp>
+        <p:cxnSp>
+          <p:nvCxnSpPr>
+            <p:cNvPr id="21" name="Gerade Verbindung mit Pfeil 20">
+              <a:extLst>
+                <a:ext uri="{FF2B5EF4-FFF2-40B4-BE49-F238E27FC236}">
+                  <a16:creationId xmlns:a16="http://schemas.microsoft.com/office/drawing/2014/main" id="{A3C77367-1FDC-FC74-5353-DAE4E9FD420E}"/>
+                </a:ext>
+              </a:extLst>
+            </p:cNvPr>
+            <p:cNvCxnSpPr>
+              <a:cxnSpLocks/>
+            </p:cNvCxnSpPr>
+            <p:nvPr/>
+          </p:nvCxnSpPr>
+          <p:spPr>
+            <a:xfrm>
+              <a:off x="3359058" y="1536945"/>
+              <a:ext cx="649590" cy="305400"/>
+            </a:xfrm>
+            <a:prstGeom prst="straightConnector1">
+              <a:avLst/>
+            </a:prstGeom>
+            <a:ln>
+              <a:tailEnd type="triangle"/>
+            </a:ln>
+          </p:spPr>
+          <p:style>
+            <a:lnRef idx="1">
+              <a:schemeClr val="accent1"/>
+            </a:lnRef>
+            <a:fillRef idx="0">
+              <a:schemeClr val="accent1"/>
+            </a:fillRef>
+            <a:effectRef idx="0">
+              <a:schemeClr val="accent1"/>
+            </a:effectRef>
+            <a:fontRef idx="minor">
+              <a:schemeClr val="tx1"/>
+            </a:fontRef>
+          </p:style>
+        </p:cxnSp>
+      </p:grpSp>
+    </p:spTree>
+    <p:extLst>
+      <p:ext uri="{BB962C8B-B14F-4D97-AF65-F5344CB8AC3E}">
+        <p14:creationId xmlns:p14="http://schemas.microsoft.com/office/powerpoint/2010/main" val="638986528"/>
+      </p:ext>
+    </p:extLst>
+  </p:cSld>
+  <p:clrMapOvr>
+    <a:masterClrMapping/>
+  </p:clrMapOvr>
+</p:sld>
+</file>
+
 <file path=ppt/theme/theme1.xml><?xml version="1.0" encoding="utf-8"?>
 <a:theme xmlns:a="http://schemas.openxmlformats.org/drawingml/2006/main" name="Office">
   <a:themeElements>

</xml_diff>

<commit_message>
only shapiro test descides for normality in algorithm
</commit_message>
<xml_diff>
--- a/vignettes/figures/decision_tree.pptx
+++ b/vignettes/figures/decision_tree.pptx
@@ -286,7 +286,7 @@
           <a:p>
             <a:fld id="{0AECA108-3915-9043-8428-B4BE4472B821}" type="datetimeFigureOut">
               <a:rPr lang="de-DE" smtClean="0"/>
-              <a:t>29.05.25</a:t>
+              <a:t>02.06.25</a:t>
             </a:fld>
             <a:endParaRPr lang="de-DE"/>
           </a:p>
@@ -892,7 +892,7 @@
           <a:p>
             <a:fld id="{43497422-92ED-3D47-BF28-17000E80E497}" type="datetimeFigureOut">
               <a:rPr lang="de-DE" smtClean="0"/>
-              <a:t>29.05.25</a:t>
+              <a:t>02.06.25</a:t>
             </a:fld>
             <a:endParaRPr lang="de-DE"/>
           </a:p>
@@ -1090,7 +1090,7 @@
           <a:p>
             <a:fld id="{43497422-92ED-3D47-BF28-17000E80E497}" type="datetimeFigureOut">
               <a:rPr lang="de-DE" smtClean="0"/>
-              <a:t>29.05.25</a:t>
+              <a:t>02.06.25</a:t>
             </a:fld>
             <a:endParaRPr lang="de-DE"/>
           </a:p>
@@ -1298,7 +1298,7 @@
           <a:p>
             <a:fld id="{43497422-92ED-3D47-BF28-17000E80E497}" type="datetimeFigureOut">
               <a:rPr lang="de-DE" smtClean="0"/>
-              <a:t>29.05.25</a:t>
+              <a:t>02.06.25</a:t>
             </a:fld>
             <a:endParaRPr lang="de-DE"/>
           </a:p>
@@ -1496,7 +1496,7 @@
           <a:p>
             <a:fld id="{43497422-92ED-3D47-BF28-17000E80E497}" type="datetimeFigureOut">
               <a:rPr lang="de-DE" smtClean="0"/>
-              <a:t>29.05.25</a:t>
+              <a:t>02.06.25</a:t>
             </a:fld>
             <a:endParaRPr lang="de-DE"/>
           </a:p>
@@ -1771,7 +1771,7 @@
           <a:p>
             <a:fld id="{43497422-92ED-3D47-BF28-17000E80E497}" type="datetimeFigureOut">
               <a:rPr lang="de-DE" smtClean="0"/>
-              <a:t>29.05.25</a:t>
+              <a:t>02.06.25</a:t>
             </a:fld>
             <a:endParaRPr lang="de-DE"/>
           </a:p>
@@ -2036,7 +2036,7 @@
           <a:p>
             <a:fld id="{43497422-92ED-3D47-BF28-17000E80E497}" type="datetimeFigureOut">
               <a:rPr lang="de-DE" smtClean="0"/>
-              <a:t>29.05.25</a:t>
+              <a:t>02.06.25</a:t>
             </a:fld>
             <a:endParaRPr lang="de-DE"/>
           </a:p>
@@ -2448,7 +2448,7 @@
           <a:p>
             <a:fld id="{43497422-92ED-3D47-BF28-17000E80E497}" type="datetimeFigureOut">
               <a:rPr lang="de-DE" smtClean="0"/>
-              <a:t>29.05.25</a:t>
+              <a:t>02.06.25</a:t>
             </a:fld>
             <a:endParaRPr lang="de-DE"/>
           </a:p>
@@ -2589,7 +2589,7 @@
           <a:p>
             <a:fld id="{43497422-92ED-3D47-BF28-17000E80E497}" type="datetimeFigureOut">
               <a:rPr lang="de-DE" smtClean="0"/>
-              <a:t>29.05.25</a:t>
+              <a:t>02.06.25</a:t>
             </a:fld>
             <a:endParaRPr lang="de-DE"/>
           </a:p>
@@ -2702,7 +2702,7 @@
           <a:p>
             <a:fld id="{43497422-92ED-3D47-BF28-17000E80E497}" type="datetimeFigureOut">
               <a:rPr lang="de-DE" smtClean="0"/>
-              <a:t>29.05.25</a:t>
+              <a:t>02.06.25</a:t>
             </a:fld>
             <a:endParaRPr lang="de-DE"/>
           </a:p>
@@ -3013,7 +3013,7 @@
           <a:p>
             <a:fld id="{43497422-92ED-3D47-BF28-17000E80E497}" type="datetimeFigureOut">
               <a:rPr lang="de-DE" smtClean="0"/>
-              <a:t>29.05.25</a:t>
+              <a:t>02.06.25</a:t>
             </a:fld>
             <a:endParaRPr lang="de-DE"/>
           </a:p>
@@ -3301,7 +3301,7 @@
           <a:p>
             <a:fld id="{43497422-92ED-3D47-BF28-17000E80E497}" type="datetimeFigureOut">
               <a:rPr lang="de-DE" smtClean="0"/>
-              <a:t>29.05.25</a:t>
+              <a:t>02.06.25</a:t>
             </a:fld>
             <a:endParaRPr lang="de-DE"/>
           </a:p>
@@ -3542,7 +3542,7 @@
           <a:p>
             <a:fld id="{43497422-92ED-3D47-BF28-17000E80E497}" type="datetimeFigureOut">
               <a:rPr lang="de-DE" smtClean="0"/>
-              <a:t>29.05.25</a:t>
+              <a:t>02.06.25</a:t>
             </a:fld>
             <a:endParaRPr lang="de-DE"/>
           </a:p>
@@ -9908,7 +9908,7 @@
         </p:nvSpPr>
         <p:spPr>
           <a:xfrm>
-            <a:off x="5037088" y="2202514"/>
+            <a:off x="5130837" y="2201318"/>
             <a:ext cx="5300726" cy="276999"/>
           </a:xfrm>
           <a:prstGeom prst="rect">
@@ -10459,8 +10459,8 @@
           </p:sp>
         </mc:Fallback>
       </mc:AlternateContent>
-      <mc:AlternateContent xmlns:mc="http://schemas.openxmlformats.org/markup-compatibility/2006">
-        <mc:Choice xmlns:a14="http://schemas.microsoft.com/office/drawing/2010/main" Requires="a14">
+      <mc:AlternateContent xmlns:mc="http://schemas.openxmlformats.org/markup-compatibility/2006" xmlns:a14="http://schemas.microsoft.com/office/drawing/2010/main">
+        <mc:Choice Requires="a14">
           <p:sp>
             <p:nvSpPr>
               <p:cNvPr id="9" name="Textfeld 8">
@@ -10544,7 +10544,7 @@
             </p:txBody>
           </p:sp>
         </mc:Choice>
-        <mc:Fallback>
+        <mc:Fallback xmlns="">
           <p:sp>
             <p:nvSpPr>
               <p:cNvPr id="9" name="Textfeld 8">
@@ -10597,8 +10597,8 @@
           </p:sp>
         </mc:Fallback>
       </mc:AlternateContent>
-      <mc:AlternateContent xmlns:mc="http://schemas.openxmlformats.org/markup-compatibility/2006">
-        <mc:Choice xmlns:a14="http://schemas.microsoft.com/office/drawing/2010/main" Requires="a14">
+      <mc:AlternateContent xmlns:mc="http://schemas.openxmlformats.org/markup-compatibility/2006" xmlns:a14="http://schemas.microsoft.com/office/drawing/2010/main">
+        <mc:Choice Requires="a14">
           <p:sp>
             <p:nvSpPr>
               <p:cNvPr id="13" name="Textfeld 12">
@@ -10728,7 +10728,7 @@
             </p:txBody>
           </p:sp>
         </mc:Choice>
-        <mc:Fallback>
+        <mc:Fallback xmlns="">
           <p:sp>
             <p:nvSpPr>
               <p:cNvPr id="13" name="Textfeld 12">
@@ -10778,8 +10778,8 @@
           </p:sp>
         </mc:Fallback>
       </mc:AlternateContent>
-      <mc:AlternateContent xmlns:mc="http://schemas.openxmlformats.org/markup-compatibility/2006">
-        <mc:Choice xmlns:a14="http://schemas.microsoft.com/office/drawing/2010/main" Requires="a14">
+      <mc:AlternateContent xmlns:mc="http://schemas.openxmlformats.org/markup-compatibility/2006" xmlns:a14="http://schemas.microsoft.com/office/drawing/2010/main">
+        <mc:Choice Requires="a14">
           <p:sp>
             <p:nvSpPr>
               <p:cNvPr id="15" name="Textfeld 14">
@@ -10915,7 +10915,7 @@
             </p:txBody>
           </p:sp>
         </mc:Choice>
-        <mc:Fallback>
+        <mc:Fallback xmlns="">
           <p:sp>
             <p:nvSpPr>
               <p:cNvPr id="15" name="Textfeld 14">
@@ -10965,8 +10965,8 @@
           </p:sp>
         </mc:Fallback>
       </mc:AlternateContent>
-      <mc:AlternateContent xmlns:mc="http://schemas.openxmlformats.org/markup-compatibility/2006">
-        <mc:Choice xmlns:a14="http://schemas.microsoft.com/office/drawing/2010/main" Requires="a14">
+      <mc:AlternateContent xmlns:mc="http://schemas.openxmlformats.org/markup-compatibility/2006" xmlns:a14="http://schemas.microsoft.com/office/drawing/2010/main">
+        <mc:Choice Requires="a14">
           <p:sp>
             <p:nvSpPr>
               <p:cNvPr id="19" name="Textfeld 18">
@@ -11112,7 +11112,7 @@
             </p:txBody>
           </p:sp>
         </mc:Choice>
-        <mc:Fallback>
+        <mc:Fallback xmlns="">
           <p:sp>
             <p:nvSpPr>
               <p:cNvPr id="19" name="Textfeld 18">
@@ -11162,8 +11162,8 @@
           </p:sp>
         </mc:Fallback>
       </mc:AlternateContent>
-      <mc:AlternateContent xmlns:mc="http://schemas.openxmlformats.org/markup-compatibility/2006">
-        <mc:Choice xmlns:a14="http://schemas.microsoft.com/office/drawing/2010/main" Requires="a14">
+      <mc:AlternateContent xmlns:mc="http://schemas.openxmlformats.org/markup-compatibility/2006" xmlns:a14="http://schemas.microsoft.com/office/drawing/2010/main">
+        <mc:Choice Requires="a14">
           <p:sp>
             <p:nvSpPr>
               <p:cNvPr id="22" name="Textfeld 21">
@@ -11316,7 +11316,7 @@
             </p:txBody>
           </p:sp>
         </mc:Choice>
-        <mc:Fallback>
+        <mc:Fallback xmlns="">
           <p:sp>
             <p:nvSpPr>
               <p:cNvPr id="22" name="Textfeld 21">
@@ -11511,7 +11511,7 @@
         </p:nvSpPr>
         <p:spPr>
           <a:xfrm>
-            <a:off x="7559455" y="3878295"/>
+            <a:off x="7636562" y="3878295"/>
             <a:ext cx="2795001" cy="280863"/>
           </a:xfrm>
           <a:prstGeom prst="rect">
@@ -11558,8 +11558,8 @@
           </a:p>
         </p:txBody>
       </p:sp>
-      <mc:AlternateContent xmlns:mc="http://schemas.openxmlformats.org/markup-compatibility/2006" xmlns:a14="http://schemas.microsoft.com/office/drawing/2010/main">
-        <mc:Choice Requires="a14">
+      <mc:AlternateContent xmlns:mc="http://schemas.openxmlformats.org/markup-compatibility/2006">
+        <mc:Choice xmlns:a14="http://schemas.microsoft.com/office/drawing/2010/main" Requires="a14">
           <p:sp>
             <p:nvSpPr>
               <p:cNvPr id="29" name="Textfeld 28">
@@ -11574,7 +11574,7 @@
             </p:nvSpPr>
             <p:spPr>
               <a:xfrm>
-                <a:off x="9261991" y="4482840"/>
+                <a:off x="9351563" y="4482840"/>
                 <a:ext cx="1080000" cy="277200"/>
               </a:xfrm>
               <a:prstGeom prst="rect">
@@ -11636,13 +11636,13 @@
             </p:txBody>
           </p:sp>
         </mc:Choice>
-        <mc:Fallback xmlns="">
+        <mc:Fallback>
           <p:sp>
             <p:nvSpPr>
               <p:cNvPr id="29" name="Textfeld 28">
                 <a:extLst>
                   <a:ext uri="{FF2B5EF4-FFF2-40B4-BE49-F238E27FC236}">
-                    <a16:creationId xmlns:a16="http://schemas.microsoft.com/office/drawing/2014/main" id="{A1E211F9-17D8-404F-BDD9-8FA1CF6DEBDF}"/>
+                    <a16:creationId xmlns:a16="http://schemas.microsoft.com/office/drawing/2014/main" id="{6A843E82-AE36-2049-F32E-7DB7C257BD0C}"/>
                   </a:ext>
                 </a:extLst>
               </p:cNvPr>
@@ -11653,7 +11653,7 @@
             </p:nvSpPr>
             <p:spPr>
               <a:xfrm>
-                <a:off x="9261991" y="4482840"/>
+                <a:off x="9351563" y="4482840"/>
                 <a:ext cx="1080000" cy="277200"/>
               </a:xfrm>
               <a:prstGeom prst="rect">
@@ -11900,7 +11900,7 @@
         </p:nvSpPr>
         <p:spPr>
           <a:xfrm>
-            <a:off x="9168872" y="4968284"/>
+            <a:off x="9262621" y="4968284"/>
             <a:ext cx="1168942" cy="276999"/>
           </a:xfrm>
           <a:prstGeom prst="rect">
@@ -12063,8 +12063,8 @@
         </p:nvSpPr>
         <p:spPr>
           <a:xfrm>
-            <a:off x="7588434" y="5449810"/>
-            <a:ext cx="2795000" cy="280863"/>
+            <a:off x="7588433" y="5449810"/>
+            <a:ext cx="2838737" cy="284869"/>
           </a:xfrm>
           <a:prstGeom prst="rect">
             <a:avLst/>
@@ -12447,7 +12447,7 @@
             </p:nvSpPr>
             <p:spPr>
               <a:xfrm>
-                <a:off x="5037088" y="3113051"/>
+                <a:off x="5130837" y="3111855"/>
                 <a:ext cx="2338425" cy="276999"/>
               </a:xfrm>
               <a:prstGeom prst="rect">
@@ -12526,7 +12526,7 @@
             </p:nvSpPr>
             <p:spPr>
               <a:xfrm>
-                <a:off x="5037088" y="3113051"/>
+                <a:off x="5130837" y="3111855"/>
                 <a:ext cx="2338425" cy="276999"/>
               </a:xfrm>
               <a:prstGeom prst="rect">
@@ -12578,7 +12578,7 @@
             </p:nvSpPr>
             <p:spPr>
               <a:xfrm>
-                <a:off x="7588434" y="3100255"/>
+                <a:off x="7625917" y="3100255"/>
                 <a:ext cx="2805646" cy="276999"/>
               </a:xfrm>
               <a:prstGeom prst="rect">
@@ -12657,7 +12657,7 @@
             </p:nvSpPr>
             <p:spPr>
               <a:xfrm>
-                <a:off x="7588434" y="3100255"/>
+                <a:off x="7625917" y="3100255"/>
                 <a:ext cx="2805646" cy="276999"/>
               </a:xfrm>
               <a:prstGeom prst="rect">
@@ -12707,8 +12707,8 @@
         </p:nvSpPr>
         <p:spPr>
           <a:xfrm>
-            <a:off x="10463276" y="5446449"/>
-            <a:ext cx="1586791" cy="276999"/>
+            <a:off x="10508557" y="5453366"/>
+            <a:ext cx="1618426" cy="277200"/>
           </a:xfrm>
           <a:prstGeom prst="rect">
             <a:avLst/>
@@ -13002,7 +13002,7 @@
         </p:nvSpPr>
         <p:spPr>
           <a:xfrm>
-            <a:off x="10463276" y="4951684"/>
+            <a:off x="10508891" y="4951684"/>
             <a:ext cx="1618427" cy="276999"/>
           </a:xfrm>
           <a:prstGeom prst="rect">
@@ -13055,8 +13055,8 @@
         </p:nvSpPr>
         <p:spPr>
           <a:xfrm>
-            <a:off x="10463276" y="3876297"/>
-            <a:ext cx="1618761" cy="276999"/>
+            <a:off x="10508557" y="3876296"/>
+            <a:ext cx="1618761" cy="277200"/>
           </a:xfrm>
           <a:prstGeom prst="rect">
             <a:avLst/>
@@ -14127,9 +14127,9 @@
           <p:nvPr/>
         </p:nvCxnSpPr>
         <p:spPr>
-          <a:xfrm flipH="1">
-            <a:off x="7687451" y="1109786"/>
-            <a:ext cx="14973" cy="1092728"/>
+          <a:xfrm>
+            <a:off x="7702424" y="1109786"/>
+            <a:ext cx="78776" cy="1091532"/>
           </a:xfrm>
           <a:prstGeom prst="straightConnector1">
             <a:avLst/>

</xml_diff>

<commit_message>
changed from bartlett to levene
</commit_message>
<xml_diff>
--- a/vignettes/figures/decision_tree.pptx
+++ b/vignettes/figures/decision_tree.pptx
@@ -5,11 +5,12 @@
     <p:sldMasterId id="2147483648" r:id="rId1"/>
   </p:sldMasterIdLst>
   <p:notesMasterIdLst>
-    <p:notesMasterId r:id="rId4"/>
+    <p:notesMasterId r:id="rId5"/>
   </p:notesMasterIdLst>
   <p:sldIdLst>
     <p:sldId id="259" r:id="rId2"/>
     <p:sldId id="260" r:id="rId3"/>
+    <p:sldId id="261" r:id="rId4"/>
   </p:sldIdLst>
   <p:sldSz cx="12192000" cy="6858000"/>
   <p:notesSz cx="6858000" cy="9144000"/>
@@ -130,13 +131,37 @@
 <file path=ppt/revisionInfo.xml><?xml version="1.0" encoding="utf-8"?>
 <p1510:revInfo xmlns:a="http://schemas.openxmlformats.org/drawingml/2006/main" xmlns:r="http://schemas.openxmlformats.org/officeDocument/2006/relationships" xmlns:p1510="http://schemas.microsoft.com/office/powerpoint/2015/10/main">
   <p1510:revLst>
-    <p1510:client id="{895C96C1-8C91-454F-AE14-4A89B17CB3FA}" v="20" dt="2025-05-25T17:04:25.327"/>
+    <p1510:client id="{34CB6A71-7513-2F40-82C8-B9798DAD0967}" v="1" dt="2025-06-17T14:09:00.039"/>
   </p1510:revLst>
 </p1510:revInfo>
 </file>
 
 <file path=ppt/changesInfos/changesInfo1.xml><?xml version="1.0" encoding="utf-8"?>
 <pc:chgInfo xmlns:a="http://schemas.openxmlformats.org/drawingml/2006/main" xmlns:r="http://schemas.openxmlformats.org/officeDocument/2006/relationships" xmlns:ac="http://schemas.microsoft.com/office/drawing/2013/main/command" xmlns:pc="http://schemas.microsoft.com/office/powerpoint/2013/main/command">
+  <pc:docChgLst>
+    <pc:chgData name="Schilling Sabine HSLU W" userId="b0e2af5c-9187-4900-883a-c96514cd8e15" providerId="ADAL" clId="{34CB6A71-7513-2F40-82C8-B9798DAD0967}"/>
+    <pc:docChg chg="addSld modSld">
+      <pc:chgData name="Schilling Sabine HSLU W" userId="b0e2af5c-9187-4900-883a-c96514cd8e15" providerId="ADAL" clId="{34CB6A71-7513-2F40-82C8-B9798DAD0967}" dt="2025-06-17T14:09:11.698" v="14" actId="20577"/>
+      <pc:docMkLst>
+        <pc:docMk/>
+      </pc:docMkLst>
+      <pc:sldChg chg="modSp add mod">
+        <pc:chgData name="Schilling Sabine HSLU W" userId="b0e2af5c-9187-4900-883a-c96514cd8e15" providerId="ADAL" clId="{34CB6A71-7513-2F40-82C8-B9798DAD0967}" dt="2025-06-17T14:09:11.698" v="14" actId="20577"/>
+        <pc:sldMkLst>
+          <pc:docMk/>
+          <pc:sldMk cId="348234868" sldId="261"/>
+        </pc:sldMkLst>
+        <pc:spChg chg="mod">
+          <ac:chgData name="Schilling Sabine HSLU W" userId="b0e2af5c-9187-4900-883a-c96514cd8e15" providerId="ADAL" clId="{34CB6A71-7513-2F40-82C8-B9798DAD0967}" dt="2025-06-17T14:09:11.698" v="14" actId="20577"/>
+          <ac:spMkLst>
+            <pc:docMk/>
+            <pc:sldMk cId="348234868" sldId="261"/>
+            <ac:spMk id="28" creationId="{DBB7D267-1E52-0B13-53D5-F9C1DDFB927A}"/>
+          </ac:spMkLst>
+        </pc:spChg>
+      </pc:sldChg>
+    </pc:docChg>
+  </pc:docChgLst>
   <pc:docChgLst>
     <pc:chgData name="Schilling Sabine HSLU W" userId="b0e2af5c-9187-4900-883a-c96514cd8e15" providerId="ADAL" clId="{895C96C1-8C91-454F-AE14-4A89B17CB3FA}"/>
     <pc:docChg chg="modSld">
@@ -286,7 +311,7 @@
           <a:p>
             <a:fld id="{0AECA108-3915-9043-8428-B4BE4472B821}" type="datetimeFigureOut">
               <a:rPr lang="de-DE" smtClean="0"/>
-              <a:t>02.06.25</a:t>
+              <a:t>17.06.25</a:t>
             </a:fld>
             <a:endParaRPr lang="de-DE"/>
           </a:p>
@@ -745,6 +770,114 @@
 </p:notes>
 </file>
 
+<file path=ppt/notesSlides/notesSlide3.xml><?xml version="1.0" encoding="utf-8"?>
+<p:notes xmlns:a="http://schemas.openxmlformats.org/drawingml/2006/main" xmlns:r="http://schemas.openxmlformats.org/officeDocument/2006/relationships" xmlns:p="http://schemas.openxmlformats.org/presentationml/2006/main">
+  <p:cSld>
+    <p:spTree>
+      <p:nvGrpSpPr>
+        <p:cNvPr id="1" name="">
+          <a:extLst>
+            <a:ext uri="{FF2B5EF4-FFF2-40B4-BE49-F238E27FC236}">
+              <a16:creationId xmlns:a16="http://schemas.microsoft.com/office/drawing/2014/main" id="{F311F13F-07D4-A934-FD35-6ECF11F11C34}"/>
+            </a:ext>
+          </a:extLst>
+        </p:cNvPr>
+        <p:cNvGrpSpPr/>
+        <p:nvPr/>
+      </p:nvGrpSpPr>
+      <p:grpSpPr>
+        <a:xfrm>
+          <a:off x="0" y="0"/>
+          <a:ext cx="0" cy="0"/>
+          <a:chOff x="0" y="0"/>
+          <a:chExt cx="0" cy="0"/>
+        </a:xfrm>
+      </p:grpSpPr>
+      <p:sp>
+        <p:nvSpPr>
+          <p:cNvPr id="2" name="Folienbildplatzhalter 1">
+            <a:extLst>
+              <a:ext uri="{FF2B5EF4-FFF2-40B4-BE49-F238E27FC236}">
+                <a16:creationId xmlns:a16="http://schemas.microsoft.com/office/drawing/2014/main" id="{7D301AF7-AF76-5D7C-E948-42503E46B213}"/>
+              </a:ext>
+            </a:extLst>
+          </p:cNvPr>
+          <p:cNvSpPr>
+            <a:spLocks noGrp="1" noRot="1" noChangeAspect="1"/>
+          </p:cNvSpPr>
+          <p:nvPr>
+            <p:ph type="sldImg"/>
+          </p:nvPr>
+        </p:nvSpPr>
+        <p:spPr/>
+      </p:sp>
+      <p:sp>
+        <p:nvSpPr>
+          <p:cNvPr id="3" name="Notizenplatzhalter 2">
+            <a:extLst>
+              <a:ext uri="{FF2B5EF4-FFF2-40B4-BE49-F238E27FC236}">
+                <a16:creationId xmlns:a16="http://schemas.microsoft.com/office/drawing/2014/main" id="{D4E8C43C-7B26-055A-5544-B5D0DC4E1AF5}"/>
+              </a:ext>
+            </a:extLst>
+          </p:cNvPr>
+          <p:cNvSpPr>
+            <a:spLocks noGrp="1"/>
+          </p:cNvSpPr>
+          <p:nvPr>
+            <p:ph type="body" idx="1"/>
+          </p:nvPr>
+        </p:nvSpPr>
+        <p:spPr/>
+        <p:txBody>
+          <a:bodyPr/>
+          <a:lstStyle/>
+          <a:p>
+            <a:endParaRPr lang="de-DE" dirty="0"/>
+          </a:p>
+        </p:txBody>
+      </p:sp>
+      <p:sp>
+        <p:nvSpPr>
+          <p:cNvPr id="4" name="Foliennummernplatzhalter 3">
+            <a:extLst>
+              <a:ext uri="{FF2B5EF4-FFF2-40B4-BE49-F238E27FC236}">
+                <a16:creationId xmlns:a16="http://schemas.microsoft.com/office/drawing/2014/main" id="{712895C5-68DC-C717-7DB5-AC4DEF0DD87D}"/>
+              </a:ext>
+            </a:extLst>
+          </p:cNvPr>
+          <p:cNvSpPr>
+            <a:spLocks noGrp="1"/>
+          </p:cNvSpPr>
+          <p:nvPr>
+            <p:ph type="sldNum" sz="quarter" idx="5"/>
+          </p:nvPr>
+        </p:nvSpPr>
+        <p:spPr/>
+        <p:txBody>
+          <a:bodyPr/>
+          <a:lstStyle/>
+          <a:p>
+            <a:fld id="{67B21A6D-3249-074E-BBD6-BCFA95367850}" type="slidenum">
+              <a:rPr lang="de-DE" smtClean="0"/>
+              <a:t>3</a:t>
+            </a:fld>
+            <a:endParaRPr lang="de-DE"/>
+          </a:p>
+        </p:txBody>
+      </p:sp>
+    </p:spTree>
+    <p:extLst>
+      <p:ext uri="{BB962C8B-B14F-4D97-AF65-F5344CB8AC3E}">
+        <p14:creationId xmlns:p14="http://schemas.microsoft.com/office/powerpoint/2010/main" val="404721673"/>
+      </p:ext>
+    </p:extLst>
+  </p:cSld>
+  <p:clrMapOvr>
+    <a:masterClrMapping/>
+  </p:clrMapOvr>
+</p:notes>
+</file>
+
 <file path=ppt/slideLayouts/slideLayout1.xml><?xml version="1.0" encoding="utf-8"?>
 <p:sldLayout xmlns:a="http://schemas.openxmlformats.org/drawingml/2006/main" xmlns:r="http://schemas.openxmlformats.org/officeDocument/2006/relationships" xmlns:p="http://schemas.openxmlformats.org/presentationml/2006/main" type="title" preserve="1">
   <p:cSld name="Titelfolie">
@@ -892,7 +1025,7 @@
           <a:p>
             <a:fld id="{43497422-92ED-3D47-BF28-17000E80E497}" type="datetimeFigureOut">
               <a:rPr lang="de-DE" smtClean="0"/>
-              <a:t>02.06.25</a:t>
+              <a:t>17.06.25</a:t>
             </a:fld>
             <a:endParaRPr lang="de-DE"/>
           </a:p>
@@ -1090,7 +1223,7 @@
           <a:p>
             <a:fld id="{43497422-92ED-3D47-BF28-17000E80E497}" type="datetimeFigureOut">
               <a:rPr lang="de-DE" smtClean="0"/>
-              <a:t>02.06.25</a:t>
+              <a:t>17.06.25</a:t>
             </a:fld>
             <a:endParaRPr lang="de-DE"/>
           </a:p>
@@ -1298,7 +1431,7 @@
           <a:p>
             <a:fld id="{43497422-92ED-3D47-BF28-17000E80E497}" type="datetimeFigureOut">
               <a:rPr lang="de-DE" smtClean="0"/>
-              <a:t>02.06.25</a:t>
+              <a:t>17.06.25</a:t>
             </a:fld>
             <a:endParaRPr lang="de-DE"/>
           </a:p>
@@ -1496,7 +1629,7 @@
           <a:p>
             <a:fld id="{43497422-92ED-3D47-BF28-17000E80E497}" type="datetimeFigureOut">
               <a:rPr lang="de-DE" smtClean="0"/>
-              <a:t>02.06.25</a:t>
+              <a:t>17.06.25</a:t>
             </a:fld>
             <a:endParaRPr lang="de-DE"/>
           </a:p>
@@ -1771,7 +1904,7 @@
           <a:p>
             <a:fld id="{43497422-92ED-3D47-BF28-17000E80E497}" type="datetimeFigureOut">
               <a:rPr lang="de-DE" smtClean="0"/>
-              <a:t>02.06.25</a:t>
+              <a:t>17.06.25</a:t>
             </a:fld>
             <a:endParaRPr lang="de-DE"/>
           </a:p>
@@ -2036,7 +2169,7 @@
           <a:p>
             <a:fld id="{43497422-92ED-3D47-BF28-17000E80E497}" type="datetimeFigureOut">
               <a:rPr lang="de-DE" smtClean="0"/>
-              <a:t>02.06.25</a:t>
+              <a:t>17.06.25</a:t>
             </a:fld>
             <a:endParaRPr lang="de-DE"/>
           </a:p>
@@ -2448,7 +2581,7 @@
           <a:p>
             <a:fld id="{43497422-92ED-3D47-BF28-17000E80E497}" type="datetimeFigureOut">
               <a:rPr lang="de-DE" smtClean="0"/>
-              <a:t>02.06.25</a:t>
+              <a:t>17.06.25</a:t>
             </a:fld>
             <a:endParaRPr lang="de-DE"/>
           </a:p>
@@ -2589,7 +2722,7 @@
           <a:p>
             <a:fld id="{43497422-92ED-3D47-BF28-17000E80E497}" type="datetimeFigureOut">
               <a:rPr lang="de-DE" smtClean="0"/>
-              <a:t>02.06.25</a:t>
+              <a:t>17.06.25</a:t>
             </a:fld>
             <a:endParaRPr lang="de-DE"/>
           </a:p>
@@ -2702,7 +2835,7 @@
           <a:p>
             <a:fld id="{43497422-92ED-3D47-BF28-17000E80E497}" type="datetimeFigureOut">
               <a:rPr lang="de-DE" smtClean="0"/>
-              <a:t>02.06.25</a:t>
+              <a:t>17.06.25</a:t>
             </a:fld>
             <a:endParaRPr lang="de-DE"/>
           </a:p>
@@ -3013,7 +3146,7 @@
           <a:p>
             <a:fld id="{43497422-92ED-3D47-BF28-17000E80E497}" type="datetimeFigureOut">
               <a:rPr lang="de-DE" smtClean="0"/>
-              <a:t>02.06.25</a:t>
+              <a:t>17.06.25</a:t>
             </a:fld>
             <a:endParaRPr lang="de-DE"/>
           </a:p>
@@ -3301,7 +3434,7 @@
           <a:p>
             <a:fld id="{43497422-92ED-3D47-BF28-17000E80E497}" type="datetimeFigureOut">
               <a:rPr lang="de-DE" smtClean="0"/>
-              <a:t>02.06.25</a:t>
+              <a:t>17.06.25</a:t>
             </a:fld>
             <a:endParaRPr lang="de-DE"/>
           </a:p>
@@ -3542,7 +3675,7 @@
           <a:p>
             <a:fld id="{43497422-92ED-3D47-BF28-17000E80E497}" type="datetimeFigureOut">
               <a:rPr lang="de-DE" smtClean="0"/>
-              <a:t>02.06.25</a:t>
+              <a:t>17.06.25</a:t>
             </a:fld>
             <a:endParaRPr lang="de-DE"/>
           </a:p>
@@ -10459,8 +10592,8 @@
           </p:sp>
         </mc:Fallback>
       </mc:AlternateContent>
-      <mc:AlternateContent xmlns:mc="http://schemas.openxmlformats.org/markup-compatibility/2006">
-        <mc:Choice xmlns:a14="http://schemas.microsoft.com/office/drawing/2010/main" Requires="a14">
+      <mc:AlternateContent xmlns:mc="http://schemas.openxmlformats.org/markup-compatibility/2006" xmlns:a14="http://schemas.microsoft.com/office/drawing/2010/main">
+        <mc:Choice Requires="a14">
           <p:sp>
             <p:nvSpPr>
               <p:cNvPr id="9" name="Textfeld 8">
@@ -10544,7 +10677,7 @@
             </p:txBody>
           </p:sp>
         </mc:Choice>
-        <mc:Fallback>
+        <mc:Fallback xmlns="">
           <p:sp>
             <p:nvSpPr>
               <p:cNvPr id="9" name="Textfeld 8">
@@ -11558,8 +11691,8 @@
           </a:p>
         </p:txBody>
       </p:sp>
-      <mc:AlternateContent xmlns:mc="http://schemas.openxmlformats.org/markup-compatibility/2006">
-        <mc:Choice xmlns:a14="http://schemas.microsoft.com/office/drawing/2010/main" Requires="a14">
+      <mc:AlternateContent xmlns:mc="http://schemas.openxmlformats.org/markup-compatibility/2006" xmlns:a14="http://schemas.microsoft.com/office/drawing/2010/main">
+        <mc:Choice Requires="a14">
           <p:sp>
             <p:nvSpPr>
               <p:cNvPr id="29" name="Textfeld 28">
@@ -11636,7 +11769,7 @@
             </p:txBody>
           </p:sp>
         </mc:Choice>
-        <mc:Fallback>
+        <mc:Fallback xmlns="">
           <p:sp>
             <p:nvSpPr>
               <p:cNvPr id="29" name="Textfeld 28">
@@ -12431,8 +12564,8 @@
           </p:style>
         </p:cxnSp>
       </p:grpSp>
-      <mc:AlternateContent xmlns:mc="http://schemas.openxmlformats.org/markup-compatibility/2006">
-        <mc:Choice xmlns:a14="http://schemas.microsoft.com/office/drawing/2010/main" Requires="a14">
+      <mc:AlternateContent xmlns:mc="http://schemas.openxmlformats.org/markup-compatibility/2006" xmlns:a14="http://schemas.microsoft.com/office/drawing/2010/main">
+        <mc:Choice Requires="a14">
           <p:sp>
             <p:nvSpPr>
               <p:cNvPr id="82" name="Textfeld 81">
@@ -12509,7 +12642,7 @@
             </p:txBody>
           </p:sp>
         </mc:Choice>
-        <mc:Fallback>
+        <mc:Fallback xmlns="">
           <p:sp>
             <p:nvSpPr>
               <p:cNvPr id="82" name="Textfeld 81">
@@ -12562,8 +12695,8 @@
           </p:sp>
         </mc:Fallback>
       </mc:AlternateContent>
-      <mc:AlternateContent xmlns:mc="http://schemas.openxmlformats.org/markup-compatibility/2006">
-        <mc:Choice xmlns:a14="http://schemas.microsoft.com/office/drawing/2010/main" Requires="a14">
+      <mc:AlternateContent xmlns:mc="http://schemas.openxmlformats.org/markup-compatibility/2006" xmlns:a14="http://schemas.microsoft.com/office/drawing/2010/main">
+        <mc:Choice Requires="a14">
           <p:sp>
             <p:nvSpPr>
               <p:cNvPr id="88" name="Textfeld 87">
@@ -12640,7 +12773,7 @@
             </p:txBody>
           </p:sp>
         </mc:Choice>
-        <mc:Fallback>
+        <mc:Fallback xmlns="">
           <p:sp>
             <p:nvSpPr>
               <p:cNvPr id="88" name="Textfeld 87">
@@ -14370,6 +14503,4629 @@
 </p:sld>
 </file>
 
+<file path=ppt/slides/slide3.xml><?xml version="1.0" encoding="utf-8"?>
+<p:sld xmlns:a="http://schemas.openxmlformats.org/drawingml/2006/main" xmlns:r="http://schemas.openxmlformats.org/officeDocument/2006/relationships" xmlns:p="http://schemas.openxmlformats.org/presentationml/2006/main">
+  <p:cSld>
+    <p:spTree>
+      <p:nvGrpSpPr>
+        <p:cNvPr id="1" name="">
+          <a:extLst>
+            <a:ext uri="{FF2B5EF4-FFF2-40B4-BE49-F238E27FC236}">
+              <a16:creationId xmlns:a16="http://schemas.microsoft.com/office/drawing/2014/main" id="{4D085427-4A64-702B-9163-D84D61A2F7BD}"/>
+            </a:ext>
+          </a:extLst>
+        </p:cNvPr>
+        <p:cNvGrpSpPr/>
+        <p:nvPr/>
+      </p:nvGrpSpPr>
+      <p:grpSpPr>
+        <a:xfrm>
+          <a:off x="0" y="0"/>
+          <a:ext cx="0" cy="0"/>
+          <a:chOff x="0" y="0"/>
+          <a:chExt cx="0" cy="0"/>
+        </a:xfrm>
+      </p:grpSpPr>
+      <p:sp>
+        <p:nvSpPr>
+          <p:cNvPr id="18" name="Textfeld 17">
+            <a:extLst>
+              <a:ext uri="{FF2B5EF4-FFF2-40B4-BE49-F238E27FC236}">
+                <a16:creationId xmlns:a16="http://schemas.microsoft.com/office/drawing/2014/main" id="{6B313EE7-478A-0AAC-A308-F43BA3BD9FA8}"/>
+              </a:ext>
+            </a:extLst>
+          </p:cNvPr>
+          <p:cNvSpPr txBox="1"/>
+          <p:nvPr/>
+        </p:nvSpPr>
+        <p:spPr>
+          <a:xfrm>
+            <a:off x="262794" y="2202514"/>
+            <a:ext cx="2959748" cy="276999"/>
+          </a:xfrm>
+          <a:prstGeom prst="rect">
+            <a:avLst/>
+          </a:prstGeom>
+          <a:solidFill>
+            <a:schemeClr val="accent2">
+              <a:alpha val="19906"/>
+            </a:schemeClr>
+          </a:solidFill>
+          <a:ln w="12700">
+            <a:solidFill>
+              <a:schemeClr val="tx1"/>
+            </a:solidFill>
+          </a:ln>
+        </p:spPr>
+        <p:txBody>
+          <a:bodyPr wrap="square">
+            <a:spAutoFit/>
+          </a:bodyPr>
+          <a:lstStyle/>
+          <a:p>
+            <a:pPr algn="ctr"/>
+            <a:r>
+              <a:rPr lang="en-GB" sz="1200" noProof="0" dirty="0" err="1">
+                <a:latin typeface="Courier New" panose="02070309020205020404" pitchFamily="49" charset="0"/>
+                <a:ea typeface="Cambria Math" panose="02040503050406030204" pitchFamily="18" charset="0"/>
+                <a:cs typeface="Courier New" panose="02070309020205020404" pitchFamily="49" charset="0"/>
+              </a:rPr>
+              <a:t>shapiro.test</a:t>
+            </a:r>
+            <a:r>
+              <a:rPr lang="en-GB" sz="1200" noProof="0" dirty="0">
+                <a:latin typeface="Courier New" panose="02070309020205020404" pitchFamily="49" charset="0"/>
+                <a:ea typeface="Cambria Math" panose="02040503050406030204" pitchFamily="18" charset="0"/>
+                <a:cs typeface="Courier New" panose="02070309020205020404" pitchFamily="49" charset="0"/>
+              </a:rPr>
+              <a:t>()</a:t>
+            </a:r>
+            <a:r>
+              <a:rPr lang="en-GB" sz="1200" noProof="0" dirty="0">
+                <a:latin typeface="Calibri" panose="020F0502020204030204" pitchFamily="34" charset="0"/>
+                <a:ea typeface="Cambria Math" panose="02040503050406030204" pitchFamily="18" charset="0"/>
+                <a:cs typeface="Calibri" panose="020F0502020204030204" pitchFamily="34" charset="0"/>
+              </a:rPr>
+              <a:t> for both levels</a:t>
+            </a:r>
+          </a:p>
+        </p:txBody>
+      </p:sp>
+      <p:sp>
+        <p:nvSpPr>
+          <p:cNvPr id="160" name="Textfeld 159">
+            <a:extLst>
+              <a:ext uri="{FF2B5EF4-FFF2-40B4-BE49-F238E27FC236}">
+                <a16:creationId xmlns:a16="http://schemas.microsoft.com/office/drawing/2014/main" id="{2D81EBD4-ABC7-BD04-F3FC-5DE26B768280}"/>
+              </a:ext>
+            </a:extLst>
+          </p:cNvPr>
+          <p:cNvSpPr txBox="1"/>
+          <p:nvPr/>
+        </p:nvSpPr>
+        <p:spPr>
+          <a:xfrm>
+            <a:off x="10508890" y="2202514"/>
+            <a:ext cx="1618428" cy="276999"/>
+          </a:xfrm>
+          <a:prstGeom prst="rect">
+            <a:avLst/>
+          </a:prstGeom>
+          <a:solidFill>
+            <a:schemeClr val="accent2">
+              <a:lumMod val="20000"/>
+              <a:lumOff val="80000"/>
+            </a:schemeClr>
+          </a:solidFill>
+          <a:ln w="12700">
+            <a:solidFill>
+              <a:schemeClr val="accent1">
+                <a:lumMod val="20000"/>
+                <a:lumOff val="80000"/>
+              </a:schemeClr>
+            </a:solidFill>
+          </a:ln>
+        </p:spPr>
+        <p:txBody>
+          <a:bodyPr wrap="square">
+            <a:spAutoFit/>
+          </a:bodyPr>
+          <a:lstStyle>
+            <a:defPPr>
+              <a:defRPr lang="de-DE"/>
+            </a:defPPr>
+            <a:lvl1pPr algn="ctr">
+              <a:defRPr sz="1200"/>
+            </a:lvl1pPr>
+          </a:lstStyle>
+          <a:p>
+            <a:r>
+              <a:rPr lang="en-GB" noProof="0" dirty="0">
+                <a:latin typeface="Calibri" panose="020F0502020204030204" pitchFamily="34" charset="0"/>
+                <a:ea typeface="Cambria Math" panose="02040503050406030204" pitchFamily="18" charset="0"/>
+                <a:cs typeface="Calibri" panose="020F0502020204030204" pitchFamily="34" charset="0"/>
+              </a:rPr>
+              <a:t>Check normality</a:t>
+            </a:r>
+          </a:p>
+        </p:txBody>
+      </p:sp>
+      <p:sp>
+        <p:nvSpPr>
+          <p:cNvPr id="6" name="Textfeld 5">
+            <a:extLst>
+              <a:ext uri="{FF2B5EF4-FFF2-40B4-BE49-F238E27FC236}">
+                <a16:creationId xmlns:a16="http://schemas.microsoft.com/office/drawing/2014/main" id="{43159668-ED57-4913-C175-44EB70EE5798}"/>
+              </a:ext>
+            </a:extLst>
+          </p:cNvPr>
+          <p:cNvSpPr txBox="1"/>
+          <p:nvPr/>
+        </p:nvSpPr>
+        <p:spPr>
+          <a:xfrm>
+            <a:off x="5130837" y="2201318"/>
+            <a:ext cx="5300726" cy="276999"/>
+          </a:xfrm>
+          <a:prstGeom prst="rect">
+            <a:avLst/>
+          </a:prstGeom>
+          <a:solidFill>
+            <a:schemeClr val="accent2">
+              <a:alpha val="19906"/>
+            </a:schemeClr>
+          </a:solidFill>
+          <a:ln w="12700">
+            <a:solidFill>
+              <a:schemeClr val="tx1"/>
+            </a:solidFill>
+          </a:ln>
+        </p:spPr>
+        <p:txBody>
+          <a:bodyPr wrap="square">
+            <a:spAutoFit/>
+          </a:bodyPr>
+          <a:lstStyle/>
+          <a:p>
+            <a:pPr algn="ctr"/>
+            <a:r>
+              <a:rPr lang="en-GB" sz="1200" noProof="0" dirty="0" err="1">
+                <a:latin typeface="Courier New" panose="02070309020205020404" pitchFamily="49" charset="0"/>
+                <a:ea typeface="Cambria Math" panose="02040503050406030204" pitchFamily="18" charset="0"/>
+                <a:cs typeface="Courier New" panose="02070309020205020404" pitchFamily="49" charset="0"/>
+              </a:rPr>
+              <a:t>shapiro.test</a:t>
+            </a:r>
+            <a:r>
+              <a:rPr lang="en-GB" sz="1200" noProof="0" dirty="0">
+                <a:latin typeface="Courier New" panose="02070309020205020404" pitchFamily="49" charset="0"/>
+                <a:ea typeface="Cambria Math" panose="02040503050406030204" pitchFamily="18" charset="0"/>
+                <a:cs typeface="Courier New" panose="02070309020205020404" pitchFamily="49" charset="0"/>
+              </a:rPr>
+              <a:t>()</a:t>
+            </a:r>
+            <a:r>
+              <a:rPr lang="en-GB" sz="1200" noProof="0" dirty="0">
+                <a:latin typeface="Calibri" panose="020F0502020204030204" pitchFamily="34" charset="0"/>
+                <a:ea typeface="Cambria Math" panose="02040503050406030204" pitchFamily="18" charset="0"/>
+                <a:cs typeface="Calibri" panose="020F0502020204030204" pitchFamily="34" charset="0"/>
+              </a:rPr>
+              <a:t> </a:t>
+            </a:r>
+            <a:r>
+              <a:rPr lang="en-GB" sz="1200" dirty="0">
+                <a:latin typeface="Calibri" panose="020F0502020204030204" pitchFamily="34" charset="0"/>
+                <a:ea typeface="Cambria Math" panose="02040503050406030204" pitchFamily="18" charset="0"/>
+                <a:cs typeface="Calibri" panose="020F0502020204030204" pitchFamily="34" charset="0"/>
+              </a:rPr>
+              <a:t>of residuals</a:t>
+            </a:r>
+            <a:endParaRPr lang="en-GB" sz="1200" noProof="0" dirty="0">
+              <a:latin typeface="Calibri" panose="020F0502020204030204" pitchFamily="34" charset="0"/>
+              <a:ea typeface="Cambria Math" panose="02040503050406030204" pitchFamily="18" charset="0"/>
+              <a:cs typeface="Calibri" panose="020F0502020204030204" pitchFamily="34" charset="0"/>
+            </a:endParaRPr>
+          </a:p>
+        </p:txBody>
+      </p:sp>
+      <mc:AlternateContent xmlns:mc="http://schemas.openxmlformats.org/markup-compatibility/2006" xmlns:a14="http://schemas.microsoft.com/office/drawing/2010/main">
+        <mc:Choice Requires="a14">
+          <p:sp>
+            <p:nvSpPr>
+              <p:cNvPr id="7" name="Textfeld 6">
+                <a:extLst>
+                  <a:ext uri="{FF2B5EF4-FFF2-40B4-BE49-F238E27FC236}">
+                    <a16:creationId xmlns:a16="http://schemas.microsoft.com/office/drawing/2014/main" id="{24802BBD-0262-E7F6-6C54-2597D007CE1E}"/>
+                  </a:ext>
+                </a:extLst>
+              </p:cNvPr>
+              <p:cNvSpPr txBox="1"/>
+              <p:nvPr/>
+            </p:nvSpPr>
+            <p:spPr>
+              <a:xfrm>
+                <a:off x="3982498" y="268315"/>
+                <a:ext cx="4305145" cy="461665"/>
+              </a:xfrm>
+              <a:prstGeom prst="rect">
+                <a:avLst/>
+              </a:prstGeom>
+              <a:noFill/>
+              <a:ln w="6350">
+                <a:solidFill>
+                  <a:schemeClr val="bg1">
+                    <a:lumMod val="85000"/>
+                  </a:schemeClr>
+                </a:solidFill>
+              </a:ln>
+            </p:spPr>
+            <p:txBody>
+              <a:bodyPr wrap="square">
+                <a:spAutoFit/>
+              </a:bodyPr>
+              <a:lstStyle/>
+              <a:p>
+                <a:pPr marL="171450" indent="-171450">
+                  <a:buFont typeface="Arial" panose="020B0604020202020204" pitchFamily="34" charset="0"/>
+                  <a:buChar char="•"/>
+                </a:pPr>
+                <a:r>
+                  <a:rPr lang="en-GB" sz="1200" dirty="0">
+                    <a:latin typeface="Calibri" panose="020F0502020204030204" pitchFamily="34" charset="0"/>
+                    <a:ea typeface="Cambria Math" panose="02040503050406030204" pitchFamily="18" charset="0"/>
+                    <a:cs typeface="Calibri" panose="020F0502020204030204" pitchFamily="34" charset="0"/>
+                  </a:rPr>
+                  <a:t>C</a:t>
+                </a:r>
+                <a:r>
+                  <a:rPr lang="en-GB" sz="1200" noProof="0" dirty="0" err="1">
+                    <a:latin typeface="Calibri" panose="020F0502020204030204" pitchFamily="34" charset="0"/>
+                    <a:ea typeface="Cambria Math" panose="02040503050406030204" pitchFamily="18" charset="0"/>
+                    <a:cs typeface="Calibri" panose="020F0502020204030204" pitchFamily="34" charset="0"/>
+                  </a:rPr>
+                  <a:t>ategorical</a:t>
+                </a:r>
+                <a:r>
+                  <a:rPr lang="en-GB" sz="1200" noProof="0" dirty="0">
+                    <a:latin typeface="Calibri" panose="020F0502020204030204" pitchFamily="34" charset="0"/>
+                    <a:ea typeface="Cambria Math" panose="02040503050406030204" pitchFamily="18" charset="0"/>
+                    <a:cs typeface="Calibri" panose="020F0502020204030204" pitchFamily="34" charset="0"/>
+                  </a:rPr>
+                  <a:t> predictor of </a:t>
+                </a:r>
+                <a:r>
+                  <a:rPr lang="en-GB" sz="1200" noProof="0" dirty="0">
+                    <a:latin typeface="Courier New" panose="02070309020205020404" pitchFamily="49" charset="0"/>
+                    <a:ea typeface="Cambria Math" panose="02040503050406030204" pitchFamily="18" charset="0"/>
+                    <a:cs typeface="Courier New" panose="02070309020205020404" pitchFamily="49" charset="0"/>
+                  </a:rPr>
+                  <a:t>class </a:t>
+                </a:r>
+                <a:r>
+                  <a:rPr lang="en-GB" sz="1200" dirty="0">
+                    <a:latin typeface="Calibri" panose="020F0502020204030204" pitchFamily="34" charset="0"/>
+                    <a:ea typeface="Cambria Math" panose="02040503050406030204" pitchFamily="18" charset="0"/>
+                    <a:cs typeface="Calibri" panose="020F0502020204030204" pitchFamily="34" charset="0"/>
+                  </a:rPr>
+                  <a:t>“</a:t>
+                </a:r>
+                <a:r>
+                  <a:rPr lang="en-GB" sz="1200" dirty="0">
+                    <a:latin typeface="Courier New" panose="02070309020205020404" pitchFamily="49" charset="0"/>
+                    <a:ea typeface="Cambria Math" panose="02040503050406030204" pitchFamily="18" charset="0"/>
+                    <a:cs typeface="Courier New" panose="02070309020205020404" pitchFamily="49" charset="0"/>
+                  </a:rPr>
+                  <a:t>factor</a:t>
+                </a:r>
+                <a:r>
+                  <a:rPr lang="en-GB" sz="1200" noProof="0" dirty="0">
+                    <a:latin typeface="Calibri" panose="020F0502020204030204" pitchFamily="34" charset="0"/>
+                    <a:ea typeface="Cambria Math" panose="02040503050406030204" pitchFamily="18" charset="0"/>
+                    <a:cs typeface="Calibri" panose="020F0502020204030204" pitchFamily="34" charset="0"/>
+                  </a:rPr>
+                  <a:t>“  with </a:t>
+                </a:r>
+                <a14:m>
+                  <m:oMath xmlns:m="http://schemas.openxmlformats.org/officeDocument/2006/math">
+                    <m:r>
+                      <a:rPr lang="en-GB" sz="1200" i="1" noProof="0" smtClean="0">
+                        <a:latin typeface="Cambria Math" panose="02040503050406030204" pitchFamily="18" charset="0"/>
+                        <a:ea typeface="Cambria Math" panose="02040503050406030204" pitchFamily="18" charset="0"/>
+                      </a:rPr>
+                      <m:t>𝑁</m:t>
+                    </m:r>
+                  </m:oMath>
+                </a14:m>
+                <a:r>
+                  <a:rPr lang="en-GB" sz="1200" noProof="0" dirty="0">
+                    <a:latin typeface="Calibri" panose="020F0502020204030204" pitchFamily="34" charset="0"/>
+                    <a:ea typeface="Cambria Math" panose="02040503050406030204" pitchFamily="18" charset="0"/>
+                    <a:cs typeface="Calibri" panose="020F0502020204030204" pitchFamily="34" charset="0"/>
+                  </a:rPr>
+                  <a:t> levels</a:t>
+                </a:r>
+              </a:p>
+              <a:p>
+                <a:pPr marL="171450" indent="-171450">
+                  <a:buFont typeface="Arial" panose="020B0604020202020204" pitchFamily="34" charset="0"/>
+                  <a:buChar char="•"/>
+                </a:pPr>
+                <a:r>
+                  <a:rPr lang="en-GB" sz="1200" dirty="0">
+                    <a:latin typeface="Calibri" panose="020F0502020204030204" pitchFamily="34" charset="0"/>
+                    <a:ea typeface="Cambria Math" panose="02040503050406030204" pitchFamily="18" charset="0"/>
+                    <a:cs typeface="Calibri" panose="020F0502020204030204" pitchFamily="34" charset="0"/>
+                  </a:rPr>
+                  <a:t>N</a:t>
+                </a:r>
+                <a:r>
+                  <a:rPr lang="en-GB" sz="1200" noProof="0" dirty="0" err="1">
+                    <a:latin typeface="Calibri" panose="020F0502020204030204" pitchFamily="34" charset="0"/>
+                    <a:ea typeface="Cambria Math" panose="02040503050406030204" pitchFamily="18" charset="0"/>
+                    <a:cs typeface="Calibri" panose="020F0502020204030204" pitchFamily="34" charset="0"/>
+                  </a:rPr>
+                  <a:t>umeric</a:t>
+                </a:r>
+                <a:r>
+                  <a:rPr lang="en-GB" sz="1200" noProof="0" dirty="0">
+                    <a:latin typeface="Calibri" panose="020F0502020204030204" pitchFamily="34" charset="0"/>
+                    <a:ea typeface="Cambria Math" panose="02040503050406030204" pitchFamily="18" charset="0"/>
+                    <a:cs typeface="Calibri" panose="020F0502020204030204" pitchFamily="34" charset="0"/>
+                  </a:rPr>
+                  <a:t> response of </a:t>
+                </a:r>
+                <a:r>
+                  <a:rPr lang="en-GB" sz="1200" noProof="0" dirty="0">
+                    <a:latin typeface="Courier New" panose="02070309020205020404" pitchFamily="49" charset="0"/>
+                    <a:ea typeface="Cambria Math" panose="02040503050406030204" pitchFamily="18" charset="0"/>
+                    <a:cs typeface="Courier New" panose="02070309020205020404" pitchFamily="49" charset="0"/>
+                  </a:rPr>
+                  <a:t>class </a:t>
+                </a:r>
+                <a:r>
+                  <a:rPr lang="en-GB" sz="1200" dirty="0">
+                    <a:latin typeface="Calibri" panose="020F0502020204030204" pitchFamily="34" charset="0"/>
+                    <a:ea typeface="Cambria Math" panose="02040503050406030204" pitchFamily="18" charset="0"/>
+                    <a:cs typeface="Calibri" panose="020F0502020204030204" pitchFamily="34" charset="0"/>
+                  </a:rPr>
+                  <a:t>“</a:t>
+                </a:r>
+                <a:r>
+                  <a:rPr lang="en-GB" sz="1200" noProof="0" dirty="0">
+                    <a:latin typeface="Courier New" panose="02070309020205020404" pitchFamily="49" charset="0"/>
+                    <a:ea typeface="Cambria Math" panose="02040503050406030204" pitchFamily="18" charset="0"/>
+                    <a:cs typeface="Courier New" panose="02070309020205020404" pitchFamily="49" charset="0"/>
+                  </a:rPr>
+                  <a:t>numeric</a:t>
+                </a:r>
+                <a:r>
+                  <a:rPr lang="en-GB" sz="1200" dirty="0">
+                    <a:latin typeface="Calibri" panose="020F0502020204030204" pitchFamily="34" charset="0"/>
+                    <a:ea typeface="Cambria Math" panose="02040503050406030204" pitchFamily="18" charset="0"/>
+                    <a:cs typeface="Calibri" panose="020F0502020204030204" pitchFamily="34" charset="0"/>
+                  </a:rPr>
+                  <a:t>”</a:t>
+                </a:r>
+                <a:r>
+                  <a:rPr lang="en-GB" sz="1200" dirty="0">
+                    <a:latin typeface="Courier New" panose="02070309020205020404" pitchFamily="49" charset="0"/>
+                    <a:ea typeface="Cambria Math" panose="02040503050406030204" pitchFamily="18" charset="0"/>
+                    <a:cs typeface="Courier New" panose="02070309020205020404" pitchFamily="49" charset="0"/>
+                  </a:rPr>
+                  <a:t> </a:t>
+                </a:r>
+                <a:r>
+                  <a:rPr lang="en-GB" sz="1200" noProof="0" dirty="0">
+                    <a:latin typeface="Calibri" panose="020F0502020204030204" pitchFamily="34" charset="0"/>
+                    <a:ea typeface="Cambria Math" panose="02040503050406030204" pitchFamily="18" charset="0"/>
+                    <a:cs typeface="Calibri" panose="020F0502020204030204" pitchFamily="34" charset="0"/>
+                  </a:rPr>
+                  <a:t>or “</a:t>
+                </a:r>
+                <a:r>
+                  <a:rPr lang="en-GB" sz="1200" noProof="0" dirty="0">
+                    <a:latin typeface="Courier New" panose="02070309020205020404" pitchFamily="49" charset="0"/>
+                    <a:ea typeface="Cambria Math" panose="02040503050406030204" pitchFamily="18" charset="0"/>
+                    <a:cs typeface="Courier New" panose="02070309020205020404" pitchFamily="49" charset="0"/>
+                  </a:rPr>
+                  <a:t>integer</a:t>
+                </a:r>
+                <a:r>
+                  <a:rPr lang="en-GB" sz="1200" dirty="0">
+                    <a:latin typeface="Calibri" panose="020F0502020204030204" pitchFamily="34" charset="0"/>
+                    <a:ea typeface="Cambria Math" panose="02040503050406030204" pitchFamily="18" charset="0"/>
+                    <a:cs typeface="Calibri" panose="020F0502020204030204" pitchFamily="34" charset="0"/>
+                  </a:rPr>
+                  <a:t>”</a:t>
+                </a:r>
+                <a:endParaRPr lang="en-GB" sz="1200" noProof="0" dirty="0">
+                  <a:latin typeface="Calibri" panose="020F0502020204030204" pitchFamily="34" charset="0"/>
+                  <a:ea typeface="Cambria Math" panose="02040503050406030204" pitchFamily="18" charset="0"/>
+                  <a:cs typeface="Calibri" panose="020F0502020204030204" pitchFamily="34" charset="0"/>
+                </a:endParaRPr>
+              </a:p>
+            </p:txBody>
+          </p:sp>
+        </mc:Choice>
+        <mc:Fallback xmlns="">
+          <p:sp>
+            <p:nvSpPr>
+              <p:cNvPr id="7" name="Textfeld 6">
+                <a:extLst>
+                  <a:ext uri="{FF2B5EF4-FFF2-40B4-BE49-F238E27FC236}">
+                    <a16:creationId xmlns:a16="http://schemas.microsoft.com/office/drawing/2014/main" id="{D954AB4D-A237-C043-A913-633703A9C26B}"/>
+                  </a:ext>
+                </a:extLst>
+              </p:cNvPr>
+              <p:cNvSpPr txBox="1">
+                <a:spLocks noRot="1" noChangeAspect="1" noMove="1" noResize="1" noEditPoints="1" noAdjustHandles="1" noChangeArrowheads="1" noChangeShapeType="1" noTextEdit="1"/>
+              </p:cNvSpPr>
+              <p:nvPr/>
+            </p:nvSpPr>
+            <p:spPr>
+              <a:xfrm>
+                <a:off x="3982498" y="268315"/>
+                <a:ext cx="4305145" cy="461665"/>
+              </a:xfrm>
+              <a:prstGeom prst="rect">
+                <a:avLst/>
+              </a:prstGeom>
+              <a:blipFill>
+                <a:blip r:embed="rId3"/>
+                <a:stretch>
+                  <a:fillRect b="-5263"/>
+                </a:stretch>
+              </a:blipFill>
+              <a:ln w="6350">
+                <a:solidFill>
+                  <a:schemeClr val="bg1">
+                    <a:lumMod val="85000"/>
+                  </a:schemeClr>
+                </a:solidFill>
+              </a:ln>
+            </p:spPr>
+            <p:txBody>
+              <a:bodyPr/>
+              <a:lstStyle/>
+              <a:p>
+                <a:r>
+                  <a:rPr lang="de-DE">
+                    <a:noFill/>
+                  </a:rPr>
+                  <a:t> </a:t>
+                </a:r>
+              </a:p>
+            </p:txBody>
+          </p:sp>
+        </mc:Fallback>
+      </mc:AlternateContent>
+      <mc:AlternateContent xmlns:mc="http://schemas.openxmlformats.org/markup-compatibility/2006" xmlns:a14="http://schemas.microsoft.com/office/drawing/2010/main">
+        <mc:Choice Requires="a14">
+          <p:sp>
+            <p:nvSpPr>
+              <p:cNvPr id="8" name="Textfeld 7">
+                <a:extLst>
+                  <a:ext uri="{FF2B5EF4-FFF2-40B4-BE49-F238E27FC236}">
+                    <a16:creationId xmlns:a16="http://schemas.microsoft.com/office/drawing/2014/main" id="{C46BE5EB-9EA9-6440-EB52-274F49A2AA2D}"/>
+                  </a:ext>
+                </a:extLst>
+              </p:cNvPr>
+              <p:cNvSpPr txBox="1"/>
+              <p:nvPr/>
+            </p:nvSpPr>
+            <p:spPr>
+              <a:xfrm>
+                <a:off x="262794" y="832787"/>
+                <a:ext cx="4514400" cy="276999"/>
+              </a:xfrm>
+              <a:prstGeom prst="rect">
+                <a:avLst/>
+              </a:prstGeom>
+              <a:noFill/>
+              <a:ln w="12700">
+                <a:solidFill>
+                  <a:schemeClr val="tx1"/>
+                </a:solidFill>
+              </a:ln>
+            </p:spPr>
+            <p:txBody>
+              <a:bodyPr wrap="square">
+                <a:spAutoFit/>
+              </a:bodyPr>
+              <a:lstStyle>
+                <a:defPPr>
+                  <a:defRPr lang="de-DE"/>
+                </a:defPPr>
+              </a:lstStyle>
+              <a:p>
+                <a:pPr algn="ctr"/>
+                <a:r>
+                  <a:rPr lang="en-GB" sz="1200" dirty="0">
+                    <a:latin typeface="Calibri" panose="020F0502020204030204" pitchFamily="34" charset="0"/>
+                    <a:ea typeface="Cambria Math" panose="02040503050406030204" pitchFamily="18" charset="0"/>
+                    <a:cs typeface="Calibri" panose="020F0502020204030204" pitchFamily="34" charset="0"/>
+                  </a:rPr>
+                  <a:t>predictor</a:t>
+                </a:r>
+                <a:r>
+                  <a:rPr lang="en-GB" sz="1200" noProof="0" dirty="0">
+                    <a:latin typeface="Calibri" panose="020F0502020204030204" pitchFamily="34" charset="0"/>
+                    <a:ea typeface="Cambria Math" panose="02040503050406030204" pitchFamily="18" charset="0"/>
+                    <a:cs typeface="Calibri" panose="020F0502020204030204" pitchFamily="34" charset="0"/>
+                  </a:rPr>
+                  <a:t>: </a:t>
+                </a:r>
+                <a14:m>
+                  <m:oMath xmlns:m="http://schemas.openxmlformats.org/officeDocument/2006/math">
+                    <m:r>
+                      <a:rPr lang="en-GB" sz="1200" i="1" noProof="0" smtClean="0">
+                        <a:latin typeface="Cambria Math" panose="02040503050406030204" pitchFamily="18" charset="0"/>
+                        <a:ea typeface="Cambria Math" panose="02040503050406030204" pitchFamily="18" charset="0"/>
+                      </a:rPr>
+                      <m:t>𝑁</m:t>
+                    </m:r>
+                    <m:r>
+                      <a:rPr lang="en-GB" sz="1200" i="1" noProof="0" smtClean="0">
+                        <a:latin typeface="Cambria Math" panose="02040503050406030204" pitchFamily="18" charset="0"/>
+                        <a:ea typeface="Cambria Math" panose="02040503050406030204" pitchFamily="18" charset="0"/>
+                      </a:rPr>
+                      <m:t>=2 </m:t>
+                    </m:r>
+                  </m:oMath>
+                </a14:m>
+                <a:r>
+                  <a:rPr lang="en-GB" sz="1200" noProof="0" dirty="0">
+                    <a:latin typeface="Calibri" panose="020F0502020204030204" pitchFamily="34" charset="0"/>
+                    <a:ea typeface="Cambria Math" panose="02040503050406030204" pitchFamily="18" charset="0"/>
+                    <a:cs typeface="Calibri" panose="020F0502020204030204" pitchFamily="34" charset="0"/>
+                  </a:rPr>
+                  <a:t>levels  with </a:t>
+                </a:r>
+                <a14:m>
+                  <m:oMath xmlns:m="http://schemas.openxmlformats.org/officeDocument/2006/math">
+                    <m:sSub>
+                      <m:sSubPr>
+                        <m:ctrlPr>
+                          <a:rPr lang="en-GB" sz="1200" b="0" i="1" noProof="0" smtClean="0">
+                            <a:latin typeface="Cambria Math" panose="02040503050406030204" pitchFamily="18" charset="0"/>
+                            <a:ea typeface="Cambria Math" panose="02040503050406030204" pitchFamily="18" charset="0"/>
+                          </a:rPr>
+                        </m:ctrlPr>
+                      </m:sSubPr>
+                      <m:e>
+                        <m:r>
+                          <a:rPr lang="en-GB" sz="1200" b="0" i="1" noProof="0" smtClean="0">
+                            <a:latin typeface="Cambria Math" panose="02040503050406030204" pitchFamily="18" charset="0"/>
+                            <a:ea typeface="Cambria Math" panose="02040503050406030204" pitchFamily="18" charset="0"/>
+                          </a:rPr>
+                          <m:t>𝑛</m:t>
+                        </m:r>
+                      </m:e>
+                      <m:sub>
+                        <m:r>
+                          <a:rPr lang="en-GB" sz="1200" b="0" i="1" noProof="0" smtClean="0">
+                            <a:latin typeface="Cambria Math" panose="02040503050406030204" pitchFamily="18" charset="0"/>
+                            <a:ea typeface="Cambria Math" panose="02040503050406030204" pitchFamily="18" charset="0"/>
+                          </a:rPr>
+                          <m:t>1</m:t>
+                        </m:r>
+                      </m:sub>
+                    </m:sSub>
+                  </m:oMath>
+                </a14:m>
+                <a:r>
+                  <a:rPr lang="en-GB" sz="1200" noProof="0" dirty="0">
+                    <a:latin typeface="Calibri" panose="020F0502020204030204" pitchFamily="34" charset="0"/>
+                    <a:ea typeface="Cambria Math" panose="02040503050406030204" pitchFamily="18" charset="0"/>
+                    <a:cs typeface="Calibri" panose="020F0502020204030204" pitchFamily="34" charset="0"/>
+                  </a:rPr>
+                  <a:t> resp.  </a:t>
+                </a:r>
+                <a14:m>
+                  <m:oMath xmlns:m="http://schemas.openxmlformats.org/officeDocument/2006/math">
+                    <m:sSub>
+                      <m:sSubPr>
+                        <m:ctrlPr>
+                          <a:rPr lang="en-GB" sz="1200" b="0" i="1" noProof="0" smtClean="0">
+                            <a:latin typeface="Cambria Math" panose="02040503050406030204" pitchFamily="18" charset="0"/>
+                            <a:ea typeface="Cambria Math" panose="02040503050406030204" pitchFamily="18" charset="0"/>
+                          </a:rPr>
+                        </m:ctrlPr>
+                      </m:sSubPr>
+                      <m:e>
+                        <m:r>
+                          <a:rPr lang="en-GB" sz="1200" b="0" i="1" noProof="0" smtClean="0">
+                            <a:latin typeface="Cambria Math" panose="02040503050406030204" pitchFamily="18" charset="0"/>
+                            <a:ea typeface="Cambria Math" panose="02040503050406030204" pitchFamily="18" charset="0"/>
+                          </a:rPr>
+                          <m:t>𝑛</m:t>
+                        </m:r>
+                      </m:e>
+                      <m:sub>
+                        <m:r>
+                          <a:rPr lang="en-GB" sz="1200" b="0" i="1" noProof="0" smtClean="0">
+                            <a:latin typeface="Cambria Math" panose="02040503050406030204" pitchFamily="18" charset="0"/>
+                            <a:ea typeface="Cambria Math" panose="02040503050406030204" pitchFamily="18" charset="0"/>
+                          </a:rPr>
+                          <m:t>2</m:t>
+                        </m:r>
+                      </m:sub>
+                    </m:sSub>
+                  </m:oMath>
+                </a14:m>
+                <a:r>
+                  <a:rPr lang="en-GB" sz="1200" noProof="0" dirty="0">
+                    <a:latin typeface="Calibri" panose="020F0502020204030204" pitchFamily="34" charset="0"/>
+                    <a:ea typeface="Cambria Math" panose="02040503050406030204" pitchFamily="18" charset="0"/>
+                    <a:cs typeface="Calibri" panose="020F0502020204030204" pitchFamily="34" charset="0"/>
+                  </a:rPr>
+                  <a:t> entries in each level</a:t>
+                </a:r>
+              </a:p>
+            </p:txBody>
+          </p:sp>
+        </mc:Choice>
+        <mc:Fallback xmlns="">
+          <p:sp>
+            <p:nvSpPr>
+              <p:cNvPr id="8" name="Textfeld 7">
+                <a:extLst>
+                  <a:ext uri="{FF2B5EF4-FFF2-40B4-BE49-F238E27FC236}">
+                    <a16:creationId xmlns:a16="http://schemas.microsoft.com/office/drawing/2014/main" id="{295FEA9A-D31C-504B-9808-C226C7EA0707}"/>
+                  </a:ext>
+                </a:extLst>
+              </p:cNvPr>
+              <p:cNvSpPr txBox="1">
+                <a:spLocks noRot="1" noChangeAspect="1" noMove="1" noResize="1" noEditPoints="1" noAdjustHandles="1" noChangeArrowheads="1" noChangeShapeType="1" noTextEdit="1"/>
+              </p:cNvSpPr>
+              <p:nvPr/>
+            </p:nvSpPr>
+            <p:spPr>
+              <a:xfrm>
+                <a:off x="262794" y="832787"/>
+                <a:ext cx="4514400" cy="276999"/>
+              </a:xfrm>
+              <a:prstGeom prst="rect">
+                <a:avLst/>
+              </a:prstGeom>
+              <a:blipFill>
+                <a:blip r:embed="rId4"/>
+                <a:stretch>
+                  <a:fillRect b="-13043"/>
+                </a:stretch>
+              </a:blipFill>
+              <a:ln w="12700">
+                <a:solidFill>
+                  <a:schemeClr val="tx1"/>
+                </a:solidFill>
+              </a:ln>
+            </p:spPr>
+            <p:txBody>
+              <a:bodyPr/>
+              <a:lstStyle/>
+              <a:p>
+                <a:r>
+                  <a:rPr lang="de-DE">
+                    <a:noFill/>
+                  </a:rPr>
+                  <a:t> </a:t>
+                </a:r>
+              </a:p>
+            </p:txBody>
+          </p:sp>
+        </mc:Fallback>
+      </mc:AlternateContent>
+      <mc:AlternateContent xmlns:mc="http://schemas.openxmlformats.org/markup-compatibility/2006" xmlns:a14="http://schemas.microsoft.com/office/drawing/2010/main">
+        <mc:Choice Requires="a14">
+          <p:sp>
+            <p:nvSpPr>
+              <p:cNvPr id="9" name="Textfeld 8">
+                <a:extLst>
+                  <a:ext uri="{FF2B5EF4-FFF2-40B4-BE49-F238E27FC236}">
+                    <a16:creationId xmlns:a16="http://schemas.microsoft.com/office/drawing/2014/main" id="{ABC84E86-D454-4E88-1982-B7D0844FF777}"/>
+                  </a:ext>
+                </a:extLst>
+              </p:cNvPr>
+              <p:cNvSpPr txBox="1"/>
+              <p:nvPr/>
+            </p:nvSpPr>
+            <p:spPr>
+              <a:xfrm>
+                <a:off x="5127496" y="832787"/>
+                <a:ext cx="5304067" cy="276999"/>
+              </a:xfrm>
+              <a:prstGeom prst="rect">
+                <a:avLst/>
+              </a:prstGeom>
+              <a:noFill/>
+              <a:ln w="12700">
+                <a:solidFill>
+                  <a:schemeClr val="accent1">
+                    <a:lumMod val="40000"/>
+                    <a:lumOff val="60000"/>
+                  </a:schemeClr>
+                </a:solidFill>
+              </a:ln>
+            </p:spPr>
+            <p:txBody>
+              <a:bodyPr wrap="square">
+                <a:spAutoFit/>
+              </a:bodyPr>
+              <a:lstStyle/>
+              <a:p>
+                <a:pPr algn="ctr"/>
+                <a:r>
+                  <a:rPr lang="en-GB" sz="1200" dirty="0">
+                    <a:latin typeface="Calibri" panose="020F0502020204030204" pitchFamily="34" charset="0"/>
+                    <a:ea typeface="Cambria Math" panose="02040503050406030204" pitchFamily="18" charset="0"/>
+                    <a:cs typeface="Calibri" panose="020F0502020204030204" pitchFamily="34" charset="0"/>
+                  </a:rPr>
+                  <a:t>predictor</a:t>
+                </a:r>
+                <a:r>
+                  <a:rPr lang="en-GB" sz="1200" noProof="0" dirty="0">
+                    <a:latin typeface="Calibri" panose="020F0502020204030204" pitchFamily="34" charset="0"/>
+                    <a:ea typeface="Cambria Math" panose="02040503050406030204" pitchFamily="18" charset="0"/>
+                    <a:cs typeface="Calibri" panose="020F0502020204030204" pitchFamily="34" charset="0"/>
+                  </a:rPr>
+                  <a:t>:  </a:t>
+                </a:r>
+                <a14:m>
+                  <m:oMath xmlns:m="http://schemas.openxmlformats.org/officeDocument/2006/math">
+                    <m:r>
+                      <a:rPr lang="en-GB" sz="1200" b="0" i="1" noProof="0" smtClean="0">
+                        <a:latin typeface="Cambria Math" panose="02040503050406030204" pitchFamily="18" charset="0"/>
+                        <a:ea typeface="Cambria Math" panose="02040503050406030204" pitchFamily="18" charset="0"/>
+                      </a:rPr>
+                      <m:t>𝑁</m:t>
+                    </m:r>
+                    <m:r>
+                      <a:rPr lang="en-GB" sz="1200" b="0" i="1" noProof="0" smtClean="0">
+                        <a:latin typeface="Cambria Math" panose="02040503050406030204" pitchFamily="18" charset="0"/>
+                        <a:ea typeface="Cambria Math" panose="02040503050406030204" pitchFamily="18" charset="0"/>
+                      </a:rPr>
+                      <m:t>&gt;2</m:t>
+                    </m:r>
+                  </m:oMath>
+                </a14:m>
+                <a:r>
+                  <a:rPr lang="en-GB" sz="1200" noProof="0" dirty="0">
+                    <a:latin typeface="Calibri" panose="020F0502020204030204" pitchFamily="34" charset="0"/>
+                    <a:ea typeface="Cambria Math" panose="02040503050406030204" pitchFamily="18" charset="0"/>
+                    <a:cs typeface="Calibri" panose="020F0502020204030204" pitchFamily="34" charset="0"/>
+                  </a:rPr>
+                  <a:t> levels</a:t>
+                </a:r>
+              </a:p>
+            </p:txBody>
+          </p:sp>
+        </mc:Choice>
+        <mc:Fallback xmlns="">
+          <p:sp>
+            <p:nvSpPr>
+              <p:cNvPr id="9" name="Textfeld 8">
+                <a:extLst>
+                  <a:ext uri="{FF2B5EF4-FFF2-40B4-BE49-F238E27FC236}">
+                    <a16:creationId xmlns:a16="http://schemas.microsoft.com/office/drawing/2014/main" id="{8503CA89-315E-D465-88DB-CCE4B3127177}"/>
+                  </a:ext>
+                </a:extLst>
+              </p:cNvPr>
+              <p:cNvSpPr txBox="1">
+                <a:spLocks noRot="1" noChangeAspect="1" noMove="1" noResize="1" noEditPoints="1" noAdjustHandles="1" noChangeArrowheads="1" noChangeShapeType="1" noTextEdit="1"/>
+              </p:cNvSpPr>
+              <p:nvPr/>
+            </p:nvSpPr>
+            <p:spPr>
+              <a:xfrm>
+                <a:off x="5127496" y="832787"/>
+                <a:ext cx="5304067" cy="276999"/>
+              </a:xfrm>
+              <a:prstGeom prst="rect">
+                <a:avLst/>
+              </a:prstGeom>
+              <a:blipFill>
+                <a:blip r:embed="rId5"/>
+                <a:stretch>
+                  <a:fillRect b="-13043"/>
+                </a:stretch>
+              </a:blipFill>
+              <a:ln w="12700">
+                <a:solidFill>
+                  <a:schemeClr val="accent1">
+                    <a:lumMod val="40000"/>
+                    <a:lumOff val="60000"/>
+                  </a:schemeClr>
+                </a:solidFill>
+              </a:ln>
+            </p:spPr>
+            <p:txBody>
+              <a:bodyPr/>
+              <a:lstStyle/>
+              <a:p>
+                <a:r>
+                  <a:rPr lang="de-DE">
+                    <a:noFill/>
+                  </a:rPr>
+                  <a:t> </a:t>
+                </a:r>
+              </a:p>
+            </p:txBody>
+          </p:sp>
+        </mc:Fallback>
+      </mc:AlternateContent>
+      <mc:AlternateContent xmlns:mc="http://schemas.openxmlformats.org/markup-compatibility/2006" xmlns:a14="http://schemas.microsoft.com/office/drawing/2010/main">
+        <mc:Choice Requires="a14">
+          <p:sp>
+            <p:nvSpPr>
+              <p:cNvPr id="13" name="Textfeld 12">
+                <a:extLst>
+                  <a:ext uri="{FF2B5EF4-FFF2-40B4-BE49-F238E27FC236}">
+                    <a16:creationId xmlns:a16="http://schemas.microsoft.com/office/drawing/2014/main" id="{ABCD3EE2-CF4F-C458-FAE6-2B49D5E8CB09}"/>
+                  </a:ext>
+                </a:extLst>
+              </p:cNvPr>
+              <p:cNvSpPr txBox="1"/>
+              <p:nvPr/>
+            </p:nvSpPr>
+            <p:spPr>
+              <a:xfrm>
+                <a:off x="3296687" y="1721123"/>
+                <a:ext cx="1490532" cy="276999"/>
+              </a:xfrm>
+              <a:prstGeom prst="rect">
+                <a:avLst/>
+              </a:prstGeom>
+              <a:noFill/>
+              <a:ln w="12700">
+                <a:solidFill>
+                  <a:schemeClr val="tx1"/>
+                </a:solidFill>
+              </a:ln>
+            </p:spPr>
+            <p:txBody>
+              <a:bodyPr wrap="square">
+                <a:spAutoFit/>
+              </a:bodyPr>
+              <a:lstStyle>
+                <a:defPPr>
+                  <a:defRPr lang="de-DE"/>
+                </a:defPPr>
+              </a:lstStyle>
+              <a:p>
+                <a:pPr algn="ctr"/>
+                <a14:m>
+                  <m:oMath xmlns:m="http://schemas.openxmlformats.org/officeDocument/2006/math">
+                    <m:sSub>
+                      <m:sSubPr>
+                        <m:ctrlPr>
+                          <a:rPr lang="en-GB" sz="1200" b="0" i="1" noProof="0" smtClean="0">
+                            <a:latin typeface="Cambria Math" panose="02040503050406030204" pitchFamily="18" charset="0"/>
+                            <a:ea typeface="Cambria Math" panose="02040503050406030204" pitchFamily="18" charset="0"/>
+                          </a:rPr>
+                        </m:ctrlPr>
+                      </m:sSubPr>
+                      <m:e>
+                        <m:r>
+                          <a:rPr lang="en-GB" sz="1200" b="0" i="1" noProof="0" smtClean="0">
+                            <a:latin typeface="Cambria Math" panose="02040503050406030204" pitchFamily="18" charset="0"/>
+                            <a:ea typeface="Cambria Math" panose="02040503050406030204" pitchFamily="18" charset="0"/>
+                          </a:rPr>
+                          <m:t>𝑛</m:t>
+                        </m:r>
+                      </m:e>
+                      <m:sub>
+                        <m:r>
+                          <a:rPr lang="en-GB" sz="1200" b="0" i="1" noProof="0" smtClean="0">
+                            <a:latin typeface="Cambria Math" panose="02040503050406030204" pitchFamily="18" charset="0"/>
+                            <a:ea typeface="Cambria Math" panose="02040503050406030204" pitchFamily="18" charset="0"/>
+                          </a:rPr>
+                          <m:t>1</m:t>
+                        </m:r>
+                      </m:sub>
+                    </m:sSub>
+                  </m:oMath>
+                </a14:m>
+                <a:r>
+                  <a:rPr lang="en-GB" sz="1200" noProof="0" dirty="0">
+                    <a:latin typeface="Calibri" panose="020F0502020204030204" pitchFamily="34" charset="0"/>
+                    <a:ea typeface="Cambria Math" panose="02040503050406030204" pitchFamily="18" charset="0"/>
+                    <a:cs typeface="Calibri" panose="020F0502020204030204" pitchFamily="34" charset="0"/>
+                  </a:rPr>
+                  <a:t> and </a:t>
+                </a:r>
+                <a14:m>
+                  <m:oMath xmlns:m="http://schemas.openxmlformats.org/officeDocument/2006/math">
+                    <m:sSub>
+                      <m:sSubPr>
+                        <m:ctrlPr>
+                          <a:rPr lang="en-GB" sz="1200" i="1" noProof="0" smtClean="0">
+                            <a:latin typeface="Cambria Math" panose="02040503050406030204" pitchFamily="18" charset="0"/>
+                            <a:ea typeface="Cambria Math" panose="02040503050406030204" pitchFamily="18" charset="0"/>
+                          </a:rPr>
+                        </m:ctrlPr>
+                      </m:sSubPr>
+                      <m:e>
+                        <m:r>
+                          <a:rPr lang="en-GB" sz="1200" i="1" noProof="0" smtClean="0">
+                            <a:latin typeface="Cambria Math" panose="02040503050406030204" pitchFamily="18" charset="0"/>
+                            <a:ea typeface="Cambria Math" panose="02040503050406030204" pitchFamily="18" charset="0"/>
+                          </a:rPr>
+                          <m:t>𝑛</m:t>
+                        </m:r>
+                      </m:e>
+                      <m:sub>
+                        <m:r>
+                          <a:rPr lang="en-GB" sz="1200" b="0" i="1" noProof="0" smtClean="0">
+                            <a:latin typeface="Cambria Math" panose="02040503050406030204" pitchFamily="18" charset="0"/>
+                            <a:ea typeface="Cambria Math" panose="02040503050406030204" pitchFamily="18" charset="0"/>
+                          </a:rPr>
+                          <m:t>2</m:t>
+                        </m:r>
+                      </m:sub>
+                    </m:sSub>
+                    <m:r>
+                      <a:rPr lang="en-GB" sz="1200" b="0" i="1" noProof="0" smtClean="0">
+                        <a:latin typeface="Cambria Math" panose="02040503050406030204" pitchFamily="18" charset="0"/>
+                        <a:ea typeface="Cambria Math" panose="02040503050406030204" pitchFamily="18" charset="0"/>
+                      </a:rPr>
+                      <m:t>&gt;30</m:t>
+                    </m:r>
+                  </m:oMath>
+                </a14:m>
+                <a:r>
+                  <a:rPr lang="en-GB" sz="1200" noProof="0" dirty="0">
+                    <a:latin typeface="Calibri" panose="020F0502020204030204" pitchFamily="34" charset="0"/>
+                    <a:ea typeface="Cambria Math" panose="02040503050406030204" pitchFamily="18" charset="0"/>
+                    <a:cs typeface="Calibri" panose="020F0502020204030204" pitchFamily="34" charset="0"/>
+                  </a:rPr>
+                  <a:t> </a:t>
+                </a:r>
+              </a:p>
+            </p:txBody>
+          </p:sp>
+        </mc:Choice>
+        <mc:Fallback xmlns="">
+          <p:sp>
+            <p:nvSpPr>
+              <p:cNvPr id="13" name="Textfeld 12">
+                <a:extLst>
+                  <a:ext uri="{FF2B5EF4-FFF2-40B4-BE49-F238E27FC236}">
+                    <a16:creationId xmlns:a16="http://schemas.microsoft.com/office/drawing/2014/main" id="{E013A2E8-9419-9082-A924-2FDA53C069E7}"/>
+                  </a:ext>
+                </a:extLst>
+              </p:cNvPr>
+              <p:cNvSpPr txBox="1">
+                <a:spLocks noRot="1" noChangeAspect="1" noMove="1" noResize="1" noEditPoints="1" noAdjustHandles="1" noChangeArrowheads="1" noChangeShapeType="1" noTextEdit="1"/>
+              </p:cNvSpPr>
+              <p:nvPr/>
+            </p:nvSpPr>
+            <p:spPr>
+              <a:xfrm>
+                <a:off x="3296687" y="1721123"/>
+                <a:ext cx="1490532" cy="276999"/>
+              </a:xfrm>
+              <a:prstGeom prst="rect">
+                <a:avLst/>
+              </a:prstGeom>
+              <a:blipFill>
+                <a:blip r:embed="rId6"/>
+                <a:stretch>
+                  <a:fillRect b="-12500"/>
+                </a:stretch>
+              </a:blipFill>
+              <a:ln w="12700">
+                <a:solidFill>
+                  <a:schemeClr val="tx1"/>
+                </a:solidFill>
+              </a:ln>
+            </p:spPr>
+            <p:txBody>
+              <a:bodyPr/>
+              <a:lstStyle/>
+              <a:p>
+                <a:r>
+                  <a:rPr lang="de-DE">
+                    <a:noFill/>
+                  </a:rPr>
+                  <a:t> </a:t>
+                </a:r>
+              </a:p>
+            </p:txBody>
+          </p:sp>
+        </mc:Fallback>
+      </mc:AlternateContent>
+      <mc:AlternateContent xmlns:mc="http://schemas.openxmlformats.org/markup-compatibility/2006" xmlns:a14="http://schemas.microsoft.com/office/drawing/2010/main">
+        <mc:Choice Requires="a14">
+          <p:sp>
+            <p:nvSpPr>
+              <p:cNvPr id="15" name="Textfeld 14">
+                <a:extLst>
+                  <a:ext uri="{FF2B5EF4-FFF2-40B4-BE49-F238E27FC236}">
+                    <a16:creationId xmlns:a16="http://schemas.microsoft.com/office/drawing/2014/main" id="{94756C1F-A31C-5037-B552-BDE9328D426E}"/>
+                  </a:ext>
+                </a:extLst>
+              </p:cNvPr>
+              <p:cNvSpPr txBox="1"/>
+              <p:nvPr/>
+            </p:nvSpPr>
+            <p:spPr>
+              <a:xfrm>
+                <a:off x="271610" y="1721123"/>
+                <a:ext cx="2950932" cy="276999"/>
+              </a:xfrm>
+              <a:prstGeom prst="rect">
+                <a:avLst/>
+              </a:prstGeom>
+              <a:noFill/>
+              <a:ln w="12700">
+                <a:solidFill>
+                  <a:schemeClr val="tx1"/>
+                </a:solidFill>
+              </a:ln>
+            </p:spPr>
+            <p:txBody>
+              <a:bodyPr wrap="square">
+                <a:spAutoFit/>
+              </a:bodyPr>
+              <a:lstStyle>
+                <a:defPPr>
+                  <a:defRPr lang="de-DE"/>
+                </a:defPPr>
+              </a:lstStyle>
+              <a:p>
+                <a:pPr algn="ctr"/>
+                <a14:m>
+                  <m:oMath xmlns:m="http://schemas.openxmlformats.org/officeDocument/2006/math">
+                    <m:sSub>
+                      <m:sSubPr>
+                        <m:ctrlPr>
+                          <a:rPr lang="en-GB" sz="1200" b="0" i="1" noProof="0" smtClean="0">
+                            <a:latin typeface="Cambria Math" panose="02040503050406030204" pitchFamily="18" charset="0"/>
+                            <a:ea typeface="Cambria Math" panose="02040503050406030204" pitchFamily="18" charset="0"/>
+                          </a:rPr>
+                        </m:ctrlPr>
+                      </m:sSubPr>
+                      <m:e>
+                        <m:r>
+                          <a:rPr lang="en-GB" sz="1200" b="0" i="1" noProof="0" smtClean="0">
+                            <a:latin typeface="Cambria Math" panose="02040503050406030204" pitchFamily="18" charset="0"/>
+                            <a:ea typeface="Cambria Math" panose="02040503050406030204" pitchFamily="18" charset="0"/>
+                          </a:rPr>
+                          <m:t>𝑛</m:t>
+                        </m:r>
+                      </m:e>
+                      <m:sub>
+                        <m:r>
+                          <a:rPr lang="en-GB" sz="1200" b="0" i="1" noProof="0" smtClean="0">
+                            <a:latin typeface="Cambria Math" panose="02040503050406030204" pitchFamily="18" charset="0"/>
+                            <a:ea typeface="Cambria Math" panose="02040503050406030204" pitchFamily="18" charset="0"/>
+                          </a:rPr>
+                          <m:t>1</m:t>
+                        </m:r>
+                      </m:sub>
+                    </m:sSub>
+                  </m:oMath>
+                </a14:m>
+                <a:r>
+                  <a:rPr lang="en-GB" sz="1200" noProof="0" dirty="0">
+                    <a:latin typeface="Calibri" panose="020F0502020204030204" pitchFamily="34" charset="0"/>
+                    <a:ea typeface="Cambria Math" panose="02040503050406030204" pitchFamily="18" charset="0"/>
+                    <a:cs typeface="Calibri" panose="020F0502020204030204" pitchFamily="34" charset="0"/>
+                  </a:rPr>
+                  <a:t> or </a:t>
+                </a:r>
+                <a14:m>
+                  <m:oMath xmlns:m="http://schemas.openxmlformats.org/officeDocument/2006/math">
+                    <m:sSub>
+                      <m:sSubPr>
+                        <m:ctrlPr>
+                          <a:rPr lang="en-GB" sz="1200" i="1" noProof="0" smtClean="0">
+                            <a:latin typeface="Cambria Math" panose="02040503050406030204" pitchFamily="18" charset="0"/>
+                            <a:ea typeface="Cambria Math" panose="02040503050406030204" pitchFamily="18" charset="0"/>
+                            <a:cs typeface="Calibri" panose="020F0502020204030204" pitchFamily="34" charset="0"/>
+                          </a:rPr>
+                        </m:ctrlPr>
+                      </m:sSubPr>
+                      <m:e>
+                        <m:r>
+                          <a:rPr lang="en-GB" sz="1200" i="1" noProof="0" smtClean="0">
+                            <a:latin typeface="Cambria Math" panose="02040503050406030204" pitchFamily="18" charset="0"/>
+                            <a:ea typeface="Cambria Math" panose="02040503050406030204" pitchFamily="18" charset="0"/>
+                          </a:rPr>
+                          <m:t>𝑛</m:t>
+                        </m:r>
+                      </m:e>
+                      <m:sub>
+                        <m:r>
+                          <a:rPr lang="en-GB" sz="1200" i="1" noProof="0" smtClean="0">
+                            <a:latin typeface="Cambria Math" panose="02040503050406030204" pitchFamily="18" charset="0"/>
+                            <a:ea typeface="Cambria Math" panose="02040503050406030204" pitchFamily="18" charset="0"/>
+                          </a:rPr>
+                          <m:t>2</m:t>
+                        </m:r>
+                      </m:sub>
+                    </m:sSub>
+                    <m:r>
+                      <a:rPr lang="en-GB" sz="1200" i="1" noProof="0" smtClean="0">
+                        <a:latin typeface="Cambria Math" panose="02040503050406030204" pitchFamily="18" charset="0"/>
+                        <a:ea typeface="Cambria Math" panose="02040503050406030204" pitchFamily="18" charset="0"/>
+                      </a:rPr>
+                      <m:t>≤30</m:t>
+                    </m:r>
+                    <m:r>
+                      <a:rPr lang="en-GB" sz="1200" i="1" noProof="0" smtClean="0">
+                        <a:latin typeface="Cambria Math" panose="02040503050406030204" pitchFamily="18" charset="0"/>
+                        <a:ea typeface="Cambria Math" panose="02040503050406030204" pitchFamily="18" charset="0"/>
+                        <a:cs typeface="Calibri" panose="020F0502020204030204" pitchFamily="34" charset="0"/>
+                      </a:rPr>
+                      <m:t> </m:t>
+                    </m:r>
+                  </m:oMath>
+                </a14:m>
+                <a:endParaRPr lang="en-GB" sz="1200" noProof="0" dirty="0">
+                  <a:latin typeface="Calibri" panose="020F0502020204030204" pitchFamily="34" charset="0"/>
+                  <a:ea typeface="Cambria Math" panose="02040503050406030204" pitchFamily="18" charset="0"/>
+                  <a:cs typeface="Calibri" panose="020F0502020204030204" pitchFamily="34" charset="0"/>
+                </a:endParaRPr>
+              </a:p>
+            </p:txBody>
+          </p:sp>
+        </mc:Choice>
+        <mc:Fallback xmlns="">
+          <p:sp>
+            <p:nvSpPr>
+              <p:cNvPr id="15" name="Textfeld 14">
+                <a:extLst>
+                  <a:ext uri="{FF2B5EF4-FFF2-40B4-BE49-F238E27FC236}">
+                    <a16:creationId xmlns:a16="http://schemas.microsoft.com/office/drawing/2014/main" id="{2A7C589D-90CE-28E1-F515-49850CAABBCC}"/>
+                  </a:ext>
+                </a:extLst>
+              </p:cNvPr>
+              <p:cNvSpPr txBox="1">
+                <a:spLocks noRot="1" noChangeAspect="1" noMove="1" noResize="1" noEditPoints="1" noAdjustHandles="1" noChangeArrowheads="1" noChangeShapeType="1" noTextEdit="1"/>
+              </p:cNvSpPr>
+              <p:nvPr/>
+            </p:nvSpPr>
+            <p:spPr>
+              <a:xfrm>
+                <a:off x="271610" y="1721123"/>
+                <a:ext cx="2950932" cy="276999"/>
+              </a:xfrm>
+              <a:prstGeom prst="rect">
+                <a:avLst/>
+              </a:prstGeom>
+              <a:blipFill>
+                <a:blip r:embed="rId7"/>
+                <a:stretch>
+                  <a:fillRect b="-12500"/>
+                </a:stretch>
+              </a:blipFill>
+              <a:ln w="12700">
+                <a:solidFill>
+                  <a:schemeClr val="tx1"/>
+                </a:solidFill>
+              </a:ln>
+            </p:spPr>
+            <p:txBody>
+              <a:bodyPr/>
+              <a:lstStyle/>
+              <a:p>
+                <a:r>
+                  <a:rPr lang="de-DE">
+                    <a:noFill/>
+                  </a:rPr>
+                  <a:t> </a:t>
+                </a:r>
+              </a:p>
+            </p:txBody>
+          </p:sp>
+        </mc:Fallback>
+      </mc:AlternateContent>
+      <mc:AlternateContent xmlns:mc="http://schemas.openxmlformats.org/markup-compatibility/2006" xmlns:a14="http://schemas.microsoft.com/office/drawing/2010/main">
+        <mc:Choice Requires="a14">
+          <p:sp>
+            <p:nvSpPr>
+              <p:cNvPr id="19" name="Textfeld 18">
+                <a:extLst>
+                  <a:ext uri="{FF2B5EF4-FFF2-40B4-BE49-F238E27FC236}">
+                    <a16:creationId xmlns:a16="http://schemas.microsoft.com/office/drawing/2014/main" id="{EFAF1AC6-90E7-2A55-B785-52B2C29B18B8}"/>
+                  </a:ext>
+                </a:extLst>
+              </p:cNvPr>
+              <p:cNvSpPr txBox="1"/>
+              <p:nvPr/>
+            </p:nvSpPr>
+            <p:spPr>
+              <a:xfrm>
+                <a:off x="1782316" y="3003780"/>
+                <a:ext cx="1440000" cy="276999"/>
+              </a:xfrm>
+              <a:prstGeom prst="rect">
+                <a:avLst/>
+              </a:prstGeom>
+              <a:noFill/>
+              <a:ln w="12700">
+                <a:solidFill>
+                  <a:schemeClr val="tx1"/>
+                </a:solidFill>
+              </a:ln>
+            </p:spPr>
+            <p:txBody>
+              <a:bodyPr wrap="square">
+                <a:spAutoFit/>
+              </a:bodyPr>
+              <a:lstStyle/>
+              <a:p>
+                <a14:m>
+                  <m:oMath xmlns:m="http://schemas.openxmlformats.org/officeDocument/2006/math">
+                    <m:sSub>
+                      <m:sSubPr>
+                        <m:ctrlPr>
+                          <a:rPr lang="en-GB" sz="1200" b="0" i="1" noProof="0" smtClean="0">
+                            <a:latin typeface="Cambria Math" panose="02040503050406030204" pitchFamily="18" charset="0"/>
+                            <a:ea typeface="Cambria Math" panose="02040503050406030204" pitchFamily="18" charset="0"/>
+                          </a:rPr>
+                        </m:ctrlPr>
+                      </m:sSubPr>
+                      <m:e>
+                        <m:r>
+                          <a:rPr lang="en-GB" sz="1200" b="0" i="1" noProof="0" smtClean="0">
+                            <a:latin typeface="Cambria Math" panose="02040503050406030204" pitchFamily="18" charset="0"/>
+                            <a:ea typeface="Cambria Math" panose="02040503050406030204" pitchFamily="18" charset="0"/>
+                          </a:rPr>
+                          <m:t>𝑝</m:t>
+                        </m:r>
+                      </m:e>
+                      <m:sub>
+                        <m:r>
+                          <a:rPr lang="en-GB" sz="1200" b="0" i="1" noProof="0" smtClean="0">
+                            <a:latin typeface="Cambria Math" panose="02040503050406030204" pitchFamily="18" charset="0"/>
+                            <a:ea typeface="Cambria Math" panose="02040503050406030204" pitchFamily="18" charset="0"/>
+                          </a:rPr>
+                          <m:t>1</m:t>
+                        </m:r>
+                      </m:sub>
+                    </m:sSub>
+                    <m:r>
+                      <a:rPr lang="en-GB" sz="1200" b="0" i="1" noProof="0" smtClean="0">
+                        <a:latin typeface="Cambria Math" panose="02040503050406030204" pitchFamily="18" charset="0"/>
+                        <a:ea typeface="Cambria Math" panose="02040503050406030204" pitchFamily="18" charset="0"/>
+                      </a:rPr>
+                      <m:t>≥</m:t>
+                    </m:r>
+                    <m:r>
+                      <a:rPr lang="en-GB" sz="1200" b="0" i="1" noProof="0" smtClean="0">
+                        <a:latin typeface="Cambria Math" panose="02040503050406030204" pitchFamily="18" charset="0"/>
+                        <a:ea typeface="Cambria Math" panose="02040503050406030204" pitchFamily="18" charset="0"/>
+                      </a:rPr>
+                      <m:t>𝛼</m:t>
+                    </m:r>
+                  </m:oMath>
+                </a14:m>
+                <a:r>
+                  <a:rPr lang="en-GB" sz="1200" noProof="0" dirty="0">
+                    <a:latin typeface="Calibri" panose="020F0502020204030204" pitchFamily="34" charset="0"/>
+                    <a:ea typeface="Cambria Math" panose="02040503050406030204" pitchFamily="18" charset="0"/>
+                    <a:cs typeface="Calibri" panose="020F0502020204030204" pitchFamily="34" charset="0"/>
+                  </a:rPr>
+                  <a:t> and </a:t>
+                </a:r>
+                <a14:m>
+                  <m:oMath xmlns:m="http://schemas.openxmlformats.org/officeDocument/2006/math">
+                    <m:sSub>
+                      <m:sSubPr>
+                        <m:ctrlPr>
+                          <a:rPr lang="en-GB" sz="1200" b="0" i="1" noProof="0" smtClean="0">
+                            <a:latin typeface="Cambria Math" panose="02040503050406030204" pitchFamily="18" charset="0"/>
+                            <a:ea typeface="Cambria Math" panose="02040503050406030204" pitchFamily="18" charset="0"/>
+                          </a:rPr>
+                        </m:ctrlPr>
+                      </m:sSubPr>
+                      <m:e>
+                        <m:r>
+                          <a:rPr lang="en-GB" sz="1200" b="0" i="1" noProof="0" smtClean="0">
+                            <a:latin typeface="Cambria Math" panose="02040503050406030204" pitchFamily="18" charset="0"/>
+                            <a:ea typeface="Cambria Math" panose="02040503050406030204" pitchFamily="18" charset="0"/>
+                          </a:rPr>
+                          <m:t>𝑝</m:t>
+                        </m:r>
+                      </m:e>
+                      <m:sub>
+                        <m:r>
+                          <a:rPr lang="en-GB" sz="1200" b="0" i="1" noProof="0" smtClean="0">
+                            <a:latin typeface="Cambria Math" panose="02040503050406030204" pitchFamily="18" charset="0"/>
+                            <a:ea typeface="Cambria Math" panose="02040503050406030204" pitchFamily="18" charset="0"/>
+                          </a:rPr>
+                          <m:t>2</m:t>
+                        </m:r>
+                      </m:sub>
+                    </m:sSub>
+                    <m:r>
+                      <a:rPr lang="en-GB" sz="1200" b="0" i="1" noProof="0" smtClean="0">
+                        <a:latin typeface="Cambria Math" panose="02040503050406030204" pitchFamily="18" charset="0"/>
+                        <a:ea typeface="Cambria Math" panose="02040503050406030204" pitchFamily="18" charset="0"/>
+                      </a:rPr>
+                      <m:t>≥</m:t>
+                    </m:r>
+                    <m:r>
+                      <a:rPr lang="en-GB" sz="1200" b="0" i="1" noProof="0" smtClean="0">
+                        <a:latin typeface="Cambria Math" panose="02040503050406030204" pitchFamily="18" charset="0"/>
+                        <a:ea typeface="Cambria Math" panose="02040503050406030204" pitchFamily="18" charset="0"/>
+                      </a:rPr>
+                      <m:t>𝛼</m:t>
+                    </m:r>
+                  </m:oMath>
+                </a14:m>
+                <a:r>
+                  <a:rPr lang="en-GB" sz="1200" noProof="0" dirty="0">
+                    <a:latin typeface="Calibri" panose="020F0502020204030204" pitchFamily="34" charset="0"/>
+                    <a:ea typeface="Cambria Math" panose="02040503050406030204" pitchFamily="18" charset="0"/>
+                    <a:cs typeface="Calibri" panose="020F0502020204030204" pitchFamily="34" charset="0"/>
+                  </a:rPr>
+                  <a:t> </a:t>
+                </a:r>
+              </a:p>
+            </p:txBody>
+          </p:sp>
+        </mc:Choice>
+        <mc:Fallback xmlns="">
+          <p:sp>
+            <p:nvSpPr>
+              <p:cNvPr id="19" name="Textfeld 18">
+                <a:extLst>
+                  <a:ext uri="{FF2B5EF4-FFF2-40B4-BE49-F238E27FC236}">
+                    <a16:creationId xmlns:a16="http://schemas.microsoft.com/office/drawing/2014/main" id="{738B4D66-E2FD-3D06-F527-A82D7C3BDF1B}"/>
+                  </a:ext>
+                </a:extLst>
+              </p:cNvPr>
+              <p:cNvSpPr txBox="1">
+                <a:spLocks noRot="1" noChangeAspect="1" noMove="1" noResize="1" noEditPoints="1" noAdjustHandles="1" noChangeArrowheads="1" noChangeShapeType="1" noTextEdit="1"/>
+              </p:cNvSpPr>
+              <p:nvPr/>
+            </p:nvSpPr>
+            <p:spPr>
+              <a:xfrm>
+                <a:off x="1782316" y="3003780"/>
+                <a:ext cx="1440000" cy="276999"/>
+              </a:xfrm>
+              <a:prstGeom prst="rect">
+                <a:avLst/>
+              </a:prstGeom>
+              <a:blipFill>
+                <a:blip r:embed="rId8"/>
+                <a:stretch>
+                  <a:fillRect b="-13043"/>
+                </a:stretch>
+              </a:blipFill>
+              <a:ln w="12700">
+                <a:solidFill>
+                  <a:schemeClr val="tx1"/>
+                </a:solidFill>
+              </a:ln>
+            </p:spPr>
+            <p:txBody>
+              <a:bodyPr/>
+              <a:lstStyle/>
+              <a:p>
+                <a:r>
+                  <a:rPr lang="de-DE">
+                    <a:noFill/>
+                  </a:rPr>
+                  <a:t> </a:t>
+                </a:r>
+              </a:p>
+            </p:txBody>
+          </p:sp>
+        </mc:Fallback>
+      </mc:AlternateContent>
+      <mc:AlternateContent xmlns:mc="http://schemas.openxmlformats.org/markup-compatibility/2006" xmlns:a14="http://schemas.microsoft.com/office/drawing/2010/main">
+        <mc:Choice Requires="a14">
+          <p:sp>
+            <p:nvSpPr>
+              <p:cNvPr id="22" name="Textfeld 21">
+                <a:extLst>
+                  <a:ext uri="{FF2B5EF4-FFF2-40B4-BE49-F238E27FC236}">
+                    <a16:creationId xmlns:a16="http://schemas.microsoft.com/office/drawing/2014/main" id="{A030B03B-5138-C1B5-576C-D5123D95FDBA}"/>
+                  </a:ext>
+                </a:extLst>
+              </p:cNvPr>
+              <p:cNvSpPr txBox="1"/>
+              <p:nvPr/>
+            </p:nvSpPr>
+            <p:spPr>
+              <a:xfrm>
+                <a:off x="271610" y="3003780"/>
+                <a:ext cx="1440000" cy="276999"/>
+              </a:xfrm>
+              <a:prstGeom prst="rect">
+                <a:avLst/>
+              </a:prstGeom>
+              <a:noFill/>
+              <a:ln w="12700">
+                <a:solidFill>
+                  <a:schemeClr val="tx1"/>
+                </a:solidFill>
+              </a:ln>
+            </p:spPr>
+            <p:txBody>
+              <a:bodyPr wrap="square">
+                <a:spAutoFit/>
+              </a:bodyPr>
+              <a:lstStyle/>
+              <a:p>
+                <a14:m>
+                  <m:oMath xmlns:m="http://schemas.openxmlformats.org/officeDocument/2006/math">
+                    <m:sSub>
+                      <m:sSubPr>
+                        <m:ctrlPr>
+                          <a:rPr lang="en-GB" sz="1200" b="0" i="1" noProof="0" smtClean="0">
+                            <a:latin typeface="Cambria Math" panose="02040503050406030204" pitchFamily="18" charset="0"/>
+                            <a:ea typeface="Cambria Math" panose="02040503050406030204" pitchFamily="18" charset="0"/>
+                          </a:rPr>
+                        </m:ctrlPr>
+                      </m:sSubPr>
+                      <m:e>
+                        <m:r>
+                          <a:rPr lang="en-GB" sz="1200" b="0" i="1" noProof="0" smtClean="0">
+                            <a:latin typeface="Cambria Math" panose="02040503050406030204" pitchFamily="18" charset="0"/>
+                            <a:ea typeface="Cambria Math" panose="02040503050406030204" pitchFamily="18" charset="0"/>
+                          </a:rPr>
+                          <m:t>𝑝</m:t>
+                        </m:r>
+                      </m:e>
+                      <m:sub>
+                        <m:r>
+                          <a:rPr lang="en-GB" sz="1200" b="0" i="1" noProof="0" smtClean="0">
+                            <a:latin typeface="Cambria Math" panose="02040503050406030204" pitchFamily="18" charset="0"/>
+                            <a:ea typeface="Cambria Math" panose="02040503050406030204" pitchFamily="18" charset="0"/>
+                          </a:rPr>
+                          <m:t>1</m:t>
+                        </m:r>
+                      </m:sub>
+                    </m:sSub>
+                    <m:r>
+                      <a:rPr lang="en-GB" sz="1200" b="0" i="1" noProof="0" smtClean="0">
+                        <a:latin typeface="Cambria Math" panose="02040503050406030204" pitchFamily="18" charset="0"/>
+                        <a:ea typeface="Cambria Math" panose="02040503050406030204" pitchFamily="18" charset="0"/>
+                      </a:rPr>
+                      <m:t>&lt;</m:t>
+                    </m:r>
+                    <m:r>
+                      <a:rPr lang="en-GB" sz="1200" b="0" i="1" noProof="0" smtClean="0">
+                        <a:latin typeface="Cambria Math" panose="02040503050406030204" pitchFamily="18" charset="0"/>
+                        <a:ea typeface="Cambria Math" panose="02040503050406030204" pitchFamily="18" charset="0"/>
+                      </a:rPr>
+                      <m:t>𝛼</m:t>
+                    </m:r>
+                    <m:r>
+                      <a:rPr lang="en-GB" sz="1200" b="0" i="1" noProof="0" smtClean="0">
+                        <a:latin typeface="Cambria Math" panose="02040503050406030204" pitchFamily="18" charset="0"/>
+                        <a:ea typeface="Cambria Math" panose="02040503050406030204" pitchFamily="18" charset="0"/>
+                      </a:rPr>
+                      <m:t>  </m:t>
+                    </m:r>
+                  </m:oMath>
+                </a14:m>
+                <a:r>
+                  <a:rPr lang="en-GB" sz="1200" noProof="0" dirty="0">
+                    <a:latin typeface="Calibri" panose="020F0502020204030204" pitchFamily="34" charset="0"/>
+                    <a:ea typeface="Cambria Math" panose="02040503050406030204" pitchFamily="18" charset="0"/>
+                    <a:cs typeface="Calibri" panose="020F0502020204030204" pitchFamily="34" charset="0"/>
+                  </a:rPr>
+                  <a:t>or </a:t>
+                </a:r>
+                <a14:m>
+                  <m:oMath xmlns:m="http://schemas.openxmlformats.org/officeDocument/2006/math">
+                    <m:sSub>
+                      <m:sSubPr>
+                        <m:ctrlPr>
+                          <a:rPr lang="en-GB" sz="1200" i="1" noProof="0" smtClean="0">
+                            <a:latin typeface="Cambria Math" panose="02040503050406030204" pitchFamily="18" charset="0"/>
+                            <a:ea typeface="Cambria Math" panose="02040503050406030204" pitchFamily="18" charset="0"/>
+                          </a:rPr>
+                        </m:ctrlPr>
+                      </m:sSubPr>
+                      <m:e>
+                        <m:r>
+                          <a:rPr lang="en-GB" sz="1200" i="1" noProof="0" smtClean="0">
+                            <a:latin typeface="Cambria Math" panose="02040503050406030204" pitchFamily="18" charset="0"/>
+                            <a:ea typeface="Cambria Math" panose="02040503050406030204" pitchFamily="18" charset="0"/>
+                          </a:rPr>
+                          <m:t>𝑝</m:t>
+                        </m:r>
+                      </m:e>
+                      <m:sub>
+                        <m:r>
+                          <a:rPr lang="en-GB" sz="1200" b="0" i="1" noProof="0" smtClean="0">
+                            <a:latin typeface="Cambria Math" panose="02040503050406030204" pitchFamily="18" charset="0"/>
+                            <a:ea typeface="Cambria Math" panose="02040503050406030204" pitchFamily="18" charset="0"/>
+                          </a:rPr>
+                          <m:t>2</m:t>
+                        </m:r>
+                      </m:sub>
+                    </m:sSub>
+                    <m:r>
+                      <a:rPr lang="en-GB" sz="1200" i="1" noProof="0" smtClean="0">
+                        <a:latin typeface="Cambria Math" panose="02040503050406030204" pitchFamily="18" charset="0"/>
+                        <a:ea typeface="Cambria Math" panose="02040503050406030204" pitchFamily="18" charset="0"/>
+                      </a:rPr>
+                      <m:t>&lt;</m:t>
+                    </m:r>
+                    <m:r>
+                      <a:rPr lang="en-GB" sz="1200" i="1" noProof="0" smtClean="0">
+                        <a:latin typeface="Cambria Math" panose="02040503050406030204" pitchFamily="18" charset="0"/>
+                        <a:ea typeface="Cambria Math" panose="02040503050406030204" pitchFamily="18" charset="0"/>
+                      </a:rPr>
+                      <m:t>𝛼</m:t>
+                    </m:r>
+                  </m:oMath>
+                </a14:m>
+                <a:r>
+                  <a:rPr lang="en-GB" sz="1200" noProof="0" dirty="0">
+                    <a:latin typeface="Calibri" panose="020F0502020204030204" pitchFamily="34" charset="0"/>
+                    <a:ea typeface="Cambria Math" panose="02040503050406030204" pitchFamily="18" charset="0"/>
+                    <a:cs typeface="Calibri" panose="020F0502020204030204" pitchFamily="34" charset="0"/>
+                  </a:rPr>
+                  <a:t> </a:t>
+                </a:r>
+              </a:p>
+            </p:txBody>
+          </p:sp>
+        </mc:Choice>
+        <mc:Fallback xmlns="">
+          <p:sp>
+            <p:nvSpPr>
+              <p:cNvPr id="22" name="Textfeld 21">
+                <a:extLst>
+                  <a:ext uri="{FF2B5EF4-FFF2-40B4-BE49-F238E27FC236}">
+                    <a16:creationId xmlns:a16="http://schemas.microsoft.com/office/drawing/2014/main" id="{935D93BB-1C95-A787-6B51-42A0FF2A9242}"/>
+                  </a:ext>
+                </a:extLst>
+              </p:cNvPr>
+              <p:cNvSpPr txBox="1">
+                <a:spLocks noRot="1" noChangeAspect="1" noMove="1" noResize="1" noEditPoints="1" noAdjustHandles="1" noChangeArrowheads="1" noChangeShapeType="1" noTextEdit="1"/>
+              </p:cNvSpPr>
+              <p:nvPr/>
+            </p:nvSpPr>
+            <p:spPr>
+              <a:xfrm>
+                <a:off x="271610" y="3003780"/>
+                <a:ext cx="1440000" cy="276999"/>
+              </a:xfrm>
+              <a:prstGeom prst="rect">
+                <a:avLst/>
+              </a:prstGeom>
+              <a:blipFill>
+                <a:blip r:embed="rId9"/>
+                <a:stretch>
+                  <a:fillRect b="-13043"/>
+                </a:stretch>
+              </a:blipFill>
+              <a:ln w="12700">
+                <a:solidFill>
+                  <a:schemeClr val="tx1"/>
+                </a:solidFill>
+              </a:ln>
+            </p:spPr>
+            <p:txBody>
+              <a:bodyPr/>
+              <a:lstStyle/>
+              <a:p>
+                <a:r>
+                  <a:rPr lang="de-DE">
+                    <a:noFill/>
+                  </a:rPr>
+                  <a:t> </a:t>
+                </a:r>
+              </a:p>
+            </p:txBody>
+          </p:sp>
+        </mc:Fallback>
+      </mc:AlternateContent>
+      <p:sp>
+        <p:nvSpPr>
+          <p:cNvPr id="23" name="Textfeld 22">
+            <a:extLst>
+              <a:ext uri="{FF2B5EF4-FFF2-40B4-BE49-F238E27FC236}">
+                <a16:creationId xmlns:a16="http://schemas.microsoft.com/office/drawing/2014/main" id="{743E7F75-A4AC-7D85-FEB9-2656D4688F17}"/>
+              </a:ext>
+            </a:extLst>
+          </p:cNvPr>
+          <p:cNvSpPr txBox="1"/>
+          <p:nvPr/>
+        </p:nvSpPr>
+        <p:spPr>
+          <a:xfrm>
+            <a:off x="219834" y="4971020"/>
+            <a:ext cx="1447008" cy="276999"/>
+          </a:xfrm>
+          <a:prstGeom prst="rect">
+            <a:avLst/>
+          </a:prstGeom>
+          <a:solidFill>
+            <a:schemeClr val="accent1">
+              <a:lumMod val="40000"/>
+              <a:lumOff val="60000"/>
+            </a:schemeClr>
+          </a:solidFill>
+          <a:ln w="12700">
+            <a:solidFill>
+              <a:schemeClr val="tx1"/>
+            </a:solidFill>
+          </a:ln>
+        </p:spPr>
+        <p:txBody>
+          <a:bodyPr wrap="square">
+            <a:spAutoFit/>
+          </a:bodyPr>
+          <a:lstStyle>
+            <a:defPPr>
+              <a:defRPr lang="de-DE"/>
+            </a:defPPr>
+            <a:lvl1pPr algn="ctr">
+              <a:defRPr sz="1200"/>
+            </a:lvl1pPr>
+          </a:lstStyle>
+          <a:p>
+            <a:r>
+              <a:rPr lang="en-GB" noProof="0" dirty="0" err="1">
+                <a:latin typeface="Courier New" panose="02070309020205020404" pitchFamily="49" charset="0"/>
+                <a:ea typeface="Cambria Math" panose="02040503050406030204" pitchFamily="18" charset="0"/>
+                <a:cs typeface="Courier New" panose="02070309020205020404" pitchFamily="49" charset="0"/>
+              </a:rPr>
+              <a:t>wilcox.test</a:t>
+            </a:r>
+            <a:r>
+              <a:rPr lang="en-GB" noProof="0" dirty="0">
+                <a:latin typeface="Courier New" panose="02070309020205020404" pitchFamily="49" charset="0"/>
+                <a:ea typeface="Cambria Math" panose="02040503050406030204" pitchFamily="18" charset="0"/>
+                <a:cs typeface="Courier New" panose="02070309020205020404" pitchFamily="49" charset="0"/>
+              </a:rPr>
+              <a:t>()</a:t>
+            </a:r>
+          </a:p>
+        </p:txBody>
+      </p:sp>
+      <p:sp>
+        <p:nvSpPr>
+          <p:cNvPr id="27" name="Textfeld 26">
+            <a:extLst>
+              <a:ext uri="{FF2B5EF4-FFF2-40B4-BE49-F238E27FC236}">
+                <a16:creationId xmlns:a16="http://schemas.microsoft.com/office/drawing/2014/main" id="{849D1520-361E-ACB7-4450-5002EB1D23CC}"/>
+              </a:ext>
+            </a:extLst>
+          </p:cNvPr>
+          <p:cNvSpPr txBox="1"/>
+          <p:nvPr/>
+        </p:nvSpPr>
+        <p:spPr>
+          <a:xfrm>
+            <a:off x="5130837" y="4971019"/>
+            <a:ext cx="2338435" cy="276999"/>
+          </a:xfrm>
+          <a:prstGeom prst="rect">
+            <a:avLst/>
+          </a:prstGeom>
+          <a:solidFill>
+            <a:schemeClr val="accent1">
+              <a:lumMod val="40000"/>
+              <a:lumOff val="60000"/>
+            </a:schemeClr>
+          </a:solidFill>
+          <a:ln w="12700">
+            <a:solidFill>
+              <a:schemeClr val="accent1">
+                <a:lumMod val="40000"/>
+                <a:lumOff val="60000"/>
+              </a:schemeClr>
+            </a:solidFill>
+          </a:ln>
+        </p:spPr>
+        <p:txBody>
+          <a:bodyPr wrap="square">
+            <a:spAutoFit/>
+          </a:bodyPr>
+          <a:lstStyle>
+            <a:defPPr>
+              <a:defRPr lang="de-DE"/>
+            </a:defPPr>
+            <a:lvl1pPr algn="ctr">
+              <a:defRPr sz="1200"/>
+            </a:lvl1pPr>
+          </a:lstStyle>
+          <a:p>
+            <a:r>
+              <a:rPr lang="en-GB" noProof="0" dirty="0" err="1">
+                <a:latin typeface="Courier New" panose="02070309020205020404" pitchFamily="49" charset="0"/>
+                <a:ea typeface="Cambria Math" panose="02040503050406030204" pitchFamily="18" charset="0"/>
+                <a:cs typeface="Courier New" panose="02070309020205020404" pitchFamily="49" charset="0"/>
+              </a:rPr>
+              <a:t>kruskal.test</a:t>
+            </a:r>
+            <a:r>
+              <a:rPr lang="en-GB" noProof="0" dirty="0">
+                <a:latin typeface="Courier New" panose="02070309020205020404" pitchFamily="49" charset="0"/>
+                <a:ea typeface="Cambria Math" panose="02040503050406030204" pitchFamily="18" charset="0"/>
+                <a:cs typeface="Courier New" panose="02070309020205020404" pitchFamily="49" charset="0"/>
+              </a:rPr>
+              <a:t>()</a:t>
+            </a:r>
+          </a:p>
+        </p:txBody>
+      </p:sp>
+      <p:sp>
+        <p:nvSpPr>
+          <p:cNvPr id="28" name="Textfeld 27">
+            <a:extLst>
+              <a:ext uri="{FF2B5EF4-FFF2-40B4-BE49-F238E27FC236}">
+                <a16:creationId xmlns:a16="http://schemas.microsoft.com/office/drawing/2014/main" id="{DBB7D267-1E52-0B13-53D5-F9C1DDFB927A}"/>
+              </a:ext>
+            </a:extLst>
+          </p:cNvPr>
+          <p:cNvSpPr txBox="1"/>
+          <p:nvPr/>
+        </p:nvSpPr>
+        <p:spPr>
+          <a:xfrm>
+            <a:off x="7636562" y="3878295"/>
+            <a:ext cx="2795001" cy="280863"/>
+          </a:xfrm>
+          <a:prstGeom prst="rect">
+            <a:avLst/>
+          </a:prstGeom>
+          <a:solidFill>
+            <a:schemeClr val="accent6">
+              <a:lumMod val="20000"/>
+              <a:lumOff val="80000"/>
+            </a:schemeClr>
+          </a:solidFill>
+          <a:ln w="12700">
+            <a:solidFill>
+              <a:schemeClr val="accent1">
+                <a:lumMod val="40000"/>
+                <a:lumOff val="60000"/>
+              </a:schemeClr>
+            </a:solidFill>
+          </a:ln>
+        </p:spPr>
+        <p:txBody>
+          <a:bodyPr wrap="square">
+            <a:spAutoFit/>
+          </a:bodyPr>
+          <a:lstStyle/>
+          <a:p>
+            <a:pPr algn="ctr"/>
+            <a:r>
+              <a:rPr lang="en-GB" sz="1200" dirty="0" err="1">
+                <a:latin typeface="Courier New" panose="02070309020205020404" pitchFamily="49" charset="0"/>
+                <a:ea typeface="Cambria Math" panose="02040503050406030204" pitchFamily="18" charset="0"/>
+                <a:cs typeface="Courier New" panose="02070309020205020404" pitchFamily="49" charset="0"/>
+              </a:rPr>
+              <a:t>levene</a:t>
+            </a:r>
+            <a:r>
+              <a:rPr lang="en-GB" sz="1200" noProof="0" dirty="0">
+                <a:latin typeface="Courier New" panose="02070309020205020404" pitchFamily="49" charset="0"/>
+                <a:ea typeface="Cambria Math" panose="02040503050406030204" pitchFamily="18" charset="0"/>
+                <a:cs typeface="Courier New" panose="02070309020205020404" pitchFamily="49" charset="0"/>
+              </a:rPr>
+              <a:t>.test() </a:t>
+            </a:r>
+          </a:p>
+        </p:txBody>
+      </p:sp>
+      <mc:AlternateContent xmlns:mc="http://schemas.openxmlformats.org/markup-compatibility/2006" xmlns:a14="http://schemas.microsoft.com/office/drawing/2010/main">
+        <mc:Choice Requires="a14">
+          <p:sp>
+            <p:nvSpPr>
+              <p:cNvPr id="29" name="Textfeld 28">
+                <a:extLst>
+                  <a:ext uri="{FF2B5EF4-FFF2-40B4-BE49-F238E27FC236}">
+                    <a16:creationId xmlns:a16="http://schemas.microsoft.com/office/drawing/2014/main" id="{8113821A-D6F4-A2CE-3EE0-34D6C3BFE470}"/>
+                  </a:ext>
+                </a:extLst>
+              </p:cNvPr>
+              <p:cNvSpPr txBox="1"/>
+              <p:nvPr/>
+            </p:nvSpPr>
+            <p:spPr>
+              <a:xfrm>
+                <a:off x="9351563" y="4482840"/>
+                <a:ext cx="1080000" cy="277200"/>
+              </a:xfrm>
+              <a:prstGeom prst="rect">
+                <a:avLst/>
+              </a:prstGeom>
+              <a:noFill/>
+              <a:ln w="12700">
+                <a:solidFill>
+                  <a:schemeClr val="accent1">
+                    <a:lumMod val="40000"/>
+                    <a:lumOff val="60000"/>
+                  </a:schemeClr>
+                </a:solidFill>
+              </a:ln>
+            </p:spPr>
+            <p:txBody>
+              <a:bodyPr wrap="square">
+                <a:spAutoFit/>
+              </a:bodyPr>
+              <a:lstStyle/>
+              <a:p>
+                <a:pPr algn="ctr"/>
+                <a14:m>
+                  <m:oMathPara xmlns:m="http://schemas.openxmlformats.org/officeDocument/2006/math">
+                    <m:oMathParaPr>
+                      <m:jc m:val="centerGroup"/>
+                    </m:oMathParaPr>
+                    <m:oMath xmlns:m="http://schemas.openxmlformats.org/officeDocument/2006/math">
+                      <m:r>
+                        <a:rPr lang="en-GB" sz="1200" b="0" i="1" noProof="0" smtClean="0">
+                          <a:latin typeface="Cambria Math" panose="02040503050406030204" pitchFamily="18" charset="0"/>
+                          <a:ea typeface="Cambria Math" panose="02040503050406030204" pitchFamily="18" charset="0"/>
+                        </a:rPr>
+                        <m:t>𝑝</m:t>
+                      </m:r>
+                      <m:r>
+                        <a:rPr lang="en-GB" sz="1200" b="0" i="1" noProof="0" smtClean="0">
+                          <a:latin typeface="Cambria Math" panose="02040503050406030204" pitchFamily="18" charset="0"/>
+                          <a:ea typeface="Cambria Math" panose="02040503050406030204" pitchFamily="18" charset="0"/>
+                        </a:rPr>
+                        <m:t>≥</m:t>
+                      </m:r>
+                      <m:r>
+                        <a:rPr lang="en-GB" sz="1200" b="0" i="1" noProof="0" smtClean="0">
+                          <a:latin typeface="Cambria Math" panose="02040503050406030204" pitchFamily="18" charset="0"/>
+                          <a:ea typeface="Cambria Math" panose="02040503050406030204" pitchFamily="18" charset="0"/>
+                        </a:rPr>
+                        <m:t>𝛼</m:t>
+                      </m:r>
+                    </m:oMath>
+                  </m:oMathPara>
+                </a14:m>
+                <a:endParaRPr lang="en-GB" sz="1200" noProof="0" dirty="0">
+                  <a:latin typeface="Calibri" panose="020F0502020204030204" pitchFamily="34" charset="0"/>
+                  <a:ea typeface="Cambria Math" panose="02040503050406030204" pitchFamily="18" charset="0"/>
+                  <a:cs typeface="Calibri" panose="020F0502020204030204" pitchFamily="34" charset="0"/>
+                </a:endParaRPr>
+              </a:p>
+            </p:txBody>
+          </p:sp>
+        </mc:Choice>
+        <mc:Fallback xmlns="">
+          <p:sp>
+            <p:nvSpPr>
+              <p:cNvPr id="29" name="Textfeld 28">
+                <a:extLst>
+                  <a:ext uri="{FF2B5EF4-FFF2-40B4-BE49-F238E27FC236}">
+                    <a16:creationId xmlns:a16="http://schemas.microsoft.com/office/drawing/2014/main" id="{6A843E82-AE36-2049-F32E-7DB7C257BD0C}"/>
+                  </a:ext>
+                </a:extLst>
+              </p:cNvPr>
+              <p:cNvSpPr txBox="1">
+                <a:spLocks noRot="1" noChangeAspect="1" noMove="1" noResize="1" noEditPoints="1" noAdjustHandles="1" noChangeArrowheads="1" noChangeShapeType="1" noTextEdit="1"/>
+              </p:cNvSpPr>
+              <p:nvPr/>
+            </p:nvSpPr>
+            <p:spPr>
+              <a:xfrm>
+                <a:off x="9351563" y="4482840"/>
+                <a:ext cx="1080000" cy="277200"/>
+              </a:xfrm>
+              <a:prstGeom prst="rect">
+                <a:avLst/>
+              </a:prstGeom>
+              <a:blipFill>
+                <a:blip r:embed="rId10"/>
+                <a:stretch>
+                  <a:fillRect/>
+                </a:stretch>
+              </a:blipFill>
+              <a:ln w="12700">
+                <a:solidFill>
+                  <a:schemeClr val="accent1">
+                    <a:lumMod val="40000"/>
+                    <a:lumOff val="60000"/>
+                  </a:schemeClr>
+                </a:solidFill>
+              </a:ln>
+            </p:spPr>
+            <p:txBody>
+              <a:bodyPr/>
+              <a:lstStyle/>
+              <a:p>
+                <a:r>
+                  <a:rPr lang="de-DE">
+                    <a:noFill/>
+                  </a:rPr>
+                  <a:t> </a:t>
+                </a:r>
+              </a:p>
+            </p:txBody>
+          </p:sp>
+        </mc:Fallback>
+      </mc:AlternateContent>
+      <mc:AlternateContent xmlns:mc="http://schemas.openxmlformats.org/markup-compatibility/2006" xmlns:a14="http://schemas.microsoft.com/office/drawing/2010/main">
+        <mc:Choice Requires="a14">
+          <p:sp>
+            <p:nvSpPr>
+              <p:cNvPr id="30" name="Textfeld 29">
+                <a:extLst>
+                  <a:ext uri="{FF2B5EF4-FFF2-40B4-BE49-F238E27FC236}">
+                    <a16:creationId xmlns:a16="http://schemas.microsoft.com/office/drawing/2014/main" id="{5C9A15C2-7CF0-23A3-D572-F3963B427E63}"/>
+                  </a:ext>
+                </a:extLst>
+              </p:cNvPr>
+              <p:cNvSpPr txBox="1"/>
+              <p:nvPr/>
+            </p:nvSpPr>
+            <p:spPr>
+              <a:xfrm>
+                <a:off x="7582544" y="4472251"/>
+                <a:ext cx="1080000" cy="276999"/>
+              </a:xfrm>
+              <a:prstGeom prst="rect">
+                <a:avLst/>
+              </a:prstGeom>
+              <a:noFill/>
+              <a:ln w="12700">
+                <a:solidFill>
+                  <a:schemeClr val="accent1">
+                    <a:lumMod val="40000"/>
+                    <a:lumOff val="60000"/>
+                  </a:schemeClr>
+                </a:solidFill>
+              </a:ln>
+            </p:spPr>
+            <p:txBody>
+              <a:bodyPr wrap="square">
+                <a:spAutoFit/>
+              </a:bodyPr>
+              <a:lstStyle/>
+              <a:p>
+                <a:pPr algn="ctr"/>
+                <a14:m>
+                  <m:oMathPara xmlns:m="http://schemas.openxmlformats.org/officeDocument/2006/math">
+                    <m:oMathParaPr>
+                      <m:jc m:val="centerGroup"/>
+                    </m:oMathParaPr>
+                    <m:oMath xmlns:m="http://schemas.openxmlformats.org/officeDocument/2006/math">
+                      <m:r>
+                        <a:rPr lang="en-GB" sz="1200" b="0" i="1" noProof="0" smtClean="0">
+                          <a:latin typeface="Cambria Math" panose="02040503050406030204" pitchFamily="18" charset="0"/>
+                          <a:ea typeface="Cambria Math" panose="02040503050406030204" pitchFamily="18" charset="0"/>
+                        </a:rPr>
+                        <m:t>𝑝</m:t>
+                      </m:r>
+                      <m:r>
+                        <a:rPr lang="en-GB" sz="1200" b="0" i="1" noProof="0" smtClean="0">
+                          <a:latin typeface="Cambria Math" panose="02040503050406030204" pitchFamily="18" charset="0"/>
+                          <a:ea typeface="Cambria Math" panose="02040503050406030204" pitchFamily="18" charset="0"/>
+                        </a:rPr>
+                        <m:t>&lt;</m:t>
+                      </m:r>
+                      <m:r>
+                        <a:rPr lang="en-GB" sz="1200" b="0" i="1" noProof="0" smtClean="0">
+                          <a:latin typeface="Cambria Math" panose="02040503050406030204" pitchFamily="18" charset="0"/>
+                          <a:ea typeface="Cambria Math" panose="02040503050406030204" pitchFamily="18" charset="0"/>
+                        </a:rPr>
+                        <m:t>𝛼</m:t>
+                      </m:r>
+                    </m:oMath>
+                  </m:oMathPara>
+                </a14:m>
+                <a:endParaRPr lang="en-GB" sz="1200" noProof="0" dirty="0">
+                  <a:latin typeface="Calibri" panose="020F0502020204030204" pitchFamily="34" charset="0"/>
+                  <a:ea typeface="Cambria Math" panose="02040503050406030204" pitchFamily="18" charset="0"/>
+                  <a:cs typeface="Calibri" panose="020F0502020204030204" pitchFamily="34" charset="0"/>
+                </a:endParaRPr>
+              </a:p>
+            </p:txBody>
+          </p:sp>
+        </mc:Choice>
+        <mc:Fallback xmlns="">
+          <p:sp>
+            <p:nvSpPr>
+              <p:cNvPr id="30" name="Textfeld 29">
+                <a:extLst>
+                  <a:ext uri="{FF2B5EF4-FFF2-40B4-BE49-F238E27FC236}">
+                    <a16:creationId xmlns:a16="http://schemas.microsoft.com/office/drawing/2014/main" id="{5E44A5B4-1C65-9447-A4FA-813B5715A602}"/>
+                  </a:ext>
+                </a:extLst>
+              </p:cNvPr>
+              <p:cNvSpPr txBox="1">
+                <a:spLocks noRot="1" noChangeAspect="1" noMove="1" noResize="1" noEditPoints="1" noAdjustHandles="1" noChangeArrowheads="1" noChangeShapeType="1" noTextEdit="1"/>
+              </p:cNvSpPr>
+              <p:nvPr/>
+            </p:nvSpPr>
+            <p:spPr>
+              <a:xfrm>
+                <a:off x="7582544" y="4472251"/>
+                <a:ext cx="1080000" cy="276999"/>
+              </a:xfrm>
+              <a:prstGeom prst="rect">
+                <a:avLst/>
+              </a:prstGeom>
+              <a:blipFill>
+                <a:blip r:embed="rId11"/>
+                <a:stretch>
+                  <a:fillRect/>
+                </a:stretch>
+              </a:blipFill>
+              <a:ln w="12700">
+                <a:solidFill>
+                  <a:schemeClr val="accent1">
+                    <a:lumMod val="40000"/>
+                    <a:lumOff val="60000"/>
+                  </a:schemeClr>
+                </a:solidFill>
+              </a:ln>
+            </p:spPr>
+            <p:txBody>
+              <a:bodyPr/>
+              <a:lstStyle/>
+              <a:p>
+                <a:r>
+                  <a:rPr lang="de-DE">
+                    <a:noFill/>
+                  </a:rPr>
+                  <a:t> </a:t>
+                </a:r>
+              </a:p>
+            </p:txBody>
+          </p:sp>
+        </mc:Fallback>
+      </mc:AlternateContent>
+      <p:sp>
+        <p:nvSpPr>
+          <p:cNvPr id="31" name="Textfeld 30">
+            <a:extLst>
+              <a:ext uri="{FF2B5EF4-FFF2-40B4-BE49-F238E27FC236}">
+                <a16:creationId xmlns:a16="http://schemas.microsoft.com/office/drawing/2014/main" id="{EC96271C-6ED1-D290-081B-E3C7E413F6D5}"/>
+              </a:ext>
+            </a:extLst>
+          </p:cNvPr>
+          <p:cNvSpPr txBox="1"/>
+          <p:nvPr/>
+        </p:nvSpPr>
+        <p:spPr>
+          <a:xfrm>
+            <a:off x="7579542" y="4968485"/>
+            <a:ext cx="1457998" cy="276999"/>
+          </a:xfrm>
+          <a:prstGeom prst="rect">
+            <a:avLst/>
+          </a:prstGeom>
+          <a:solidFill>
+            <a:schemeClr val="accent4">
+              <a:alpha val="19758"/>
+            </a:schemeClr>
+          </a:solidFill>
+          <a:ln w="12700">
+            <a:solidFill>
+              <a:schemeClr val="accent1">
+                <a:lumMod val="40000"/>
+                <a:lumOff val="60000"/>
+              </a:schemeClr>
+            </a:solidFill>
+          </a:ln>
+        </p:spPr>
+        <p:txBody>
+          <a:bodyPr wrap="square">
+            <a:spAutoFit/>
+          </a:bodyPr>
+          <a:lstStyle>
+            <a:defPPr>
+              <a:defRPr lang="de-DE"/>
+            </a:defPPr>
+            <a:lvl1pPr algn="ctr">
+              <a:defRPr sz="1200"/>
+            </a:lvl1pPr>
+          </a:lstStyle>
+          <a:p>
+            <a:r>
+              <a:rPr lang="en-GB" noProof="0" dirty="0" err="1">
+                <a:latin typeface="Courier New" panose="02070309020205020404" pitchFamily="49" charset="0"/>
+                <a:ea typeface="Cambria Math" panose="02040503050406030204" pitchFamily="18" charset="0"/>
+                <a:cs typeface="Courier New" panose="02070309020205020404" pitchFamily="49" charset="0"/>
+              </a:rPr>
+              <a:t>oneway.test</a:t>
+            </a:r>
+            <a:r>
+              <a:rPr lang="en-GB" noProof="0" dirty="0">
+                <a:latin typeface="Courier New" panose="02070309020205020404" pitchFamily="49" charset="0"/>
+                <a:ea typeface="Cambria Math" panose="02040503050406030204" pitchFamily="18" charset="0"/>
+                <a:cs typeface="Courier New" panose="02070309020205020404" pitchFamily="49" charset="0"/>
+              </a:rPr>
+              <a:t>()</a:t>
+            </a:r>
+          </a:p>
+        </p:txBody>
+      </p:sp>
+      <p:sp>
+        <p:nvSpPr>
+          <p:cNvPr id="32" name="Textfeld 31">
+            <a:extLst>
+              <a:ext uri="{FF2B5EF4-FFF2-40B4-BE49-F238E27FC236}">
+                <a16:creationId xmlns:a16="http://schemas.microsoft.com/office/drawing/2014/main" id="{1851ACE8-3789-7F14-1006-C88A2D2B6D83}"/>
+              </a:ext>
+            </a:extLst>
+          </p:cNvPr>
+          <p:cNvSpPr txBox="1"/>
+          <p:nvPr/>
+        </p:nvSpPr>
+        <p:spPr>
+          <a:xfrm>
+            <a:off x="9262621" y="4968284"/>
+            <a:ext cx="1168942" cy="276999"/>
+          </a:xfrm>
+          <a:prstGeom prst="rect">
+            <a:avLst/>
+          </a:prstGeom>
+          <a:solidFill>
+            <a:schemeClr val="accent4">
+              <a:alpha val="19758"/>
+            </a:schemeClr>
+          </a:solidFill>
+          <a:ln w="12700">
+            <a:solidFill>
+              <a:schemeClr val="accent1">
+                <a:lumMod val="40000"/>
+                <a:lumOff val="60000"/>
+              </a:schemeClr>
+            </a:solidFill>
+          </a:ln>
+        </p:spPr>
+        <p:txBody>
+          <a:bodyPr wrap="square">
+            <a:spAutoFit/>
+          </a:bodyPr>
+          <a:lstStyle/>
+          <a:p>
+            <a:pPr algn="ctr"/>
+            <a:r>
+              <a:rPr lang="en-GB" sz="1200" noProof="0" dirty="0" err="1">
+                <a:latin typeface="Courier New" panose="02070309020205020404" pitchFamily="49" charset="0"/>
+                <a:ea typeface="Cambria Math" panose="02040503050406030204" pitchFamily="18" charset="0"/>
+                <a:cs typeface="Courier New" panose="02070309020205020404" pitchFamily="49" charset="0"/>
+              </a:rPr>
+              <a:t>aov</a:t>
+            </a:r>
+            <a:r>
+              <a:rPr lang="en-GB" sz="1200" noProof="0" dirty="0">
+                <a:latin typeface="Courier New" panose="02070309020205020404" pitchFamily="49" charset="0"/>
+                <a:ea typeface="Cambria Math" panose="02040503050406030204" pitchFamily="18" charset="0"/>
+                <a:cs typeface="Courier New" panose="02070309020205020404" pitchFamily="49" charset="0"/>
+              </a:rPr>
+              <a:t>()</a:t>
+            </a:r>
+          </a:p>
+        </p:txBody>
+      </p:sp>
+      <p:grpSp>
+        <p:nvGrpSpPr>
+          <p:cNvPr id="427" name="Gruppieren 426">
+            <a:extLst>
+              <a:ext uri="{FF2B5EF4-FFF2-40B4-BE49-F238E27FC236}">
+                <a16:creationId xmlns:a16="http://schemas.microsoft.com/office/drawing/2014/main" id="{D09F6AFC-B815-576E-4600-FE8EFA1ABA3E}"/>
+              </a:ext>
+            </a:extLst>
+          </p:cNvPr>
+          <p:cNvGrpSpPr/>
+          <p:nvPr/>
+        </p:nvGrpSpPr>
+        <p:grpSpPr>
+          <a:xfrm>
+            <a:off x="8296125" y="4173488"/>
+            <a:ext cx="1289076" cy="305400"/>
+            <a:chOff x="8002301" y="4581613"/>
+            <a:chExt cx="1289076" cy="305400"/>
+          </a:xfrm>
+        </p:grpSpPr>
+        <p:cxnSp>
+          <p:nvCxnSpPr>
+            <p:cNvPr id="85" name="Gerade Verbindung mit Pfeil 84">
+              <a:extLst>
+                <a:ext uri="{FF2B5EF4-FFF2-40B4-BE49-F238E27FC236}">
+                  <a16:creationId xmlns:a16="http://schemas.microsoft.com/office/drawing/2014/main" id="{CF310334-7163-DACC-E5C7-DBDACE235CD3}"/>
+                </a:ext>
+              </a:extLst>
+            </p:cNvPr>
+            <p:cNvCxnSpPr>
+              <a:cxnSpLocks/>
+            </p:cNvCxnSpPr>
+            <p:nvPr/>
+          </p:nvCxnSpPr>
+          <p:spPr>
+            <a:xfrm flipH="1">
+              <a:off x="8002301" y="4581613"/>
+              <a:ext cx="639486" cy="305400"/>
+            </a:xfrm>
+            <a:prstGeom prst="straightConnector1">
+              <a:avLst/>
+            </a:prstGeom>
+            <a:ln>
+              <a:tailEnd type="triangle"/>
+            </a:ln>
+          </p:spPr>
+          <p:style>
+            <a:lnRef idx="1">
+              <a:schemeClr val="accent1"/>
+            </a:lnRef>
+            <a:fillRef idx="0">
+              <a:schemeClr val="accent1"/>
+            </a:fillRef>
+            <a:effectRef idx="0">
+              <a:schemeClr val="accent1"/>
+            </a:effectRef>
+            <a:fontRef idx="minor">
+              <a:schemeClr val="tx1"/>
+            </a:fontRef>
+          </p:style>
+        </p:cxnSp>
+        <p:cxnSp>
+          <p:nvCxnSpPr>
+            <p:cNvPr id="86" name="Gerade Verbindung mit Pfeil 85">
+              <a:extLst>
+                <a:ext uri="{FF2B5EF4-FFF2-40B4-BE49-F238E27FC236}">
+                  <a16:creationId xmlns:a16="http://schemas.microsoft.com/office/drawing/2014/main" id="{137AD157-3F86-DF6B-ECDD-49AF2DFF4C42}"/>
+                </a:ext>
+              </a:extLst>
+            </p:cNvPr>
+            <p:cNvCxnSpPr>
+              <a:cxnSpLocks/>
+            </p:cNvCxnSpPr>
+            <p:nvPr/>
+          </p:nvCxnSpPr>
+          <p:spPr>
+            <a:xfrm>
+              <a:off x="8641787" y="4581613"/>
+              <a:ext cx="649590" cy="305400"/>
+            </a:xfrm>
+            <a:prstGeom prst="straightConnector1">
+              <a:avLst/>
+            </a:prstGeom>
+            <a:ln>
+              <a:tailEnd type="triangle"/>
+            </a:ln>
+          </p:spPr>
+          <p:style>
+            <a:lnRef idx="1">
+              <a:schemeClr val="accent1"/>
+            </a:lnRef>
+            <a:fillRef idx="0">
+              <a:schemeClr val="accent1"/>
+            </a:fillRef>
+            <a:effectRef idx="0">
+              <a:schemeClr val="accent1"/>
+            </a:effectRef>
+            <a:fontRef idx="minor">
+              <a:schemeClr val="tx1"/>
+            </a:fontRef>
+          </p:style>
+        </p:cxnSp>
+      </p:grpSp>
+      <p:sp>
+        <p:nvSpPr>
+          <p:cNvPr id="93" name="Textfeld 92">
+            <a:extLst>
+              <a:ext uri="{FF2B5EF4-FFF2-40B4-BE49-F238E27FC236}">
+                <a16:creationId xmlns:a16="http://schemas.microsoft.com/office/drawing/2014/main" id="{1816C4C5-9900-56B2-070D-4FC7DE63AB37}"/>
+              </a:ext>
+            </a:extLst>
+          </p:cNvPr>
+          <p:cNvSpPr txBox="1"/>
+          <p:nvPr/>
+        </p:nvSpPr>
+        <p:spPr>
+          <a:xfrm>
+            <a:off x="7588433" y="5449810"/>
+            <a:ext cx="2838737" cy="284869"/>
+          </a:xfrm>
+          <a:prstGeom prst="rect">
+            <a:avLst/>
+          </a:prstGeom>
+          <a:solidFill>
+            <a:schemeClr val="bg2">
+              <a:lumMod val="90000"/>
+            </a:schemeClr>
+          </a:solidFill>
+          <a:ln w="12700">
+            <a:solidFill>
+              <a:schemeClr val="accent1">
+                <a:lumMod val="40000"/>
+                <a:lumOff val="60000"/>
+              </a:schemeClr>
+            </a:solidFill>
+          </a:ln>
+        </p:spPr>
+        <p:txBody>
+          <a:bodyPr wrap="square">
+            <a:spAutoFit/>
+          </a:bodyPr>
+          <a:lstStyle>
+            <a:defPPr>
+              <a:defRPr lang="de-DE"/>
+            </a:defPPr>
+            <a:lvl1pPr algn="ctr">
+              <a:defRPr sz="1200"/>
+            </a:lvl1pPr>
+          </a:lstStyle>
+          <a:p>
+            <a:r>
+              <a:rPr lang="en-GB" noProof="0" dirty="0" err="1">
+                <a:latin typeface="Courier New" panose="02070309020205020404" pitchFamily="49" charset="0"/>
+                <a:ea typeface="Cambria Math" panose="02040503050406030204" pitchFamily="18" charset="0"/>
+                <a:cs typeface="Courier New" panose="02070309020205020404" pitchFamily="49" charset="0"/>
+              </a:rPr>
+              <a:t>TukeyHSD</a:t>
+            </a:r>
+            <a:r>
+              <a:rPr lang="en-GB" noProof="0" dirty="0">
+                <a:latin typeface="Courier New" panose="02070309020205020404" pitchFamily="49" charset="0"/>
+                <a:ea typeface="Cambria Math" panose="02040503050406030204" pitchFamily="18" charset="0"/>
+                <a:cs typeface="Courier New" panose="02070309020205020404" pitchFamily="49" charset="0"/>
+              </a:rPr>
+              <a:t>()</a:t>
+            </a:r>
+          </a:p>
+        </p:txBody>
+      </p:sp>
+      <p:sp>
+        <p:nvSpPr>
+          <p:cNvPr id="94" name="Textfeld 93">
+            <a:extLst>
+              <a:ext uri="{FF2B5EF4-FFF2-40B4-BE49-F238E27FC236}">
+                <a16:creationId xmlns:a16="http://schemas.microsoft.com/office/drawing/2014/main" id="{04816788-AF21-588C-C893-9A3FCC982798}"/>
+              </a:ext>
+            </a:extLst>
+          </p:cNvPr>
+          <p:cNvSpPr txBox="1"/>
+          <p:nvPr/>
+        </p:nvSpPr>
+        <p:spPr>
+          <a:xfrm>
+            <a:off x="5130837" y="5449811"/>
+            <a:ext cx="2341205" cy="276999"/>
+          </a:xfrm>
+          <a:prstGeom prst="rect">
+            <a:avLst/>
+          </a:prstGeom>
+          <a:solidFill>
+            <a:schemeClr val="bg2">
+              <a:lumMod val="90000"/>
+            </a:schemeClr>
+          </a:solidFill>
+          <a:ln w="12700">
+            <a:solidFill>
+              <a:schemeClr val="accent1">
+                <a:lumMod val="40000"/>
+                <a:lumOff val="60000"/>
+              </a:schemeClr>
+            </a:solidFill>
+          </a:ln>
+        </p:spPr>
+        <p:txBody>
+          <a:bodyPr wrap="square">
+            <a:spAutoFit/>
+          </a:bodyPr>
+          <a:lstStyle/>
+          <a:p>
+            <a:pPr algn="ctr"/>
+            <a:r>
+              <a:rPr lang="en-GB" sz="1200" noProof="0" dirty="0" err="1">
+                <a:latin typeface="Courier New" panose="02070309020205020404" pitchFamily="49" charset="0"/>
+                <a:ea typeface="Cambria Math" panose="02040503050406030204" pitchFamily="18" charset="0"/>
+                <a:cs typeface="Courier New" panose="02070309020205020404" pitchFamily="49" charset="0"/>
+              </a:rPr>
+              <a:t>pairwise.wilcox.test</a:t>
+            </a:r>
+            <a:r>
+              <a:rPr lang="en-GB" sz="1200" noProof="0" dirty="0">
+                <a:latin typeface="Courier New" panose="02070309020205020404" pitchFamily="49" charset="0"/>
+                <a:ea typeface="Cambria Math" panose="02040503050406030204" pitchFamily="18" charset="0"/>
+                <a:cs typeface="Courier New" panose="02070309020205020404" pitchFamily="49" charset="0"/>
+              </a:rPr>
+              <a:t>()</a:t>
+            </a:r>
+          </a:p>
+        </p:txBody>
+      </p:sp>
+      <p:cxnSp>
+        <p:nvCxnSpPr>
+          <p:cNvPr id="2" name="Gerade Verbindung mit Pfeil 1">
+            <a:extLst>
+              <a:ext uri="{FF2B5EF4-FFF2-40B4-BE49-F238E27FC236}">
+                <a16:creationId xmlns:a16="http://schemas.microsoft.com/office/drawing/2014/main" id="{442ABA59-9984-CC9C-22E8-4CD2259C18BC}"/>
+              </a:ext>
+            </a:extLst>
+          </p:cNvPr>
+          <p:cNvCxnSpPr>
+            <a:cxnSpLocks/>
+          </p:cNvCxnSpPr>
+          <p:nvPr/>
+        </p:nvCxnSpPr>
+        <p:spPr>
+          <a:xfrm flipH="1">
+            <a:off x="4041194" y="1992541"/>
+            <a:ext cx="15604" cy="2920119"/>
+          </a:xfrm>
+          <a:prstGeom prst="straightConnector1">
+            <a:avLst/>
+          </a:prstGeom>
+          <a:ln>
+            <a:solidFill>
+              <a:schemeClr val="tx1"/>
+            </a:solidFill>
+            <a:tailEnd type="triangle"/>
+          </a:ln>
+        </p:spPr>
+        <p:style>
+          <a:lnRef idx="1">
+            <a:schemeClr val="accent1"/>
+          </a:lnRef>
+          <a:fillRef idx="0">
+            <a:schemeClr val="accent1"/>
+          </a:fillRef>
+          <a:effectRef idx="0">
+            <a:schemeClr val="accent1"/>
+          </a:effectRef>
+          <a:fontRef idx="minor">
+            <a:schemeClr val="tx1"/>
+          </a:fontRef>
+        </p:style>
+      </p:cxnSp>
+      <p:sp>
+        <p:nvSpPr>
+          <p:cNvPr id="50" name="Textfeld 49">
+            <a:extLst>
+              <a:ext uri="{FF2B5EF4-FFF2-40B4-BE49-F238E27FC236}">
+                <a16:creationId xmlns:a16="http://schemas.microsoft.com/office/drawing/2014/main" id="{6B44DB3D-B95D-EFAC-75E5-157A6CC47CE5}"/>
+              </a:ext>
+            </a:extLst>
+          </p:cNvPr>
+          <p:cNvSpPr txBox="1"/>
+          <p:nvPr/>
+        </p:nvSpPr>
+        <p:spPr>
+          <a:xfrm>
+            <a:off x="1792997" y="4971020"/>
+            <a:ext cx="3053668" cy="276999"/>
+          </a:xfrm>
+          <a:prstGeom prst="rect">
+            <a:avLst/>
+          </a:prstGeom>
+          <a:solidFill>
+            <a:schemeClr val="accent4">
+              <a:alpha val="19758"/>
+            </a:schemeClr>
+          </a:solidFill>
+          <a:ln w="12700">
+            <a:solidFill>
+              <a:schemeClr val="tx1"/>
+            </a:solidFill>
+          </a:ln>
+        </p:spPr>
+        <p:txBody>
+          <a:bodyPr wrap="square">
+            <a:spAutoFit/>
+          </a:bodyPr>
+          <a:lstStyle/>
+          <a:p>
+            <a:pPr algn="ctr"/>
+            <a:r>
+              <a:rPr lang="en-GB" sz="1200" noProof="0" dirty="0" err="1">
+                <a:latin typeface="Courier New" panose="02070309020205020404" pitchFamily="49" charset="0"/>
+                <a:ea typeface="Cambria Math" panose="02040503050406030204" pitchFamily="18" charset="0"/>
+                <a:cs typeface="Courier New" panose="02070309020205020404" pitchFamily="49" charset="0"/>
+              </a:rPr>
+              <a:t>t.test</a:t>
+            </a:r>
+            <a:r>
+              <a:rPr lang="en-GB" sz="1200" noProof="0" dirty="0">
+                <a:latin typeface="Courier New" panose="02070309020205020404" pitchFamily="49" charset="0"/>
+                <a:ea typeface="Cambria Math" panose="02040503050406030204" pitchFamily="18" charset="0"/>
+                <a:cs typeface="Courier New" panose="02070309020205020404" pitchFamily="49" charset="0"/>
+              </a:rPr>
+              <a:t>()</a:t>
+            </a:r>
+          </a:p>
+        </p:txBody>
+      </p:sp>
+      <p:cxnSp>
+        <p:nvCxnSpPr>
+          <p:cNvPr id="51" name="Gerade Verbindung mit Pfeil 50">
+            <a:extLst>
+              <a:ext uri="{FF2B5EF4-FFF2-40B4-BE49-F238E27FC236}">
+                <a16:creationId xmlns:a16="http://schemas.microsoft.com/office/drawing/2014/main" id="{26243798-860B-2ACA-D728-5E3E3765CAF3}"/>
+              </a:ext>
+            </a:extLst>
+          </p:cNvPr>
+          <p:cNvCxnSpPr>
+            <a:cxnSpLocks/>
+            <a:stCxn id="22" idx="2"/>
+            <a:endCxn id="23" idx="0"/>
+          </p:cNvCxnSpPr>
+          <p:nvPr/>
+        </p:nvCxnSpPr>
+        <p:spPr>
+          <a:xfrm flipH="1">
+            <a:off x="943338" y="3280779"/>
+            <a:ext cx="48272" cy="1690241"/>
+          </a:xfrm>
+          <a:prstGeom prst="straightConnector1">
+            <a:avLst/>
+          </a:prstGeom>
+          <a:ln>
+            <a:solidFill>
+              <a:schemeClr val="tx1"/>
+            </a:solidFill>
+            <a:tailEnd type="triangle"/>
+          </a:ln>
+        </p:spPr>
+        <p:style>
+          <a:lnRef idx="1">
+            <a:schemeClr val="accent1"/>
+          </a:lnRef>
+          <a:fillRef idx="0">
+            <a:schemeClr val="accent1"/>
+          </a:fillRef>
+          <a:effectRef idx="0">
+            <a:schemeClr val="accent1"/>
+          </a:effectRef>
+          <a:fontRef idx="minor">
+            <a:schemeClr val="tx1"/>
+          </a:fontRef>
+        </p:style>
+      </p:cxnSp>
+      <p:grpSp>
+        <p:nvGrpSpPr>
+          <p:cNvPr id="69" name="Gruppieren 68">
+            <a:extLst>
+              <a:ext uri="{FF2B5EF4-FFF2-40B4-BE49-F238E27FC236}">
+                <a16:creationId xmlns:a16="http://schemas.microsoft.com/office/drawing/2014/main" id="{54B2A6BE-D508-A351-28B4-83ED32FE15FF}"/>
+              </a:ext>
+            </a:extLst>
+          </p:cNvPr>
+          <p:cNvGrpSpPr/>
+          <p:nvPr/>
+        </p:nvGrpSpPr>
+        <p:grpSpPr>
+          <a:xfrm>
+            <a:off x="824372" y="2492447"/>
+            <a:ext cx="1552397" cy="469922"/>
+            <a:chOff x="2719572" y="1536945"/>
+            <a:chExt cx="1289076" cy="305400"/>
+          </a:xfrm>
+        </p:grpSpPr>
+        <p:cxnSp>
+          <p:nvCxnSpPr>
+            <p:cNvPr id="70" name="Gerade Verbindung mit Pfeil 69">
+              <a:extLst>
+                <a:ext uri="{FF2B5EF4-FFF2-40B4-BE49-F238E27FC236}">
+                  <a16:creationId xmlns:a16="http://schemas.microsoft.com/office/drawing/2014/main" id="{D200E892-AEC3-6065-5388-73EFE83A92D7}"/>
+                </a:ext>
+              </a:extLst>
+            </p:cNvPr>
+            <p:cNvCxnSpPr>
+              <a:cxnSpLocks/>
+            </p:cNvCxnSpPr>
+            <p:nvPr/>
+          </p:nvCxnSpPr>
+          <p:spPr>
+            <a:xfrm flipH="1">
+              <a:off x="2719572" y="1536945"/>
+              <a:ext cx="639486" cy="305400"/>
+            </a:xfrm>
+            <a:prstGeom prst="straightConnector1">
+              <a:avLst/>
+            </a:prstGeom>
+            <a:ln>
+              <a:solidFill>
+                <a:schemeClr val="tx1"/>
+              </a:solidFill>
+              <a:tailEnd type="triangle"/>
+            </a:ln>
+          </p:spPr>
+          <p:style>
+            <a:lnRef idx="1">
+              <a:schemeClr val="accent1"/>
+            </a:lnRef>
+            <a:fillRef idx="0">
+              <a:schemeClr val="accent1"/>
+            </a:fillRef>
+            <a:effectRef idx="0">
+              <a:schemeClr val="accent1"/>
+            </a:effectRef>
+            <a:fontRef idx="minor">
+              <a:schemeClr val="tx1"/>
+            </a:fontRef>
+          </p:style>
+        </p:cxnSp>
+        <p:cxnSp>
+          <p:nvCxnSpPr>
+            <p:cNvPr id="71" name="Gerade Verbindung mit Pfeil 70">
+              <a:extLst>
+                <a:ext uri="{FF2B5EF4-FFF2-40B4-BE49-F238E27FC236}">
+                  <a16:creationId xmlns:a16="http://schemas.microsoft.com/office/drawing/2014/main" id="{8395A6F8-FDF1-5AAD-57E2-7013C1DC307B}"/>
+                </a:ext>
+              </a:extLst>
+            </p:cNvPr>
+            <p:cNvCxnSpPr>
+              <a:cxnSpLocks/>
+            </p:cNvCxnSpPr>
+            <p:nvPr/>
+          </p:nvCxnSpPr>
+          <p:spPr>
+            <a:xfrm>
+              <a:off x="3359058" y="1536945"/>
+              <a:ext cx="649590" cy="305400"/>
+            </a:xfrm>
+            <a:prstGeom prst="straightConnector1">
+              <a:avLst/>
+            </a:prstGeom>
+            <a:ln>
+              <a:solidFill>
+                <a:schemeClr val="tx1"/>
+              </a:solidFill>
+              <a:tailEnd type="triangle"/>
+            </a:ln>
+          </p:spPr>
+          <p:style>
+            <a:lnRef idx="1">
+              <a:schemeClr val="accent1"/>
+            </a:lnRef>
+            <a:fillRef idx="0">
+              <a:schemeClr val="accent1"/>
+            </a:fillRef>
+            <a:effectRef idx="0">
+              <a:schemeClr val="accent1"/>
+            </a:effectRef>
+            <a:fontRef idx="minor">
+              <a:schemeClr val="tx1"/>
+            </a:fontRef>
+          </p:style>
+        </p:cxnSp>
+      </p:grpSp>
+      <mc:AlternateContent xmlns:mc="http://schemas.openxmlformats.org/markup-compatibility/2006" xmlns:a14="http://schemas.microsoft.com/office/drawing/2010/main">
+        <mc:Choice Requires="a14">
+          <p:sp>
+            <p:nvSpPr>
+              <p:cNvPr id="82" name="Textfeld 81">
+                <a:extLst>
+                  <a:ext uri="{FF2B5EF4-FFF2-40B4-BE49-F238E27FC236}">
+                    <a16:creationId xmlns:a16="http://schemas.microsoft.com/office/drawing/2014/main" id="{FF8AA592-C660-3782-5CA1-25F1FB0AAFB5}"/>
+                  </a:ext>
+                </a:extLst>
+              </p:cNvPr>
+              <p:cNvSpPr txBox="1"/>
+              <p:nvPr/>
+            </p:nvSpPr>
+            <p:spPr>
+              <a:xfrm>
+                <a:off x="5130837" y="3111855"/>
+                <a:ext cx="2338425" cy="276999"/>
+              </a:xfrm>
+              <a:prstGeom prst="rect">
+                <a:avLst/>
+              </a:prstGeom>
+              <a:noFill/>
+              <a:ln w="12700">
+                <a:solidFill>
+                  <a:schemeClr val="accent1">
+                    <a:lumMod val="40000"/>
+                    <a:lumOff val="60000"/>
+                  </a:schemeClr>
+                </a:solidFill>
+              </a:ln>
+            </p:spPr>
+            <p:txBody>
+              <a:bodyPr wrap="square">
+                <a:spAutoFit/>
+              </a:bodyPr>
+              <a:lstStyle/>
+              <a:p>
+                <a:pPr algn="ctr"/>
+                <a14:m>
+                  <m:oMathPara xmlns:m="http://schemas.openxmlformats.org/officeDocument/2006/math">
+                    <m:oMathParaPr>
+                      <m:jc m:val="centerGroup"/>
+                    </m:oMathParaPr>
+                    <m:oMath xmlns:m="http://schemas.openxmlformats.org/officeDocument/2006/math">
+                      <m:r>
+                        <a:rPr lang="en-GB" sz="1200" i="1">
+                          <a:latin typeface="Cambria Math" panose="02040503050406030204" pitchFamily="18" charset="0"/>
+                          <a:ea typeface="Cambria Math" panose="02040503050406030204" pitchFamily="18" charset="0"/>
+                        </a:rPr>
+                        <m:t>𝑝</m:t>
+                      </m:r>
+                      <m:r>
+                        <a:rPr lang="en-GB" sz="1200" i="1">
+                          <a:latin typeface="Cambria Math" panose="02040503050406030204" pitchFamily="18" charset="0"/>
+                          <a:ea typeface="Cambria Math" panose="02040503050406030204" pitchFamily="18" charset="0"/>
+                        </a:rPr>
+                        <m:t>&lt;</m:t>
+                      </m:r>
+                      <m:r>
+                        <a:rPr lang="en-GB" sz="1200" i="1">
+                          <a:latin typeface="Cambria Math" panose="02040503050406030204" pitchFamily="18" charset="0"/>
+                          <a:ea typeface="Cambria Math" panose="02040503050406030204" pitchFamily="18" charset="0"/>
+                        </a:rPr>
+                        <m:t>𝛼</m:t>
+                      </m:r>
+                    </m:oMath>
+                  </m:oMathPara>
+                </a14:m>
+                <a:endParaRPr lang="en-GB" sz="1200" noProof="0" dirty="0">
+                  <a:latin typeface="Calibri" panose="020F0502020204030204" pitchFamily="34" charset="0"/>
+                  <a:ea typeface="Cambria Math" panose="02040503050406030204" pitchFamily="18" charset="0"/>
+                  <a:cs typeface="Calibri" panose="020F0502020204030204" pitchFamily="34" charset="0"/>
+                </a:endParaRPr>
+              </a:p>
+            </p:txBody>
+          </p:sp>
+        </mc:Choice>
+        <mc:Fallback xmlns="">
+          <p:sp>
+            <p:nvSpPr>
+              <p:cNvPr id="82" name="Textfeld 81">
+                <a:extLst>
+                  <a:ext uri="{FF2B5EF4-FFF2-40B4-BE49-F238E27FC236}">
+                    <a16:creationId xmlns:a16="http://schemas.microsoft.com/office/drawing/2014/main" id="{74CB43FD-F472-800C-0BC9-D288FF8733B0}"/>
+                  </a:ext>
+                </a:extLst>
+              </p:cNvPr>
+              <p:cNvSpPr txBox="1">
+                <a:spLocks noRot="1" noChangeAspect="1" noMove="1" noResize="1" noEditPoints="1" noAdjustHandles="1" noChangeArrowheads="1" noChangeShapeType="1" noTextEdit="1"/>
+              </p:cNvSpPr>
+              <p:nvPr/>
+            </p:nvSpPr>
+            <p:spPr>
+              <a:xfrm>
+                <a:off x="5130837" y="3111855"/>
+                <a:ext cx="2338425" cy="276999"/>
+              </a:xfrm>
+              <a:prstGeom prst="rect">
+                <a:avLst/>
+              </a:prstGeom>
+              <a:blipFill>
+                <a:blip r:embed="rId12"/>
+                <a:stretch>
+                  <a:fillRect/>
+                </a:stretch>
+              </a:blipFill>
+              <a:ln w="12700">
+                <a:solidFill>
+                  <a:schemeClr val="accent1">
+                    <a:lumMod val="40000"/>
+                    <a:lumOff val="60000"/>
+                  </a:schemeClr>
+                </a:solidFill>
+              </a:ln>
+            </p:spPr>
+            <p:txBody>
+              <a:bodyPr/>
+              <a:lstStyle/>
+              <a:p>
+                <a:r>
+                  <a:rPr lang="de-DE">
+                    <a:noFill/>
+                  </a:rPr>
+                  <a:t> </a:t>
+                </a:r>
+              </a:p>
+            </p:txBody>
+          </p:sp>
+        </mc:Fallback>
+      </mc:AlternateContent>
+      <mc:AlternateContent xmlns:mc="http://schemas.openxmlformats.org/markup-compatibility/2006" xmlns:a14="http://schemas.microsoft.com/office/drawing/2010/main">
+        <mc:Choice Requires="a14">
+          <p:sp>
+            <p:nvSpPr>
+              <p:cNvPr id="88" name="Textfeld 87">
+                <a:extLst>
+                  <a:ext uri="{FF2B5EF4-FFF2-40B4-BE49-F238E27FC236}">
+                    <a16:creationId xmlns:a16="http://schemas.microsoft.com/office/drawing/2014/main" id="{EA598DBA-4B0B-AAE3-7F99-27798F6877BE}"/>
+                  </a:ext>
+                </a:extLst>
+              </p:cNvPr>
+              <p:cNvSpPr txBox="1"/>
+              <p:nvPr/>
+            </p:nvSpPr>
+            <p:spPr>
+              <a:xfrm>
+                <a:off x="7625917" y="3100255"/>
+                <a:ext cx="2805646" cy="276999"/>
+              </a:xfrm>
+              <a:prstGeom prst="rect">
+                <a:avLst/>
+              </a:prstGeom>
+              <a:noFill/>
+              <a:ln w="12700">
+                <a:solidFill>
+                  <a:schemeClr val="accent1">
+                    <a:lumMod val="40000"/>
+                    <a:lumOff val="60000"/>
+                  </a:schemeClr>
+                </a:solidFill>
+              </a:ln>
+            </p:spPr>
+            <p:txBody>
+              <a:bodyPr wrap="square">
+                <a:spAutoFit/>
+              </a:bodyPr>
+              <a:lstStyle/>
+              <a:p>
+                <a:pPr algn="ctr"/>
+                <a14:m>
+                  <m:oMathPara xmlns:m="http://schemas.openxmlformats.org/officeDocument/2006/math">
+                    <m:oMathParaPr>
+                      <m:jc m:val="centerGroup"/>
+                    </m:oMathParaPr>
+                    <m:oMath xmlns:m="http://schemas.openxmlformats.org/officeDocument/2006/math">
+                      <m:r>
+                        <a:rPr lang="en-GB" sz="1200" b="0" i="1" noProof="0" smtClean="0">
+                          <a:latin typeface="Cambria Math" panose="02040503050406030204" pitchFamily="18" charset="0"/>
+                          <a:ea typeface="Cambria Math" panose="02040503050406030204" pitchFamily="18" charset="0"/>
+                        </a:rPr>
+                        <m:t>𝑝</m:t>
+                      </m:r>
+                      <m:r>
+                        <a:rPr lang="en-GB" sz="1200" b="0" i="1" noProof="0" smtClean="0">
+                          <a:latin typeface="Cambria Math" panose="02040503050406030204" pitchFamily="18" charset="0"/>
+                          <a:ea typeface="Cambria Math" panose="02040503050406030204" pitchFamily="18" charset="0"/>
+                        </a:rPr>
+                        <m:t>≥</m:t>
+                      </m:r>
+                      <m:r>
+                        <a:rPr lang="en-GB" sz="1200" b="0" i="1" noProof="0" smtClean="0">
+                          <a:latin typeface="Cambria Math" panose="02040503050406030204" pitchFamily="18" charset="0"/>
+                          <a:ea typeface="Cambria Math" panose="02040503050406030204" pitchFamily="18" charset="0"/>
+                        </a:rPr>
+                        <m:t>𝛼</m:t>
+                      </m:r>
+                    </m:oMath>
+                  </m:oMathPara>
+                </a14:m>
+                <a:endParaRPr lang="en-GB" sz="1200" noProof="0" dirty="0">
+                  <a:latin typeface="Calibri" panose="020F0502020204030204" pitchFamily="34" charset="0"/>
+                  <a:ea typeface="Cambria Math" panose="02040503050406030204" pitchFamily="18" charset="0"/>
+                  <a:cs typeface="Calibri" panose="020F0502020204030204" pitchFamily="34" charset="0"/>
+                </a:endParaRPr>
+              </a:p>
+            </p:txBody>
+          </p:sp>
+        </mc:Choice>
+        <mc:Fallback xmlns="">
+          <p:sp>
+            <p:nvSpPr>
+              <p:cNvPr id="88" name="Textfeld 87">
+                <a:extLst>
+                  <a:ext uri="{FF2B5EF4-FFF2-40B4-BE49-F238E27FC236}">
+                    <a16:creationId xmlns:a16="http://schemas.microsoft.com/office/drawing/2014/main" id="{436DE9B5-559B-6581-9440-FF83D251A495}"/>
+                  </a:ext>
+                </a:extLst>
+              </p:cNvPr>
+              <p:cNvSpPr txBox="1">
+                <a:spLocks noRot="1" noChangeAspect="1" noMove="1" noResize="1" noEditPoints="1" noAdjustHandles="1" noChangeArrowheads="1" noChangeShapeType="1" noTextEdit="1"/>
+              </p:cNvSpPr>
+              <p:nvPr/>
+            </p:nvSpPr>
+            <p:spPr>
+              <a:xfrm>
+                <a:off x="7625917" y="3100255"/>
+                <a:ext cx="2805646" cy="276999"/>
+              </a:xfrm>
+              <a:prstGeom prst="rect">
+                <a:avLst/>
+              </a:prstGeom>
+              <a:blipFill>
+                <a:blip r:embed="rId13"/>
+                <a:stretch>
+                  <a:fillRect/>
+                </a:stretch>
+              </a:blipFill>
+              <a:ln w="12700">
+                <a:solidFill>
+                  <a:schemeClr val="accent1">
+                    <a:lumMod val="40000"/>
+                    <a:lumOff val="60000"/>
+                  </a:schemeClr>
+                </a:solidFill>
+              </a:ln>
+            </p:spPr>
+            <p:txBody>
+              <a:bodyPr/>
+              <a:lstStyle/>
+              <a:p>
+                <a:r>
+                  <a:rPr lang="de-DE">
+                    <a:noFill/>
+                  </a:rPr>
+                  <a:t> </a:t>
+                </a:r>
+              </a:p>
+            </p:txBody>
+          </p:sp>
+        </mc:Fallback>
+      </mc:AlternateContent>
+      <p:sp>
+        <p:nvSpPr>
+          <p:cNvPr id="4" name="Textfeld 3">
+            <a:extLst>
+              <a:ext uri="{FF2B5EF4-FFF2-40B4-BE49-F238E27FC236}">
+                <a16:creationId xmlns:a16="http://schemas.microsoft.com/office/drawing/2014/main" id="{8034E0AE-CBAC-2B8E-9BAE-94624C86B232}"/>
+              </a:ext>
+            </a:extLst>
+          </p:cNvPr>
+          <p:cNvSpPr txBox="1"/>
+          <p:nvPr/>
+        </p:nvSpPr>
+        <p:spPr>
+          <a:xfrm>
+            <a:off x="10508557" y="5453366"/>
+            <a:ext cx="1618426" cy="277200"/>
+          </a:xfrm>
+          <a:prstGeom prst="rect">
+            <a:avLst/>
+          </a:prstGeom>
+          <a:solidFill>
+            <a:schemeClr val="bg2">
+              <a:lumMod val="90000"/>
+            </a:schemeClr>
+          </a:solidFill>
+          <a:ln w="12700">
+            <a:solidFill>
+              <a:schemeClr val="bg2">
+                <a:lumMod val="90000"/>
+              </a:schemeClr>
+            </a:solidFill>
+          </a:ln>
+        </p:spPr>
+        <p:txBody>
+          <a:bodyPr wrap="square">
+            <a:spAutoFit/>
+          </a:bodyPr>
+          <a:lstStyle>
+            <a:defPPr>
+              <a:defRPr lang="de-DE"/>
+            </a:defPPr>
+            <a:lvl1pPr algn="ctr">
+              <a:defRPr sz="1200"/>
+            </a:lvl1pPr>
+          </a:lstStyle>
+          <a:p>
+            <a:r>
+              <a:rPr lang="en-GB" noProof="0" dirty="0">
+                <a:latin typeface="Calibri" panose="020F0502020204030204" pitchFamily="34" charset="0"/>
+                <a:ea typeface="Cambria Math" panose="02040503050406030204" pitchFamily="18" charset="0"/>
+                <a:cs typeface="Calibri" panose="020F0502020204030204" pitchFamily="34" charset="0"/>
+              </a:rPr>
+              <a:t>Post-hoc test </a:t>
+            </a:r>
+          </a:p>
+        </p:txBody>
+      </p:sp>
+      <mc:AlternateContent xmlns:mc="http://schemas.openxmlformats.org/markup-compatibility/2006" xmlns:a14="http://schemas.microsoft.com/office/drawing/2010/main">
+        <mc:Choice Requires="a14">
+          <p:sp>
+            <p:nvSpPr>
+              <p:cNvPr id="11" name="Textfeld 10">
+                <a:extLst>
+                  <a:ext uri="{FF2B5EF4-FFF2-40B4-BE49-F238E27FC236}">
+                    <a16:creationId xmlns:a16="http://schemas.microsoft.com/office/drawing/2014/main" id="{660F1CCB-0E89-EC4D-FE95-51F423E84B38}"/>
+                  </a:ext>
+                </a:extLst>
+              </p:cNvPr>
+              <p:cNvSpPr txBox="1"/>
+              <p:nvPr/>
+            </p:nvSpPr>
+            <p:spPr>
+              <a:xfrm>
+                <a:off x="9967683" y="5959220"/>
+                <a:ext cx="2082384" cy="461665"/>
+              </a:xfrm>
+              <a:prstGeom prst="rect">
+                <a:avLst/>
+              </a:prstGeom>
+              <a:noFill/>
+              <a:ln>
+                <a:noFill/>
+              </a:ln>
+            </p:spPr>
+            <p:txBody>
+              <a:bodyPr wrap="square">
+                <a:spAutoFit/>
+              </a:bodyPr>
+              <a:lstStyle/>
+              <a:p>
+                <a14:m>
+                  <m:oMath xmlns:m="http://schemas.openxmlformats.org/officeDocument/2006/math">
+                    <m:r>
+                      <a:rPr lang="en-GB" sz="1200" i="1" noProof="0" smtClean="0">
+                        <a:latin typeface="Cambria Math" panose="02040503050406030204" pitchFamily="18" charset="0"/>
+                        <a:ea typeface="Cambria Math" panose="02040503050406030204" pitchFamily="18" charset="0"/>
+                      </a:rPr>
+                      <m:t>𝛼</m:t>
+                    </m:r>
+                    <m:r>
+                      <a:rPr lang="en-GB" sz="1200" b="0" i="1" noProof="0" smtClean="0">
+                        <a:latin typeface="Cambria Math" panose="02040503050406030204" pitchFamily="18" charset="0"/>
+                        <a:ea typeface="Cambria Math" panose="02040503050406030204" pitchFamily="18" charset="0"/>
+                      </a:rPr>
+                      <m:t>=1−</m:t>
+                    </m:r>
+                  </m:oMath>
+                </a14:m>
+                <a:r>
+                  <a:rPr lang="en-GB" sz="1200" noProof="0" dirty="0">
+                    <a:latin typeface="Calibri" panose="020F0502020204030204" pitchFamily="34" charset="0"/>
+                    <a:ea typeface="Cambria Math" panose="02040503050406030204" pitchFamily="18" charset="0"/>
+                    <a:cs typeface="Calibri" panose="020F0502020204030204" pitchFamily="34" charset="0"/>
+                  </a:rPr>
+                  <a:t> </a:t>
+                </a:r>
+                <a:r>
+                  <a:rPr lang="en-GB" sz="1200" noProof="0" dirty="0" err="1">
+                    <a:latin typeface="Courier New" panose="02070309020205020404" pitchFamily="49" charset="0"/>
+                    <a:ea typeface="CMU Bright Roman" panose="02000603000000000000" pitchFamily="2" charset="0"/>
+                    <a:cs typeface="Courier New" panose="02070309020205020404" pitchFamily="49" charset="0"/>
+                  </a:rPr>
+                  <a:t>conf.level</a:t>
+                </a:r>
+                <a:r>
+                  <a:rPr lang="en-GB" sz="800" noProof="0" dirty="0">
+                    <a:latin typeface="CMU Bright Roman" panose="02000603000000000000" pitchFamily="2" charset="0"/>
+                    <a:ea typeface="CMU Bright Roman" panose="02000603000000000000" pitchFamily="2" charset="0"/>
+                    <a:cs typeface="CMU Bright Roman" panose="02000603000000000000" pitchFamily="2" charset="0"/>
+                  </a:rPr>
+                  <a:t> </a:t>
+                </a:r>
+              </a:p>
+              <a:p>
+                <a14:m>
+                  <m:oMath xmlns:m="http://schemas.openxmlformats.org/officeDocument/2006/math">
+                    <m:sSub>
+                      <m:sSubPr>
+                        <m:ctrlPr>
+                          <a:rPr lang="en-GB" sz="1200" i="1" noProof="0" smtClean="0">
+                            <a:latin typeface="Cambria Math" panose="02040503050406030204" pitchFamily="18" charset="0"/>
+                            <a:ea typeface="Cambria Math" panose="02040503050406030204" pitchFamily="18" charset="0"/>
+                          </a:rPr>
+                        </m:ctrlPr>
+                      </m:sSubPr>
+                      <m:e>
+                        <m:r>
+                          <a:rPr lang="en-GB" sz="1200" i="1" noProof="0" smtClean="0">
+                            <a:latin typeface="Cambria Math" panose="02040503050406030204" pitchFamily="18" charset="0"/>
+                            <a:ea typeface="Cambria Math" panose="02040503050406030204" pitchFamily="18" charset="0"/>
+                          </a:rPr>
+                          <m:t>𝑝</m:t>
+                        </m:r>
+                      </m:e>
+                      <m:sub>
+                        <m:r>
+                          <a:rPr lang="en-GB" sz="1200" i="1" noProof="0" smtClean="0">
+                            <a:latin typeface="Cambria Math" panose="02040503050406030204" pitchFamily="18" charset="0"/>
+                            <a:ea typeface="Cambria Math" panose="02040503050406030204" pitchFamily="18" charset="0"/>
+                          </a:rPr>
+                          <m:t>𝑖</m:t>
+                        </m:r>
+                      </m:sub>
+                    </m:sSub>
+                    <m:r>
+                      <a:rPr lang="en-US" sz="1200" b="0" i="0" noProof="0" smtClean="0">
+                        <a:latin typeface="Cambria Math" panose="02040503050406030204" pitchFamily="18" charset="0"/>
+                        <a:ea typeface="Cambria Math" panose="02040503050406030204" pitchFamily="18" charset="0"/>
+                      </a:rPr>
+                      <m:t>=</m:t>
+                    </m:r>
+                  </m:oMath>
+                </a14:m>
+                <a:r>
+                  <a:rPr lang="en-GB" sz="1200" noProof="0" dirty="0">
+                    <a:ea typeface="Cambria Math" panose="02040503050406030204" pitchFamily="18" charset="0"/>
+                  </a:rPr>
+                  <a:t> </a:t>
+                </a:r>
+                <a14:m>
+                  <m:oMath xmlns:m="http://schemas.openxmlformats.org/officeDocument/2006/math">
+                    <m:r>
+                      <a:rPr lang="en-GB" sz="1200" i="1" noProof="0" dirty="0" smtClean="0">
+                        <a:latin typeface="Cambria Math" panose="02040503050406030204" pitchFamily="18" charset="0"/>
+                        <a:ea typeface="Cambria Math" panose="02040503050406030204" pitchFamily="18" charset="0"/>
+                      </a:rPr>
+                      <m:t>𝑝</m:t>
+                    </m:r>
+                  </m:oMath>
+                </a14:m>
+                <a:r>
+                  <a:rPr lang="en-GB" sz="1200" noProof="0" dirty="0">
+                    <a:ea typeface="Cambria Math" panose="02040503050406030204" pitchFamily="18" charset="0"/>
+                  </a:rPr>
+                  <a:t>-value of level </a:t>
+                </a:r>
+                <a14:m>
+                  <m:oMath xmlns:m="http://schemas.openxmlformats.org/officeDocument/2006/math">
+                    <m:r>
+                      <a:rPr lang="en-GB" sz="1200" i="1" noProof="0" smtClean="0">
+                        <a:latin typeface="Cambria Math" panose="02040503050406030204" pitchFamily="18" charset="0"/>
+                        <a:ea typeface="Cambria Math" panose="02040503050406030204" pitchFamily="18" charset="0"/>
+                      </a:rPr>
+                      <m:t>𝑖</m:t>
+                    </m:r>
+                    <m:r>
+                      <a:rPr lang="en-GB" sz="1200" i="1" noProof="0" smtClean="0">
+                        <a:latin typeface="Cambria Math" panose="02040503050406030204" pitchFamily="18" charset="0"/>
+                        <a:ea typeface="Cambria Math" panose="02040503050406030204" pitchFamily="18" charset="0"/>
+                      </a:rPr>
+                      <m:t>,</m:t>
+                    </m:r>
+                  </m:oMath>
+                </a14:m>
+                <a:r>
+                  <a:rPr lang="en-GB" sz="1200" noProof="0" dirty="0">
+                    <a:ea typeface="Cambria Math" panose="02040503050406030204" pitchFamily="18" charset="0"/>
+                  </a:rPr>
+                  <a:t> </a:t>
+                </a:r>
+                <a14:m>
+                  <m:oMath xmlns:m="http://schemas.openxmlformats.org/officeDocument/2006/math">
+                    <m:r>
+                      <a:rPr lang="en-GB" sz="1200" i="1" noProof="0" smtClean="0">
+                        <a:latin typeface="Cambria Math" panose="02040503050406030204" pitchFamily="18" charset="0"/>
+                        <a:ea typeface="Cambria Math" panose="02040503050406030204" pitchFamily="18" charset="0"/>
+                      </a:rPr>
+                      <m:t>𝑖</m:t>
+                    </m:r>
+                    <m:r>
+                      <a:rPr lang="en-GB" sz="1200" i="1" noProof="0" smtClean="0">
+                        <a:latin typeface="Cambria Math" panose="02040503050406030204" pitchFamily="18" charset="0"/>
+                        <a:ea typeface="Cambria Math" panose="02040503050406030204" pitchFamily="18" charset="0"/>
+                      </a:rPr>
+                      <m:t>=1,2</m:t>
+                    </m:r>
+                  </m:oMath>
+                </a14:m>
+                <a:endParaRPr lang="en-GB" sz="1200" noProof="0" dirty="0">
+                  <a:latin typeface="CMU Bright Roman" panose="02000603000000000000" pitchFamily="2" charset="0"/>
+                  <a:ea typeface="CMU Bright Roman" panose="02000603000000000000" pitchFamily="2" charset="0"/>
+                  <a:cs typeface="CMU Bright Roman" panose="02000603000000000000" pitchFamily="2" charset="0"/>
+                </a:endParaRPr>
+              </a:p>
+            </p:txBody>
+          </p:sp>
+        </mc:Choice>
+        <mc:Fallback xmlns="">
+          <p:sp>
+            <p:nvSpPr>
+              <p:cNvPr id="11" name="Textfeld 10">
+                <a:extLst>
+                  <a:ext uri="{FF2B5EF4-FFF2-40B4-BE49-F238E27FC236}">
+                    <a16:creationId xmlns:a16="http://schemas.microsoft.com/office/drawing/2014/main" id="{BEADCB87-2FE2-B735-89A2-59CFEE3B9378}"/>
+                  </a:ext>
+                </a:extLst>
+              </p:cNvPr>
+              <p:cNvSpPr txBox="1">
+                <a:spLocks noRot="1" noChangeAspect="1" noMove="1" noResize="1" noEditPoints="1" noAdjustHandles="1" noChangeArrowheads="1" noChangeShapeType="1" noTextEdit="1"/>
+              </p:cNvSpPr>
+              <p:nvPr/>
+            </p:nvSpPr>
+            <p:spPr>
+              <a:xfrm>
+                <a:off x="9967683" y="5959220"/>
+                <a:ext cx="2082384" cy="461665"/>
+              </a:xfrm>
+              <a:prstGeom prst="rect">
+                <a:avLst/>
+              </a:prstGeom>
+              <a:blipFill>
+                <a:blip r:embed="rId18"/>
+                <a:stretch>
+                  <a:fillRect t="-2703" b="-10811"/>
+                </a:stretch>
+              </a:blipFill>
+              <a:ln>
+                <a:noFill/>
+              </a:ln>
+            </p:spPr>
+            <p:txBody>
+              <a:bodyPr/>
+              <a:lstStyle/>
+              <a:p>
+                <a:r>
+                  <a:rPr lang="de-DE">
+                    <a:noFill/>
+                  </a:rPr>
+                  <a:t> </a:t>
+                </a:r>
+              </a:p>
+            </p:txBody>
+          </p:sp>
+        </mc:Fallback>
+      </mc:AlternateContent>
+      <p:sp>
+        <p:nvSpPr>
+          <p:cNvPr id="149" name="Textfeld 148">
+            <a:extLst>
+              <a:ext uri="{FF2B5EF4-FFF2-40B4-BE49-F238E27FC236}">
+                <a16:creationId xmlns:a16="http://schemas.microsoft.com/office/drawing/2014/main" id="{E18EDFC7-E6F5-7AD6-1BF9-8BE154A0C051}"/>
+              </a:ext>
+            </a:extLst>
+          </p:cNvPr>
+          <p:cNvSpPr txBox="1"/>
+          <p:nvPr/>
+        </p:nvSpPr>
+        <p:spPr>
+          <a:xfrm>
+            <a:off x="10508891" y="4951684"/>
+            <a:ext cx="1618427" cy="276999"/>
+          </a:xfrm>
+          <a:prstGeom prst="rect">
+            <a:avLst/>
+          </a:prstGeom>
+          <a:noFill/>
+          <a:ln w="12700">
+            <a:solidFill>
+              <a:schemeClr val="bg2">
+                <a:lumMod val="90000"/>
+              </a:schemeClr>
+            </a:solidFill>
+          </a:ln>
+        </p:spPr>
+        <p:txBody>
+          <a:bodyPr wrap="square">
+            <a:spAutoFit/>
+          </a:bodyPr>
+          <a:lstStyle>
+            <a:defPPr>
+              <a:defRPr lang="de-DE"/>
+            </a:defPPr>
+            <a:lvl1pPr algn="ctr">
+              <a:defRPr sz="1200"/>
+            </a:lvl1pPr>
+          </a:lstStyle>
+          <a:p>
+            <a:r>
+              <a:rPr lang="en-GB" noProof="0" dirty="0">
+                <a:latin typeface="Calibri" panose="020F0502020204030204" pitchFamily="34" charset="0"/>
+                <a:ea typeface="Cambria Math" panose="02040503050406030204" pitchFamily="18" charset="0"/>
+                <a:cs typeface="Calibri" panose="020F0502020204030204" pitchFamily="34" charset="0"/>
+              </a:rPr>
+              <a:t>Final test selected </a:t>
+            </a:r>
+          </a:p>
+        </p:txBody>
+      </p:sp>
+      <p:sp>
+        <p:nvSpPr>
+          <p:cNvPr id="159" name="Textfeld 158">
+            <a:extLst>
+              <a:ext uri="{FF2B5EF4-FFF2-40B4-BE49-F238E27FC236}">
+                <a16:creationId xmlns:a16="http://schemas.microsoft.com/office/drawing/2014/main" id="{D01F2F02-B5B5-CDEA-DC9F-C49B13E8C5AC}"/>
+              </a:ext>
+            </a:extLst>
+          </p:cNvPr>
+          <p:cNvSpPr txBox="1"/>
+          <p:nvPr/>
+        </p:nvSpPr>
+        <p:spPr>
+          <a:xfrm>
+            <a:off x="10508557" y="3876296"/>
+            <a:ext cx="1618761" cy="277200"/>
+          </a:xfrm>
+          <a:prstGeom prst="rect">
+            <a:avLst/>
+          </a:prstGeom>
+          <a:solidFill>
+            <a:schemeClr val="accent6">
+              <a:lumMod val="20000"/>
+              <a:lumOff val="80000"/>
+            </a:schemeClr>
+          </a:solidFill>
+          <a:ln w="12700">
+            <a:solidFill>
+              <a:schemeClr val="accent1">
+                <a:lumMod val="20000"/>
+                <a:lumOff val="80000"/>
+              </a:schemeClr>
+            </a:solidFill>
+          </a:ln>
+        </p:spPr>
+        <p:txBody>
+          <a:bodyPr wrap="square">
+            <a:spAutoFit/>
+          </a:bodyPr>
+          <a:lstStyle>
+            <a:defPPr>
+              <a:defRPr lang="de-DE"/>
+            </a:defPPr>
+            <a:lvl1pPr algn="ctr">
+              <a:defRPr sz="1200"/>
+            </a:lvl1pPr>
+          </a:lstStyle>
+          <a:p>
+            <a:r>
+              <a:rPr lang="en-GB" dirty="0">
+                <a:latin typeface="Calibri" panose="020F0502020204030204" pitchFamily="34" charset="0"/>
+                <a:ea typeface="Cambria Math" panose="02040503050406030204" pitchFamily="18" charset="0"/>
+                <a:cs typeface="Calibri" panose="020F0502020204030204" pitchFamily="34" charset="0"/>
+              </a:rPr>
+              <a:t>C</a:t>
+            </a:r>
+            <a:r>
+              <a:rPr lang="en-GB" noProof="0" dirty="0">
+                <a:latin typeface="Calibri" panose="020F0502020204030204" pitchFamily="34" charset="0"/>
+                <a:ea typeface="Cambria Math" panose="02040503050406030204" pitchFamily="18" charset="0"/>
+                <a:cs typeface="Calibri" panose="020F0502020204030204" pitchFamily="34" charset="0"/>
+              </a:rPr>
+              <a:t>heck </a:t>
+            </a:r>
+            <a:r>
+              <a:rPr lang="en-GB" noProof="0" dirty="0" err="1">
+                <a:latin typeface="Calibri" panose="020F0502020204030204" pitchFamily="34" charset="0"/>
+                <a:ea typeface="Cambria Math" panose="02040503050406030204" pitchFamily="18" charset="0"/>
+                <a:cs typeface="Calibri" panose="020F0502020204030204" pitchFamily="34" charset="0"/>
+              </a:rPr>
+              <a:t>homoscedacity</a:t>
+            </a:r>
+            <a:r>
+              <a:rPr lang="en-GB" noProof="0" dirty="0">
+                <a:latin typeface="Calibri" panose="020F0502020204030204" pitchFamily="34" charset="0"/>
+                <a:ea typeface="Cambria Math" panose="02040503050406030204" pitchFamily="18" charset="0"/>
+                <a:cs typeface="Calibri" panose="020F0502020204030204" pitchFamily="34" charset="0"/>
+              </a:rPr>
+              <a:t> </a:t>
+            </a:r>
+          </a:p>
+        </p:txBody>
+      </p:sp>
+      <p:cxnSp>
+        <p:nvCxnSpPr>
+          <p:cNvPr id="182" name="Gewinkelte Verbindung 181">
+            <a:extLst>
+              <a:ext uri="{FF2B5EF4-FFF2-40B4-BE49-F238E27FC236}">
+                <a16:creationId xmlns:a16="http://schemas.microsoft.com/office/drawing/2014/main" id="{2B1DB2AC-11C9-33FF-0221-1D77F8B25059}"/>
+              </a:ext>
+            </a:extLst>
+          </p:cNvPr>
+          <p:cNvCxnSpPr>
+            <a:cxnSpLocks/>
+            <a:stCxn id="7" idx="1"/>
+            <a:endCxn id="8" idx="0"/>
+          </p:cNvCxnSpPr>
+          <p:nvPr/>
+        </p:nvCxnSpPr>
+        <p:spPr>
+          <a:xfrm rot="10800000" flipV="1">
+            <a:off x="2519994" y="499147"/>
+            <a:ext cx="1462504" cy="333639"/>
+          </a:xfrm>
+          <a:prstGeom prst="bentConnector2">
+            <a:avLst/>
+          </a:prstGeom>
+          <a:ln>
+            <a:solidFill>
+              <a:schemeClr val="tx1"/>
+            </a:solidFill>
+            <a:tailEnd type="triangle"/>
+          </a:ln>
+        </p:spPr>
+        <p:style>
+          <a:lnRef idx="1">
+            <a:schemeClr val="accent1"/>
+          </a:lnRef>
+          <a:fillRef idx="0">
+            <a:schemeClr val="accent1"/>
+          </a:fillRef>
+          <a:effectRef idx="0">
+            <a:schemeClr val="accent1"/>
+          </a:effectRef>
+          <a:fontRef idx="minor">
+            <a:schemeClr val="tx1"/>
+          </a:fontRef>
+        </p:style>
+      </p:cxnSp>
+      <p:cxnSp>
+        <p:nvCxnSpPr>
+          <p:cNvPr id="185" name="Gewinkelte Verbindung 184">
+            <a:extLst>
+              <a:ext uri="{FF2B5EF4-FFF2-40B4-BE49-F238E27FC236}">
+                <a16:creationId xmlns:a16="http://schemas.microsoft.com/office/drawing/2014/main" id="{B4465E71-B3EF-DC5B-4146-90C0A29DC7E5}"/>
+              </a:ext>
+            </a:extLst>
+          </p:cNvPr>
+          <p:cNvCxnSpPr>
+            <a:cxnSpLocks/>
+            <a:stCxn id="7" idx="3"/>
+          </p:cNvCxnSpPr>
+          <p:nvPr/>
+        </p:nvCxnSpPr>
+        <p:spPr>
+          <a:xfrm>
+            <a:off x="8287643" y="499148"/>
+            <a:ext cx="1512594" cy="334194"/>
+          </a:xfrm>
+          <a:prstGeom prst="bentConnector3">
+            <a:avLst>
+              <a:gd name="adj1" fmla="val 101482"/>
+            </a:avLst>
+          </a:prstGeom>
+          <a:ln>
+            <a:tailEnd type="triangle"/>
+          </a:ln>
+        </p:spPr>
+        <p:style>
+          <a:lnRef idx="1">
+            <a:schemeClr val="accent1"/>
+          </a:lnRef>
+          <a:fillRef idx="0">
+            <a:schemeClr val="accent1"/>
+          </a:fillRef>
+          <a:effectRef idx="0">
+            <a:schemeClr val="accent1"/>
+          </a:effectRef>
+          <a:fontRef idx="minor">
+            <a:schemeClr val="tx1"/>
+          </a:fontRef>
+        </p:style>
+      </p:cxnSp>
+      <p:cxnSp>
+        <p:nvCxnSpPr>
+          <p:cNvPr id="320" name="Gerade Verbindung mit Pfeil 319">
+            <a:extLst>
+              <a:ext uri="{FF2B5EF4-FFF2-40B4-BE49-F238E27FC236}">
+                <a16:creationId xmlns:a16="http://schemas.microsoft.com/office/drawing/2014/main" id="{541C7AAA-B3A8-9D92-DE50-39F0A7FC41EC}"/>
+              </a:ext>
+            </a:extLst>
+          </p:cNvPr>
+          <p:cNvCxnSpPr>
+            <a:cxnSpLocks/>
+          </p:cNvCxnSpPr>
+          <p:nvPr/>
+        </p:nvCxnSpPr>
+        <p:spPr>
+          <a:xfrm>
+            <a:off x="6189491" y="3402561"/>
+            <a:ext cx="0" cy="1510099"/>
+          </a:xfrm>
+          <a:prstGeom prst="straightConnector1">
+            <a:avLst/>
+          </a:prstGeom>
+          <a:ln>
+            <a:tailEnd type="triangle"/>
+          </a:ln>
+        </p:spPr>
+        <p:style>
+          <a:lnRef idx="1">
+            <a:schemeClr val="accent1"/>
+          </a:lnRef>
+          <a:fillRef idx="0">
+            <a:schemeClr val="accent1"/>
+          </a:fillRef>
+          <a:effectRef idx="0">
+            <a:schemeClr val="accent1"/>
+          </a:effectRef>
+          <a:fontRef idx="minor">
+            <a:schemeClr val="tx1"/>
+          </a:fontRef>
+        </p:style>
+      </p:cxnSp>
+      <p:cxnSp>
+        <p:nvCxnSpPr>
+          <p:cNvPr id="363" name="Gerade Verbindung mit Pfeil 362">
+            <a:extLst>
+              <a:ext uri="{FF2B5EF4-FFF2-40B4-BE49-F238E27FC236}">
+                <a16:creationId xmlns:a16="http://schemas.microsoft.com/office/drawing/2014/main" id="{0620544F-8BDB-0246-4FCA-0500489D7CD2}"/>
+              </a:ext>
+            </a:extLst>
+          </p:cNvPr>
+          <p:cNvCxnSpPr>
+            <a:cxnSpLocks/>
+            <a:stCxn id="19" idx="2"/>
+          </p:cNvCxnSpPr>
+          <p:nvPr/>
+        </p:nvCxnSpPr>
+        <p:spPr>
+          <a:xfrm>
+            <a:off x="2502316" y="3280779"/>
+            <a:ext cx="0" cy="1670905"/>
+          </a:xfrm>
+          <a:prstGeom prst="straightConnector1">
+            <a:avLst/>
+          </a:prstGeom>
+          <a:ln>
+            <a:solidFill>
+              <a:schemeClr val="tx1"/>
+            </a:solidFill>
+            <a:tailEnd type="triangle"/>
+          </a:ln>
+        </p:spPr>
+        <p:style>
+          <a:lnRef idx="1">
+            <a:schemeClr val="accent1"/>
+          </a:lnRef>
+          <a:fillRef idx="0">
+            <a:schemeClr val="accent1"/>
+          </a:fillRef>
+          <a:effectRef idx="0">
+            <a:schemeClr val="accent1"/>
+          </a:effectRef>
+          <a:fontRef idx="minor">
+            <a:schemeClr val="tx1"/>
+          </a:fontRef>
+        </p:style>
+      </p:cxnSp>
+      <p:sp>
+        <p:nvSpPr>
+          <p:cNvPr id="5" name="Textfeld 4">
+            <a:extLst>
+              <a:ext uri="{FF2B5EF4-FFF2-40B4-BE49-F238E27FC236}">
+                <a16:creationId xmlns:a16="http://schemas.microsoft.com/office/drawing/2014/main" id="{C7B9B6B0-E0F5-E570-B1D7-EFDDAC4CD8CE}"/>
+              </a:ext>
+            </a:extLst>
+          </p:cNvPr>
+          <p:cNvSpPr txBox="1"/>
+          <p:nvPr/>
+        </p:nvSpPr>
+        <p:spPr>
+          <a:xfrm>
+            <a:off x="305981" y="6396835"/>
+            <a:ext cx="1868481" cy="281831"/>
+          </a:xfrm>
+          <a:prstGeom prst="rect">
+            <a:avLst/>
+          </a:prstGeom>
+          <a:solidFill>
+            <a:schemeClr val="accent1">
+              <a:lumMod val="40000"/>
+              <a:lumOff val="60000"/>
+            </a:schemeClr>
+          </a:solidFill>
+          <a:ln w="12700">
+            <a:noFill/>
+          </a:ln>
+        </p:spPr>
+        <p:txBody>
+          <a:bodyPr wrap="square">
+            <a:spAutoFit/>
+          </a:bodyPr>
+          <a:lstStyle>
+            <a:defPPr>
+              <a:defRPr lang="de-DE"/>
+            </a:defPPr>
+            <a:lvl1pPr algn="ctr">
+              <a:defRPr sz="1200"/>
+            </a:lvl1pPr>
+          </a:lstStyle>
+          <a:p>
+            <a:r>
+              <a:rPr lang="en-GB" noProof="0" dirty="0">
+                <a:latin typeface="Calibri" panose="020F0502020204030204" pitchFamily="34" charset="0"/>
+                <a:ea typeface="Cambria Math" panose="02040503050406030204" pitchFamily="18" charset="0"/>
+                <a:cs typeface="Calibri" panose="020F0502020204030204" pitchFamily="34" charset="0"/>
+              </a:rPr>
+              <a:t>non-parametric tests </a:t>
+            </a:r>
+          </a:p>
+        </p:txBody>
+      </p:sp>
+      <p:sp>
+        <p:nvSpPr>
+          <p:cNvPr id="148" name="Textfeld 147">
+            <a:extLst>
+              <a:ext uri="{FF2B5EF4-FFF2-40B4-BE49-F238E27FC236}">
+                <a16:creationId xmlns:a16="http://schemas.microsoft.com/office/drawing/2014/main" id="{2C4D11F2-4EFC-38E2-5A76-DAD361E4EF56}"/>
+              </a:ext>
+            </a:extLst>
+          </p:cNvPr>
+          <p:cNvSpPr txBox="1"/>
+          <p:nvPr/>
+        </p:nvSpPr>
+        <p:spPr>
+          <a:xfrm>
+            <a:off x="305981" y="5974839"/>
+            <a:ext cx="1859022" cy="281831"/>
+          </a:xfrm>
+          <a:prstGeom prst="rect">
+            <a:avLst/>
+          </a:prstGeom>
+          <a:solidFill>
+            <a:schemeClr val="accent4">
+              <a:alpha val="19758"/>
+            </a:schemeClr>
+          </a:solidFill>
+          <a:ln w="12700">
+            <a:noFill/>
+          </a:ln>
+        </p:spPr>
+        <p:txBody>
+          <a:bodyPr wrap="square">
+            <a:spAutoFit/>
+          </a:bodyPr>
+          <a:lstStyle/>
+          <a:p>
+            <a:pPr algn="ctr"/>
+            <a:r>
+              <a:rPr lang="en-GB" sz="1200" noProof="0" dirty="0">
+                <a:latin typeface="Calibri" panose="020F0502020204030204" pitchFamily="34" charset="0"/>
+                <a:ea typeface="Cambria Math" panose="02040503050406030204" pitchFamily="18" charset="0"/>
+                <a:cs typeface="Calibri" panose="020F0502020204030204" pitchFamily="34" charset="0"/>
+              </a:rPr>
+              <a:t>parametric tests</a:t>
+            </a:r>
+          </a:p>
+        </p:txBody>
+      </p:sp>
+      <mc:AlternateContent xmlns:mc="http://schemas.openxmlformats.org/markup-compatibility/2006" xmlns:a14="http://schemas.microsoft.com/office/drawing/2010/main">
+        <mc:Choice Requires="a14">
+          <p:sp>
+            <p:nvSpPr>
+              <p:cNvPr id="467" name="Textfeld 466">
+                <a:extLst>
+                  <a:ext uri="{FF2B5EF4-FFF2-40B4-BE49-F238E27FC236}">
+                    <a16:creationId xmlns:a16="http://schemas.microsoft.com/office/drawing/2014/main" id="{29F8B6C9-4A2D-DF13-DB81-DAAAFFA4FF1C}"/>
+                  </a:ext>
+                </a:extLst>
+              </p:cNvPr>
+              <p:cNvSpPr txBox="1"/>
+              <p:nvPr/>
+            </p:nvSpPr>
+            <p:spPr>
+              <a:xfrm>
+                <a:off x="2248265" y="5954905"/>
+                <a:ext cx="2538462" cy="281831"/>
+              </a:xfrm>
+              <a:prstGeom prst="rect">
+                <a:avLst/>
+              </a:prstGeom>
+              <a:noFill/>
+              <a:ln w="12700">
+                <a:solidFill>
+                  <a:schemeClr val="tx1"/>
+                </a:solidFill>
+              </a:ln>
+            </p:spPr>
+            <p:txBody>
+              <a:bodyPr wrap="square">
+                <a:spAutoFit/>
+              </a:bodyPr>
+              <a:lstStyle>
+                <a:defPPr>
+                  <a:defRPr lang="de-DE"/>
+                </a:defPPr>
+                <a:lvl1pPr algn="ctr">
+                  <a:defRPr sz="1200"/>
+                </a:lvl1pPr>
+              </a:lstStyle>
+              <a:p>
+                <a:r>
+                  <a:rPr lang="en-GB" dirty="0">
+                    <a:latin typeface="Calibri" panose="020F0502020204030204" pitchFamily="34" charset="0"/>
+                    <a:ea typeface="Cambria Math" panose="02040503050406030204" pitchFamily="18" charset="0"/>
+                    <a:cs typeface="Calibri" panose="020F0502020204030204" pitchFamily="34" charset="0"/>
+                  </a:rPr>
+                  <a:t>predictor</a:t>
+                </a:r>
+                <a:r>
+                  <a:rPr lang="en-GB" noProof="0" dirty="0">
+                    <a:latin typeface="Calibri" panose="020F0502020204030204" pitchFamily="34" charset="0"/>
+                    <a:ea typeface="Cambria Math" panose="02040503050406030204" pitchFamily="18" charset="0"/>
+                    <a:cs typeface="Calibri" panose="020F0502020204030204" pitchFamily="34" charset="0"/>
+                  </a:rPr>
+                  <a:t> with </a:t>
+                </a:r>
+                <a14:m>
+                  <m:oMath xmlns:m="http://schemas.openxmlformats.org/officeDocument/2006/math">
+                    <m:r>
+                      <a:rPr lang="en-GB" i="1" noProof="0" dirty="0" smtClean="0">
+                        <a:latin typeface="Cambria Math" panose="02040503050406030204" pitchFamily="18" charset="0"/>
+                        <a:ea typeface="Cambria Math" panose="02040503050406030204" pitchFamily="18" charset="0"/>
+                        <a:cs typeface="Calibri" panose="020F0502020204030204" pitchFamily="34" charset="0"/>
+                      </a:rPr>
+                      <m:t>𝑁</m:t>
+                    </m:r>
+                    <m:r>
+                      <a:rPr lang="en-GB" i="1" noProof="0" dirty="0" smtClean="0">
+                        <a:latin typeface="Cambria Math" panose="02040503050406030204" pitchFamily="18" charset="0"/>
+                        <a:ea typeface="Cambria Math" panose="02040503050406030204" pitchFamily="18" charset="0"/>
+                        <a:cs typeface="Calibri" panose="020F0502020204030204" pitchFamily="34" charset="0"/>
+                      </a:rPr>
+                      <m:t>=2</m:t>
+                    </m:r>
+                  </m:oMath>
+                </a14:m>
+                <a:r>
+                  <a:rPr lang="en-GB" noProof="0" dirty="0">
+                    <a:latin typeface="Calibri" panose="020F0502020204030204" pitchFamily="34" charset="0"/>
+                    <a:ea typeface="Cambria Math" panose="02040503050406030204" pitchFamily="18" charset="0"/>
+                    <a:cs typeface="Calibri" panose="020F0502020204030204" pitchFamily="34" charset="0"/>
+                  </a:rPr>
+                  <a:t> levels </a:t>
+                </a:r>
+              </a:p>
+            </p:txBody>
+          </p:sp>
+        </mc:Choice>
+        <mc:Fallback xmlns="">
+          <p:sp>
+            <p:nvSpPr>
+              <p:cNvPr id="467" name="Textfeld 466">
+                <a:extLst>
+                  <a:ext uri="{FF2B5EF4-FFF2-40B4-BE49-F238E27FC236}">
+                    <a16:creationId xmlns:a16="http://schemas.microsoft.com/office/drawing/2014/main" id="{9F3DB9C3-A6B3-DC3B-D937-ACB248DD1895}"/>
+                  </a:ext>
+                </a:extLst>
+              </p:cNvPr>
+              <p:cNvSpPr txBox="1">
+                <a:spLocks noRot="1" noChangeAspect="1" noMove="1" noResize="1" noEditPoints="1" noAdjustHandles="1" noChangeArrowheads="1" noChangeShapeType="1" noTextEdit="1"/>
+              </p:cNvSpPr>
+              <p:nvPr/>
+            </p:nvSpPr>
+            <p:spPr>
+              <a:xfrm>
+                <a:off x="2248265" y="5954905"/>
+                <a:ext cx="2538462" cy="281831"/>
+              </a:xfrm>
+              <a:prstGeom prst="rect">
+                <a:avLst/>
+              </a:prstGeom>
+              <a:blipFill>
+                <a:blip r:embed="rId19"/>
+                <a:stretch>
+                  <a:fillRect b="-8333"/>
+                </a:stretch>
+              </a:blipFill>
+              <a:ln w="12700">
+                <a:solidFill>
+                  <a:schemeClr val="tx1"/>
+                </a:solidFill>
+              </a:ln>
+            </p:spPr>
+            <p:txBody>
+              <a:bodyPr/>
+              <a:lstStyle/>
+              <a:p>
+                <a:r>
+                  <a:rPr lang="de-DE">
+                    <a:noFill/>
+                  </a:rPr>
+                  <a:t> </a:t>
+                </a:r>
+              </a:p>
+            </p:txBody>
+          </p:sp>
+        </mc:Fallback>
+      </mc:AlternateContent>
+      <mc:AlternateContent xmlns:mc="http://schemas.openxmlformats.org/markup-compatibility/2006" xmlns:a14="http://schemas.microsoft.com/office/drawing/2010/main">
+        <mc:Choice Requires="a14">
+          <p:sp>
+            <p:nvSpPr>
+              <p:cNvPr id="468" name="Textfeld 467">
+                <a:extLst>
+                  <a:ext uri="{FF2B5EF4-FFF2-40B4-BE49-F238E27FC236}">
+                    <a16:creationId xmlns:a16="http://schemas.microsoft.com/office/drawing/2014/main" id="{98215D10-AA82-4137-BC4D-73F96F508950}"/>
+                  </a:ext>
+                </a:extLst>
+              </p:cNvPr>
+              <p:cNvSpPr txBox="1"/>
+              <p:nvPr/>
+            </p:nvSpPr>
+            <p:spPr>
+              <a:xfrm>
+                <a:off x="2238790" y="6376901"/>
+                <a:ext cx="2543546" cy="276999"/>
+              </a:xfrm>
+              <a:prstGeom prst="rect">
+                <a:avLst/>
+              </a:prstGeom>
+              <a:noFill/>
+              <a:ln w="12700">
+                <a:solidFill>
+                  <a:schemeClr val="accent1">
+                    <a:lumMod val="40000"/>
+                    <a:lumOff val="60000"/>
+                  </a:schemeClr>
+                </a:solidFill>
+              </a:ln>
+            </p:spPr>
+            <p:txBody>
+              <a:bodyPr wrap="square">
+                <a:spAutoFit/>
+              </a:bodyPr>
+              <a:lstStyle>
+                <a:defPPr>
+                  <a:defRPr lang="de-DE"/>
+                </a:defPPr>
+                <a:lvl1pPr algn="ctr">
+                  <a:defRPr sz="1200"/>
+                </a:lvl1pPr>
+              </a:lstStyle>
+              <a:p>
+                <a:r>
+                  <a:rPr lang="en-GB" dirty="0">
+                    <a:latin typeface="Calibri" panose="020F0502020204030204" pitchFamily="34" charset="0"/>
+                    <a:ea typeface="Cambria Math" panose="02040503050406030204" pitchFamily="18" charset="0"/>
+                    <a:cs typeface="Calibri" panose="020F0502020204030204" pitchFamily="34" charset="0"/>
+                  </a:rPr>
+                  <a:t>predictor</a:t>
+                </a:r>
+                <a:r>
+                  <a:rPr lang="en-GB" noProof="0" dirty="0">
+                    <a:latin typeface="Calibri" panose="020F0502020204030204" pitchFamily="34" charset="0"/>
+                    <a:ea typeface="Cambria Math" panose="02040503050406030204" pitchFamily="18" charset="0"/>
+                    <a:cs typeface="Calibri" panose="020F0502020204030204" pitchFamily="34" charset="0"/>
+                  </a:rPr>
+                  <a:t> with </a:t>
+                </a:r>
+                <a14:m>
+                  <m:oMath xmlns:m="http://schemas.openxmlformats.org/officeDocument/2006/math">
+                    <m:r>
+                      <a:rPr lang="en-GB" i="1" noProof="0" dirty="0" smtClean="0">
+                        <a:latin typeface="Cambria Math" panose="02040503050406030204" pitchFamily="18" charset="0"/>
+                        <a:ea typeface="Cambria Math" panose="02040503050406030204" pitchFamily="18" charset="0"/>
+                        <a:cs typeface="Calibri" panose="020F0502020204030204" pitchFamily="34" charset="0"/>
+                      </a:rPr>
+                      <m:t>𝑁</m:t>
+                    </m:r>
+                    <m:r>
+                      <a:rPr lang="en-GB" i="1" noProof="0" dirty="0" smtClean="0">
+                        <a:latin typeface="Cambria Math" panose="02040503050406030204" pitchFamily="18" charset="0"/>
+                        <a:ea typeface="Cambria Math" panose="02040503050406030204" pitchFamily="18" charset="0"/>
+                        <a:cs typeface="Calibri" panose="020F0502020204030204" pitchFamily="34" charset="0"/>
+                      </a:rPr>
+                      <m:t>&gt; 2 </m:t>
+                    </m:r>
+                  </m:oMath>
+                </a14:m>
+                <a:r>
+                  <a:rPr lang="en-GB" noProof="0" dirty="0">
+                    <a:latin typeface="Calibri" panose="020F0502020204030204" pitchFamily="34" charset="0"/>
+                    <a:ea typeface="Cambria Math" panose="02040503050406030204" pitchFamily="18" charset="0"/>
+                    <a:cs typeface="Calibri" panose="020F0502020204030204" pitchFamily="34" charset="0"/>
+                  </a:rPr>
+                  <a:t>levels </a:t>
+                </a:r>
+              </a:p>
+            </p:txBody>
+          </p:sp>
+        </mc:Choice>
+        <mc:Fallback xmlns="">
+          <p:sp>
+            <p:nvSpPr>
+              <p:cNvPr id="468" name="Textfeld 467">
+                <a:extLst>
+                  <a:ext uri="{FF2B5EF4-FFF2-40B4-BE49-F238E27FC236}">
+                    <a16:creationId xmlns:a16="http://schemas.microsoft.com/office/drawing/2014/main" id="{706DE281-AE3D-2689-6BA1-030155DAFDD8}"/>
+                  </a:ext>
+                </a:extLst>
+              </p:cNvPr>
+              <p:cNvSpPr txBox="1">
+                <a:spLocks noRot="1" noChangeAspect="1" noMove="1" noResize="1" noEditPoints="1" noAdjustHandles="1" noChangeArrowheads="1" noChangeShapeType="1" noTextEdit="1"/>
+              </p:cNvSpPr>
+              <p:nvPr/>
+            </p:nvSpPr>
+            <p:spPr>
+              <a:xfrm>
+                <a:off x="2238790" y="6376901"/>
+                <a:ext cx="2543546" cy="276999"/>
+              </a:xfrm>
+              <a:prstGeom prst="rect">
+                <a:avLst/>
+              </a:prstGeom>
+              <a:blipFill>
+                <a:blip r:embed="rId20"/>
+                <a:stretch>
+                  <a:fillRect b="-12500"/>
+                </a:stretch>
+              </a:blipFill>
+              <a:ln w="12700">
+                <a:solidFill>
+                  <a:schemeClr val="accent1">
+                    <a:lumMod val="40000"/>
+                    <a:lumOff val="60000"/>
+                  </a:schemeClr>
+                </a:solidFill>
+              </a:ln>
+            </p:spPr>
+            <p:txBody>
+              <a:bodyPr/>
+              <a:lstStyle/>
+              <a:p>
+                <a:r>
+                  <a:rPr lang="de-DE">
+                    <a:noFill/>
+                  </a:rPr>
+                  <a:t> </a:t>
+                </a:r>
+              </a:p>
+            </p:txBody>
+          </p:sp>
+        </mc:Fallback>
+      </mc:AlternateContent>
+      <p:sp>
+        <p:nvSpPr>
+          <p:cNvPr id="477" name="Textfeld 476">
+            <a:extLst>
+              <a:ext uri="{FF2B5EF4-FFF2-40B4-BE49-F238E27FC236}">
+                <a16:creationId xmlns:a16="http://schemas.microsoft.com/office/drawing/2014/main" id="{694F209D-AE15-3C11-6D5D-136CF693359B}"/>
+              </a:ext>
+            </a:extLst>
+          </p:cNvPr>
+          <p:cNvSpPr txBox="1"/>
+          <p:nvPr/>
+        </p:nvSpPr>
+        <p:spPr>
+          <a:xfrm>
+            <a:off x="305981" y="5743382"/>
+            <a:ext cx="1091245" cy="281831"/>
+          </a:xfrm>
+          <a:prstGeom prst="rect">
+            <a:avLst/>
+          </a:prstGeom>
+          <a:noFill/>
+          <a:ln w="12700">
+            <a:noFill/>
+          </a:ln>
+        </p:spPr>
+        <p:txBody>
+          <a:bodyPr wrap="square">
+            <a:spAutoFit/>
+          </a:bodyPr>
+          <a:lstStyle>
+            <a:defPPr>
+              <a:defRPr lang="de-DE"/>
+            </a:defPPr>
+            <a:lvl1pPr algn="ctr">
+              <a:defRPr sz="1200"/>
+            </a:lvl1pPr>
+          </a:lstStyle>
+          <a:p>
+            <a:pPr algn="l"/>
+            <a:r>
+              <a:rPr lang="en-GB" noProof="0" dirty="0">
+                <a:latin typeface="Calibri" panose="020F0502020204030204" pitchFamily="34" charset="0"/>
+                <a:ea typeface="Cambria Math" panose="02040503050406030204" pitchFamily="18" charset="0"/>
+                <a:cs typeface="Calibri" panose="020F0502020204030204" pitchFamily="34" charset="0"/>
+              </a:rPr>
+              <a:t>Colour code: </a:t>
+            </a:r>
+          </a:p>
+        </p:txBody>
+      </p:sp>
+      <p:grpSp>
+        <p:nvGrpSpPr>
+          <p:cNvPr id="491" name="Gruppieren 490">
+            <a:extLst>
+              <a:ext uri="{FF2B5EF4-FFF2-40B4-BE49-F238E27FC236}">
+                <a16:creationId xmlns:a16="http://schemas.microsoft.com/office/drawing/2014/main" id="{3BEF4251-E783-6997-81AF-73FA2A62F8C2}"/>
+              </a:ext>
+            </a:extLst>
+          </p:cNvPr>
+          <p:cNvGrpSpPr/>
+          <p:nvPr/>
+        </p:nvGrpSpPr>
+        <p:grpSpPr>
+          <a:xfrm>
+            <a:off x="1666842" y="1127125"/>
+            <a:ext cx="1785240" cy="542165"/>
+            <a:chOff x="2719572" y="1536945"/>
+            <a:chExt cx="1289076" cy="305400"/>
+          </a:xfrm>
+        </p:grpSpPr>
+        <p:cxnSp>
+          <p:nvCxnSpPr>
+            <p:cNvPr id="492" name="Gerade Verbindung mit Pfeil 491">
+              <a:extLst>
+                <a:ext uri="{FF2B5EF4-FFF2-40B4-BE49-F238E27FC236}">
+                  <a16:creationId xmlns:a16="http://schemas.microsoft.com/office/drawing/2014/main" id="{C2D3EC66-2791-4F1C-501D-1BB263EEE32A}"/>
+                </a:ext>
+              </a:extLst>
+            </p:cNvPr>
+            <p:cNvCxnSpPr>
+              <a:cxnSpLocks/>
+            </p:cNvCxnSpPr>
+            <p:nvPr/>
+          </p:nvCxnSpPr>
+          <p:spPr>
+            <a:xfrm flipH="1">
+              <a:off x="2719572" y="1536945"/>
+              <a:ext cx="639486" cy="305400"/>
+            </a:xfrm>
+            <a:prstGeom prst="straightConnector1">
+              <a:avLst/>
+            </a:prstGeom>
+            <a:ln>
+              <a:solidFill>
+                <a:schemeClr val="tx1"/>
+              </a:solidFill>
+              <a:tailEnd type="triangle"/>
+            </a:ln>
+          </p:spPr>
+          <p:style>
+            <a:lnRef idx="1">
+              <a:schemeClr val="accent1"/>
+            </a:lnRef>
+            <a:fillRef idx="0">
+              <a:schemeClr val="accent1"/>
+            </a:fillRef>
+            <a:effectRef idx="0">
+              <a:schemeClr val="accent1"/>
+            </a:effectRef>
+            <a:fontRef idx="minor">
+              <a:schemeClr val="tx1"/>
+            </a:fontRef>
+          </p:style>
+        </p:cxnSp>
+        <p:cxnSp>
+          <p:nvCxnSpPr>
+            <p:cNvPr id="493" name="Gerade Verbindung mit Pfeil 492">
+              <a:extLst>
+                <a:ext uri="{FF2B5EF4-FFF2-40B4-BE49-F238E27FC236}">
+                  <a16:creationId xmlns:a16="http://schemas.microsoft.com/office/drawing/2014/main" id="{625E0312-D230-8901-EE53-C7074AB39DF3}"/>
+                </a:ext>
+              </a:extLst>
+            </p:cNvPr>
+            <p:cNvCxnSpPr>
+              <a:cxnSpLocks/>
+            </p:cNvCxnSpPr>
+            <p:nvPr/>
+          </p:nvCxnSpPr>
+          <p:spPr>
+            <a:xfrm>
+              <a:off x="3359058" y="1536945"/>
+              <a:ext cx="649590" cy="305400"/>
+            </a:xfrm>
+            <a:prstGeom prst="straightConnector1">
+              <a:avLst/>
+            </a:prstGeom>
+            <a:ln>
+              <a:solidFill>
+                <a:schemeClr val="tx1"/>
+              </a:solidFill>
+              <a:tailEnd type="triangle"/>
+            </a:ln>
+          </p:spPr>
+          <p:style>
+            <a:lnRef idx="1">
+              <a:schemeClr val="accent1"/>
+            </a:lnRef>
+            <a:fillRef idx="0">
+              <a:schemeClr val="accent1"/>
+            </a:fillRef>
+            <a:effectRef idx="0">
+              <a:schemeClr val="accent1"/>
+            </a:effectRef>
+            <a:fontRef idx="minor">
+              <a:schemeClr val="tx1"/>
+            </a:fontRef>
+          </p:style>
+        </p:cxnSp>
+      </p:grpSp>
+      <p:cxnSp>
+        <p:nvCxnSpPr>
+          <p:cNvPr id="461" name="Gerade Verbindung mit Pfeil 460">
+            <a:extLst>
+              <a:ext uri="{FF2B5EF4-FFF2-40B4-BE49-F238E27FC236}">
+                <a16:creationId xmlns:a16="http://schemas.microsoft.com/office/drawing/2014/main" id="{B8535EFA-6F94-0EE5-B427-A5E577793C6E}"/>
+              </a:ext>
+            </a:extLst>
+          </p:cNvPr>
+          <p:cNvCxnSpPr>
+            <a:cxnSpLocks/>
+          </p:cNvCxnSpPr>
+          <p:nvPr/>
+        </p:nvCxnSpPr>
+        <p:spPr>
+          <a:xfrm flipH="1">
+            <a:off x="8287643" y="4758610"/>
+            <a:ext cx="4391" cy="180489"/>
+          </a:xfrm>
+          <a:prstGeom prst="straightConnector1">
+            <a:avLst/>
+          </a:prstGeom>
+          <a:ln>
+            <a:solidFill>
+              <a:schemeClr val="accent1"/>
+            </a:solidFill>
+            <a:tailEnd type="triangle"/>
+          </a:ln>
+        </p:spPr>
+        <p:style>
+          <a:lnRef idx="1">
+            <a:schemeClr val="accent1"/>
+          </a:lnRef>
+          <a:fillRef idx="0">
+            <a:schemeClr val="accent1"/>
+          </a:fillRef>
+          <a:effectRef idx="0">
+            <a:schemeClr val="accent1"/>
+          </a:effectRef>
+          <a:fontRef idx="minor">
+            <a:schemeClr val="tx1"/>
+          </a:fontRef>
+        </p:style>
+      </p:cxnSp>
+      <p:cxnSp>
+        <p:nvCxnSpPr>
+          <p:cNvPr id="465" name="Gerade Verbindung mit Pfeil 464">
+            <a:extLst>
+              <a:ext uri="{FF2B5EF4-FFF2-40B4-BE49-F238E27FC236}">
+                <a16:creationId xmlns:a16="http://schemas.microsoft.com/office/drawing/2014/main" id="{D06C3080-1070-97B4-78A3-EB48C636F88F}"/>
+              </a:ext>
+            </a:extLst>
+          </p:cNvPr>
+          <p:cNvCxnSpPr>
+            <a:cxnSpLocks/>
+          </p:cNvCxnSpPr>
+          <p:nvPr/>
+        </p:nvCxnSpPr>
+        <p:spPr>
+          <a:xfrm flipH="1">
+            <a:off x="9767473" y="4763372"/>
+            <a:ext cx="4391" cy="180489"/>
+          </a:xfrm>
+          <a:prstGeom prst="straightConnector1">
+            <a:avLst/>
+          </a:prstGeom>
+          <a:ln>
+            <a:solidFill>
+              <a:schemeClr val="accent1"/>
+            </a:solidFill>
+            <a:tailEnd type="triangle"/>
+          </a:ln>
+        </p:spPr>
+        <p:style>
+          <a:lnRef idx="1">
+            <a:schemeClr val="accent1"/>
+          </a:lnRef>
+          <a:fillRef idx="0">
+            <a:schemeClr val="accent1"/>
+          </a:fillRef>
+          <a:effectRef idx="0">
+            <a:schemeClr val="accent1"/>
+          </a:effectRef>
+          <a:fontRef idx="minor">
+            <a:schemeClr val="tx1"/>
+          </a:fontRef>
+        </p:style>
+      </p:cxnSp>
+      <p:cxnSp>
+        <p:nvCxnSpPr>
+          <p:cNvPr id="466" name="Gerade Verbindung mit Pfeil 465">
+            <a:extLst>
+              <a:ext uri="{FF2B5EF4-FFF2-40B4-BE49-F238E27FC236}">
+                <a16:creationId xmlns:a16="http://schemas.microsoft.com/office/drawing/2014/main" id="{B9B089EB-341B-4C1A-279C-AEFB2282C6A0}"/>
+              </a:ext>
+            </a:extLst>
+          </p:cNvPr>
+          <p:cNvCxnSpPr>
+            <a:cxnSpLocks/>
+          </p:cNvCxnSpPr>
+          <p:nvPr/>
+        </p:nvCxnSpPr>
+        <p:spPr>
+          <a:xfrm flipH="1">
+            <a:off x="8287643" y="5246480"/>
+            <a:ext cx="4391" cy="180489"/>
+          </a:xfrm>
+          <a:prstGeom prst="straightConnector1">
+            <a:avLst/>
+          </a:prstGeom>
+          <a:ln>
+            <a:solidFill>
+              <a:schemeClr val="accent1"/>
+            </a:solidFill>
+            <a:tailEnd type="triangle"/>
+          </a:ln>
+        </p:spPr>
+        <p:style>
+          <a:lnRef idx="1">
+            <a:schemeClr val="accent1"/>
+          </a:lnRef>
+          <a:fillRef idx="0">
+            <a:schemeClr val="accent1"/>
+          </a:fillRef>
+          <a:effectRef idx="0">
+            <a:schemeClr val="accent1"/>
+          </a:effectRef>
+          <a:fontRef idx="minor">
+            <a:schemeClr val="tx1"/>
+          </a:fontRef>
+        </p:style>
+      </p:cxnSp>
+      <p:cxnSp>
+        <p:nvCxnSpPr>
+          <p:cNvPr id="469" name="Gerade Verbindung mit Pfeil 468">
+            <a:extLst>
+              <a:ext uri="{FF2B5EF4-FFF2-40B4-BE49-F238E27FC236}">
+                <a16:creationId xmlns:a16="http://schemas.microsoft.com/office/drawing/2014/main" id="{F87DBCB6-F331-0B0E-92E8-49B95251FE7D}"/>
+              </a:ext>
+            </a:extLst>
+          </p:cNvPr>
+          <p:cNvCxnSpPr>
+            <a:cxnSpLocks/>
+          </p:cNvCxnSpPr>
+          <p:nvPr/>
+        </p:nvCxnSpPr>
+        <p:spPr>
+          <a:xfrm flipH="1">
+            <a:off x="9767473" y="5251947"/>
+            <a:ext cx="4391" cy="180489"/>
+          </a:xfrm>
+          <a:prstGeom prst="straightConnector1">
+            <a:avLst/>
+          </a:prstGeom>
+          <a:ln>
+            <a:solidFill>
+              <a:schemeClr val="accent1"/>
+            </a:solidFill>
+            <a:tailEnd type="triangle"/>
+          </a:ln>
+        </p:spPr>
+        <p:style>
+          <a:lnRef idx="1">
+            <a:schemeClr val="accent1"/>
+          </a:lnRef>
+          <a:fillRef idx="0">
+            <a:schemeClr val="accent1"/>
+          </a:fillRef>
+          <a:effectRef idx="0">
+            <a:schemeClr val="accent1"/>
+          </a:effectRef>
+          <a:fontRef idx="minor">
+            <a:schemeClr val="tx1"/>
+          </a:fontRef>
+        </p:style>
+      </p:cxnSp>
+      <p:cxnSp>
+        <p:nvCxnSpPr>
+          <p:cNvPr id="470" name="Gerade Verbindung mit Pfeil 469">
+            <a:extLst>
+              <a:ext uri="{FF2B5EF4-FFF2-40B4-BE49-F238E27FC236}">
+                <a16:creationId xmlns:a16="http://schemas.microsoft.com/office/drawing/2014/main" id="{C02C6353-A580-F09F-5950-72AFB94CF120}"/>
+              </a:ext>
+            </a:extLst>
+          </p:cNvPr>
+          <p:cNvCxnSpPr>
+            <a:cxnSpLocks/>
+          </p:cNvCxnSpPr>
+          <p:nvPr/>
+        </p:nvCxnSpPr>
+        <p:spPr>
+          <a:xfrm flipH="1">
+            <a:off x="6182061" y="5264410"/>
+            <a:ext cx="4391" cy="180489"/>
+          </a:xfrm>
+          <a:prstGeom prst="straightConnector1">
+            <a:avLst/>
+          </a:prstGeom>
+          <a:ln>
+            <a:solidFill>
+              <a:schemeClr val="accent1"/>
+            </a:solidFill>
+            <a:tailEnd type="triangle"/>
+          </a:ln>
+        </p:spPr>
+        <p:style>
+          <a:lnRef idx="1">
+            <a:schemeClr val="accent1"/>
+          </a:lnRef>
+          <a:fillRef idx="0">
+            <a:schemeClr val="accent1"/>
+          </a:fillRef>
+          <a:effectRef idx="0">
+            <a:schemeClr val="accent1"/>
+          </a:effectRef>
+          <a:fontRef idx="minor">
+            <a:schemeClr val="tx1"/>
+          </a:fontRef>
+        </p:style>
+      </p:cxnSp>
+      <p:cxnSp>
+        <p:nvCxnSpPr>
+          <p:cNvPr id="496" name="Gerade Verbindung mit Pfeil 495">
+            <a:extLst>
+              <a:ext uri="{FF2B5EF4-FFF2-40B4-BE49-F238E27FC236}">
+                <a16:creationId xmlns:a16="http://schemas.microsoft.com/office/drawing/2014/main" id="{8B851C1B-D9B5-D945-19A5-F7938D5CD3A1}"/>
+              </a:ext>
+            </a:extLst>
+          </p:cNvPr>
+          <p:cNvCxnSpPr>
+            <a:cxnSpLocks/>
+          </p:cNvCxnSpPr>
+          <p:nvPr/>
+        </p:nvCxnSpPr>
+        <p:spPr>
+          <a:xfrm flipH="1">
+            <a:off x="8946555" y="3270049"/>
+            <a:ext cx="7967" cy="597516"/>
+          </a:xfrm>
+          <a:prstGeom prst="straightConnector1">
+            <a:avLst/>
+          </a:prstGeom>
+          <a:ln>
+            <a:solidFill>
+              <a:schemeClr val="accent1"/>
+            </a:solidFill>
+            <a:tailEnd type="triangle"/>
+          </a:ln>
+        </p:spPr>
+        <p:style>
+          <a:lnRef idx="1">
+            <a:schemeClr val="accent1"/>
+          </a:lnRef>
+          <a:fillRef idx="0">
+            <a:schemeClr val="accent1"/>
+          </a:fillRef>
+          <a:effectRef idx="0">
+            <a:schemeClr val="accent1"/>
+          </a:effectRef>
+          <a:fontRef idx="minor">
+            <a:schemeClr val="tx1"/>
+          </a:fontRef>
+        </p:style>
+      </p:cxnSp>
+      <p:cxnSp>
+        <p:nvCxnSpPr>
+          <p:cNvPr id="77" name="Gerade Verbindung mit Pfeil 76">
+            <a:extLst>
+              <a:ext uri="{FF2B5EF4-FFF2-40B4-BE49-F238E27FC236}">
+                <a16:creationId xmlns:a16="http://schemas.microsoft.com/office/drawing/2014/main" id="{E58B5024-72E9-BF24-2F70-4C93506905A1}"/>
+              </a:ext>
+            </a:extLst>
+          </p:cNvPr>
+          <p:cNvCxnSpPr>
+            <a:cxnSpLocks/>
+            <a:stCxn id="9" idx="2"/>
+            <a:endCxn id="6" idx="0"/>
+          </p:cNvCxnSpPr>
+          <p:nvPr/>
+        </p:nvCxnSpPr>
+        <p:spPr>
+          <a:xfrm>
+            <a:off x="7779530" y="1109786"/>
+            <a:ext cx="1670" cy="1091532"/>
+          </a:xfrm>
+          <a:prstGeom prst="straightConnector1">
+            <a:avLst/>
+          </a:prstGeom>
+          <a:ln>
+            <a:solidFill>
+              <a:schemeClr val="accent1"/>
+            </a:solidFill>
+            <a:tailEnd type="triangle"/>
+          </a:ln>
+        </p:spPr>
+        <p:style>
+          <a:lnRef idx="1">
+            <a:schemeClr val="accent1"/>
+          </a:lnRef>
+          <a:fillRef idx="0">
+            <a:schemeClr val="accent1"/>
+          </a:fillRef>
+          <a:effectRef idx="0">
+            <a:schemeClr val="accent1"/>
+          </a:effectRef>
+          <a:fontRef idx="minor">
+            <a:schemeClr val="tx1"/>
+          </a:fontRef>
+        </p:style>
+      </p:cxnSp>
+      <p:cxnSp>
+        <p:nvCxnSpPr>
+          <p:cNvPr id="78" name="Gerade Verbindung mit Pfeil 77">
+            <a:extLst>
+              <a:ext uri="{FF2B5EF4-FFF2-40B4-BE49-F238E27FC236}">
+                <a16:creationId xmlns:a16="http://schemas.microsoft.com/office/drawing/2014/main" id="{A976BA90-C577-0271-8A7E-30EDF616A86D}"/>
+              </a:ext>
+            </a:extLst>
+          </p:cNvPr>
+          <p:cNvCxnSpPr>
+            <a:cxnSpLocks/>
+          </p:cNvCxnSpPr>
+          <p:nvPr/>
+        </p:nvCxnSpPr>
+        <p:spPr>
+          <a:xfrm flipH="1">
+            <a:off x="1572292" y="1996567"/>
+            <a:ext cx="4391" cy="180489"/>
+          </a:xfrm>
+          <a:prstGeom prst="straightConnector1">
+            <a:avLst/>
+          </a:prstGeom>
+          <a:ln>
+            <a:solidFill>
+              <a:schemeClr val="tx1"/>
+            </a:solidFill>
+            <a:tailEnd type="triangle"/>
+          </a:ln>
+        </p:spPr>
+        <p:style>
+          <a:lnRef idx="1">
+            <a:schemeClr val="accent1"/>
+          </a:lnRef>
+          <a:fillRef idx="0">
+            <a:schemeClr val="accent1"/>
+          </a:fillRef>
+          <a:effectRef idx="0">
+            <a:schemeClr val="accent1"/>
+          </a:effectRef>
+          <a:fontRef idx="minor">
+            <a:schemeClr val="tx1"/>
+          </a:fontRef>
+        </p:style>
+      </p:cxnSp>
+      <p:sp>
+        <p:nvSpPr>
+          <p:cNvPr id="79" name="Rechteck 78">
+            <a:extLst>
+              <a:ext uri="{FF2B5EF4-FFF2-40B4-BE49-F238E27FC236}">
+                <a16:creationId xmlns:a16="http://schemas.microsoft.com/office/drawing/2014/main" id="{DC688577-4FC9-203C-8BF7-B9332F066223}"/>
+              </a:ext>
+            </a:extLst>
+          </p:cNvPr>
+          <p:cNvSpPr/>
+          <p:nvPr/>
+        </p:nvSpPr>
+        <p:spPr>
+          <a:xfrm>
+            <a:off x="243603" y="5730875"/>
+            <a:ext cx="4603061" cy="999264"/>
+          </a:xfrm>
+          <a:prstGeom prst="rect">
+            <a:avLst/>
+          </a:prstGeom>
+          <a:noFill/>
+          <a:ln>
+            <a:solidFill>
+              <a:schemeClr val="bg1">
+                <a:lumMod val="85000"/>
+              </a:schemeClr>
+            </a:solidFill>
+          </a:ln>
+        </p:spPr>
+        <p:style>
+          <a:lnRef idx="2">
+            <a:schemeClr val="accent1">
+              <a:shade val="15000"/>
+            </a:schemeClr>
+          </a:lnRef>
+          <a:fillRef idx="1">
+            <a:schemeClr val="accent1"/>
+          </a:fillRef>
+          <a:effectRef idx="0">
+            <a:schemeClr val="accent1"/>
+          </a:effectRef>
+          <a:fontRef idx="minor">
+            <a:schemeClr val="lt1"/>
+          </a:fontRef>
+        </p:style>
+        <p:txBody>
+          <a:bodyPr rtlCol="0" anchor="ctr"/>
+          <a:lstStyle/>
+          <a:p>
+            <a:pPr algn="ctr"/>
+            <a:endParaRPr lang="de-DE"/>
+          </a:p>
+        </p:txBody>
+      </p:sp>
+      <p:grpSp>
+        <p:nvGrpSpPr>
+          <p:cNvPr id="17" name="Gruppieren 16">
+            <a:extLst>
+              <a:ext uri="{FF2B5EF4-FFF2-40B4-BE49-F238E27FC236}">
+                <a16:creationId xmlns:a16="http://schemas.microsoft.com/office/drawing/2014/main" id="{A8F6590F-D0D3-C8CF-DA7E-CF6D94FE78DB}"/>
+              </a:ext>
+            </a:extLst>
+          </p:cNvPr>
+          <p:cNvGrpSpPr/>
+          <p:nvPr/>
+        </p:nvGrpSpPr>
+        <p:grpSpPr>
+          <a:xfrm>
+            <a:off x="6911252" y="2511762"/>
+            <a:ext cx="1552397" cy="469922"/>
+            <a:chOff x="2719572" y="1536945"/>
+            <a:chExt cx="1289076" cy="305400"/>
+          </a:xfrm>
+        </p:grpSpPr>
+        <p:cxnSp>
+          <p:nvCxnSpPr>
+            <p:cNvPr id="20" name="Gerade Verbindung mit Pfeil 19">
+              <a:extLst>
+                <a:ext uri="{FF2B5EF4-FFF2-40B4-BE49-F238E27FC236}">
+                  <a16:creationId xmlns:a16="http://schemas.microsoft.com/office/drawing/2014/main" id="{90AAC1B5-81A6-8756-6A74-272E6E3E8F2D}"/>
+                </a:ext>
+              </a:extLst>
+            </p:cNvPr>
+            <p:cNvCxnSpPr>
+              <a:cxnSpLocks/>
+            </p:cNvCxnSpPr>
+            <p:nvPr/>
+          </p:nvCxnSpPr>
+          <p:spPr>
+            <a:xfrm flipH="1">
+              <a:off x="2719572" y="1536945"/>
+              <a:ext cx="639486" cy="305400"/>
+            </a:xfrm>
+            <a:prstGeom prst="straightConnector1">
+              <a:avLst/>
+            </a:prstGeom>
+            <a:ln>
+              <a:tailEnd type="triangle"/>
+            </a:ln>
+          </p:spPr>
+          <p:style>
+            <a:lnRef idx="1">
+              <a:schemeClr val="accent1"/>
+            </a:lnRef>
+            <a:fillRef idx="0">
+              <a:schemeClr val="accent1"/>
+            </a:fillRef>
+            <a:effectRef idx="0">
+              <a:schemeClr val="accent1"/>
+            </a:effectRef>
+            <a:fontRef idx="minor">
+              <a:schemeClr val="tx1"/>
+            </a:fontRef>
+          </p:style>
+        </p:cxnSp>
+        <p:cxnSp>
+          <p:nvCxnSpPr>
+            <p:cNvPr id="21" name="Gerade Verbindung mit Pfeil 20">
+              <a:extLst>
+                <a:ext uri="{FF2B5EF4-FFF2-40B4-BE49-F238E27FC236}">
+                  <a16:creationId xmlns:a16="http://schemas.microsoft.com/office/drawing/2014/main" id="{5F189AB0-A0A6-23BC-E7AC-F37F653109ED}"/>
+                </a:ext>
+              </a:extLst>
+            </p:cNvPr>
+            <p:cNvCxnSpPr>
+              <a:cxnSpLocks/>
+            </p:cNvCxnSpPr>
+            <p:nvPr/>
+          </p:nvCxnSpPr>
+          <p:spPr>
+            <a:xfrm>
+              <a:off x="3359058" y="1536945"/>
+              <a:ext cx="649590" cy="305400"/>
+            </a:xfrm>
+            <a:prstGeom prst="straightConnector1">
+              <a:avLst/>
+            </a:prstGeom>
+            <a:ln>
+              <a:tailEnd type="triangle"/>
+            </a:ln>
+          </p:spPr>
+          <p:style>
+            <a:lnRef idx="1">
+              <a:schemeClr val="accent1"/>
+            </a:lnRef>
+            <a:fillRef idx="0">
+              <a:schemeClr val="accent1"/>
+            </a:fillRef>
+            <a:effectRef idx="0">
+              <a:schemeClr val="accent1"/>
+            </a:effectRef>
+            <a:fontRef idx="minor">
+              <a:schemeClr val="tx1"/>
+            </a:fontRef>
+          </p:style>
+        </p:cxnSp>
+      </p:grpSp>
+    </p:spTree>
+    <p:extLst>
+      <p:ext uri="{BB962C8B-B14F-4D97-AF65-F5344CB8AC3E}">
+        <p14:creationId xmlns:p14="http://schemas.microsoft.com/office/powerpoint/2010/main" val="348234868"/>
+      </p:ext>
+    </p:extLst>
+  </p:cSld>
+  <p:clrMapOvr>
+    <a:masterClrMapping/>
+  </p:clrMapOvr>
+</p:sld>
+</file>
+
 <file path=ppt/theme/theme1.xml><?xml version="1.0" encoding="utf-8"?>
 <a:theme xmlns:a="http://schemas.openxmlformats.org/drawingml/2006/main" name="Office">
   <a:themeElements>

</xml_diff>